<commit_message>
update uml class diagrams for storage, model
</commit_message>
<xml_diff>
--- a/docs/diagrams/ModelComponentClassBetterOopDiagram.pptx
+++ b/docs/diagrams/ModelComponentClassBetterOopDiagram.pptx
@@ -126,6 +126,483 @@
 </p:presentation>
 </file>
 
+<file path=ppt/changesInfos/changesInfo1.xml><?xml version="1.0" encoding="utf-8"?>
+<pc:chgInfo xmlns:a="http://schemas.openxmlformats.org/drawingml/2006/main" xmlns:r="http://schemas.openxmlformats.org/officeDocument/2006/relationships" xmlns:ac="http://schemas.microsoft.com/office/drawing/2013/main/command" xmlns:pc="http://schemas.microsoft.com/office/powerpoint/2013/main/command">
+  <pc:docChgLst>
+    <pc:chgData name="Shengmin Leong" userId="075411cc4697ef0d" providerId="LiveId" clId="{B47E0FA8-705D-450E-B7A5-9E4D249F3A5D}"/>
+    <pc:docChg chg="custSel modSld">
+      <pc:chgData name="Shengmin Leong" userId="075411cc4697ef0d" providerId="LiveId" clId="{B47E0FA8-705D-450E-B7A5-9E4D249F3A5D}" dt="2018-10-14T07:44:00.420" v="18" actId="20577"/>
+      <pc:docMkLst>
+        <pc:docMk/>
+      </pc:docMkLst>
+      <pc:sldChg chg="addSp delSp modSp modNotesTx">
+        <pc:chgData name="Shengmin Leong" userId="075411cc4697ef0d" providerId="LiveId" clId="{B47E0FA8-705D-450E-B7A5-9E4D249F3A5D}" dt="2018-10-14T07:44:00.420" v="18" actId="20577"/>
+        <pc:sldMkLst>
+          <pc:docMk/>
+          <pc:sldMk cId="2396968029" sldId="263"/>
+        </pc:sldMkLst>
+        <pc:spChg chg="del">
+          <ac:chgData name="Shengmin Leong" userId="075411cc4697ef0d" providerId="LiveId" clId="{B47E0FA8-705D-450E-B7A5-9E4D249F3A5D}" dt="2018-10-14T07:28:33.185" v="0" actId="478"/>
+          <ac:spMkLst>
+            <pc:docMk/>
+            <pc:sldMk cId="2396968029" sldId="263"/>
+            <ac:spMk id="2" creationId="{00000000-0000-0000-0000-000000000000}"/>
+          </ac:spMkLst>
+        </pc:spChg>
+        <pc:spChg chg="del">
+          <ac:chgData name="Shengmin Leong" userId="075411cc4697ef0d" providerId="LiveId" clId="{B47E0FA8-705D-450E-B7A5-9E4D249F3A5D}" dt="2018-10-14T07:28:33.185" v="0" actId="478"/>
+          <ac:spMkLst>
+            <pc:docMk/>
+            <pc:sldMk cId="2396968029" sldId="263"/>
+            <ac:spMk id="9" creationId="{00000000-0000-0000-0000-000000000000}"/>
+          </ac:spMkLst>
+        </pc:spChg>
+        <pc:spChg chg="del">
+          <ac:chgData name="Shengmin Leong" userId="075411cc4697ef0d" providerId="LiveId" clId="{B47E0FA8-705D-450E-B7A5-9E4D249F3A5D}" dt="2018-10-14T07:28:33.185" v="0" actId="478"/>
+          <ac:spMkLst>
+            <pc:docMk/>
+            <pc:sldMk cId="2396968029" sldId="263"/>
+            <ac:spMk id="42" creationId="{00000000-0000-0000-0000-000000000000}"/>
+          </ac:spMkLst>
+        </pc:spChg>
+        <pc:spChg chg="del">
+          <ac:chgData name="Shengmin Leong" userId="075411cc4697ef0d" providerId="LiveId" clId="{B47E0FA8-705D-450E-B7A5-9E4D249F3A5D}" dt="2018-10-14T07:28:33.185" v="0" actId="478"/>
+          <ac:spMkLst>
+            <pc:docMk/>
+            <pc:sldMk cId="2396968029" sldId="263"/>
+            <ac:spMk id="46" creationId="{00000000-0000-0000-0000-000000000000}"/>
+          </ac:spMkLst>
+        </pc:spChg>
+        <pc:spChg chg="del">
+          <ac:chgData name="Shengmin Leong" userId="075411cc4697ef0d" providerId="LiveId" clId="{B47E0FA8-705D-450E-B7A5-9E4D249F3A5D}" dt="2018-10-14T07:28:33.185" v="0" actId="478"/>
+          <ac:spMkLst>
+            <pc:docMk/>
+            <pc:sldMk cId="2396968029" sldId="263"/>
+            <ac:spMk id="48" creationId="{00000000-0000-0000-0000-000000000000}"/>
+          </ac:spMkLst>
+        </pc:spChg>
+        <pc:spChg chg="del">
+          <ac:chgData name="Shengmin Leong" userId="075411cc4697ef0d" providerId="LiveId" clId="{B47E0FA8-705D-450E-B7A5-9E4D249F3A5D}" dt="2018-10-14T07:28:33.185" v="0" actId="478"/>
+          <ac:spMkLst>
+            <pc:docMk/>
+            <pc:sldMk cId="2396968029" sldId="263"/>
+            <ac:spMk id="49" creationId="{00000000-0000-0000-0000-000000000000}"/>
+          </ac:spMkLst>
+        </pc:spChg>
+        <pc:spChg chg="del">
+          <ac:chgData name="Shengmin Leong" userId="075411cc4697ef0d" providerId="LiveId" clId="{B47E0FA8-705D-450E-B7A5-9E4D249F3A5D}" dt="2018-10-14T07:28:33.185" v="0" actId="478"/>
+          <ac:spMkLst>
+            <pc:docMk/>
+            <pc:sldMk cId="2396968029" sldId="263"/>
+            <ac:spMk id="50" creationId="{B3FA9D57-880F-49C4-AD0B-A64E30D6F403}"/>
+          </ac:spMkLst>
+        </pc:spChg>
+        <pc:spChg chg="del">
+          <ac:chgData name="Shengmin Leong" userId="075411cc4697ef0d" providerId="LiveId" clId="{B47E0FA8-705D-450E-B7A5-9E4D249F3A5D}" dt="2018-10-14T07:28:33.185" v="0" actId="478"/>
+          <ac:spMkLst>
+            <pc:docMk/>
+            <pc:sldMk cId="2396968029" sldId="263"/>
+            <ac:spMk id="51" creationId="{00000000-0000-0000-0000-000000000000}"/>
+          </ac:spMkLst>
+        </pc:spChg>
+        <pc:spChg chg="del">
+          <ac:chgData name="Shengmin Leong" userId="075411cc4697ef0d" providerId="LiveId" clId="{B47E0FA8-705D-450E-B7A5-9E4D249F3A5D}" dt="2018-10-14T07:28:33.185" v="0" actId="478"/>
+          <ac:spMkLst>
+            <pc:docMk/>
+            <pc:sldMk cId="2396968029" sldId="263"/>
+            <ac:spMk id="52" creationId="{ABDCDBD2-131A-4B66-A2F2-43BBEE82C773}"/>
+          </ac:spMkLst>
+        </pc:spChg>
+        <pc:spChg chg="del">
+          <ac:chgData name="Shengmin Leong" userId="075411cc4697ef0d" providerId="LiveId" clId="{B47E0FA8-705D-450E-B7A5-9E4D249F3A5D}" dt="2018-10-14T07:28:33.185" v="0" actId="478"/>
+          <ac:spMkLst>
+            <pc:docMk/>
+            <pc:sldMk cId="2396968029" sldId="263"/>
+            <ac:spMk id="54" creationId="{00000000-0000-0000-0000-000000000000}"/>
+          </ac:spMkLst>
+        </pc:spChg>
+        <pc:spChg chg="del">
+          <ac:chgData name="Shengmin Leong" userId="075411cc4697ef0d" providerId="LiveId" clId="{B47E0FA8-705D-450E-B7A5-9E4D249F3A5D}" dt="2018-10-14T07:28:33.185" v="0" actId="478"/>
+          <ac:spMkLst>
+            <pc:docMk/>
+            <pc:sldMk cId="2396968029" sldId="263"/>
+            <ac:spMk id="55" creationId="{B9F96195-942D-4692-91B7-CF34229E7461}"/>
+          </ac:spMkLst>
+        </pc:spChg>
+        <pc:spChg chg="del">
+          <ac:chgData name="Shengmin Leong" userId="075411cc4697ef0d" providerId="LiveId" clId="{B47E0FA8-705D-450E-B7A5-9E4D249F3A5D}" dt="2018-10-14T07:28:33.185" v="0" actId="478"/>
+          <ac:spMkLst>
+            <pc:docMk/>
+            <pc:sldMk cId="2396968029" sldId="263"/>
+            <ac:spMk id="61" creationId="{00000000-0000-0000-0000-000000000000}"/>
+          </ac:spMkLst>
+        </pc:spChg>
+        <pc:spChg chg="del">
+          <ac:chgData name="Shengmin Leong" userId="075411cc4697ef0d" providerId="LiveId" clId="{B47E0FA8-705D-450E-B7A5-9E4D249F3A5D}" dt="2018-10-14T07:28:33.185" v="0" actId="478"/>
+          <ac:spMkLst>
+            <pc:docMk/>
+            <pc:sldMk cId="2396968029" sldId="263"/>
+            <ac:spMk id="62" creationId="{00000000-0000-0000-0000-000000000000}"/>
+          </ac:spMkLst>
+        </pc:spChg>
+        <pc:spChg chg="del">
+          <ac:chgData name="Shengmin Leong" userId="075411cc4697ef0d" providerId="LiveId" clId="{B47E0FA8-705D-450E-B7A5-9E4D249F3A5D}" dt="2018-10-14T07:28:33.185" v="0" actId="478"/>
+          <ac:spMkLst>
+            <pc:docMk/>
+            <pc:sldMk cId="2396968029" sldId="263"/>
+            <ac:spMk id="63" creationId="{00000000-0000-0000-0000-000000000000}"/>
+          </ac:spMkLst>
+        </pc:spChg>
+        <pc:spChg chg="del">
+          <ac:chgData name="Shengmin Leong" userId="075411cc4697ef0d" providerId="LiveId" clId="{B47E0FA8-705D-450E-B7A5-9E4D249F3A5D}" dt="2018-10-14T07:28:33.185" v="0" actId="478"/>
+          <ac:spMkLst>
+            <pc:docMk/>
+            <pc:sldMk cId="2396968029" sldId="263"/>
+            <ac:spMk id="65" creationId="{00000000-0000-0000-0000-000000000000}"/>
+          </ac:spMkLst>
+        </pc:spChg>
+        <pc:spChg chg="del">
+          <ac:chgData name="Shengmin Leong" userId="075411cc4697ef0d" providerId="LiveId" clId="{B47E0FA8-705D-450E-B7A5-9E4D249F3A5D}" dt="2018-10-14T07:28:33.185" v="0" actId="478"/>
+          <ac:spMkLst>
+            <pc:docMk/>
+            <pc:sldMk cId="2396968029" sldId="263"/>
+            <ac:spMk id="66" creationId="{00000000-0000-0000-0000-000000000000}"/>
+          </ac:spMkLst>
+        </pc:spChg>
+        <pc:spChg chg="del">
+          <ac:chgData name="Shengmin Leong" userId="075411cc4697ef0d" providerId="LiveId" clId="{B47E0FA8-705D-450E-B7A5-9E4D249F3A5D}" dt="2018-10-14T07:28:33.185" v="0" actId="478"/>
+          <ac:spMkLst>
+            <pc:docMk/>
+            <pc:sldMk cId="2396968029" sldId="263"/>
+            <ac:spMk id="67" creationId="{36D68104-33BB-4C8F-B764-F3F0B25E592B}"/>
+          </ac:spMkLst>
+        </pc:spChg>
+        <pc:spChg chg="del">
+          <ac:chgData name="Shengmin Leong" userId="075411cc4697ef0d" providerId="LiveId" clId="{B47E0FA8-705D-450E-B7A5-9E4D249F3A5D}" dt="2018-10-14T07:28:33.185" v="0" actId="478"/>
+          <ac:spMkLst>
+            <pc:docMk/>
+            <pc:sldMk cId="2396968029" sldId="263"/>
+            <ac:spMk id="68" creationId="{18A2ABF0-4DA8-43EE-BACE-A737C4E4CFEC}"/>
+          </ac:spMkLst>
+        </pc:spChg>
+        <pc:spChg chg="del">
+          <ac:chgData name="Shengmin Leong" userId="075411cc4697ef0d" providerId="LiveId" clId="{B47E0FA8-705D-450E-B7A5-9E4D249F3A5D}" dt="2018-10-14T07:28:33.185" v="0" actId="478"/>
+          <ac:spMkLst>
+            <pc:docMk/>
+            <pc:sldMk cId="2396968029" sldId="263"/>
+            <ac:spMk id="69" creationId="{8CF9406A-39C7-4163-8880-BB65541FC08E}"/>
+          </ac:spMkLst>
+        </pc:spChg>
+        <pc:spChg chg="del">
+          <ac:chgData name="Shengmin Leong" userId="075411cc4697ef0d" providerId="LiveId" clId="{B47E0FA8-705D-450E-B7A5-9E4D249F3A5D}" dt="2018-10-14T07:28:33.185" v="0" actId="478"/>
+          <ac:spMkLst>
+            <pc:docMk/>
+            <pc:sldMk cId="2396968029" sldId="263"/>
+            <ac:spMk id="70" creationId="{00000000-0000-0000-0000-000000000000}"/>
+          </ac:spMkLst>
+        </pc:spChg>
+        <pc:spChg chg="del">
+          <ac:chgData name="Shengmin Leong" userId="075411cc4697ef0d" providerId="LiveId" clId="{B47E0FA8-705D-450E-B7A5-9E4D249F3A5D}" dt="2018-10-14T07:28:33.185" v="0" actId="478"/>
+          <ac:spMkLst>
+            <pc:docMk/>
+            <pc:sldMk cId="2396968029" sldId="263"/>
+            <ac:spMk id="71" creationId="{233007D4-EEA2-4CA6-ACFE-1517B654224E}"/>
+          </ac:spMkLst>
+        </pc:spChg>
+        <pc:spChg chg="del">
+          <ac:chgData name="Shengmin Leong" userId="075411cc4697ef0d" providerId="LiveId" clId="{B47E0FA8-705D-450E-B7A5-9E4D249F3A5D}" dt="2018-10-14T07:28:33.185" v="0" actId="478"/>
+          <ac:spMkLst>
+            <pc:docMk/>
+            <pc:sldMk cId="2396968029" sldId="263"/>
+            <ac:spMk id="76" creationId="{00000000-0000-0000-0000-000000000000}"/>
+          </ac:spMkLst>
+        </pc:spChg>
+        <pc:spChg chg="del">
+          <ac:chgData name="Shengmin Leong" userId="075411cc4697ef0d" providerId="LiveId" clId="{B47E0FA8-705D-450E-B7A5-9E4D249F3A5D}" dt="2018-10-14T07:28:33.185" v="0" actId="478"/>
+          <ac:spMkLst>
+            <pc:docMk/>
+            <pc:sldMk cId="2396968029" sldId="263"/>
+            <ac:spMk id="78" creationId="{00000000-0000-0000-0000-000000000000}"/>
+          </ac:spMkLst>
+        </pc:spChg>
+        <pc:spChg chg="del">
+          <ac:chgData name="Shengmin Leong" userId="075411cc4697ef0d" providerId="LiveId" clId="{B47E0FA8-705D-450E-B7A5-9E4D249F3A5D}" dt="2018-10-14T07:28:33.185" v="0" actId="478"/>
+          <ac:spMkLst>
+            <pc:docMk/>
+            <pc:sldMk cId="2396968029" sldId="263"/>
+            <ac:spMk id="80" creationId="{00000000-0000-0000-0000-000000000000}"/>
+          </ac:spMkLst>
+        </pc:spChg>
+        <pc:spChg chg="del">
+          <ac:chgData name="Shengmin Leong" userId="075411cc4697ef0d" providerId="LiveId" clId="{B47E0FA8-705D-450E-B7A5-9E4D249F3A5D}" dt="2018-10-14T07:28:33.185" v="0" actId="478"/>
+          <ac:spMkLst>
+            <pc:docMk/>
+            <pc:sldMk cId="2396968029" sldId="263"/>
+            <ac:spMk id="83" creationId="{00000000-0000-0000-0000-000000000000}"/>
+          </ac:spMkLst>
+        </pc:spChg>
+        <pc:spChg chg="del">
+          <ac:chgData name="Shengmin Leong" userId="075411cc4697ef0d" providerId="LiveId" clId="{B47E0FA8-705D-450E-B7A5-9E4D249F3A5D}" dt="2018-10-14T07:28:33.185" v="0" actId="478"/>
+          <ac:spMkLst>
+            <pc:docMk/>
+            <pc:sldMk cId="2396968029" sldId="263"/>
+            <ac:spMk id="85" creationId="{00000000-0000-0000-0000-000000000000}"/>
+          </ac:spMkLst>
+        </pc:spChg>
+        <pc:spChg chg="del">
+          <ac:chgData name="Shengmin Leong" userId="075411cc4697ef0d" providerId="LiveId" clId="{B47E0FA8-705D-450E-B7A5-9E4D249F3A5D}" dt="2018-10-14T07:28:33.185" v="0" actId="478"/>
+          <ac:spMkLst>
+            <pc:docMk/>
+            <pc:sldMk cId="2396968029" sldId="263"/>
+            <ac:spMk id="91" creationId="{00000000-0000-0000-0000-000000000000}"/>
+          </ac:spMkLst>
+        </pc:spChg>
+        <pc:spChg chg="del">
+          <ac:chgData name="Shengmin Leong" userId="075411cc4697ef0d" providerId="LiveId" clId="{B47E0FA8-705D-450E-B7A5-9E4D249F3A5D}" dt="2018-10-14T07:28:33.185" v="0" actId="478"/>
+          <ac:spMkLst>
+            <pc:docMk/>
+            <pc:sldMk cId="2396968029" sldId="263"/>
+            <ac:spMk id="92" creationId="{00000000-0000-0000-0000-000000000000}"/>
+          </ac:spMkLst>
+        </pc:spChg>
+        <pc:spChg chg="del">
+          <ac:chgData name="Shengmin Leong" userId="075411cc4697ef0d" providerId="LiveId" clId="{B47E0FA8-705D-450E-B7A5-9E4D249F3A5D}" dt="2018-10-14T07:28:33.185" v="0" actId="478"/>
+          <ac:spMkLst>
+            <pc:docMk/>
+            <pc:sldMk cId="2396968029" sldId="263"/>
+            <ac:spMk id="93" creationId="{00000000-0000-0000-0000-000000000000}"/>
+          </ac:spMkLst>
+        </pc:spChg>
+        <pc:spChg chg="del">
+          <ac:chgData name="Shengmin Leong" userId="075411cc4697ef0d" providerId="LiveId" clId="{B47E0FA8-705D-450E-B7A5-9E4D249F3A5D}" dt="2018-10-14T07:28:33.185" v="0" actId="478"/>
+          <ac:spMkLst>
+            <pc:docMk/>
+            <pc:sldMk cId="2396968029" sldId="263"/>
+            <ac:spMk id="94" creationId="{00000000-0000-0000-0000-000000000000}"/>
+          </ac:spMkLst>
+        </pc:spChg>
+        <pc:spChg chg="del">
+          <ac:chgData name="Shengmin Leong" userId="075411cc4697ef0d" providerId="LiveId" clId="{B47E0FA8-705D-450E-B7A5-9E4D249F3A5D}" dt="2018-10-14T07:28:33.185" v="0" actId="478"/>
+          <ac:spMkLst>
+            <pc:docMk/>
+            <pc:sldMk cId="2396968029" sldId="263"/>
+            <ac:spMk id="114" creationId="{00000000-0000-0000-0000-000000000000}"/>
+          </ac:spMkLst>
+        </pc:spChg>
+        <pc:spChg chg="del">
+          <ac:chgData name="Shengmin Leong" userId="075411cc4697ef0d" providerId="LiveId" clId="{B47E0FA8-705D-450E-B7A5-9E4D249F3A5D}" dt="2018-10-14T07:28:33.185" v="0" actId="478"/>
+          <ac:spMkLst>
+            <pc:docMk/>
+            <pc:sldMk cId="2396968029" sldId="263"/>
+            <ac:spMk id="118" creationId="{00000000-0000-0000-0000-000000000000}"/>
+          </ac:spMkLst>
+        </pc:spChg>
+        <pc:spChg chg="del">
+          <ac:chgData name="Shengmin Leong" userId="075411cc4697ef0d" providerId="LiveId" clId="{B47E0FA8-705D-450E-B7A5-9E4D249F3A5D}" dt="2018-10-14T07:28:33.185" v="0" actId="478"/>
+          <ac:spMkLst>
+            <pc:docMk/>
+            <pc:sldMk cId="2396968029" sldId="263"/>
+            <ac:spMk id="119" creationId="{00000000-0000-0000-0000-000000000000}"/>
+          </ac:spMkLst>
+        </pc:spChg>
+        <pc:spChg chg="del">
+          <ac:chgData name="Shengmin Leong" userId="075411cc4697ef0d" providerId="LiveId" clId="{B47E0FA8-705D-450E-B7A5-9E4D249F3A5D}" dt="2018-10-14T07:28:33.185" v="0" actId="478"/>
+          <ac:spMkLst>
+            <pc:docMk/>
+            <pc:sldMk cId="2396968029" sldId="263"/>
+            <ac:spMk id="120" creationId="{00000000-0000-0000-0000-000000000000}"/>
+          </ac:spMkLst>
+        </pc:spChg>
+        <pc:spChg chg="del">
+          <ac:chgData name="Shengmin Leong" userId="075411cc4697ef0d" providerId="LiveId" clId="{B47E0FA8-705D-450E-B7A5-9E4D249F3A5D}" dt="2018-10-14T07:28:33.185" v="0" actId="478"/>
+          <ac:spMkLst>
+            <pc:docMk/>
+            <pc:sldMk cId="2396968029" sldId="263"/>
+            <ac:spMk id="122" creationId="{00000000-0000-0000-0000-000000000000}"/>
+          </ac:spMkLst>
+        </pc:spChg>
+        <pc:graphicFrameChg chg="add del mod">
+          <ac:chgData name="Shengmin Leong" userId="075411cc4697ef0d" providerId="LiveId" clId="{B47E0FA8-705D-450E-B7A5-9E4D249F3A5D}" dt="2018-10-14T07:41:47.160" v="6" actId="478"/>
+          <ac:graphicFrameMkLst>
+            <pc:docMk/>
+            <pc:sldMk cId="2396968029" sldId="263"/>
+            <ac:graphicFrameMk id="3" creationId="{C7D4C197-984F-4891-9CFB-0F09063E9078}"/>
+          </ac:graphicFrameMkLst>
+        </pc:graphicFrameChg>
+        <pc:graphicFrameChg chg="add del">
+          <ac:chgData name="Shengmin Leong" userId="075411cc4697ef0d" providerId="LiveId" clId="{B47E0FA8-705D-450E-B7A5-9E4D249F3A5D}" dt="2018-10-14T07:41:45.695" v="5" actId="478"/>
+          <ac:graphicFrameMkLst>
+            <pc:docMk/>
+            <pc:sldMk cId="2396968029" sldId="263"/>
+            <ac:graphicFrameMk id="4" creationId="{EF446414-F693-4EFA-BB3C-4D5F395969D5}"/>
+          </ac:graphicFrameMkLst>
+        </pc:graphicFrameChg>
+        <pc:graphicFrameChg chg="add del mod">
+          <ac:chgData name="Shengmin Leong" userId="075411cc4697ef0d" providerId="LiveId" clId="{B47E0FA8-705D-450E-B7A5-9E4D249F3A5D}" dt="2018-10-14T07:42:12.175" v="12" actId="478"/>
+          <ac:graphicFrameMkLst>
+            <pc:docMk/>
+            <pc:sldMk cId="2396968029" sldId="263"/>
+            <ac:graphicFrameMk id="7" creationId="{CBCC49C7-5877-41C1-AE37-B1D8F5396315}"/>
+          </ac:graphicFrameMkLst>
+        </pc:graphicFrameChg>
+        <pc:picChg chg="add del mod">
+          <ac:chgData name="Shengmin Leong" userId="075411cc4697ef0d" providerId="LiveId" clId="{B47E0FA8-705D-450E-B7A5-9E4D249F3A5D}" dt="2018-10-14T07:41:57.869" v="8" actId="478"/>
+          <ac:picMkLst>
+            <pc:docMk/>
+            <pc:sldMk cId="2396968029" sldId="263"/>
+            <ac:picMk id="6" creationId="{1F04E6A5-4F3D-4D7D-8427-3739ECFDB235}"/>
+          </ac:picMkLst>
+        </pc:picChg>
+        <pc:picChg chg="add mod">
+          <ac:chgData name="Shengmin Leong" userId="075411cc4697ef0d" providerId="LiveId" clId="{B47E0FA8-705D-450E-B7A5-9E4D249F3A5D}" dt="2018-10-14T07:42:59.888" v="16" actId="1076"/>
+          <ac:picMkLst>
+            <pc:docMk/>
+            <pc:sldMk cId="2396968029" sldId="263"/>
+            <ac:picMk id="10" creationId="{B254752A-BE3D-4520-A588-D36130F38AEE}"/>
+          </ac:picMkLst>
+        </pc:picChg>
+        <pc:cxnChg chg="del mod">
+          <ac:chgData name="Shengmin Leong" userId="075411cc4697ef0d" providerId="LiveId" clId="{B47E0FA8-705D-450E-B7A5-9E4D249F3A5D}" dt="2018-10-14T07:28:33.185" v="0" actId="478"/>
+          <ac:cxnSpMkLst>
+            <pc:docMk/>
+            <pc:sldMk cId="2396968029" sldId="263"/>
+            <ac:cxnSpMk id="21" creationId="{00000000-0000-0000-0000-000000000000}"/>
+          </ac:cxnSpMkLst>
+        </pc:cxnChg>
+        <pc:cxnChg chg="del mod">
+          <ac:chgData name="Shengmin Leong" userId="075411cc4697ef0d" providerId="LiveId" clId="{B47E0FA8-705D-450E-B7A5-9E4D249F3A5D}" dt="2018-10-14T07:28:33.185" v="0" actId="478"/>
+          <ac:cxnSpMkLst>
+            <pc:docMk/>
+            <pc:sldMk cId="2396968029" sldId="263"/>
+            <ac:cxnSpMk id="30" creationId="{00000000-0000-0000-0000-000000000000}"/>
+          </ac:cxnSpMkLst>
+        </pc:cxnChg>
+        <pc:cxnChg chg="del mod">
+          <ac:chgData name="Shengmin Leong" userId="075411cc4697ef0d" providerId="LiveId" clId="{B47E0FA8-705D-450E-B7A5-9E4D249F3A5D}" dt="2018-10-14T07:28:33.185" v="0" actId="478"/>
+          <ac:cxnSpMkLst>
+            <pc:docMk/>
+            <pc:sldMk cId="2396968029" sldId="263"/>
+            <ac:cxnSpMk id="47" creationId="{00000000-0000-0000-0000-000000000000}"/>
+          </ac:cxnSpMkLst>
+        </pc:cxnChg>
+        <pc:cxnChg chg="del mod">
+          <ac:chgData name="Shengmin Leong" userId="075411cc4697ef0d" providerId="LiveId" clId="{B47E0FA8-705D-450E-B7A5-9E4D249F3A5D}" dt="2018-10-14T07:28:33.185" v="0" actId="478"/>
+          <ac:cxnSpMkLst>
+            <pc:docMk/>
+            <pc:sldMk cId="2396968029" sldId="263"/>
+            <ac:cxnSpMk id="53" creationId="{B97967F8-618A-448B-81FD-CDFD4AF0EC64}"/>
+          </ac:cxnSpMkLst>
+        </pc:cxnChg>
+        <pc:cxnChg chg="del mod">
+          <ac:chgData name="Shengmin Leong" userId="075411cc4697ef0d" providerId="LiveId" clId="{B47E0FA8-705D-450E-B7A5-9E4D249F3A5D}" dt="2018-10-14T07:28:33.185" v="0" actId="478"/>
+          <ac:cxnSpMkLst>
+            <pc:docMk/>
+            <pc:sldMk cId="2396968029" sldId="263"/>
+            <ac:cxnSpMk id="58" creationId="{00000000-0000-0000-0000-000000000000}"/>
+          </ac:cxnSpMkLst>
+        </pc:cxnChg>
+        <pc:cxnChg chg="del mod">
+          <ac:chgData name="Shengmin Leong" userId="075411cc4697ef0d" providerId="LiveId" clId="{B47E0FA8-705D-450E-B7A5-9E4D249F3A5D}" dt="2018-10-14T07:28:33.185" v="0" actId="478"/>
+          <ac:cxnSpMkLst>
+            <pc:docMk/>
+            <pc:sldMk cId="2396968029" sldId="263"/>
+            <ac:cxnSpMk id="59" creationId="{E2D6A56C-A223-4236-A1F0-7EFEBA2FC940}"/>
+          </ac:cxnSpMkLst>
+        </pc:cxnChg>
+        <pc:cxnChg chg="del mod">
+          <ac:chgData name="Shengmin Leong" userId="075411cc4697ef0d" providerId="LiveId" clId="{B47E0FA8-705D-450E-B7A5-9E4D249F3A5D}" dt="2018-10-14T07:28:33.185" v="0" actId="478"/>
+          <ac:cxnSpMkLst>
+            <pc:docMk/>
+            <pc:sldMk cId="2396968029" sldId="263"/>
+            <ac:cxnSpMk id="64" creationId="{00000000-0000-0000-0000-000000000000}"/>
+          </ac:cxnSpMkLst>
+        </pc:cxnChg>
+        <pc:cxnChg chg="del mod">
+          <ac:chgData name="Shengmin Leong" userId="075411cc4697ef0d" providerId="LiveId" clId="{B47E0FA8-705D-450E-B7A5-9E4D249F3A5D}" dt="2018-10-14T07:28:33.185" v="0" actId="478"/>
+          <ac:cxnSpMkLst>
+            <pc:docMk/>
+            <pc:sldMk cId="2396968029" sldId="263"/>
+            <ac:cxnSpMk id="72" creationId="{D5DFB8C5-B0B0-46C1-967B-4449112ABD6F}"/>
+          </ac:cxnSpMkLst>
+        </pc:cxnChg>
+        <pc:cxnChg chg="del">
+          <ac:chgData name="Shengmin Leong" userId="075411cc4697ef0d" providerId="LiveId" clId="{B47E0FA8-705D-450E-B7A5-9E4D249F3A5D}" dt="2018-10-14T07:28:33.185" v="0" actId="478"/>
+          <ac:cxnSpMkLst>
+            <pc:docMk/>
+            <pc:sldMk cId="2396968029" sldId="263"/>
+            <ac:cxnSpMk id="75" creationId="{00000000-0000-0000-0000-000000000000}"/>
+          </ac:cxnSpMkLst>
+        </pc:cxnChg>
+        <pc:cxnChg chg="del">
+          <ac:chgData name="Shengmin Leong" userId="075411cc4697ef0d" providerId="LiveId" clId="{B47E0FA8-705D-450E-B7A5-9E4D249F3A5D}" dt="2018-10-14T07:28:33.185" v="0" actId="478"/>
+          <ac:cxnSpMkLst>
+            <pc:docMk/>
+            <pc:sldMk cId="2396968029" sldId="263"/>
+            <ac:cxnSpMk id="79" creationId="{00000000-0000-0000-0000-000000000000}"/>
+          </ac:cxnSpMkLst>
+        </pc:cxnChg>
+        <pc:cxnChg chg="del mod">
+          <ac:chgData name="Shengmin Leong" userId="075411cc4697ef0d" providerId="LiveId" clId="{B47E0FA8-705D-450E-B7A5-9E4D249F3A5D}" dt="2018-10-14T07:28:33.185" v="0" actId="478"/>
+          <ac:cxnSpMkLst>
+            <pc:docMk/>
+            <pc:sldMk cId="2396968029" sldId="263"/>
+            <ac:cxnSpMk id="81" creationId="{00000000-0000-0000-0000-000000000000}"/>
+          </ac:cxnSpMkLst>
+        </pc:cxnChg>
+        <pc:cxnChg chg="del mod">
+          <ac:chgData name="Shengmin Leong" userId="075411cc4697ef0d" providerId="LiveId" clId="{B47E0FA8-705D-450E-B7A5-9E4D249F3A5D}" dt="2018-10-14T07:28:33.185" v="0" actId="478"/>
+          <ac:cxnSpMkLst>
+            <pc:docMk/>
+            <pc:sldMk cId="2396968029" sldId="263"/>
+            <ac:cxnSpMk id="84" creationId="{00000000-0000-0000-0000-000000000000}"/>
+          </ac:cxnSpMkLst>
+        </pc:cxnChg>
+        <pc:cxnChg chg="del mod">
+          <ac:chgData name="Shengmin Leong" userId="075411cc4697ef0d" providerId="LiveId" clId="{B47E0FA8-705D-450E-B7A5-9E4D249F3A5D}" dt="2018-10-14T07:28:33.185" v="0" actId="478"/>
+          <ac:cxnSpMkLst>
+            <pc:docMk/>
+            <pc:sldMk cId="2396968029" sldId="263"/>
+            <ac:cxnSpMk id="86" creationId="{00000000-0000-0000-0000-000000000000}"/>
+          </ac:cxnSpMkLst>
+        </pc:cxnChg>
+        <pc:cxnChg chg="del mod">
+          <ac:chgData name="Shengmin Leong" userId="075411cc4697ef0d" providerId="LiveId" clId="{B47E0FA8-705D-450E-B7A5-9E4D249F3A5D}" dt="2018-10-14T07:28:33.185" v="0" actId="478"/>
+          <ac:cxnSpMkLst>
+            <pc:docMk/>
+            <pc:sldMk cId="2396968029" sldId="263"/>
+            <ac:cxnSpMk id="90" creationId="{00000000-0000-0000-0000-000000000000}"/>
+          </ac:cxnSpMkLst>
+        </pc:cxnChg>
+        <pc:cxnChg chg="del mod">
+          <ac:chgData name="Shengmin Leong" userId="075411cc4697ef0d" providerId="LiveId" clId="{B47E0FA8-705D-450E-B7A5-9E4D249F3A5D}" dt="2018-10-14T07:28:33.185" v="0" actId="478"/>
+          <ac:cxnSpMkLst>
+            <pc:docMk/>
+            <pc:sldMk cId="2396968029" sldId="263"/>
+            <ac:cxnSpMk id="95" creationId="{00000000-0000-0000-0000-000000000000}"/>
+          </ac:cxnSpMkLst>
+        </pc:cxnChg>
+        <pc:cxnChg chg="del">
+          <ac:chgData name="Shengmin Leong" userId="075411cc4697ef0d" providerId="LiveId" clId="{B47E0FA8-705D-450E-B7A5-9E4D249F3A5D}" dt="2018-10-14T07:28:33.185" v="0" actId="478"/>
+          <ac:cxnSpMkLst>
+            <pc:docMk/>
+            <pc:sldMk cId="2396968029" sldId="263"/>
+            <ac:cxnSpMk id="107" creationId="{00000000-0000-0000-0000-000000000000}"/>
+          </ac:cxnSpMkLst>
+        </pc:cxnChg>
+        <pc:cxnChg chg="del mod">
+          <ac:chgData name="Shengmin Leong" userId="075411cc4697ef0d" providerId="LiveId" clId="{B47E0FA8-705D-450E-B7A5-9E4D249F3A5D}" dt="2018-10-14T07:28:33.185" v="0" actId="478"/>
+          <ac:cxnSpMkLst>
+            <pc:docMk/>
+            <pc:sldMk cId="2396968029" sldId="263"/>
+            <ac:cxnSpMk id="124" creationId="{00000000-0000-0000-0000-000000000000}"/>
+          </ac:cxnSpMkLst>
+        </pc:cxnChg>
+      </pc:sldChg>
+    </pc:docChg>
+  </pc:docChgLst>
+</pc:chgInfo>
+</file>
+
 <file path=ppt/notesMasters/notesMaster1.xml><?xml version="1.0" encoding="utf-8"?>
 <p:notesMaster xmlns:a="http://schemas.openxmlformats.org/drawingml/2006/main" xmlns:r="http://schemas.openxmlformats.org/officeDocument/2006/relationships" xmlns:p="http://schemas.openxmlformats.org/presentationml/2006/main">
   <p:cSld>
@@ -208,7 +685,7 @@
           <a:p>
             <a:fld id="{F5CC4B3F-88C1-4FFA-B1B6-F41C21DC6924}" type="datetimeFigureOut">
               <a:rPr lang="en-US" smtClean="0"/>
-              <a:t>6/27/2018</a:t>
+              <a:t>10/14/2018</a:t>
             </a:fld>
             <a:endParaRPr lang="en-US"/>
           </a:p>
@@ -475,6 +952,96 @@
 </p:notesMaster>
 </file>
 
+<file path=ppt/notesSlides/notesSlide1.xml><?xml version="1.0" encoding="utf-8"?>
+<p:notes xmlns:a="http://schemas.openxmlformats.org/drawingml/2006/main" xmlns:r="http://schemas.openxmlformats.org/officeDocument/2006/relationships" xmlns:p="http://schemas.openxmlformats.org/presentationml/2006/main">
+  <p:cSld>
+    <p:spTree>
+      <p:nvGrpSpPr>
+        <p:cNvPr id="1" name=""/>
+        <p:cNvGrpSpPr/>
+        <p:nvPr/>
+      </p:nvGrpSpPr>
+      <p:grpSpPr>
+        <a:xfrm>
+          <a:off x="0" y="0"/>
+          <a:ext cx="0" cy="0"/>
+          <a:chOff x="0" y="0"/>
+          <a:chExt cx="0" cy="0"/>
+        </a:xfrm>
+      </p:grpSpPr>
+      <p:sp>
+        <p:nvSpPr>
+          <p:cNvPr id="2" name="Slide Image Placeholder 1"/>
+          <p:cNvSpPr>
+            <a:spLocks noGrp="1" noRot="1" noChangeAspect="1"/>
+          </p:cNvSpPr>
+          <p:nvPr>
+            <p:ph type="sldImg"/>
+          </p:nvPr>
+        </p:nvSpPr>
+        <p:spPr/>
+      </p:sp>
+      <p:sp>
+        <p:nvSpPr>
+          <p:cNvPr id="3" name="Notes Placeholder 2"/>
+          <p:cNvSpPr>
+            <a:spLocks noGrp="1"/>
+          </p:cNvSpPr>
+          <p:nvPr>
+            <p:ph type="body" idx="1"/>
+          </p:nvPr>
+        </p:nvSpPr>
+        <p:spPr/>
+        <p:txBody>
+          <a:bodyPr/>
+          <a:lstStyle/>
+          <a:p>
+            <a:r>
+              <a:rPr lang="en-US" dirty="0"/>
+              <a:t>https://www.draw.io/?lightbox=1&amp;highlight=0000ff&amp;edit=_blank&amp;layers=1&amp;nav=1&amp;title=ModelComponentClassDiagram.xml#R7V1bk5s2FP41fulMdgAhgR%2FXzqZ9SNtMN2nSR2y0NglGW2Bv%2FfUVRgJ0wYttCXs9yUNmOYjb%2Bc79SPIEzDfPv%2BbR%2Ffp3EuN04jnx8wS8n3heECL6f0V4qQk%2BgjVhlSdxTXJbwm3yH2ZEh1EfkhgXwsCSkLRM7kXikmQZXpYCLcpz8iQOuyOp%2BNT7aIUVwu0ySlXq1yQu1zU1hE5L%2Fw0nqzV%2FsuuwM4to%2BWOVk4eMPW%2Figbvtv%2Fr0JuL3YuOLdRSTpw4J3EzAPCekrP%2FaPM9xWrGWs62%2B7kPP2ea9c5yVQy4A9QWPUfqA%2BRtv36t84bzYfg2uxrsTMHtaJyW%2BvY%2BW1dknCj6lrctNyk7fJWk6JynJt9eCeTi7mdNnz4oyJz8wP5ORjF4%2BI%2FQ2SVmJSOjQQ%2FXd2ec84rzEzx0S%2B5ZfMdngMn%2BhQ%2FhZzlcmdwCx46cWRRQy2rqDIACMGDHJWTX3brlH%2F2AM1DPT1zATpfQJswX9Y1Vuv7Em3BH6jZX8clahfx9IPQD4N44znXdJ9bVMy%2Bob0Hep7yHel5I7z5KQpEwsRbi0sHQxZKQoTVYZPVxSaDClzypIEqov1%2BzEJonj6jFa%2BWglyLGDui%2BhHqio%2BxrQPQOYByrmc29yPUsqRt1VbKCHswafRS4jFiePMqlB8C8cxX9m6cvXpFjPCPmhR7mhCbeSsO%2FX0fez984NsITEVEXCBTr9MwAFcFUsZDbgmNp5dkjyck1WJIvSm5YqCWuHbXFUrBszWJRRXl5XnoYSFilZ%2FuDED0n1gtuLcRbzIUyPKKVz%2Fjsuyxfm%2FKKHklTK0bzTR0Lu2cMoHvnLt%2BqiK8gP%2F2H36AWtIA%2F5kn11yFxolK8wH8VoFUN2IpvjNCqTR9Ex6mDaXkq%2FN3rpDLgnVBGKzp0%2FVYRWYBpV5YEChKK%2FksdP4a7x9I%2F6DVqBaT5lkAyFvSa8o1wadTy96gH3ddWbWtK86QDFa3WBq4ugUKJm0COmF64naiF%2BTspvfBT9%2Bx9RLb51VaY9d6iWBAOVpGveeMixn%2BIokt6AxSXdheIt6ldnV%2B1SGUevYs2N6g9WbnSA9nAR7AjClwLvkgVyjzMVb0EyOuD3wngKgEKJraFzGD6yz1RuZBAfaNVDDvVnsuKrwtAxBYNU1%2BVJYtfD%2BWfh4VwEBHghdHeKgyfZcWn80R7O1URJ%2B0Wsi76EpD%2Fz6HeBMw%2BhDx%2B2UlVSFEiVTLybGksHRd77KFR8oi4b9GG%2FEAz1ia4mGzyQz38uCpw%2FRosUf0yK8kiGNzFHh%2BGm2I0k0dVk302lxDi%2FNZnYKNE%2FC%2B3l4H94cK8ERq0B3On0BAOINAZwqHMcbACHYqGthIyBRZxEG5LFn9dJtjsf07qawZDxGPTKp1LXxqH83CecJ5RnVaFkDxemQ3BqxYWpPkeOZabhoFim3xceEaQEdtP4IbprSlD2At42yAhKIAcSyD1x5r4BT2PNmwBGKkG%2F8l77juffYSxAQhr5U2oA29jn9yiLVjg%2Fug7QHwSJBdpJlcxV%2F8z4a0%2FODBG8gorH1hUNoIGigbbWMoaTYCq9Q%2BlFN2JT93WVOeP2oAcRsvhe9c48J40WOO0i0FRUQefJDL7TufAh2aJ1dIA3Ejr0kAHUU3O7HDfZ1relyh3NoZRqAT17WHylAZObtlMXweWiNthdBPelEsG%2B48HUrMec%2BiYlr42uYQCFKq8T7miGHJSkmcwIDpPK6dlKpe9JUhkGu6VMHg92x3G%2BnHSI44%2BP49T44m%2BcFzS6wnHbwdm%2FbmIg8AJA6WJpAq9mMoPQszZQKuHZnWF9VToyx6ijWgsx7t4t6Zkq6EDu5Fgr8E%2FVBozB6QiN%2Buwo%2FJ5RR1Q2SCDUlCN1OgYM6BgcMTwbp%2Bo1SKd4eNz1Z77xKtbgGSGeAsKXLPn3AVf2v66ln0Yy5d4u1Fh%2FXaHciPXX1TfGyLvPwuhrAy54KgF1HTuhs%2BCKA2F2hCZsPr%2BSqAYk4%2FOVBmOkzm4R4sjPeZQV0XJbtjuTcDLUmBNkyZy4vM1kO5rsqxJsxfvsRJjblPMQYdeoiecYuf0YuVeuYGbeOVe95Zs3gV0ATgee3Vk7o%2FpoITo4GAz3TOb2%2BNL8EvRayWP3%2BOMLcaqknImHQt6V1BWcerqShwNteSlz03Gut5yck80myuIqi8CZ0AM8alaOCWZDkdXI1%2BS9UMNo30RXb8hc4Lfb1euE0Z4SRw%2ByZ816tlO0%2FFS41DLFlwLnn3J8t4f0Nv1rq%2B1qOcyFrq5qGliKc4HdtFmQ5WUaFUWynOzsf%2FaJ8z4zcY%2BeMw98jTTbWVoyoA3WuBTDU1p8JD8J7Pbz8nhktuEG7E6dOEE%2FvrcFfIwggqHLN%2BxGiUiu%2F78iPa%2BMP1561FCorop%2BjlbnVBT1NGGLraIo1DRObGnU4EjFcqk%2BUDXGfKn%2BMI2Rp%2FhBwX7uO%2F54jVHnllNdOURPqjXbXIacXpiGKw2SS3%2BeLq2COq0xEOyjs2hyjT4vjGtJV3OQ8WbyYBAG7OHwEwTbINhd8fAThCEgBCOCcA516vPiPm86jdZj0KQKb0lPgpO1g%2FjuTD%2BRGojUySawsCmXP5EyvpSxJ5EIQzGcRsMWwik3CvgSyKYlb2exVeDqVzj3vpc8PjSbKYVWppa%2BXYF91bQYL1EN3qxMbdRUvUIFvnGKP0oeC9WV%2BtayWLVrehs94vh6Q%2BXyVNWwgF8ir9bstjqmdhgSjjCjx3ttyx5Dzb19uiGDtBhq1hGdboYrVDsBf0QbdcudkYTWl4QWqCVcW1rsq%2F25XxQ2qDsg5rhI%2Fqu21mAixRwuHQ1nE%2FieUiqJKdjmRJN2K8QU31W3kjdCLCtpmhXVHofZ6vNWtN75hmykvJsJUCt92iUjJrirVkBVI%2FGmuav07FzV4FrjrqrFl85dNJ7sQu%2FyLYMcLKh21xp31aLbhcmuJ%2B9RyXcoGYO7amx6YdwFrjSrBziaDpYt%2FiK173uziZJU4fGJAigIFFZYS4Mu30zyT%2BTc9cdT5EDlLpWjEuc4TnVzLk7HaBsb8SF5U0MHKZzXTtwzwXm1P3phJhTJVkOz0NWaXKsO6tKshi%2BlXZrFmta4q6Zdn%2FJkeS75PXTcEWebBGqW9BfeRPmpdnFQuOGhMbmh1m%2B%2F5OcSt%2FA93MZgRLNm5HINPABSW8obL3BxnYsvrPnSPniQm91R2Kua%2BKekWN%2FSIAxrZ%2BNeVmQIQslygGDgHoRGuO%2BqwaFzdXVh8o2Q1FzTxIe6H2Uxw2HVa1MOX5iB7v2xBvO%2FQEQP258Hqzv07U%2BwgZv%2FAQ%3D%3D </a:t>
+            </a:r>
+          </a:p>
+          <a:p>
+            <a:endParaRPr lang="en-US" dirty="0"/>
+          </a:p>
+        </p:txBody>
+      </p:sp>
+      <p:sp>
+        <p:nvSpPr>
+          <p:cNvPr id="4" name="Slide Number Placeholder 3"/>
+          <p:cNvSpPr>
+            <a:spLocks noGrp="1"/>
+          </p:cNvSpPr>
+          <p:nvPr>
+            <p:ph type="sldNum" sz="quarter" idx="5"/>
+          </p:nvPr>
+        </p:nvSpPr>
+        <p:spPr/>
+        <p:txBody>
+          <a:bodyPr/>
+          <a:lstStyle/>
+          <a:p>
+            <a:fld id="{5A7AB025-77E3-4BD1-A2FD-B3183DBA47A3}" type="slidenum">
+              <a:rPr lang="en-US" smtClean="0"/>
+              <a:t>1</a:t>
+            </a:fld>
+            <a:endParaRPr lang="en-US"/>
+          </a:p>
+        </p:txBody>
+      </p:sp>
+    </p:spTree>
+    <p:extLst>
+      <p:ext uri="{BB962C8B-B14F-4D97-AF65-F5344CB8AC3E}">
+        <p14:creationId xmlns:p14="http://schemas.microsoft.com/office/powerpoint/2010/main" val="1080312137"/>
+      </p:ext>
+    </p:extLst>
+  </p:cSld>
+  <p:clrMapOvr>
+    <a:masterClrMapping/>
+  </p:clrMapOvr>
+</p:notes>
+</file>
+
 <file path=ppt/slideLayouts/slideLayout1.xml><?xml version="1.0" encoding="utf-8"?>
 <p:sldLayout xmlns:a="http://schemas.openxmlformats.org/drawingml/2006/main" xmlns:r="http://schemas.openxmlformats.org/officeDocument/2006/relationships" xmlns:p="http://schemas.openxmlformats.org/presentationml/2006/main" type="title" preserve="1">
   <p:cSld name="Title Slide">
@@ -654,7 +1221,7 @@
           <a:p>
             <a:fld id="{78C97017-6FC3-485B-9764-EAC9E56C1D49}" type="datetimeFigureOut">
               <a:rPr lang="en-US" smtClean="0"/>
-              <a:t>6/27/2018</a:t>
+              <a:t>10/14/2018</a:t>
             </a:fld>
             <a:endParaRPr lang="en-US"/>
           </a:p>
@@ -822,7 +1389,7 @@
           <a:p>
             <a:fld id="{78C97017-6FC3-485B-9764-EAC9E56C1D49}" type="datetimeFigureOut">
               <a:rPr lang="en-US" smtClean="0"/>
-              <a:t>6/27/2018</a:t>
+              <a:t>10/14/2018</a:t>
             </a:fld>
             <a:endParaRPr lang="en-US"/>
           </a:p>
@@ -1000,7 +1567,7 @@
           <a:p>
             <a:fld id="{78C97017-6FC3-485B-9764-EAC9E56C1D49}" type="datetimeFigureOut">
               <a:rPr lang="en-US" smtClean="0"/>
-              <a:t>6/27/2018</a:t>
+              <a:t>10/14/2018</a:t>
             </a:fld>
             <a:endParaRPr lang="en-US"/>
           </a:p>
@@ -1168,7 +1735,7 @@
           <a:p>
             <a:fld id="{78C97017-6FC3-485B-9764-EAC9E56C1D49}" type="datetimeFigureOut">
               <a:rPr lang="en-US" smtClean="0"/>
-              <a:t>6/27/2018</a:t>
+              <a:t>10/14/2018</a:t>
             </a:fld>
             <a:endParaRPr lang="en-US"/>
           </a:p>
@@ -1413,7 +1980,7 @@
           <a:p>
             <a:fld id="{78C97017-6FC3-485B-9764-EAC9E56C1D49}" type="datetimeFigureOut">
               <a:rPr lang="en-US" smtClean="0"/>
-              <a:t>6/27/2018</a:t>
+              <a:t>10/14/2018</a:t>
             </a:fld>
             <a:endParaRPr lang="en-US"/>
           </a:p>
@@ -1698,7 +2265,7 @@
           <a:p>
             <a:fld id="{78C97017-6FC3-485B-9764-EAC9E56C1D49}" type="datetimeFigureOut">
               <a:rPr lang="en-US" smtClean="0"/>
-              <a:t>6/27/2018</a:t>
+              <a:t>10/14/2018</a:t>
             </a:fld>
             <a:endParaRPr lang="en-US"/>
           </a:p>
@@ -2117,7 +2684,7 @@
           <a:p>
             <a:fld id="{78C97017-6FC3-485B-9764-EAC9E56C1D49}" type="datetimeFigureOut">
               <a:rPr lang="en-US" smtClean="0"/>
-              <a:t>6/27/2018</a:t>
+              <a:t>10/14/2018</a:t>
             </a:fld>
             <a:endParaRPr lang="en-US"/>
           </a:p>
@@ -2234,7 +2801,7 @@
           <a:p>
             <a:fld id="{78C97017-6FC3-485B-9764-EAC9E56C1D49}" type="datetimeFigureOut">
               <a:rPr lang="en-US" smtClean="0"/>
-              <a:t>6/27/2018</a:t>
+              <a:t>10/14/2018</a:t>
             </a:fld>
             <a:endParaRPr lang="en-US"/>
           </a:p>
@@ -2329,7 +2896,7 @@
           <a:p>
             <a:fld id="{78C97017-6FC3-485B-9764-EAC9E56C1D49}" type="datetimeFigureOut">
               <a:rPr lang="en-US" smtClean="0"/>
-              <a:t>6/27/2018</a:t>
+              <a:t>10/14/2018</a:t>
             </a:fld>
             <a:endParaRPr lang="en-US"/>
           </a:p>
@@ -2604,7 +3171,7 @@
           <a:p>
             <a:fld id="{78C97017-6FC3-485B-9764-EAC9E56C1D49}" type="datetimeFigureOut">
               <a:rPr lang="en-US" smtClean="0"/>
-              <a:t>6/27/2018</a:t>
+              <a:t>10/14/2018</a:t>
             </a:fld>
             <a:endParaRPr lang="en-US"/>
           </a:p>
@@ -2856,7 +3423,7 @@
           <a:p>
             <a:fld id="{78C97017-6FC3-485B-9764-EAC9E56C1D49}" type="datetimeFigureOut">
               <a:rPr lang="en-US" smtClean="0"/>
-              <a:t>6/27/2018</a:t>
+              <a:t>10/14/2018</a:t>
             </a:fld>
             <a:endParaRPr lang="en-US"/>
           </a:p>
@@ -3067,7 +3634,7 @@
           <a:p>
             <a:fld id="{78C97017-6FC3-485B-9764-EAC9E56C1D49}" type="datetimeFigureOut">
               <a:rPr lang="en-US" smtClean="0"/>
-              <a:t>6/27/2018</a:t>
+              <a:t>10/14/2018</a:t>
             </a:fld>
             <a:endParaRPr lang="en-US"/>
           </a:p>
@@ -3442,2555 +4009,42 @@
           <a:chExt cx="0" cy="0"/>
         </a:xfrm>
       </p:grpSpPr>
-      <p:sp>
-        <p:nvSpPr>
-          <p:cNvPr id="118" name="Rectangle 65"/>
-          <p:cNvSpPr/>
+      <p:pic>
+        <p:nvPicPr>
+          <p:cNvPr id="10" name="Picture 9">
+            <a:extLst>
+              <a:ext uri="{FF2B5EF4-FFF2-40B4-BE49-F238E27FC236}">
+                <a16:creationId xmlns:a16="http://schemas.microsoft.com/office/drawing/2014/main" id="{B254752A-BE3D-4520-A588-D36130F38AEE}"/>
+              </a:ext>
+            </a:extLst>
+          </p:cNvPr>
+          <p:cNvPicPr>
+            <a:picLocks noChangeAspect="1"/>
+          </p:cNvPicPr>
           <p:nvPr/>
-        </p:nvSpPr>
+        </p:nvPicPr>
+        <p:blipFill>
+          <a:blip r:embed="rId3">
+            <a:extLst>
+              <a:ext uri="{28A0092B-C50C-407E-A947-70E740481C1C}">
+                <a14:useLocalDpi xmlns:a14="http://schemas.microsoft.com/office/drawing/2010/main" val="0"/>
+              </a:ext>
+            </a:extLst>
+          </a:blip>
+          <a:stretch>
+            <a:fillRect/>
+          </a:stretch>
+        </p:blipFill>
         <p:spPr>
           <a:xfrm>
-            <a:off x="1119865" y="1676400"/>
-            <a:ext cx="7490735" cy="3059747"/>
-          </a:xfrm>
-          <a:prstGeom prst="roundRect">
-            <a:avLst>
-              <a:gd name="adj" fmla="val 3484"/>
-            </a:avLst>
-          </a:prstGeom>
-          <a:solidFill>
-            <a:schemeClr val="accent4">
-              <a:lumMod val="20000"/>
-              <a:lumOff val="80000"/>
-            </a:schemeClr>
-          </a:solidFill>
-          <a:ln w="19050">
-            <a:noFill/>
-          </a:ln>
-          <a:effectLst/>
-        </p:spPr>
-        <p:style>
-          <a:lnRef idx="1">
-            <a:schemeClr val="accent2"/>
-          </a:lnRef>
-          <a:fillRef idx="2">
-            <a:schemeClr val="accent2"/>
-          </a:fillRef>
-          <a:effectRef idx="1">
-            <a:schemeClr val="accent2"/>
-          </a:effectRef>
-          <a:fontRef idx="minor">
-            <a:schemeClr val="dk1"/>
-          </a:fontRef>
-        </p:style>
-        <p:txBody>
-          <a:bodyPr rtlCol="0" anchor="t"/>
-          <a:lstStyle/>
-          <a:p>
-            <a:r>
-              <a:rPr lang="en-US" sz="1200" b="1" dirty="0">
-                <a:solidFill>
-                  <a:srgbClr val="7030A0"/>
-                </a:solidFill>
-              </a:rPr>
-              <a:t>Model</a:t>
-            </a:r>
-            <a:endParaRPr lang="en-SG" sz="1200" b="1" dirty="0">
-              <a:solidFill>
-                <a:srgbClr val="7030A0"/>
-              </a:solidFill>
-            </a:endParaRPr>
-          </a:p>
-        </p:txBody>
-      </p:sp>
-      <p:sp>
-        <p:nvSpPr>
-          <p:cNvPr id="2" name="Rectangle 8"/>
-          <p:cNvSpPr/>
-          <p:nvPr/>
-        </p:nvSpPr>
-        <p:spPr>
-          <a:xfrm>
-            <a:off x="2877180" y="3463240"/>
-            <a:ext cx="1093635" cy="346760"/>
+            <a:off x="381000" y="1219200"/>
+            <a:ext cx="7720055" cy="3481387"/>
           </a:xfrm>
           <a:prstGeom prst="rect">
             <a:avLst/>
           </a:prstGeom>
-          <a:solidFill>
-            <a:srgbClr val="7030A0"/>
-          </a:solidFill>
-          <a:ln w="19050">
-            <a:solidFill>
-              <a:srgbClr val="7030A0"/>
-            </a:solidFill>
-          </a:ln>
-          <a:effectLst/>
         </p:spPr>
-        <p:style>
-          <a:lnRef idx="1">
-            <a:schemeClr val="accent2"/>
-          </a:lnRef>
-          <a:fillRef idx="2">
-            <a:schemeClr val="accent2"/>
-          </a:fillRef>
-          <a:effectRef idx="1">
-            <a:schemeClr val="accent2"/>
-          </a:effectRef>
-          <a:fontRef idx="minor">
-            <a:schemeClr val="dk1"/>
-          </a:fontRef>
-        </p:style>
-        <p:txBody>
-          <a:bodyPr rtlCol="0" anchor="ctr"/>
-          <a:lstStyle/>
-          <a:p>
-            <a:pPr algn="ctr"/>
-            <a:r>
-              <a:rPr lang="en-US" sz="1050" dirty="0" err="1">
-                <a:solidFill>
-                  <a:schemeClr val="bg1"/>
-                </a:solidFill>
-              </a:rPr>
-              <a:t>UserPref</a:t>
-            </a:r>
-            <a:endParaRPr lang="en-SG" sz="1050" dirty="0">
-              <a:solidFill>
-                <a:schemeClr val="bg1"/>
-              </a:solidFill>
-            </a:endParaRPr>
-          </a:p>
-        </p:txBody>
-      </p:sp>
-      <p:sp>
-        <p:nvSpPr>
-          <p:cNvPr id="9" name="Rectangle 62"/>
-          <p:cNvSpPr/>
-          <p:nvPr/>
-        </p:nvSpPr>
-        <p:spPr>
-          <a:xfrm rot="16200000">
-            <a:off x="1661548" y="3097750"/>
-            <a:ext cx="1093635" cy="346760"/>
-          </a:xfrm>
-          <a:prstGeom prst="rect">
-            <a:avLst/>
-          </a:prstGeom>
-          <a:solidFill>
-            <a:srgbClr val="7030A0"/>
-          </a:solidFill>
-          <a:ln w="19050">
-            <a:solidFill>
-              <a:srgbClr val="7030A0"/>
-            </a:solidFill>
-          </a:ln>
-          <a:effectLst/>
-        </p:spPr>
-        <p:style>
-          <a:lnRef idx="1">
-            <a:schemeClr val="accent2"/>
-          </a:lnRef>
-          <a:fillRef idx="2">
-            <a:schemeClr val="accent2"/>
-          </a:fillRef>
-          <a:effectRef idx="1">
-            <a:schemeClr val="accent2"/>
-          </a:effectRef>
-          <a:fontRef idx="minor">
-            <a:schemeClr val="dk1"/>
-          </a:fontRef>
-        </p:style>
-        <p:txBody>
-          <a:bodyPr rtlCol="0" anchor="ctr"/>
-          <a:lstStyle/>
-          <a:p>
-            <a:pPr algn="ctr"/>
-            <a:r>
-              <a:rPr lang="en-US" sz="1050" dirty="0" err="1">
-                <a:solidFill>
-                  <a:schemeClr val="bg1"/>
-                </a:solidFill>
-              </a:rPr>
-              <a:t>ModelManager</a:t>
-            </a:r>
-            <a:endParaRPr lang="en-SG" sz="1050" dirty="0">
-              <a:solidFill>
-                <a:schemeClr val="bg1"/>
-              </a:solidFill>
-            </a:endParaRPr>
-          </a:p>
-        </p:txBody>
-      </p:sp>
-      <p:cxnSp>
-        <p:nvCxnSpPr>
-          <p:cNvPr id="107" name="Elbow Connector 106"/>
-          <p:cNvCxnSpPr>
-            <a:cxnSpLocks/>
-          </p:cNvCxnSpPr>
-          <p:nvPr/>
-        </p:nvCxnSpPr>
-        <p:spPr>
-          <a:xfrm rot="5400000" flipH="1" flipV="1">
-            <a:off x="4155901" y="1308943"/>
-            <a:ext cx="613122" cy="4459404"/>
-          </a:xfrm>
-          <a:prstGeom prst="bentConnector3">
-            <a:avLst>
-              <a:gd name="adj1" fmla="val -26668"/>
-            </a:avLst>
-          </a:prstGeom>
-          <a:ln w="19050">
-            <a:solidFill>
-              <a:srgbClr val="7030A0"/>
-            </a:solidFill>
-            <a:prstDash val="solid"/>
-            <a:headEnd type="none" w="med" len="med"/>
-            <a:tailEnd type="arrow" w="med" len="med"/>
-          </a:ln>
-          <a:effectLst/>
-        </p:spPr>
-        <p:style>
-          <a:lnRef idx="1">
-            <a:schemeClr val="accent2"/>
-          </a:lnRef>
-          <a:fillRef idx="2">
-            <a:schemeClr val="accent2"/>
-          </a:fillRef>
-          <a:effectRef idx="1">
-            <a:schemeClr val="accent2"/>
-          </a:effectRef>
-          <a:fontRef idx="minor">
-            <a:schemeClr val="dk1"/>
-          </a:fontRef>
-        </p:style>
-      </p:cxnSp>
-      <p:sp>
-        <p:nvSpPr>
-          <p:cNvPr id="119" name="Rectangle 62"/>
-          <p:cNvSpPr/>
-          <p:nvPr/>
-        </p:nvSpPr>
-        <p:spPr>
-          <a:xfrm rot="16200000">
-            <a:off x="956202" y="2861202"/>
-            <a:ext cx="1093635" cy="346760"/>
-          </a:xfrm>
-          <a:prstGeom prst="rect">
-            <a:avLst/>
-          </a:prstGeom>
-          <a:solidFill>
-            <a:srgbClr val="7030A0"/>
-          </a:solidFill>
-          <a:ln w="19050">
-            <a:solidFill>
-              <a:srgbClr val="7030A0"/>
-            </a:solidFill>
-          </a:ln>
-          <a:effectLst/>
-        </p:spPr>
-        <p:style>
-          <a:lnRef idx="1">
-            <a:schemeClr val="accent2"/>
-          </a:lnRef>
-          <a:fillRef idx="2">
-            <a:schemeClr val="accent2"/>
-          </a:fillRef>
-          <a:effectRef idx="1">
-            <a:schemeClr val="accent2"/>
-          </a:effectRef>
-          <a:fontRef idx="minor">
-            <a:schemeClr val="dk1"/>
-          </a:fontRef>
-        </p:style>
-        <p:txBody>
-          <a:bodyPr rtlCol="0" anchor="ctr"/>
-          <a:lstStyle/>
-          <a:p>
-            <a:pPr algn="ctr"/>
-            <a:r>
-              <a:rPr lang="en-US" sz="1050" dirty="0">
-                <a:solidFill>
-                  <a:schemeClr val="bg1"/>
-                </a:solidFill>
-              </a:rPr>
-              <a:t>&lt;&lt;interface&gt;&gt;</a:t>
-            </a:r>
-          </a:p>
-          <a:p>
-            <a:pPr algn="ctr"/>
-            <a:r>
-              <a:rPr lang="en-US" sz="1050" dirty="0">
-                <a:solidFill>
-                  <a:schemeClr val="bg1"/>
-                </a:solidFill>
-              </a:rPr>
-              <a:t>Model</a:t>
-            </a:r>
-            <a:endParaRPr lang="en-SG" sz="1050" dirty="0">
-              <a:solidFill>
-                <a:schemeClr val="bg1"/>
-              </a:solidFill>
-            </a:endParaRPr>
-          </a:p>
-        </p:txBody>
-      </p:sp>
-      <p:sp>
-        <p:nvSpPr>
-          <p:cNvPr id="120" name="Isosceles Triangle 102"/>
-          <p:cNvSpPr/>
-          <p:nvPr/>
-        </p:nvSpPr>
-        <p:spPr>
-          <a:xfrm rot="16200000">
-            <a:off x="1626910" y="2952291"/>
-            <a:ext cx="270504" cy="175523"/>
-          </a:xfrm>
-          <a:prstGeom prst="triangle">
-            <a:avLst/>
-          </a:prstGeom>
-          <a:solidFill>
-            <a:srgbClr val="7030A0"/>
-          </a:solidFill>
-          <a:ln w="19050">
-            <a:solidFill>
-              <a:srgbClr val="7030A0"/>
-            </a:solidFill>
-          </a:ln>
-          <a:effectLst/>
-        </p:spPr>
-        <p:style>
-          <a:lnRef idx="1">
-            <a:schemeClr val="accent6"/>
-          </a:lnRef>
-          <a:fillRef idx="2">
-            <a:schemeClr val="accent6"/>
-          </a:fillRef>
-          <a:effectRef idx="1">
-            <a:schemeClr val="accent6"/>
-          </a:effectRef>
-          <a:fontRef idx="minor">
-            <a:schemeClr val="dk1"/>
-          </a:fontRef>
-        </p:style>
-        <p:txBody>
-          <a:bodyPr rtlCol="0" anchor="ctr"/>
-          <a:lstStyle/>
-          <a:p>
-            <a:pPr algn="ctr"/>
-            <a:endParaRPr lang="en-SG" sz="1050"/>
-          </a:p>
-        </p:txBody>
-      </p:sp>
-      <p:cxnSp>
-        <p:nvCxnSpPr>
-          <p:cNvPr id="58" name="Straight Arrow Connector 57"/>
-          <p:cNvCxnSpPr>
-            <a:stCxn id="42" idx="3"/>
-            <a:endCxn id="2" idx="1"/>
-          </p:cNvCxnSpPr>
-          <p:nvPr/>
-        </p:nvCxnSpPr>
-        <p:spPr>
-          <a:xfrm>
-            <a:off x="2609828" y="3636620"/>
-            <a:ext cx="267352" cy="0"/>
-          </a:xfrm>
-          <a:prstGeom prst="straightConnector1">
-            <a:avLst/>
-          </a:prstGeom>
-          <a:ln w="19050">
-            <a:solidFill>
-              <a:srgbClr val="7030A0"/>
-            </a:solidFill>
-            <a:headEnd type="none" w="med" len="med"/>
-            <a:tailEnd type="arrow" w="med" len="med"/>
-          </a:ln>
-          <a:effectLst/>
-        </p:spPr>
-        <p:style>
-          <a:lnRef idx="1">
-            <a:schemeClr val="accent2"/>
-          </a:lnRef>
-          <a:fillRef idx="2">
-            <a:schemeClr val="accent2"/>
-          </a:fillRef>
-          <a:effectRef idx="1">
-            <a:schemeClr val="accent2"/>
-          </a:effectRef>
-          <a:fontRef idx="minor">
-            <a:schemeClr val="dk1"/>
-          </a:fontRef>
-        </p:style>
-      </p:cxnSp>
-      <p:cxnSp>
-        <p:nvCxnSpPr>
-          <p:cNvPr id="75" name="Elbow Connector 122"/>
-          <p:cNvCxnSpPr/>
-          <p:nvPr/>
-        </p:nvCxnSpPr>
-        <p:spPr>
-          <a:xfrm>
-            <a:off x="910091" y="3040053"/>
-            <a:ext cx="419548" cy="2860"/>
-          </a:xfrm>
-          <a:prstGeom prst="bentConnector3">
-            <a:avLst>
-              <a:gd name="adj1" fmla="val 50000"/>
-            </a:avLst>
-          </a:prstGeom>
-          <a:ln w="19050">
-            <a:solidFill>
-              <a:schemeClr val="bg1">
-                <a:lumMod val="75000"/>
-              </a:schemeClr>
-            </a:solidFill>
-            <a:prstDash val="sysDot"/>
-            <a:headEnd type="none" w="med" len="med"/>
-            <a:tailEnd type="arrow" w="med" len="med"/>
-          </a:ln>
-          <a:effectLst/>
-        </p:spPr>
-        <p:style>
-          <a:lnRef idx="1">
-            <a:schemeClr val="accent2"/>
-          </a:lnRef>
-          <a:fillRef idx="2">
-            <a:schemeClr val="accent2"/>
-          </a:fillRef>
-          <a:effectRef idx="1">
-            <a:schemeClr val="accent2"/>
-          </a:effectRef>
-          <a:fontRef idx="minor">
-            <a:schemeClr val="dk1"/>
-          </a:fontRef>
-        </p:style>
-      </p:cxnSp>
-      <p:cxnSp>
-        <p:nvCxnSpPr>
-          <p:cNvPr id="21" name="Straight Connector 20"/>
-          <p:cNvCxnSpPr>
-            <a:stCxn id="120" idx="3"/>
-          </p:cNvCxnSpPr>
-          <p:nvPr/>
-        </p:nvCxnSpPr>
-        <p:spPr>
-          <a:xfrm flipV="1">
-            <a:off x="1849924" y="3040052"/>
-            <a:ext cx="216105" cy="1"/>
-          </a:xfrm>
-          <a:prstGeom prst="line">
-            <a:avLst/>
-          </a:prstGeom>
-          <a:ln w="19050">
-            <a:solidFill>
-              <a:srgbClr val="7030A0"/>
-            </a:solidFill>
-            <a:prstDash val="sysDot"/>
-            <a:headEnd type="none" w="med" len="med"/>
-            <a:tailEnd type="none" w="med" len="med"/>
-          </a:ln>
-          <a:effectLst/>
-        </p:spPr>
-        <p:style>
-          <a:lnRef idx="1">
-            <a:schemeClr val="accent2"/>
-          </a:lnRef>
-          <a:fillRef idx="2">
-            <a:schemeClr val="accent2"/>
-          </a:fillRef>
-          <a:effectRef idx="1">
-            <a:schemeClr val="accent2"/>
-          </a:effectRef>
-          <a:fontRef idx="minor">
-            <a:schemeClr val="dk1"/>
-          </a:fontRef>
-        </p:style>
-      </p:cxnSp>
-      <p:sp>
-        <p:nvSpPr>
-          <p:cNvPr id="42" name="Flowchart: Decision 96"/>
-          <p:cNvSpPr/>
-          <p:nvPr/>
-        </p:nvSpPr>
-        <p:spPr>
-          <a:xfrm>
-            <a:off x="2373780" y="3549930"/>
-            <a:ext cx="236048" cy="173380"/>
-          </a:xfrm>
-          <a:prstGeom prst="flowChartDecision">
-            <a:avLst/>
-          </a:prstGeom>
-          <a:noFill/>
-          <a:ln w="19050">
-            <a:solidFill>
-              <a:srgbClr val="7030A0"/>
-            </a:solidFill>
-          </a:ln>
-          <a:effectLst/>
-        </p:spPr>
-        <p:style>
-          <a:lnRef idx="1">
-            <a:schemeClr val="accent6"/>
-          </a:lnRef>
-          <a:fillRef idx="2">
-            <a:schemeClr val="accent6"/>
-          </a:fillRef>
-          <a:effectRef idx="1">
-            <a:schemeClr val="accent6"/>
-          </a:effectRef>
-          <a:fontRef idx="minor">
-            <a:schemeClr val="dk1"/>
-          </a:fontRef>
-        </p:style>
-        <p:txBody>
-          <a:bodyPr rtlCol="0" anchor="ctr"/>
-          <a:lstStyle/>
-          <a:p>
-            <a:pPr algn="ctr"/>
-            <a:endParaRPr lang="en-US" sz="1050"/>
-          </a:p>
-        </p:txBody>
-      </p:sp>
-      <p:sp>
-        <p:nvSpPr>
-          <p:cNvPr id="46" name="Rectangle 8"/>
-          <p:cNvSpPr/>
-          <p:nvPr/>
-        </p:nvSpPr>
-        <p:spPr>
-          <a:xfrm>
-            <a:off x="2786406" y="2834911"/>
-            <a:ext cx="1447688" cy="346760"/>
-          </a:xfrm>
-          <a:prstGeom prst="rect">
-            <a:avLst/>
-          </a:prstGeom>
-          <a:ln w="19050">
-            <a:solidFill>
-              <a:srgbClr val="7030A0"/>
-            </a:solidFill>
-          </a:ln>
-          <a:effectLst/>
-        </p:spPr>
-        <p:style>
-          <a:lnRef idx="1">
-            <a:schemeClr val="accent4"/>
-          </a:lnRef>
-          <a:fillRef idx="2">
-            <a:schemeClr val="accent4"/>
-          </a:fillRef>
-          <a:effectRef idx="1">
-            <a:schemeClr val="accent4"/>
-          </a:effectRef>
-          <a:fontRef idx="minor">
-            <a:schemeClr val="dk1"/>
-          </a:fontRef>
-        </p:style>
-        <p:txBody>
-          <a:bodyPr rtlCol="0" anchor="ctr"/>
-          <a:lstStyle/>
-          <a:p>
-            <a:pPr algn="ctr"/>
-            <a:r>
-              <a:rPr lang="en-US" sz="1050" dirty="0" err="1" smtClean="0">
-                <a:solidFill>
-                  <a:srgbClr val="7030A0"/>
-                </a:solidFill>
-              </a:rPr>
-              <a:t>VersionedAddressBook</a:t>
-            </a:r>
-            <a:endParaRPr lang="en-SG" sz="1050" dirty="0">
-              <a:solidFill>
-                <a:srgbClr val="7030A0"/>
-              </a:solidFill>
-            </a:endParaRPr>
-          </a:p>
-        </p:txBody>
-      </p:sp>
-      <p:cxnSp>
-        <p:nvCxnSpPr>
-          <p:cNvPr id="47" name="Straight Arrow Connector 46"/>
-          <p:cNvCxnSpPr>
-            <a:stCxn id="48" idx="3"/>
-            <a:endCxn id="46" idx="1"/>
-          </p:cNvCxnSpPr>
-          <p:nvPr/>
-        </p:nvCxnSpPr>
-        <p:spPr>
-          <a:xfrm>
-            <a:off x="2624360" y="3003033"/>
-            <a:ext cx="162046" cy="5258"/>
-          </a:xfrm>
-          <a:prstGeom prst="straightConnector1">
-            <a:avLst/>
-          </a:prstGeom>
-          <a:ln w="19050">
-            <a:solidFill>
-              <a:srgbClr val="7030A0"/>
-            </a:solidFill>
-            <a:headEnd type="none" w="med" len="med"/>
-            <a:tailEnd type="arrow" w="med" len="med"/>
-          </a:ln>
-          <a:effectLst/>
-        </p:spPr>
-        <p:style>
-          <a:lnRef idx="1">
-            <a:schemeClr val="accent2"/>
-          </a:lnRef>
-          <a:fillRef idx="2">
-            <a:schemeClr val="accent2"/>
-          </a:fillRef>
-          <a:effectRef idx="1">
-            <a:schemeClr val="accent2"/>
-          </a:effectRef>
-          <a:fontRef idx="minor">
-            <a:schemeClr val="dk1"/>
-          </a:fontRef>
-        </p:style>
-      </p:cxnSp>
-      <p:sp>
-        <p:nvSpPr>
-          <p:cNvPr id="48" name="Flowchart: Decision 96"/>
-          <p:cNvSpPr/>
-          <p:nvPr/>
-        </p:nvSpPr>
-        <p:spPr>
-          <a:xfrm>
-            <a:off x="2388312" y="2916343"/>
-            <a:ext cx="236048" cy="173380"/>
-          </a:xfrm>
-          <a:prstGeom prst="flowChartDecision">
-            <a:avLst/>
-          </a:prstGeom>
-          <a:noFill/>
-          <a:ln w="19050">
-            <a:solidFill>
-              <a:srgbClr val="7030A0"/>
-            </a:solidFill>
-          </a:ln>
-          <a:effectLst/>
-        </p:spPr>
-        <p:style>
-          <a:lnRef idx="1">
-            <a:schemeClr val="accent6"/>
-          </a:lnRef>
-          <a:fillRef idx="2">
-            <a:schemeClr val="accent6"/>
-          </a:fillRef>
-          <a:effectRef idx="1">
-            <a:schemeClr val="accent6"/>
-          </a:effectRef>
-          <a:fontRef idx="minor">
-            <a:schemeClr val="dk1"/>
-          </a:fontRef>
-        </p:style>
-        <p:txBody>
-          <a:bodyPr rtlCol="0" anchor="ctr"/>
-          <a:lstStyle/>
-          <a:p>
-            <a:pPr algn="ctr"/>
-            <a:endParaRPr lang="en-US" sz="1050"/>
-          </a:p>
-        </p:txBody>
-      </p:sp>
-      <p:sp>
-        <p:nvSpPr>
-          <p:cNvPr id="49" name="Rectangle 8"/>
-          <p:cNvSpPr/>
-          <p:nvPr/>
-        </p:nvSpPr>
-        <p:spPr>
-          <a:xfrm>
-            <a:off x="4762209" y="2863434"/>
-            <a:ext cx="1156969" cy="346760"/>
-          </a:xfrm>
-          <a:prstGeom prst="rect">
-            <a:avLst/>
-          </a:prstGeom>
-          <a:ln w="19050">
-            <a:solidFill>
-              <a:srgbClr val="7030A0"/>
-            </a:solidFill>
-          </a:ln>
-          <a:effectLst/>
-        </p:spPr>
-        <p:style>
-          <a:lnRef idx="1">
-            <a:schemeClr val="accent4"/>
-          </a:lnRef>
-          <a:fillRef idx="2">
-            <a:schemeClr val="accent4"/>
-          </a:fillRef>
-          <a:effectRef idx="1">
-            <a:schemeClr val="accent4"/>
-          </a:effectRef>
-          <a:fontRef idx="minor">
-            <a:schemeClr val="dk1"/>
-          </a:fontRef>
-        </p:style>
-        <p:txBody>
-          <a:bodyPr rtlCol="0" anchor="ctr"/>
-          <a:lstStyle/>
-          <a:p>
-            <a:pPr algn="ctr"/>
-            <a:r>
-              <a:rPr lang="en-US" sz="1050" dirty="0" err="1">
-                <a:solidFill>
-                  <a:srgbClr val="7030A0"/>
-                </a:solidFill>
-              </a:rPr>
-              <a:t>UniquePersonList</a:t>
-            </a:r>
-            <a:endParaRPr lang="en-SG" sz="1050" dirty="0">
-              <a:solidFill>
-                <a:srgbClr val="7030A0"/>
-              </a:solidFill>
-            </a:endParaRPr>
-          </a:p>
-        </p:txBody>
-      </p:sp>
-      <p:sp>
-        <p:nvSpPr>
-          <p:cNvPr id="51" name="Flowchart: Decision 96"/>
-          <p:cNvSpPr/>
-          <p:nvPr/>
-        </p:nvSpPr>
-        <p:spPr>
-          <a:xfrm>
-            <a:off x="4233246" y="2948201"/>
-            <a:ext cx="236048" cy="173380"/>
-          </a:xfrm>
-          <a:prstGeom prst="flowChartDecision">
-            <a:avLst/>
-          </a:prstGeom>
-          <a:solidFill>
-            <a:srgbClr val="7030A0"/>
-          </a:solidFill>
-          <a:ln w="19050">
-            <a:solidFill>
-              <a:srgbClr val="7030A0"/>
-            </a:solidFill>
-          </a:ln>
-          <a:effectLst/>
-        </p:spPr>
-        <p:style>
-          <a:lnRef idx="1">
-            <a:schemeClr val="accent6"/>
-          </a:lnRef>
-          <a:fillRef idx="2">
-            <a:schemeClr val="accent6"/>
-          </a:fillRef>
-          <a:effectRef idx="1">
-            <a:schemeClr val="accent6"/>
-          </a:effectRef>
-          <a:fontRef idx="minor">
-            <a:schemeClr val="dk1"/>
-          </a:fontRef>
-        </p:style>
-        <p:txBody>
-          <a:bodyPr rtlCol="0" anchor="ctr"/>
-          <a:lstStyle/>
-          <a:p>
-            <a:pPr algn="ctr"/>
-            <a:endParaRPr lang="en-US" sz="1050"/>
-          </a:p>
-        </p:txBody>
-      </p:sp>
-      <p:cxnSp>
-        <p:nvCxnSpPr>
-          <p:cNvPr id="30" name="Elbow Connector 29"/>
-          <p:cNvCxnSpPr>
-            <a:stCxn id="51" idx="3"/>
-            <a:endCxn id="49" idx="1"/>
-          </p:cNvCxnSpPr>
-          <p:nvPr/>
-        </p:nvCxnSpPr>
-        <p:spPr>
-          <a:xfrm>
-            <a:off x="4469294" y="3034891"/>
-            <a:ext cx="292915" cy="1923"/>
-          </a:xfrm>
-          <a:prstGeom prst="bentConnector3">
-            <a:avLst/>
-          </a:prstGeom>
-          <a:ln w="19050">
-            <a:solidFill>
-              <a:srgbClr val="7030A0"/>
-            </a:solidFill>
-            <a:headEnd type="none" w="med" len="med"/>
-            <a:tailEnd type="arrow" w="med" len="med"/>
-          </a:ln>
-          <a:effectLst/>
-        </p:spPr>
-        <p:style>
-          <a:lnRef idx="1">
-            <a:schemeClr val="accent2"/>
-          </a:lnRef>
-          <a:fillRef idx="2">
-            <a:schemeClr val="accent2"/>
-          </a:fillRef>
-          <a:effectRef idx="1">
-            <a:schemeClr val="accent2"/>
-          </a:effectRef>
-          <a:fontRef idx="minor">
-            <a:schemeClr val="dk1"/>
-          </a:fontRef>
-        </p:style>
-      </p:cxnSp>
-      <p:sp>
-        <p:nvSpPr>
-          <p:cNvPr id="62" name="Rectangle 8"/>
-          <p:cNvSpPr/>
-          <p:nvPr/>
-        </p:nvSpPr>
-        <p:spPr>
-          <a:xfrm>
-            <a:off x="6313677" y="2858066"/>
-            <a:ext cx="708186" cy="346760"/>
-          </a:xfrm>
-          <a:prstGeom prst="rect">
-            <a:avLst/>
-          </a:prstGeom>
-          <a:ln w="19050">
-            <a:solidFill>
-              <a:srgbClr val="7030A0"/>
-            </a:solidFill>
-          </a:ln>
-          <a:effectLst/>
-        </p:spPr>
-        <p:style>
-          <a:lnRef idx="1">
-            <a:schemeClr val="accent4"/>
-          </a:lnRef>
-          <a:fillRef idx="2">
-            <a:schemeClr val="accent4"/>
-          </a:fillRef>
-          <a:effectRef idx="1">
-            <a:schemeClr val="accent4"/>
-          </a:effectRef>
-          <a:fontRef idx="minor">
-            <a:schemeClr val="dk1"/>
-          </a:fontRef>
-        </p:style>
-        <p:txBody>
-          <a:bodyPr rtlCol="0" anchor="ctr"/>
-          <a:lstStyle/>
-          <a:p>
-            <a:pPr algn="ctr"/>
-            <a:r>
-              <a:rPr lang="en-US" sz="1050" dirty="0">
-                <a:solidFill>
-                  <a:srgbClr val="7030A0"/>
-                </a:solidFill>
-              </a:rPr>
-              <a:t>Person</a:t>
-            </a:r>
-            <a:endParaRPr lang="en-SG" sz="1050" dirty="0">
-              <a:solidFill>
-                <a:srgbClr val="7030A0"/>
-              </a:solidFill>
-            </a:endParaRPr>
-          </a:p>
-        </p:txBody>
-      </p:sp>
-      <p:sp>
-        <p:nvSpPr>
-          <p:cNvPr id="63" name="Flowchart: Decision 96"/>
-          <p:cNvSpPr/>
-          <p:nvPr/>
-        </p:nvSpPr>
-        <p:spPr>
-          <a:xfrm>
-            <a:off x="5918460" y="2941065"/>
-            <a:ext cx="236048" cy="173380"/>
-          </a:xfrm>
-          <a:prstGeom prst="flowChartDecision">
-            <a:avLst/>
-          </a:prstGeom>
-          <a:noFill/>
-          <a:ln w="19050">
-            <a:solidFill>
-              <a:srgbClr val="7030A0"/>
-            </a:solidFill>
-          </a:ln>
-          <a:effectLst/>
-        </p:spPr>
-        <p:style>
-          <a:lnRef idx="1">
-            <a:schemeClr val="accent6"/>
-          </a:lnRef>
-          <a:fillRef idx="2">
-            <a:schemeClr val="accent6"/>
-          </a:fillRef>
-          <a:effectRef idx="1">
-            <a:schemeClr val="accent6"/>
-          </a:effectRef>
-          <a:fontRef idx="minor">
-            <a:schemeClr val="dk1"/>
-          </a:fontRef>
-        </p:style>
-        <p:txBody>
-          <a:bodyPr rtlCol="0" anchor="ctr"/>
-          <a:lstStyle/>
-          <a:p>
-            <a:pPr algn="ctr"/>
-            <a:endParaRPr lang="en-US" sz="1050"/>
-          </a:p>
-        </p:txBody>
-      </p:sp>
-      <p:cxnSp>
-        <p:nvCxnSpPr>
-          <p:cNvPr id="64" name="Elbow Connector 63"/>
-          <p:cNvCxnSpPr>
-            <a:cxnSpLocks/>
-            <a:stCxn id="63" idx="3"/>
-            <a:endCxn id="62" idx="1"/>
-          </p:cNvCxnSpPr>
-          <p:nvPr/>
-        </p:nvCxnSpPr>
-        <p:spPr>
-          <a:xfrm>
-            <a:off x="6154508" y="3027755"/>
-            <a:ext cx="159169" cy="3691"/>
-          </a:xfrm>
-          <a:prstGeom prst="bentConnector3">
-            <a:avLst/>
-          </a:prstGeom>
-          <a:ln w="19050">
-            <a:solidFill>
-              <a:srgbClr val="7030A0"/>
-            </a:solidFill>
-            <a:headEnd type="none" w="med" len="med"/>
-            <a:tailEnd type="arrow" w="med" len="med"/>
-          </a:ln>
-          <a:effectLst/>
-        </p:spPr>
-        <p:style>
-          <a:lnRef idx="1">
-            <a:schemeClr val="accent2"/>
-          </a:lnRef>
-          <a:fillRef idx="2">
-            <a:schemeClr val="accent2"/>
-          </a:fillRef>
-          <a:effectRef idx="1">
-            <a:schemeClr val="accent2"/>
-          </a:effectRef>
-          <a:fontRef idx="minor">
-            <a:schemeClr val="dk1"/>
-          </a:fontRef>
-        </p:style>
-      </p:cxnSp>
-      <p:sp>
-        <p:nvSpPr>
-          <p:cNvPr id="76" name="Rectangle 8"/>
-          <p:cNvSpPr/>
-          <p:nvPr/>
-        </p:nvSpPr>
-        <p:spPr>
-          <a:xfrm>
-            <a:off x="7712397" y="2564238"/>
-            <a:ext cx="708186" cy="285783"/>
-          </a:xfrm>
-          <a:prstGeom prst="rect">
-            <a:avLst/>
-          </a:prstGeom>
-          <a:ln w="19050">
-            <a:solidFill>
-              <a:srgbClr val="7030A0"/>
-            </a:solidFill>
-          </a:ln>
-          <a:effectLst/>
-        </p:spPr>
-        <p:style>
-          <a:lnRef idx="1">
-            <a:schemeClr val="accent4"/>
-          </a:lnRef>
-          <a:fillRef idx="2">
-            <a:schemeClr val="accent4"/>
-          </a:fillRef>
-          <a:effectRef idx="1">
-            <a:schemeClr val="accent4"/>
-          </a:effectRef>
-          <a:fontRef idx="minor">
-            <a:schemeClr val="dk1"/>
-          </a:fontRef>
-        </p:style>
-        <p:txBody>
-          <a:bodyPr rtlCol="0" anchor="ctr"/>
-          <a:lstStyle/>
-          <a:p>
-            <a:pPr algn="ctr"/>
-            <a:r>
-              <a:rPr lang="en-US" sz="1050" dirty="0">
-                <a:solidFill>
-                  <a:srgbClr val="7030A0"/>
-                </a:solidFill>
-              </a:rPr>
-              <a:t>Name</a:t>
-            </a:r>
-            <a:endParaRPr lang="en-SG" sz="1050" dirty="0">
-              <a:solidFill>
-                <a:srgbClr val="7030A0"/>
-              </a:solidFill>
-            </a:endParaRPr>
-          </a:p>
-        </p:txBody>
-      </p:sp>
-      <p:sp>
-        <p:nvSpPr>
-          <p:cNvPr id="78" name="Flowchart: Decision 96"/>
-          <p:cNvSpPr/>
-          <p:nvPr/>
-        </p:nvSpPr>
-        <p:spPr>
-          <a:xfrm>
-            <a:off x="7041947" y="2948201"/>
-            <a:ext cx="236048" cy="173380"/>
-          </a:xfrm>
-          <a:prstGeom prst="flowChartDecision">
-            <a:avLst/>
-          </a:prstGeom>
-          <a:solidFill>
-            <a:srgbClr val="7030A0"/>
-          </a:solidFill>
-          <a:ln w="19050">
-            <a:solidFill>
-              <a:srgbClr val="7030A0"/>
-            </a:solidFill>
-          </a:ln>
-          <a:effectLst/>
-        </p:spPr>
-        <p:style>
-          <a:lnRef idx="1">
-            <a:schemeClr val="accent6"/>
-          </a:lnRef>
-          <a:fillRef idx="2">
-            <a:schemeClr val="accent6"/>
-          </a:fillRef>
-          <a:effectRef idx="1">
-            <a:schemeClr val="accent6"/>
-          </a:effectRef>
-          <a:fontRef idx="minor">
-            <a:schemeClr val="dk1"/>
-          </a:fontRef>
-        </p:style>
-        <p:txBody>
-          <a:bodyPr rtlCol="0" anchor="ctr"/>
-          <a:lstStyle/>
-          <a:p>
-            <a:pPr algn="ctr"/>
-            <a:endParaRPr lang="en-US" sz="1050"/>
-          </a:p>
-        </p:txBody>
-      </p:sp>
-      <p:cxnSp>
-        <p:nvCxnSpPr>
-          <p:cNvPr id="79" name="Elbow Connector 78"/>
-          <p:cNvCxnSpPr>
-            <a:cxnSpLocks/>
-          </p:cNvCxnSpPr>
-          <p:nvPr/>
-        </p:nvCxnSpPr>
-        <p:spPr>
-          <a:xfrm flipV="1">
-            <a:off x="7277995" y="2706821"/>
-            <a:ext cx="434402" cy="327761"/>
-          </a:xfrm>
-          <a:prstGeom prst="bentConnector3">
-            <a:avLst/>
-          </a:prstGeom>
-          <a:ln w="19050">
-            <a:solidFill>
-              <a:srgbClr val="7030A0"/>
-            </a:solidFill>
-            <a:headEnd type="none" w="med" len="med"/>
-            <a:tailEnd type="arrow" w="med" len="med"/>
-          </a:ln>
-          <a:effectLst/>
-        </p:spPr>
-        <p:style>
-          <a:lnRef idx="1">
-            <a:schemeClr val="accent2"/>
-          </a:lnRef>
-          <a:fillRef idx="2">
-            <a:schemeClr val="accent2"/>
-          </a:fillRef>
-          <a:effectRef idx="1">
-            <a:schemeClr val="accent2"/>
-          </a:effectRef>
-          <a:fontRef idx="minor">
-            <a:schemeClr val="dk1"/>
-          </a:fontRef>
-        </p:style>
-      </p:cxnSp>
-      <p:sp>
-        <p:nvSpPr>
-          <p:cNvPr id="80" name="Rectangle 8"/>
-          <p:cNvSpPr/>
-          <p:nvPr/>
-        </p:nvSpPr>
-        <p:spPr>
-          <a:xfrm>
-            <a:off x="7712397" y="2887216"/>
-            <a:ext cx="708186" cy="285783"/>
-          </a:xfrm>
-          <a:prstGeom prst="rect">
-            <a:avLst/>
-          </a:prstGeom>
-          <a:ln w="19050">
-            <a:solidFill>
-              <a:srgbClr val="7030A0"/>
-            </a:solidFill>
-          </a:ln>
-          <a:effectLst/>
-        </p:spPr>
-        <p:style>
-          <a:lnRef idx="1">
-            <a:schemeClr val="accent4"/>
-          </a:lnRef>
-          <a:fillRef idx="2">
-            <a:schemeClr val="accent4"/>
-          </a:fillRef>
-          <a:effectRef idx="1">
-            <a:schemeClr val="accent4"/>
-          </a:effectRef>
-          <a:fontRef idx="minor">
-            <a:schemeClr val="dk1"/>
-          </a:fontRef>
-        </p:style>
-        <p:txBody>
-          <a:bodyPr rtlCol="0" anchor="ctr"/>
-          <a:lstStyle/>
-          <a:p>
-            <a:pPr algn="ctr"/>
-            <a:r>
-              <a:rPr lang="en-US" sz="1050" dirty="0">
-                <a:solidFill>
-                  <a:srgbClr val="7030A0"/>
-                </a:solidFill>
-              </a:rPr>
-              <a:t>Phone</a:t>
-            </a:r>
-            <a:endParaRPr lang="en-SG" sz="1050" dirty="0">
-              <a:solidFill>
-                <a:srgbClr val="7030A0"/>
-              </a:solidFill>
-            </a:endParaRPr>
-          </a:p>
-        </p:txBody>
-      </p:sp>
-      <p:cxnSp>
-        <p:nvCxnSpPr>
-          <p:cNvPr id="81" name="Elbow Connector 80"/>
-          <p:cNvCxnSpPr>
-            <a:stCxn id="78" idx="3"/>
-            <a:endCxn id="80" idx="1"/>
-          </p:cNvCxnSpPr>
-          <p:nvPr/>
-        </p:nvCxnSpPr>
-        <p:spPr>
-          <a:xfrm flipV="1">
-            <a:off x="7277995" y="3030108"/>
-            <a:ext cx="434402" cy="4783"/>
-          </a:xfrm>
-          <a:prstGeom prst="bentConnector3">
-            <a:avLst/>
-          </a:prstGeom>
-          <a:ln w="19050">
-            <a:solidFill>
-              <a:srgbClr val="7030A0"/>
-            </a:solidFill>
-            <a:headEnd type="none" w="med" len="med"/>
-            <a:tailEnd type="arrow" w="med" len="med"/>
-          </a:ln>
-          <a:effectLst/>
-        </p:spPr>
-        <p:style>
-          <a:lnRef idx="1">
-            <a:schemeClr val="accent2"/>
-          </a:lnRef>
-          <a:fillRef idx="2">
-            <a:schemeClr val="accent2"/>
-          </a:fillRef>
-          <a:effectRef idx="1">
-            <a:schemeClr val="accent2"/>
-          </a:effectRef>
-          <a:fontRef idx="minor">
-            <a:schemeClr val="dk1"/>
-          </a:fontRef>
-        </p:style>
-      </p:cxnSp>
-      <p:sp>
-        <p:nvSpPr>
-          <p:cNvPr id="83" name="Rectangle 8"/>
-          <p:cNvSpPr/>
-          <p:nvPr/>
-        </p:nvSpPr>
-        <p:spPr>
-          <a:xfrm>
-            <a:off x="7712397" y="3210194"/>
-            <a:ext cx="708186" cy="285783"/>
-          </a:xfrm>
-          <a:prstGeom prst="rect">
-            <a:avLst/>
-          </a:prstGeom>
-          <a:ln w="19050">
-            <a:solidFill>
-              <a:srgbClr val="7030A0"/>
-            </a:solidFill>
-          </a:ln>
-          <a:effectLst/>
-        </p:spPr>
-        <p:style>
-          <a:lnRef idx="1">
-            <a:schemeClr val="accent4"/>
-          </a:lnRef>
-          <a:fillRef idx="2">
-            <a:schemeClr val="accent4"/>
-          </a:fillRef>
-          <a:effectRef idx="1">
-            <a:schemeClr val="accent4"/>
-          </a:effectRef>
-          <a:fontRef idx="minor">
-            <a:schemeClr val="dk1"/>
-          </a:fontRef>
-        </p:style>
-        <p:txBody>
-          <a:bodyPr rtlCol="0" anchor="ctr"/>
-          <a:lstStyle/>
-          <a:p>
-            <a:pPr algn="ctr"/>
-            <a:r>
-              <a:rPr lang="en-US" sz="1050" dirty="0">
-                <a:solidFill>
-                  <a:srgbClr val="7030A0"/>
-                </a:solidFill>
-              </a:rPr>
-              <a:t>Email</a:t>
-            </a:r>
-            <a:endParaRPr lang="en-SG" sz="1050" dirty="0">
-              <a:solidFill>
-                <a:srgbClr val="7030A0"/>
-              </a:solidFill>
-            </a:endParaRPr>
-          </a:p>
-        </p:txBody>
-      </p:sp>
-      <p:cxnSp>
-        <p:nvCxnSpPr>
-          <p:cNvPr id="84" name="Elbow Connector 83"/>
-          <p:cNvCxnSpPr>
-            <a:stCxn id="78" idx="3"/>
-            <a:endCxn id="83" idx="1"/>
-          </p:cNvCxnSpPr>
-          <p:nvPr/>
-        </p:nvCxnSpPr>
-        <p:spPr>
-          <a:xfrm>
-            <a:off x="7277995" y="3034891"/>
-            <a:ext cx="434402" cy="318195"/>
-          </a:xfrm>
-          <a:prstGeom prst="bentConnector3">
-            <a:avLst/>
-          </a:prstGeom>
-          <a:ln w="19050">
-            <a:solidFill>
-              <a:srgbClr val="7030A0"/>
-            </a:solidFill>
-            <a:headEnd type="none" w="med" len="med"/>
-            <a:tailEnd type="arrow" w="med" len="med"/>
-          </a:ln>
-          <a:effectLst/>
-        </p:spPr>
-        <p:style>
-          <a:lnRef idx="1">
-            <a:schemeClr val="accent2"/>
-          </a:lnRef>
-          <a:fillRef idx="2">
-            <a:schemeClr val="accent2"/>
-          </a:fillRef>
-          <a:effectRef idx="1">
-            <a:schemeClr val="accent2"/>
-          </a:effectRef>
-          <a:fontRef idx="minor">
-            <a:schemeClr val="dk1"/>
-          </a:fontRef>
-        </p:style>
-      </p:cxnSp>
-      <p:sp>
-        <p:nvSpPr>
-          <p:cNvPr id="85" name="Rectangle 8"/>
-          <p:cNvSpPr/>
-          <p:nvPr/>
-        </p:nvSpPr>
-        <p:spPr>
-          <a:xfrm>
-            <a:off x="7712397" y="3533171"/>
-            <a:ext cx="708186" cy="285783"/>
-          </a:xfrm>
-          <a:prstGeom prst="rect">
-            <a:avLst/>
-          </a:prstGeom>
-          <a:ln w="19050">
-            <a:solidFill>
-              <a:srgbClr val="7030A0"/>
-            </a:solidFill>
-          </a:ln>
-          <a:effectLst/>
-        </p:spPr>
-        <p:style>
-          <a:lnRef idx="1">
-            <a:schemeClr val="accent4"/>
-          </a:lnRef>
-          <a:fillRef idx="2">
-            <a:schemeClr val="accent4"/>
-          </a:fillRef>
-          <a:effectRef idx="1">
-            <a:schemeClr val="accent4"/>
-          </a:effectRef>
-          <a:fontRef idx="minor">
-            <a:schemeClr val="dk1"/>
-          </a:fontRef>
-        </p:style>
-        <p:txBody>
-          <a:bodyPr rtlCol="0" anchor="ctr"/>
-          <a:lstStyle/>
-          <a:p>
-            <a:pPr algn="ctr"/>
-            <a:r>
-              <a:rPr lang="en-US" sz="1050" dirty="0">
-                <a:solidFill>
-                  <a:srgbClr val="7030A0"/>
-                </a:solidFill>
-              </a:rPr>
-              <a:t>Address</a:t>
-            </a:r>
-            <a:endParaRPr lang="en-SG" sz="1050" dirty="0">
-              <a:solidFill>
-                <a:srgbClr val="7030A0"/>
-              </a:solidFill>
-            </a:endParaRPr>
-          </a:p>
-        </p:txBody>
-      </p:sp>
-      <p:cxnSp>
-        <p:nvCxnSpPr>
-          <p:cNvPr id="86" name="Elbow Connector 85"/>
-          <p:cNvCxnSpPr>
-            <a:stCxn id="78" idx="3"/>
-            <a:endCxn id="85" idx="1"/>
-          </p:cNvCxnSpPr>
-          <p:nvPr/>
-        </p:nvCxnSpPr>
-        <p:spPr>
-          <a:xfrm>
-            <a:off x="7277995" y="3034891"/>
-            <a:ext cx="434402" cy="641172"/>
-          </a:xfrm>
-          <a:prstGeom prst="bentConnector3">
-            <a:avLst/>
-          </a:prstGeom>
-          <a:ln w="19050">
-            <a:solidFill>
-              <a:srgbClr val="7030A0"/>
-            </a:solidFill>
-            <a:headEnd type="none" w="med" len="med"/>
-            <a:tailEnd type="arrow" w="med" len="med"/>
-          </a:ln>
-          <a:effectLst/>
-        </p:spPr>
-        <p:style>
-          <a:lnRef idx="1">
-            <a:schemeClr val="accent2"/>
-          </a:lnRef>
-          <a:fillRef idx="2">
-            <a:schemeClr val="accent2"/>
-          </a:fillRef>
-          <a:effectRef idx="1">
-            <a:schemeClr val="accent2"/>
-          </a:effectRef>
-          <a:fontRef idx="minor">
-            <a:schemeClr val="dk1"/>
-          </a:fontRef>
-        </p:style>
-      </p:cxnSp>
-      <p:sp>
-        <p:nvSpPr>
-          <p:cNvPr id="114" name="TextBox 113"/>
-          <p:cNvSpPr txBox="1"/>
-          <p:nvPr/>
-        </p:nvSpPr>
-        <p:spPr>
-          <a:xfrm rot="16200000">
-            <a:off x="6362886" y="3586305"/>
-            <a:ext cx="881018" cy="261610"/>
-          </a:xfrm>
-          <a:prstGeom prst="rect">
-            <a:avLst/>
-          </a:prstGeom>
-          <a:noFill/>
-        </p:spPr>
-        <p:txBody>
-          <a:bodyPr wrap="square" rtlCol="0">
-            <a:spAutoFit/>
-          </a:bodyPr>
-          <a:lstStyle/>
-          <a:p>
-            <a:pPr algn="r"/>
-            <a:r>
-              <a:rPr lang="en-US" sz="1100" dirty="0">
-                <a:solidFill>
-                  <a:srgbClr val="7030A0"/>
-                </a:solidFill>
-              </a:rPr>
-              <a:t>filtered list</a:t>
-            </a:r>
-            <a:endParaRPr lang="en-SG" sz="1100" dirty="0">
-              <a:solidFill>
-                <a:srgbClr val="7030A0"/>
-              </a:solidFill>
-            </a:endParaRPr>
-          </a:p>
-        </p:txBody>
-      </p:sp>
-      <p:sp>
-        <p:nvSpPr>
-          <p:cNvPr id="122" name="Rectangle 8"/>
-          <p:cNvSpPr/>
-          <p:nvPr/>
-        </p:nvSpPr>
-        <p:spPr>
-          <a:xfrm>
-            <a:off x="2057401" y="4239491"/>
-            <a:ext cx="1066800" cy="346760"/>
-          </a:xfrm>
-          <a:prstGeom prst="rect">
-            <a:avLst/>
-          </a:prstGeom>
-          <a:ln w="19050">
-            <a:solidFill>
-              <a:srgbClr val="7030A0"/>
-            </a:solidFill>
-          </a:ln>
-          <a:effectLst/>
-        </p:spPr>
-        <p:style>
-          <a:lnRef idx="1">
-            <a:schemeClr val="accent4"/>
-          </a:lnRef>
-          <a:fillRef idx="2">
-            <a:schemeClr val="accent4"/>
-          </a:fillRef>
-          <a:effectRef idx="1">
-            <a:schemeClr val="accent4"/>
-          </a:effectRef>
-          <a:fontRef idx="minor">
-            <a:schemeClr val="dk1"/>
-          </a:fontRef>
-        </p:style>
-        <p:txBody>
-          <a:bodyPr rtlCol="0" anchor="ctr"/>
-          <a:lstStyle/>
-          <a:p>
-            <a:pPr algn="ctr"/>
-            <a:r>
-              <a:rPr lang="en-US" sz="1050" dirty="0">
-                <a:solidFill>
-                  <a:srgbClr val="7030A0"/>
-                </a:solidFill>
-              </a:rPr>
-              <a:t>&lt;&lt;interface&gt;&gt;</a:t>
-            </a:r>
-            <a:r>
-              <a:rPr lang="en-US" sz="1050">
-                <a:solidFill>
-                  <a:srgbClr val="7030A0"/>
-                </a:solidFill>
-              </a:rPr>
-              <a:t/>
-            </a:r>
-            <a:br>
-              <a:rPr lang="en-US" sz="1050">
-                <a:solidFill>
-                  <a:srgbClr val="7030A0"/>
-                </a:solidFill>
-              </a:rPr>
-            </a:br>
-            <a:r>
-              <a:rPr lang="en-US" sz="1050" dirty="0" err="1">
-                <a:solidFill>
-                  <a:srgbClr val="7030A0"/>
-                </a:solidFill>
-              </a:rPr>
-              <a:t>ObservableList</a:t>
-            </a:r>
-            <a:endParaRPr lang="en-SG" sz="1050" dirty="0">
-              <a:solidFill>
-                <a:srgbClr val="7030A0"/>
-              </a:solidFill>
-            </a:endParaRPr>
-          </a:p>
-        </p:txBody>
-      </p:sp>
-      <p:cxnSp>
-        <p:nvCxnSpPr>
-          <p:cNvPr id="124" name="Elbow Connector 122"/>
-          <p:cNvCxnSpPr>
-            <a:stCxn id="119" idx="1"/>
-            <a:endCxn id="122" idx="1"/>
-          </p:cNvCxnSpPr>
-          <p:nvPr/>
-        </p:nvCxnSpPr>
-        <p:spPr>
-          <a:xfrm rot="16200000" flipH="1">
-            <a:off x="1364475" y="3719944"/>
-            <a:ext cx="831471" cy="554381"/>
-          </a:xfrm>
-          <a:prstGeom prst="bentConnector2">
-            <a:avLst/>
-          </a:prstGeom>
-          <a:ln w="19050">
-            <a:solidFill>
-              <a:srgbClr val="7030A0"/>
-            </a:solidFill>
-            <a:prstDash val="sysDot"/>
-            <a:headEnd type="none" w="med" len="med"/>
-            <a:tailEnd type="arrow" w="med" len="med"/>
-          </a:ln>
-          <a:effectLst/>
-        </p:spPr>
-        <p:style>
-          <a:lnRef idx="1">
-            <a:schemeClr val="accent2"/>
-          </a:lnRef>
-          <a:fillRef idx="2">
-            <a:schemeClr val="accent2"/>
-          </a:fillRef>
-          <a:effectRef idx="1">
-            <a:schemeClr val="accent2"/>
-          </a:effectRef>
-          <a:fontRef idx="minor">
-            <a:schemeClr val="dk1"/>
-          </a:fontRef>
-        </p:style>
-      </p:cxnSp>
-      <p:sp>
-        <p:nvSpPr>
-          <p:cNvPr id="54" name="TextBox 53"/>
-          <p:cNvSpPr txBox="1"/>
-          <p:nvPr/>
-        </p:nvSpPr>
-        <p:spPr>
-          <a:xfrm>
-            <a:off x="4324972" y="3058864"/>
-            <a:ext cx="189257" cy="178683"/>
-          </a:xfrm>
-          <a:prstGeom prst="rect">
-            <a:avLst/>
-          </a:prstGeom>
-          <a:noFill/>
-        </p:spPr>
-        <p:txBody>
-          <a:bodyPr wrap="square" lIns="0" tIns="0" rIns="0" bIns="0" rtlCol="0">
-            <a:noAutofit/>
-          </a:bodyPr>
-          <a:lstStyle/>
-          <a:p>
-            <a:pPr algn="ctr"/>
-            <a:r>
-              <a:rPr lang="en-US" sz="1100" dirty="0">
-                <a:solidFill>
-                  <a:srgbClr val="7030A0"/>
-                </a:solidFill>
-              </a:rPr>
-              <a:t>1</a:t>
-            </a:r>
-            <a:endParaRPr lang="en-SG" sz="1100" dirty="0">
-              <a:solidFill>
-                <a:srgbClr val="7030A0"/>
-              </a:solidFill>
-            </a:endParaRPr>
-          </a:p>
-        </p:txBody>
-      </p:sp>
-      <p:sp>
-        <p:nvSpPr>
-          <p:cNvPr id="61" name="TextBox 60"/>
-          <p:cNvSpPr txBox="1"/>
-          <p:nvPr/>
-        </p:nvSpPr>
-        <p:spPr>
-          <a:xfrm>
-            <a:off x="6135256" y="3097917"/>
-            <a:ext cx="189257" cy="178683"/>
-          </a:xfrm>
-          <a:prstGeom prst="rect">
-            <a:avLst/>
-          </a:prstGeom>
-          <a:noFill/>
-        </p:spPr>
-        <p:txBody>
-          <a:bodyPr wrap="square" lIns="0" tIns="0" rIns="0" bIns="0" rtlCol="0">
-            <a:noAutofit/>
-          </a:bodyPr>
-          <a:lstStyle/>
-          <a:p>
-            <a:pPr algn="ctr"/>
-            <a:r>
-              <a:rPr lang="en-US" sz="1100" dirty="0">
-                <a:solidFill>
-                  <a:srgbClr val="7030A0"/>
-                </a:solidFill>
-              </a:rPr>
-              <a:t>*</a:t>
-            </a:r>
-            <a:endParaRPr lang="en-SG" sz="1100" dirty="0">
-              <a:solidFill>
-                <a:srgbClr val="7030A0"/>
-              </a:solidFill>
-            </a:endParaRPr>
-          </a:p>
-        </p:txBody>
-      </p:sp>
-      <p:sp>
-        <p:nvSpPr>
-          <p:cNvPr id="65" name="TextBox 64"/>
-          <p:cNvSpPr txBox="1"/>
-          <p:nvPr/>
-        </p:nvSpPr>
-        <p:spPr>
-          <a:xfrm>
-            <a:off x="2560167" y="2753818"/>
-            <a:ext cx="78378" cy="193767"/>
-          </a:xfrm>
-          <a:prstGeom prst="rect">
-            <a:avLst/>
-          </a:prstGeom>
-          <a:noFill/>
-        </p:spPr>
-        <p:txBody>
-          <a:bodyPr wrap="square" lIns="0" tIns="0" rIns="0" bIns="0" rtlCol="0">
-            <a:noAutofit/>
-          </a:bodyPr>
-          <a:lstStyle/>
-          <a:p>
-            <a:pPr algn="ctr"/>
-            <a:r>
-              <a:rPr lang="en-US" sz="1100" dirty="0">
-                <a:solidFill>
-                  <a:srgbClr val="7030A0"/>
-                </a:solidFill>
-              </a:rPr>
-              <a:t>1</a:t>
-            </a:r>
-            <a:endParaRPr lang="en-SG" sz="1100" dirty="0">
-              <a:solidFill>
-                <a:srgbClr val="7030A0"/>
-              </a:solidFill>
-            </a:endParaRPr>
-          </a:p>
-        </p:txBody>
-      </p:sp>
-      <p:sp>
-        <p:nvSpPr>
-          <p:cNvPr id="66" name="TextBox 65"/>
-          <p:cNvSpPr txBox="1"/>
-          <p:nvPr/>
-        </p:nvSpPr>
-        <p:spPr>
-          <a:xfrm>
-            <a:off x="2707070" y="3667737"/>
-            <a:ext cx="189257" cy="178683"/>
-          </a:xfrm>
-          <a:prstGeom prst="rect">
-            <a:avLst/>
-          </a:prstGeom>
-          <a:noFill/>
-        </p:spPr>
-        <p:txBody>
-          <a:bodyPr wrap="square" lIns="0" tIns="0" rIns="0" bIns="0" rtlCol="0">
-            <a:noAutofit/>
-          </a:bodyPr>
-          <a:lstStyle/>
-          <a:p>
-            <a:pPr algn="ctr"/>
-            <a:r>
-              <a:rPr lang="en-US" sz="1100" dirty="0">
-                <a:solidFill>
-                  <a:srgbClr val="7030A0"/>
-                </a:solidFill>
-              </a:rPr>
-              <a:t>1</a:t>
-            </a:r>
-            <a:endParaRPr lang="en-SG" sz="1100" dirty="0">
-              <a:solidFill>
-                <a:srgbClr val="7030A0"/>
-              </a:solidFill>
-            </a:endParaRPr>
-          </a:p>
-        </p:txBody>
-      </p:sp>
-      <p:sp>
-        <p:nvSpPr>
-          <p:cNvPr id="70" name="TextBox 69"/>
-          <p:cNvSpPr txBox="1"/>
-          <p:nvPr/>
-        </p:nvSpPr>
-        <p:spPr>
-          <a:xfrm>
-            <a:off x="6449896" y="3204826"/>
-            <a:ext cx="189257" cy="178683"/>
-          </a:xfrm>
-          <a:prstGeom prst="rect">
-            <a:avLst/>
-          </a:prstGeom>
-          <a:noFill/>
-        </p:spPr>
-        <p:txBody>
-          <a:bodyPr wrap="square" lIns="0" tIns="0" rIns="0" bIns="0" rtlCol="0">
-            <a:noAutofit/>
-          </a:bodyPr>
-          <a:lstStyle/>
-          <a:p>
-            <a:pPr algn="ctr"/>
-            <a:r>
-              <a:rPr lang="en-US" sz="1100" dirty="0">
-                <a:solidFill>
-                  <a:srgbClr val="7030A0"/>
-                </a:solidFill>
-              </a:rPr>
-              <a:t>1</a:t>
-            </a:r>
-            <a:endParaRPr lang="en-SG" sz="1100" dirty="0">
-              <a:solidFill>
-                <a:srgbClr val="7030A0"/>
-              </a:solidFill>
-            </a:endParaRPr>
-          </a:p>
-        </p:txBody>
-      </p:sp>
-      <p:sp>
-        <p:nvSpPr>
-          <p:cNvPr id="52" name="Rectangle 8">
-            <a:extLst>
-              <a:ext uri="{FF2B5EF4-FFF2-40B4-BE49-F238E27FC236}">
-                <a16:creationId xmlns:a16="http://schemas.microsoft.com/office/drawing/2014/main" id="{ABDCDBD2-131A-4B66-A2F2-43BBEE82C773}"/>
-              </a:ext>
-            </a:extLst>
-          </p:cNvPr>
-          <p:cNvSpPr/>
-          <p:nvPr/>
-        </p:nvSpPr>
-        <p:spPr>
-          <a:xfrm>
-            <a:off x="4755872" y="2206861"/>
-            <a:ext cx="1156969" cy="285783"/>
-          </a:xfrm>
-          <a:prstGeom prst="rect">
-            <a:avLst/>
-          </a:prstGeom>
-          <a:ln w="19050">
-            <a:solidFill>
-              <a:srgbClr val="7030A0"/>
-            </a:solidFill>
-          </a:ln>
-          <a:effectLst/>
-        </p:spPr>
-        <p:style>
-          <a:lnRef idx="1">
-            <a:schemeClr val="accent4"/>
-          </a:lnRef>
-          <a:fillRef idx="2">
-            <a:schemeClr val="accent4"/>
-          </a:fillRef>
-          <a:effectRef idx="1">
-            <a:schemeClr val="accent4"/>
-          </a:effectRef>
-          <a:fontRef idx="minor">
-            <a:schemeClr val="dk1"/>
-          </a:fontRef>
-        </p:style>
-        <p:txBody>
-          <a:bodyPr rtlCol="0" anchor="ctr"/>
-          <a:lstStyle/>
-          <a:p>
-            <a:pPr algn="ctr"/>
-            <a:r>
-              <a:rPr lang="en-US" sz="1050" dirty="0" err="1">
-                <a:solidFill>
-                  <a:srgbClr val="7030A0"/>
-                </a:solidFill>
-              </a:rPr>
-              <a:t>UniqueTagList</a:t>
-            </a:r>
-            <a:endParaRPr lang="en-SG" sz="1050" dirty="0">
-              <a:solidFill>
-                <a:srgbClr val="7030A0"/>
-              </a:solidFill>
-            </a:endParaRPr>
-          </a:p>
-        </p:txBody>
-      </p:sp>
-      <p:cxnSp>
-        <p:nvCxnSpPr>
-          <p:cNvPr id="53" name="Elbow Connector 78">
-            <a:extLst>
-              <a:ext uri="{FF2B5EF4-FFF2-40B4-BE49-F238E27FC236}">
-                <a16:creationId xmlns:a16="http://schemas.microsoft.com/office/drawing/2014/main" id="{B97967F8-618A-448B-81FD-CDFD4AF0EC64}"/>
-              </a:ext>
-            </a:extLst>
-          </p:cNvPr>
-          <p:cNvCxnSpPr>
-            <a:cxnSpLocks/>
-            <a:stCxn id="54" idx="0"/>
-            <a:endCxn id="52" idx="1"/>
-          </p:cNvCxnSpPr>
-          <p:nvPr/>
-        </p:nvCxnSpPr>
-        <p:spPr>
-          <a:xfrm rot="5400000" flipH="1" flipV="1">
-            <a:off x="4233181" y="2536174"/>
-            <a:ext cx="709111" cy="336271"/>
-          </a:xfrm>
-          <a:prstGeom prst="bentConnector2">
-            <a:avLst/>
-          </a:prstGeom>
-          <a:ln w="19050">
-            <a:solidFill>
-              <a:srgbClr val="7030A0"/>
-            </a:solidFill>
-            <a:headEnd type="none" w="med" len="med"/>
-            <a:tailEnd type="arrow" w="med" len="med"/>
-          </a:ln>
-          <a:effectLst/>
-        </p:spPr>
-        <p:style>
-          <a:lnRef idx="1">
-            <a:schemeClr val="accent2"/>
-          </a:lnRef>
-          <a:fillRef idx="2">
-            <a:schemeClr val="accent2"/>
-          </a:fillRef>
-          <a:effectRef idx="1">
-            <a:schemeClr val="accent2"/>
-          </a:effectRef>
-          <a:fontRef idx="minor">
-            <a:schemeClr val="dk1"/>
-          </a:fontRef>
-        </p:style>
-      </p:cxnSp>
-      <p:sp>
-        <p:nvSpPr>
-          <p:cNvPr id="50" name="TextBox 49">
-            <a:extLst>
-              <a:ext uri="{FF2B5EF4-FFF2-40B4-BE49-F238E27FC236}">
-                <a16:creationId xmlns:a16="http://schemas.microsoft.com/office/drawing/2014/main" id="{B3FA9D57-880F-49C4-AD0B-A64E30D6F403}"/>
-              </a:ext>
-            </a:extLst>
-          </p:cNvPr>
-          <p:cNvSpPr txBox="1"/>
-          <p:nvPr/>
-        </p:nvSpPr>
-        <p:spPr>
-          <a:xfrm>
-            <a:off x="6714344" y="2430721"/>
-            <a:ext cx="189257" cy="178683"/>
-          </a:xfrm>
-          <a:prstGeom prst="rect">
-            <a:avLst/>
-          </a:prstGeom>
-          <a:noFill/>
-        </p:spPr>
-        <p:txBody>
-          <a:bodyPr wrap="square" lIns="0" tIns="0" rIns="0" bIns="0" rtlCol="0">
-            <a:noAutofit/>
-          </a:bodyPr>
-          <a:lstStyle/>
-          <a:p>
-            <a:pPr algn="ctr"/>
-            <a:r>
-              <a:rPr lang="en-US" sz="1100" dirty="0">
-                <a:solidFill>
-                  <a:srgbClr val="7030A0"/>
-                </a:solidFill>
-              </a:rPr>
-              <a:t>*</a:t>
-            </a:r>
-            <a:endParaRPr lang="en-SG" sz="1100" dirty="0">
-              <a:solidFill>
-                <a:srgbClr val="7030A0"/>
-              </a:solidFill>
-            </a:endParaRPr>
-          </a:p>
-        </p:txBody>
-      </p:sp>
-      <p:sp>
-        <p:nvSpPr>
-          <p:cNvPr id="55" name="Flowchart: Decision 96">
-            <a:extLst>
-              <a:ext uri="{FF2B5EF4-FFF2-40B4-BE49-F238E27FC236}">
-                <a16:creationId xmlns:a16="http://schemas.microsoft.com/office/drawing/2014/main" id="{B9F96195-942D-4692-91B7-CF34229E7461}"/>
-              </a:ext>
-            </a:extLst>
-          </p:cNvPr>
-          <p:cNvSpPr/>
-          <p:nvPr/>
-        </p:nvSpPr>
-        <p:spPr>
-          <a:xfrm rot="16200000">
-            <a:off x="6553482" y="2664721"/>
-            <a:ext cx="236048" cy="173380"/>
-          </a:xfrm>
-          <a:prstGeom prst="flowChartDecision">
-            <a:avLst/>
-          </a:prstGeom>
-          <a:noFill/>
-          <a:ln w="19050">
-            <a:solidFill>
-              <a:srgbClr val="7030A0"/>
-            </a:solidFill>
-          </a:ln>
-          <a:effectLst/>
-        </p:spPr>
-        <p:style>
-          <a:lnRef idx="1">
-            <a:schemeClr val="accent6"/>
-          </a:lnRef>
-          <a:fillRef idx="2">
-            <a:schemeClr val="accent6"/>
-          </a:fillRef>
-          <a:effectRef idx="1">
-            <a:schemeClr val="accent6"/>
-          </a:effectRef>
-          <a:fontRef idx="minor">
-            <a:schemeClr val="dk1"/>
-          </a:fontRef>
-        </p:style>
-        <p:txBody>
-          <a:bodyPr rtlCol="0" anchor="ctr"/>
-          <a:lstStyle/>
-          <a:p>
-            <a:pPr algn="ctr"/>
-            <a:endParaRPr lang="en-US" sz="1050"/>
-          </a:p>
-        </p:txBody>
-      </p:sp>
-      <p:cxnSp>
-        <p:nvCxnSpPr>
-          <p:cNvPr id="59" name="Elbow Connector 63">
-            <a:extLst>
-              <a:ext uri="{FF2B5EF4-FFF2-40B4-BE49-F238E27FC236}">
-                <a16:creationId xmlns:a16="http://schemas.microsoft.com/office/drawing/2014/main" id="{E2D6A56C-A223-4236-A1F0-7EFEBA2FC940}"/>
-              </a:ext>
-            </a:extLst>
-          </p:cNvPr>
-          <p:cNvCxnSpPr>
-            <a:cxnSpLocks/>
-            <a:endCxn id="67" idx="1"/>
-          </p:cNvCxnSpPr>
-          <p:nvPr/>
-        </p:nvCxnSpPr>
-        <p:spPr>
-          <a:xfrm flipV="1">
-            <a:off x="5884280" y="2233006"/>
-            <a:ext cx="432916" cy="111294"/>
-          </a:xfrm>
-          <a:prstGeom prst="bentConnector3">
-            <a:avLst/>
-          </a:prstGeom>
-          <a:ln w="19050">
-            <a:solidFill>
-              <a:srgbClr val="7030A0"/>
-            </a:solidFill>
-            <a:headEnd type="none" w="med" len="med"/>
-            <a:tailEnd type="arrow" w="med" len="med"/>
-          </a:ln>
-          <a:effectLst/>
-        </p:spPr>
-        <p:style>
-          <a:lnRef idx="1">
-            <a:schemeClr val="accent2"/>
-          </a:lnRef>
-          <a:fillRef idx="2">
-            <a:schemeClr val="accent2"/>
-          </a:fillRef>
-          <a:effectRef idx="1">
-            <a:schemeClr val="accent2"/>
-          </a:effectRef>
-          <a:fontRef idx="minor">
-            <a:schemeClr val="dk1"/>
-          </a:fontRef>
-        </p:style>
-      </p:cxnSp>
-      <p:sp>
-        <p:nvSpPr>
-          <p:cNvPr id="67" name="Rectangle 8">
-            <a:extLst>
-              <a:ext uri="{FF2B5EF4-FFF2-40B4-BE49-F238E27FC236}">
-                <a16:creationId xmlns:a16="http://schemas.microsoft.com/office/drawing/2014/main" id="{36D68104-33BB-4C8F-B764-F3F0B25E592B}"/>
-              </a:ext>
-            </a:extLst>
-          </p:cNvPr>
-          <p:cNvSpPr/>
-          <p:nvPr/>
-        </p:nvSpPr>
-        <p:spPr>
-          <a:xfrm>
-            <a:off x="6317196" y="2059626"/>
-            <a:ext cx="708186" cy="346760"/>
-          </a:xfrm>
-          <a:prstGeom prst="rect">
-            <a:avLst/>
-          </a:prstGeom>
-          <a:ln w="19050">
-            <a:solidFill>
-              <a:srgbClr val="7030A0"/>
-            </a:solidFill>
-          </a:ln>
-          <a:effectLst/>
-        </p:spPr>
-        <p:style>
-          <a:lnRef idx="1">
-            <a:schemeClr val="accent4"/>
-          </a:lnRef>
-          <a:fillRef idx="2">
-            <a:schemeClr val="accent4"/>
-          </a:fillRef>
-          <a:effectRef idx="1">
-            <a:schemeClr val="accent4"/>
-          </a:effectRef>
-          <a:fontRef idx="minor">
-            <a:schemeClr val="dk1"/>
-          </a:fontRef>
-        </p:style>
-        <p:txBody>
-          <a:bodyPr rtlCol="0" anchor="ctr"/>
-          <a:lstStyle/>
-          <a:p>
-            <a:pPr algn="ctr"/>
-            <a:r>
-              <a:rPr lang="en-US" sz="1050" dirty="0">
-                <a:solidFill>
-                  <a:srgbClr val="7030A0"/>
-                </a:solidFill>
-              </a:rPr>
-              <a:t>Tag</a:t>
-            </a:r>
-            <a:endParaRPr lang="en-SG" sz="1050" dirty="0">
-              <a:solidFill>
-                <a:srgbClr val="7030A0"/>
-              </a:solidFill>
-            </a:endParaRPr>
-          </a:p>
-        </p:txBody>
-      </p:sp>
-      <p:sp>
-        <p:nvSpPr>
-          <p:cNvPr id="68" name="TextBox 67">
-            <a:extLst>
-              <a:ext uri="{FF2B5EF4-FFF2-40B4-BE49-F238E27FC236}">
-                <a16:creationId xmlns:a16="http://schemas.microsoft.com/office/drawing/2014/main" id="{18A2ABF0-4DA8-43EE-BACE-A737C4E4CFEC}"/>
-              </a:ext>
-            </a:extLst>
-          </p:cNvPr>
-          <p:cNvSpPr txBox="1"/>
-          <p:nvPr/>
-        </p:nvSpPr>
-        <p:spPr>
-          <a:xfrm>
-            <a:off x="6135256" y="2278014"/>
-            <a:ext cx="189257" cy="178683"/>
-          </a:xfrm>
-          <a:prstGeom prst="rect">
-            <a:avLst/>
-          </a:prstGeom>
-          <a:noFill/>
-        </p:spPr>
-        <p:txBody>
-          <a:bodyPr wrap="square" lIns="0" tIns="0" rIns="0" bIns="0" rtlCol="0">
-            <a:noAutofit/>
-          </a:bodyPr>
-          <a:lstStyle/>
-          <a:p>
-            <a:pPr algn="ctr"/>
-            <a:r>
-              <a:rPr lang="en-US" sz="1100" dirty="0">
-                <a:solidFill>
-                  <a:srgbClr val="7030A0"/>
-                </a:solidFill>
-              </a:rPr>
-              <a:t>*</a:t>
-            </a:r>
-            <a:endParaRPr lang="en-SG" sz="1100" dirty="0">
-              <a:solidFill>
-                <a:srgbClr val="7030A0"/>
-              </a:solidFill>
-            </a:endParaRPr>
-          </a:p>
-        </p:txBody>
-      </p:sp>
-      <p:sp>
-        <p:nvSpPr>
-          <p:cNvPr id="69" name="TextBox 68">
-            <a:extLst>
-              <a:ext uri="{FF2B5EF4-FFF2-40B4-BE49-F238E27FC236}">
-                <a16:creationId xmlns:a16="http://schemas.microsoft.com/office/drawing/2014/main" id="{8CF9406A-39C7-4163-8880-BB65541FC08E}"/>
-              </a:ext>
-            </a:extLst>
-          </p:cNvPr>
-          <p:cNvSpPr txBox="1"/>
-          <p:nvPr/>
-        </p:nvSpPr>
-        <p:spPr>
-          <a:xfrm>
-            <a:off x="4367100" y="2172972"/>
-            <a:ext cx="189257" cy="178683"/>
-          </a:xfrm>
-          <a:prstGeom prst="rect">
-            <a:avLst/>
-          </a:prstGeom>
-          <a:noFill/>
-        </p:spPr>
-        <p:txBody>
-          <a:bodyPr wrap="square" lIns="0" tIns="0" rIns="0" bIns="0" rtlCol="0">
-            <a:noAutofit/>
-          </a:bodyPr>
-          <a:lstStyle/>
-          <a:p>
-            <a:pPr algn="ctr"/>
-            <a:r>
-              <a:rPr lang="en-US" sz="1100" dirty="0">
-                <a:solidFill>
-                  <a:srgbClr val="7030A0"/>
-                </a:solidFill>
-              </a:rPr>
-              <a:t>1</a:t>
-            </a:r>
-            <a:endParaRPr lang="en-SG" sz="1100" dirty="0">
-              <a:solidFill>
-                <a:srgbClr val="7030A0"/>
-              </a:solidFill>
-            </a:endParaRPr>
-          </a:p>
-        </p:txBody>
-      </p:sp>
-      <p:sp>
-        <p:nvSpPr>
-          <p:cNvPr id="71" name="Flowchart: Decision 96">
-            <a:extLst>
-              <a:ext uri="{FF2B5EF4-FFF2-40B4-BE49-F238E27FC236}">
-                <a16:creationId xmlns:a16="http://schemas.microsoft.com/office/drawing/2014/main" id="{233007D4-EEA2-4CA6-ACFE-1517B654224E}"/>
-              </a:ext>
-            </a:extLst>
-          </p:cNvPr>
-          <p:cNvSpPr/>
-          <p:nvPr/>
-        </p:nvSpPr>
-        <p:spPr>
-          <a:xfrm>
-            <a:off x="5911329" y="2262081"/>
-            <a:ext cx="236048" cy="173380"/>
-          </a:xfrm>
-          <a:prstGeom prst="flowChartDecision">
-            <a:avLst/>
-          </a:prstGeom>
-          <a:solidFill>
-            <a:srgbClr val="7030A0"/>
-          </a:solidFill>
-          <a:ln w="19050">
-            <a:solidFill>
-              <a:srgbClr val="7030A0"/>
-            </a:solidFill>
-          </a:ln>
-          <a:effectLst/>
-        </p:spPr>
-        <p:style>
-          <a:lnRef idx="1">
-            <a:schemeClr val="accent6"/>
-          </a:lnRef>
-          <a:fillRef idx="2">
-            <a:schemeClr val="accent6"/>
-          </a:fillRef>
-          <a:effectRef idx="1">
-            <a:schemeClr val="accent6"/>
-          </a:effectRef>
-          <a:fontRef idx="minor">
-            <a:schemeClr val="dk1"/>
-          </a:fontRef>
-        </p:style>
-        <p:txBody>
-          <a:bodyPr rtlCol="0" anchor="ctr"/>
-          <a:lstStyle/>
-          <a:p>
-            <a:pPr algn="ctr"/>
-            <a:endParaRPr lang="en-US" sz="1050"/>
-          </a:p>
-        </p:txBody>
-      </p:sp>
-      <p:cxnSp>
-        <p:nvCxnSpPr>
-          <p:cNvPr id="72" name="Elbow Connector 78">
-            <a:extLst>
-              <a:ext uri="{FF2B5EF4-FFF2-40B4-BE49-F238E27FC236}">
-                <a16:creationId xmlns:a16="http://schemas.microsoft.com/office/drawing/2014/main" id="{D5DFB8C5-B0B0-46C1-967B-4449112ABD6F}"/>
-              </a:ext>
-            </a:extLst>
-          </p:cNvPr>
-          <p:cNvCxnSpPr>
-            <a:cxnSpLocks/>
-            <a:stCxn id="55" idx="3"/>
-            <a:endCxn id="67" idx="2"/>
-          </p:cNvCxnSpPr>
-          <p:nvPr/>
-        </p:nvCxnSpPr>
-        <p:spPr>
-          <a:xfrm rot="16200000" flipV="1">
-            <a:off x="6557898" y="2519778"/>
-            <a:ext cx="227001" cy="217"/>
-          </a:xfrm>
-          <a:prstGeom prst="bentConnector3">
-            <a:avLst>
-              <a:gd name="adj1" fmla="val 50000"/>
-            </a:avLst>
-          </a:prstGeom>
-          <a:ln w="19050">
-            <a:solidFill>
-              <a:srgbClr val="7030A0"/>
-            </a:solidFill>
-            <a:headEnd type="none" w="med" len="med"/>
-            <a:tailEnd type="arrow" w="med" len="med"/>
-          </a:ln>
-          <a:effectLst/>
-        </p:spPr>
-        <p:style>
-          <a:lnRef idx="1">
-            <a:schemeClr val="accent2"/>
-          </a:lnRef>
-          <a:fillRef idx="2">
-            <a:schemeClr val="accent2"/>
-          </a:fillRef>
-          <a:effectRef idx="1">
-            <a:schemeClr val="accent2"/>
-          </a:effectRef>
-          <a:fontRef idx="minor">
-            <a:schemeClr val="dk1"/>
-          </a:fontRef>
-        </p:style>
-      </p:cxnSp>
-      <p:cxnSp>
-        <p:nvCxnSpPr>
-          <p:cNvPr id="90" name="Elbow Connector 63"/>
-          <p:cNvCxnSpPr>
-            <a:stCxn id="91" idx="3"/>
-          </p:cNvCxnSpPr>
-          <p:nvPr/>
-        </p:nvCxnSpPr>
-        <p:spPr>
-          <a:xfrm rot="5400000">
-            <a:off x="3470636" y="2687353"/>
-            <a:ext cx="293825" cy="5938"/>
-          </a:xfrm>
-          <a:prstGeom prst="bentConnector3">
-            <a:avLst>
-              <a:gd name="adj1" fmla="val 50000"/>
-            </a:avLst>
-          </a:prstGeom>
-          <a:ln w="19050">
-            <a:solidFill>
-              <a:srgbClr val="7030A0"/>
-            </a:solidFill>
-            <a:prstDash val="sysDot"/>
-            <a:headEnd type="none" w="med" len="med"/>
-            <a:tailEnd type="none" w="med" len="med"/>
-          </a:ln>
-          <a:effectLst/>
-        </p:spPr>
-        <p:style>
-          <a:lnRef idx="1">
-            <a:schemeClr val="accent2"/>
-          </a:lnRef>
-          <a:fillRef idx="2">
-            <a:schemeClr val="accent2"/>
-          </a:fillRef>
-          <a:effectRef idx="1">
-            <a:schemeClr val="accent2"/>
-          </a:effectRef>
-          <a:fontRef idx="minor">
-            <a:schemeClr val="dk1"/>
-          </a:fontRef>
-        </p:style>
-      </p:cxnSp>
-      <p:sp>
-        <p:nvSpPr>
-          <p:cNvPr id="91" name="Isosceles Triangle 102"/>
-          <p:cNvSpPr/>
-          <p:nvPr/>
-        </p:nvSpPr>
-        <p:spPr>
-          <a:xfrm rot="10800000" flipV="1">
-            <a:off x="3479324" y="2386348"/>
-            <a:ext cx="282387" cy="157062"/>
-          </a:xfrm>
-          <a:prstGeom prst="triangle">
-            <a:avLst/>
-          </a:prstGeom>
-          <a:ln w="19050">
-            <a:solidFill>
-              <a:srgbClr val="7030A0"/>
-            </a:solidFill>
-          </a:ln>
-          <a:effectLst/>
-        </p:spPr>
-        <p:style>
-          <a:lnRef idx="1">
-            <a:schemeClr val="accent4"/>
-          </a:lnRef>
-          <a:fillRef idx="2">
-            <a:schemeClr val="accent4"/>
-          </a:fillRef>
-          <a:effectRef idx="1">
-            <a:schemeClr val="accent4"/>
-          </a:effectRef>
-          <a:fontRef idx="minor">
-            <a:schemeClr val="dk1"/>
-          </a:fontRef>
-        </p:style>
-        <p:txBody>
-          <a:bodyPr rtlCol="0" anchor="ctr"/>
-          <a:lstStyle/>
-          <a:p>
-            <a:pPr algn="ctr"/>
-            <a:endParaRPr lang="en-SG" sz="1050" b="1">
-              <a:solidFill>
-                <a:srgbClr val="92D050"/>
-              </a:solidFill>
-            </a:endParaRPr>
-          </a:p>
-        </p:txBody>
-      </p:sp>
-      <p:sp>
-        <p:nvSpPr>
-          <p:cNvPr id="92" name="Rectangle 8"/>
-          <p:cNvSpPr/>
-          <p:nvPr/>
-        </p:nvSpPr>
-        <p:spPr>
-          <a:xfrm>
-            <a:off x="1177947" y="1998144"/>
-            <a:ext cx="1443661" cy="364396"/>
-          </a:xfrm>
-          <a:prstGeom prst="rect">
-            <a:avLst/>
-          </a:prstGeom>
-          <a:ln w="19050">
-            <a:solidFill>
-              <a:srgbClr val="7030A0"/>
-            </a:solidFill>
-          </a:ln>
-          <a:effectLst/>
-        </p:spPr>
-        <p:style>
-          <a:lnRef idx="1">
-            <a:schemeClr val="accent4"/>
-          </a:lnRef>
-          <a:fillRef idx="2">
-            <a:schemeClr val="accent4"/>
-          </a:fillRef>
-          <a:effectRef idx="1">
-            <a:schemeClr val="accent4"/>
-          </a:effectRef>
-          <a:fontRef idx="minor">
-            <a:schemeClr val="dk1"/>
-          </a:fontRef>
-        </p:style>
-        <p:txBody>
-          <a:bodyPr rtlCol="0" anchor="ctr"/>
-          <a:lstStyle/>
-          <a:p>
-            <a:pPr algn="ctr"/>
-            <a:r>
-              <a:rPr lang="en-US" sz="1050" dirty="0">
-                <a:solidFill>
-                  <a:srgbClr val="7030A0"/>
-                </a:solidFill>
-              </a:rPr>
-              <a:t>&lt;&lt;interface&gt;&gt;</a:t>
-            </a:r>
-            <a:br>
-              <a:rPr lang="en-US" sz="1050" dirty="0">
-                <a:solidFill>
-                  <a:srgbClr val="7030A0"/>
-                </a:solidFill>
-              </a:rPr>
-            </a:br>
-            <a:r>
-              <a:rPr lang="en-US" sz="1050" dirty="0" err="1">
-                <a:solidFill>
-                  <a:srgbClr val="7030A0"/>
-                </a:solidFill>
-              </a:rPr>
-              <a:t>ReadOnlyAddressBook</a:t>
-            </a:r>
-            <a:endParaRPr lang="en-SG" sz="1050" dirty="0">
-              <a:solidFill>
-                <a:srgbClr val="7030A0"/>
-              </a:solidFill>
-            </a:endParaRPr>
-          </a:p>
-        </p:txBody>
-      </p:sp>
-      <p:sp>
-        <p:nvSpPr>
-          <p:cNvPr id="93" name="Rectangle 8"/>
-          <p:cNvSpPr/>
-          <p:nvPr/>
-        </p:nvSpPr>
-        <p:spPr>
-          <a:xfrm>
-            <a:off x="3087206" y="1998144"/>
-            <a:ext cx="1060683" cy="364396"/>
-          </a:xfrm>
-          <a:prstGeom prst="rect">
-            <a:avLst/>
-          </a:prstGeom>
-          <a:ln w="19050">
-            <a:solidFill>
-              <a:srgbClr val="7030A0"/>
-            </a:solidFill>
-          </a:ln>
-          <a:effectLst/>
-        </p:spPr>
-        <p:style>
-          <a:lnRef idx="1">
-            <a:schemeClr val="accent4"/>
-          </a:lnRef>
-          <a:fillRef idx="2">
-            <a:schemeClr val="accent4"/>
-          </a:fillRef>
-          <a:effectRef idx="1">
-            <a:schemeClr val="accent4"/>
-          </a:effectRef>
-          <a:fontRef idx="minor">
-            <a:schemeClr val="dk1"/>
-          </a:fontRef>
-        </p:style>
-        <p:txBody>
-          <a:bodyPr rtlCol="0" anchor="ctr"/>
-          <a:lstStyle/>
-          <a:p>
-            <a:pPr algn="ctr"/>
-            <a:r>
-              <a:rPr lang="en-US" sz="1050" dirty="0" err="1">
-                <a:solidFill>
-                  <a:srgbClr val="7030A0"/>
-                </a:solidFill>
-              </a:rPr>
-              <a:t>AddressBook</a:t>
-            </a:r>
-            <a:endParaRPr lang="en-SG" sz="1050" dirty="0">
-              <a:solidFill>
-                <a:srgbClr val="7030A0"/>
-              </a:solidFill>
-            </a:endParaRPr>
-          </a:p>
-        </p:txBody>
-      </p:sp>
-      <p:sp>
-        <p:nvSpPr>
-          <p:cNvPr id="94" name="Isosceles Triangle 102"/>
-          <p:cNvSpPr/>
-          <p:nvPr/>
-        </p:nvSpPr>
-        <p:spPr>
-          <a:xfrm rot="16200000">
-            <a:off x="2586098" y="2068952"/>
-            <a:ext cx="271014" cy="187417"/>
-          </a:xfrm>
-          <a:prstGeom prst="triangle">
-            <a:avLst>
-              <a:gd name="adj" fmla="val 44517"/>
-            </a:avLst>
-          </a:prstGeom>
-          <a:solidFill>
-            <a:schemeClr val="accent4">
-              <a:lumMod val="20000"/>
-              <a:lumOff val="80000"/>
-            </a:schemeClr>
-          </a:solidFill>
-          <a:ln w="19050">
-            <a:solidFill>
-              <a:srgbClr val="7030A0"/>
-            </a:solidFill>
-          </a:ln>
-          <a:effectLst/>
-        </p:spPr>
-        <p:style>
-          <a:lnRef idx="1">
-            <a:schemeClr val="accent6"/>
-          </a:lnRef>
-          <a:fillRef idx="2">
-            <a:schemeClr val="accent6"/>
-          </a:fillRef>
-          <a:effectRef idx="1">
-            <a:schemeClr val="accent6"/>
-          </a:effectRef>
-          <a:fontRef idx="minor">
-            <a:schemeClr val="dk1"/>
-          </a:fontRef>
-        </p:style>
-        <p:txBody>
-          <a:bodyPr rtlCol="0" anchor="ctr"/>
-          <a:lstStyle/>
-          <a:p>
-            <a:pPr algn="ctr"/>
-            <a:endParaRPr lang="en-SG" sz="1050"/>
-          </a:p>
-        </p:txBody>
-      </p:sp>
-      <p:cxnSp>
-        <p:nvCxnSpPr>
-          <p:cNvPr id="95" name="Elbow Connector 63"/>
-          <p:cNvCxnSpPr>
-            <a:stCxn id="94" idx="3"/>
-            <a:endCxn id="93" idx="1"/>
-          </p:cNvCxnSpPr>
-          <p:nvPr/>
-        </p:nvCxnSpPr>
-        <p:spPr>
-          <a:xfrm>
-            <a:off x="2815314" y="2177521"/>
-            <a:ext cx="271892" cy="2821"/>
-          </a:xfrm>
-          <a:prstGeom prst="bentConnector3">
-            <a:avLst>
-              <a:gd name="adj1" fmla="val 50000"/>
-            </a:avLst>
-          </a:prstGeom>
-          <a:ln w="19050">
-            <a:solidFill>
-              <a:srgbClr val="7030A0"/>
-            </a:solidFill>
-            <a:prstDash val="sysDot"/>
-            <a:headEnd type="none" w="med" len="med"/>
-            <a:tailEnd type="none" w="med" len="med"/>
-          </a:ln>
-          <a:effectLst/>
-        </p:spPr>
-        <p:style>
-          <a:lnRef idx="1">
-            <a:schemeClr val="accent2"/>
-          </a:lnRef>
-          <a:fillRef idx="2">
-            <a:schemeClr val="accent2"/>
-          </a:fillRef>
-          <a:effectRef idx="1">
-            <a:schemeClr val="accent2"/>
-          </a:effectRef>
-          <a:fontRef idx="minor">
-            <a:schemeClr val="dk1"/>
-          </a:fontRef>
-        </p:style>
-      </p:cxnSp>
+      </p:pic>
     </p:spTree>
     <p:extLst>
       <p:ext uri="{BB962C8B-B14F-4D97-AF65-F5344CB8AC3E}">
@@ -6572,4 +4626,24 @@
   <a:objectDefaults/>
   <a:extraClrSchemeLst/>
 </a:theme>
+</file>
+
+<file path=ppt/webextensions/taskpanes.xml><?xml version="1.0" encoding="utf-8"?>
+<wetp:taskpanes xmlns:wetp="http://schemas.microsoft.com/office/webextensions/taskpanes/2010/11">
+  <wetp:taskpane dockstate="right" visibility="0" width="525" row="2">
+    <wetp:webextensionref xmlns:r="http://schemas.openxmlformats.org/officeDocument/2006/relationships" r:id="rId1"/>
+  </wetp:taskpane>
+</wetp:taskpanes>
+</file>
+
+<file path=ppt/webextensions/webextension1.xml><?xml version="1.0" encoding="utf-8"?>
+<we:webextension xmlns:we="http://schemas.microsoft.com/office/webextensions/webextension/2010/11" id="{46533BE7-B6A3-41EE-97CE-56B239A70786}">
+  <we:reference id="wa104381637" version="1.0.0.0" store="en-US" storeType="OMEX"/>
+  <we:alternateReferences>
+    <we:reference id="wa104381637" version="1.0.0.0" store="WA104381637" storeType="OMEX"/>
+  </we:alternateReferences>
+  <we:properties/>
+  <we:bindings/>
+  <we:snapshot xmlns:r="http://schemas.openxmlformats.org/officeDocument/2006/relationships"/>
+</we:webextension>
 </file>
</xml_diff>

<commit_message>
Revert "Update dev guide"
</commit_message>
<xml_diff>
--- a/docs/diagrams/ModelComponentClassBetterOopDiagram.pptx
+++ b/docs/diagrams/ModelComponentClassBetterOopDiagram.pptx
@@ -126,483 +126,6 @@
 </p:presentation>
 </file>
 
-<file path=ppt/changesInfos/changesInfo1.xml><?xml version="1.0" encoding="utf-8"?>
-<pc:chgInfo xmlns:a="http://schemas.openxmlformats.org/drawingml/2006/main" xmlns:r="http://schemas.openxmlformats.org/officeDocument/2006/relationships" xmlns:ac="http://schemas.microsoft.com/office/drawing/2013/main/command" xmlns:pc="http://schemas.microsoft.com/office/powerpoint/2013/main/command">
-  <pc:docChgLst>
-    <pc:chgData name="Shengmin Leong" userId="075411cc4697ef0d" providerId="LiveId" clId="{B47E0FA8-705D-450E-B7A5-9E4D249F3A5D}"/>
-    <pc:docChg chg="custSel modSld">
-      <pc:chgData name="Shengmin Leong" userId="075411cc4697ef0d" providerId="LiveId" clId="{B47E0FA8-705D-450E-B7A5-9E4D249F3A5D}" dt="2018-10-14T07:44:00.420" v="18" actId="20577"/>
-      <pc:docMkLst>
-        <pc:docMk/>
-      </pc:docMkLst>
-      <pc:sldChg chg="addSp delSp modSp modNotesTx">
-        <pc:chgData name="Shengmin Leong" userId="075411cc4697ef0d" providerId="LiveId" clId="{B47E0FA8-705D-450E-B7A5-9E4D249F3A5D}" dt="2018-10-14T07:44:00.420" v="18" actId="20577"/>
-        <pc:sldMkLst>
-          <pc:docMk/>
-          <pc:sldMk cId="2396968029" sldId="263"/>
-        </pc:sldMkLst>
-        <pc:spChg chg="del">
-          <ac:chgData name="Shengmin Leong" userId="075411cc4697ef0d" providerId="LiveId" clId="{B47E0FA8-705D-450E-B7A5-9E4D249F3A5D}" dt="2018-10-14T07:28:33.185" v="0" actId="478"/>
-          <ac:spMkLst>
-            <pc:docMk/>
-            <pc:sldMk cId="2396968029" sldId="263"/>
-            <ac:spMk id="2" creationId="{00000000-0000-0000-0000-000000000000}"/>
-          </ac:spMkLst>
-        </pc:spChg>
-        <pc:spChg chg="del">
-          <ac:chgData name="Shengmin Leong" userId="075411cc4697ef0d" providerId="LiveId" clId="{B47E0FA8-705D-450E-B7A5-9E4D249F3A5D}" dt="2018-10-14T07:28:33.185" v="0" actId="478"/>
-          <ac:spMkLst>
-            <pc:docMk/>
-            <pc:sldMk cId="2396968029" sldId="263"/>
-            <ac:spMk id="9" creationId="{00000000-0000-0000-0000-000000000000}"/>
-          </ac:spMkLst>
-        </pc:spChg>
-        <pc:spChg chg="del">
-          <ac:chgData name="Shengmin Leong" userId="075411cc4697ef0d" providerId="LiveId" clId="{B47E0FA8-705D-450E-B7A5-9E4D249F3A5D}" dt="2018-10-14T07:28:33.185" v="0" actId="478"/>
-          <ac:spMkLst>
-            <pc:docMk/>
-            <pc:sldMk cId="2396968029" sldId="263"/>
-            <ac:spMk id="42" creationId="{00000000-0000-0000-0000-000000000000}"/>
-          </ac:spMkLst>
-        </pc:spChg>
-        <pc:spChg chg="del">
-          <ac:chgData name="Shengmin Leong" userId="075411cc4697ef0d" providerId="LiveId" clId="{B47E0FA8-705D-450E-B7A5-9E4D249F3A5D}" dt="2018-10-14T07:28:33.185" v="0" actId="478"/>
-          <ac:spMkLst>
-            <pc:docMk/>
-            <pc:sldMk cId="2396968029" sldId="263"/>
-            <ac:spMk id="46" creationId="{00000000-0000-0000-0000-000000000000}"/>
-          </ac:spMkLst>
-        </pc:spChg>
-        <pc:spChg chg="del">
-          <ac:chgData name="Shengmin Leong" userId="075411cc4697ef0d" providerId="LiveId" clId="{B47E0FA8-705D-450E-B7A5-9E4D249F3A5D}" dt="2018-10-14T07:28:33.185" v="0" actId="478"/>
-          <ac:spMkLst>
-            <pc:docMk/>
-            <pc:sldMk cId="2396968029" sldId="263"/>
-            <ac:spMk id="48" creationId="{00000000-0000-0000-0000-000000000000}"/>
-          </ac:spMkLst>
-        </pc:spChg>
-        <pc:spChg chg="del">
-          <ac:chgData name="Shengmin Leong" userId="075411cc4697ef0d" providerId="LiveId" clId="{B47E0FA8-705D-450E-B7A5-9E4D249F3A5D}" dt="2018-10-14T07:28:33.185" v="0" actId="478"/>
-          <ac:spMkLst>
-            <pc:docMk/>
-            <pc:sldMk cId="2396968029" sldId="263"/>
-            <ac:spMk id="49" creationId="{00000000-0000-0000-0000-000000000000}"/>
-          </ac:spMkLst>
-        </pc:spChg>
-        <pc:spChg chg="del">
-          <ac:chgData name="Shengmin Leong" userId="075411cc4697ef0d" providerId="LiveId" clId="{B47E0FA8-705D-450E-B7A5-9E4D249F3A5D}" dt="2018-10-14T07:28:33.185" v="0" actId="478"/>
-          <ac:spMkLst>
-            <pc:docMk/>
-            <pc:sldMk cId="2396968029" sldId="263"/>
-            <ac:spMk id="50" creationId="{B3FA9D57-880F-49C4-AD0B-A64E30D6F403}"/>
-          </ac:spMkLst>
-        </pc:spChg>
-        <pc:spChg chg="del">
-          <ac:chgData name="Shengmin Leong" userId="075411cc4697ef0d" providerId="LiveId" clId="{B47E0FA8-705D-450E-B7A5-9E4D249F3A5D}" dt="2018-10-14T07:28:33.185" v="0" actId="478"/>
-          <ac:spMkLst>
-            <pc:docMk/>
-            <pc:sldMk cId="2396968029" sldId="263"/>
-            <ac:spMk id="51" creationId="{00000000-0000-0000-0000-000000000000}"/>
-          </ac:spMkLst>
-        </pc:spChg>
-        <pc:spChg chg="del">
-          <ac:chgData name="Shengmin Leong" userId="075411cc4697ef0d" providerId="LiveId" clId="{B47E0FA8-705D-450E-B7A5-9E4D249F3A5D}" dt="2018-10-14T07:28:33.185" v="0" actId="478"/>
-          <ac:spMkLst>
-            <pc:docMk/>
-            <pc:sldMk cId="2396968029" sldId="263"/>
-            <ac:spMk id="52" creationId="{ABDCDBD2-131A-4B66-A2F2-43BBEE82C773}"/>
-          </ac:spMkLst>
-        </pc:spChg>
-        <pc:spChg chg="del">
-          <ac:chgData name="Shengmin Leong" userId="075411cc4697ef0d" providerId="LiveId" clId="{B47E0FA8-705D-450E-B7A5-9E4D249F3A5D}" dt="2018-10-14T07:28:33.185" v="0" actId="478"/>
-          <ac:spMkLst>
-            <pc:docMk/>
-            <pc:sldMk cId="2396968029" sldId="263"/>
-            <ac:spMk id="54" creationId="{00000000-0000-0000-0000-000000000000}"/>
-          </ac:spMkLst>
-        </pc:spChg>
-        <pc:spChg chg="del">
-          <ac:chgData name="Shengmin Leong" userId="075411cc4697ef0d" providerId="LiveId" clId="{B47E0FA8-705D-450E-B7A5-9E4D249F3A5D}" dt="2018-10-14T07:28:33.185" v="0" actId="478"/>
-          <ac:spMkLst>
-            <pc:docMk/>
-            <pc:sldMk cId="2396968029" sldId="263"/>
-            <ac:spMk id="55" creationId="{B9F96195-942D-4692-91B7-CF34229E7461}"/>
-          </ac:spMkLst>
-        </pc:spChg>
-        <pc:spChg chg="del">
-          <ac:chgData name="Shengmin Leong" userId="075411cc4697ef0d" providerId="LiveId" clId="{B47E0FA8-705D-450E-B7A5-9E4D249F3A5D}" dt="2018-10-14T07:28:33.185" v="0" actId="478"/>
-          <ac:spMkLst>
-            <pc:docMk/>
-            <pc:sldMk cId="2396968029" sldId="263"/>
-            <ac:spMk id="61" creationId="{00000000-0000-0000-0000-000000000000}"/>
-          </ac:spMkLst>
-        </pc:spChg>
-        <pc:spChg chg="del">
-          <ac:chgData name="Shengmin Leong" userId="075411cc4697ef0d" providerId="LiveId" clId="{B47E0FA8-705D-450E-B7A5-9E4D249F3A5D}" dt="2018-10-14T07:28:33.185" v="0" actId="478"/>
-          <ac:spMkLst>
-            <pc:docMk/>
-            <pc:sldMk cId="2396968029" sldId="263"/>
-            <ac:spMk id="62" creationId="{00000000-0000-0000-0000-000000000000}"/>
-          </ac:spMkLst>
-        </pc:spChg>
-        <pc:spChg chg="del">
-          <ac:chgData name="Shengmin Leong" userId="075411cc4697ef0d" providerId="LiveId" clId="{B47E0FA8-705D-450E-B7A5-9E4D249F3A5D}" dt="2018-10-14T07:28:33.185" v="0" actId="478"/>
-          <ac:spMkLst>
-            <pc:docMk/>
-            <pc:sldMk cId="2396968029" sldId="263"/>
-            <ac:spMk id="63" creationId="{00000000-0000-0000-0000-000000000000}"/>
-          </ac:spMkLst>
-        </pc:spChg>
-        <pc:spChg chg="del">
-          <ac:chgData name="Shengmin Leong" userId="075411cc4697ef0d" providerId="LiveId" clId="{B47E0FA8-705D-450E-B7A5-9E4D249F3A5D}" dt="2018-10-14T07:28:33.185" v="0" actId="478"/>
-          <ac:spMkLst>
-            <pc:docMk/>
-            <pc:sldMk cId="2396968029" sldId="263"/>
-            <ac:spMk id="65" creationId="{00000000-0000-0000-0000-000000000000}"/>
-          </ac:spMkLst>
-        </pc:spChg>
-        <pc:spChg chg="del">
-          <ac:chgData name="Shengmin Leong" userId="075411cc4697ef0d" providerId="LiveId" clId="{B47E0FA8-705D-450E-B7A5-9E4D249F3A5D}" dt="2018-10-14T07:28:33.185" v="0" actId="478"/>
-          <ac:spMkLst>
-            <pc:docMk/>
-            <pc:sldMk cId="2396968029" sldId="263"/>
-            <ac:spMk id="66" creationId="{00000000-0000-0000-0000-000000000000}"/>
-          </ac:spMkLst>
-        </pc:spChg>
-        <pc:spChg chg="del">
-          <ac:chgData name="Shengmin Leong" userId="075411cc4697ef0d" providerId="LiveId" clId="{B47E0FA8-705D-450E-B7A5-9E4D249F3A5D}" dt="2018-10-14T07:28:33.185" v="0" actId="478"/>
-          <ac:spMkLst>
-            <pc:docMk/>
-            <pc:sldMk cId="2396968029" sldId="263"/>
-            <ac:spMk id="67" creationId="{36D68104-33BB-4C8F-B764-F3F0B25E592B}"/>
-          </ac:spMkLst>
-        </pc:spChg>
-        <pc:spChg chg="del">
-          <ac:chgData name="Shengmin Leong" userId="075411cc4697ef0d" providerId="LiveId" clId="{B47E0FA8-705D-450E-B7A5-9E4D249F3A5D}" dt="2018-10-14T07:28:33.185" v="0" actId="478"/>
-          <ac:spMkLst>
-            <pc:docMk/>
-            <pc:sldMk cId="2396968029" sldId="263"/>
-            <ac:spMk id="68" creationId="{18A2ABF0-4DA8-43EE-BACE-A737C4E4CFEC}"/>
-          </ac:spMkLst>
-        </pc:spChg>
-        <pc:spChg chg="del">
-          <ac:chgData name="Shengmin Leong" userId="075411cc4697ef0d" providerId="LiveId" clId="{B47E0FA8-705D-450E-B7A5-9E4D249F3A5D}" dt="2018-10-14T07:28:33.185" v="0" actId="478"/>
-          <ac:spMkLst>
-            <pc:docMk/>
-            <pc:sldMk cId="2396968029" sldId="263"/>
-            <ac:spMk id="69" creationId="{8CF9406A-39C7-4163-8880-BB65541FC08E}"/>
-          </ac:spMkLst>
-        </pc:spChg>
-        <pc:spChg chg="del">
-          <ac:chgData name="Shengmin Leong" userId="075411cc4697ef0d" providerId="LiveId" clId="{B47E0FA8-705D-450E-B7A5-9E4D249F3A5D}" dt="2018-10-14T07:28:33.185" v="0" actId="478"/>
-          <ac:spMkLst>
-            <pc:docMk/>
-            <pc:sldMk cId="2396968029" sldId="263"/>
-            <ac:spMk id="70" creationId="{00000000-0000-0000-0000-000000000000}"/>
-          </ac:spMkLst>
-        </pc:spChg>
-        <pc:spChg chg="del">
-          <ac:chgData name="Shengmin Leong" userId="075411cc4697ef0d" providerId="LiveId" clId="{B47E0FA8-705D-450E-B7A5-9E4D249F3A5D}" dt="2018-10-14T07:28:33.185" v="0" actId="478"/>
-          <ac:spMkLst>
-            <pc:docMk/>
-            <pc:sldMk cId="2396968029" sldId="263"/>
-            <ac:spMk id="71" creationId="{233007D4-EEA2-4CA6-ACFE-1517B654224E}"/>
-          </ac:spMkLst>
-        </pc:spChg>
-        <pc:spChg chg="del">
-          <ac:chgData name="Shengmin Leong" userId="075411cc4697ef0d" providerId="LiveId" clId="{B47E0FA8-705D-450E-B7A5-9E4D249F3A5D}" dt="2018-10-14T07:28:33.185" v="0" actId="478"/>
-          <ac:spMkLst>
-            <pc:docMk/>
-            <pc:sldMk cId="2396968029" sldId="263"/>
-            <ac:spMk id="76" creationId="{00000000-0000-0000-0000-000000000000}"/>
-          </ac:spMkLst>
-        </pc:spChg>
-        <pc:spChg chg="del">
-          <ac:chgData name="Shengmin Leong" userId="075411cc4697ef0d" providerId="LiveId" clId="{B47E0FA8-705D-450E-B7A5-9E4D249F3A5D}" dt="2018-10-14T07:28:33.185" v="0" actId="478"/>
-          <ac:spMkLst>
-            <pc:docMk/>
-            <pc:sldMk cId="2396968029" sldId="263"/>
-            <ac:spMk id="78" creationId="{00000000-0000-0000-0000-000000000000}"/>
-          </ac:spMkLst>
-        </pc:spChg>
-        <pc:spChg chg="del">
-          <ac:chgData name="Shengmin Leong" userId="075411cc4697ef0d" providerId="LiveId" clId="{B47E0FA8-705D-450E-B7A5-9E4D249F3A5D}" dt="2018-10-14T07:28:33.185" v="0" actId="478"/>
-          <ac:spMkLst>
-            <pc:docMk/>
-            <pc:sldMk cId="2396968029" sldId="263"/>
-            <ac:spMk id="80" creationId="{00000000-0000-0000-0000-000000000000}"/>
-          </ac:spMkLst>
-        </pc:spChg>
-        <pc:spChg chg="del">
-          <ac:chgData name="Shengmin Leong" userId="075411cc4697ef0d" providerId="LiveId" clId="{B47E0FA8-705D-450E-B7A5-9E4D249F3A5D}" dt="2018-10-14T07:28:33.185" v="0" actId="478"/>
-          <ac:spMkLst>
-            <pc:docMk/>
-            <pc:sldMk cId="2396968029" sldId="263"/>
-            <ac:spMk id="83" creationId="{00000000-0000-0000-0000-000000000000}"/>
-          </ac:spMkLst>
-        </pc:spChg>
-        <pc:spChg chg="del">
-          <ac:chgData name="Shengmin Leong" userId="075411cc4697ef0d" providerId="LiveId" clId="{B47E0FA8-705D-450E-B7A5-9E4D249F3A5D}" dt="2018-10-14T07:28:33.185" v="0" actId="478"/>
-          <ac:spMkLst>
-            <pc:docMk/>
-            <pc:sldMk cId="2396968029" sldId="263"/>
-            <ac:spMk id="85" creationId="{00000000-0000-0000-0000-000000000000}"/>
-          </ac:spMkLst>
-        </pc:spChg>
-        <pc:spChg chg="del">
-          <ac:chgData name="Shengmin Leong" userId="075411cc4697ef0d" providerId="LiveId" clId="{B47E0FA8-705D-450E-B7A5-9E4D249F3A5D}" dt="2018-10-14T07:28:33.185" v="0" actId="478"/>
-          <ac:spMkLst>
-            <pc:docMk/>
-            <pc:sldMk cId="2396968029" sldId="263"/>
-            <ac:spMk id="91" creationId="{00000000-0000-0000-0000-000000000000}"/>
-          </ac:spMkLst>
-        </pc:spChg>
-        <pc:spChg chg="del">
-          <ac:chgData name="Shengmin Leong" userId="075411cc4697ef0d" providerId="LiveId" clId="{B47E0FA8-705D-450E-B7A5-9E4D249F3A5D}" dt="2018-10-14T07:28:33.185" v="0" actId="478"/>
-          <ac:spMkLst>
-            <pc:docMk/>
-            <pc:sldMk cId="2396968029" sldId="263"/>
-            <ac:spMk id="92" creationId="{00000000-0000-0000-0000-000000000000}"/>
-          </ac:spMkLst>
-        </pc:spChg>
-        <pc:spChg chg="del">
-          <ac:chgData name="Shengmin Leong" userId="075411cc4697ef0d" providerId="LiveId" clId="{B47E0FA8-705D-450E-B7A5-9E4D249F3A5D}" dt="2018-10-14T07:28:33.185" v="0" actId="478"/>
-          <ac:spMkLst>
-            <pc:docMk/>
-            <pc:sldMk cId="2396968029" sldId="263"/>
-            <ac:spMk id="93" creationId="{00000000-0000-0000-0000-000000000000}"/>
-          </ac:spMkLst>
-        </pc:spChg>
-        <pc:spChg chg="del">
-          <ac:chgData name="Shengmin Leong" userId="075411cc4697ef0d" providerId="LiveId" clId="{B47E0FA8-705D-450E-B7A5-9E4D249F3A5D}" dt="2018-10-14T07:28:33.185" v="0" actId="478"/>
-          <ac:spMkLst>
-            <pc:docMk/>
-            <pc:sldMk cId="2396968029" sldId="263"/>
-            <ac:spMk id="94" creationId="{00000000-0000-0000-0000-000000000000}"/>
-          </ac:spMkLst>
-        </pc:spChg>
-        <pc:spChg chg="del">
-          <ac:chgData name="Shengmin Leong" userId="075411cc4697ef0d" providerId="LiveId" clId="{B47E0FA8-705D-450E-B7A5-9E4D249F3A5D}" dt="2018-10-14T07:28:33.185" v="0" actId="478"/>
-          <ac:spMkLst>
-            <pc:docMk/>
-            <pc:sldMk cId="2396968029" sldId="263"/>
-            <ac:spMk id="114" creationId="{00000000-0000-0000-0000-000000000000}"/>
-          </ac:spMkLst>
-        </pc:spChg>
-        <pc:spChg chg="del">
-          <ac:chgData name="Shengmin Leong" userId="075411cc4697ef0d" providerId="LiveId" clId="{B47E0FA8-705D-450E-B7A5-9E4D249F3A5D}" dt="2018-10-14T07:28:33.185" v="0" actId="478"/>
-          <ac:spMkLst>
-            <pc:docMk/>
-            <pc:sldMk cId="2396968029" sldId="263"/>
-            <ac:spMk id="118" creationId="{00000000-0000-0000-0000-000000000000}"/>
-          </ac:spMkLst>
-        </pc:spChg>
-        <pc:spChg chg="del">
-          <ac:chgData name="Shengmin Leong" userId="075411cc4697ef0d" providerId="LiveId" clId="{B47E0FA8-705D-450E-B7A5-9E4D249F3A5D}" dt="2018-10-14T07:28:33.185" v="0" actId="478"/>
-          <ac:spMkLst>
-            <pc:docMk/>
-            <pc:sldMk cId="2396968029" sldId="263"/>
-            <ac:spMk id="119" creationId="{00000000-0000-0000-0000-000000000000}"/>
-          </ac:spMkLst>
-        </pc:spChg>
-        <pc:spChg chg="del">
-          <ac:chgData name="Shengmin Leong" userId="075411cc4697ef0d" providerId="LiveId" clId="{B47E0FA8-705D-450E-B7A5-9E4D249F3A5D}" dt="2018-10-14T07:28:33.185" v="0" actId="478"/>
-          <ac:spMkLst>
-            <pc:docMk/>
-            <pc:sldMk cId="2396968029" sldId="263"/>
-            <ac:spMk id="120" creationId="{00000000-0000-0000-0000-000000000000}"/>
-          </ac:spMkLst>
-        </pc:spChg>
-        <pc:spChg chg="del">
-          <ac:chgData name="Shengmin Leong" userId="075411cc4697ef0d" providerId="LiveId" clId="{B47E0FA8-705D-450E-B7A5-9E4D249F3A5D}" dt="2018-10-14T07:28:33.185" v="0" actId="478"/>
-          <ac:spMkLst>
-            <pc:docMk/>
-            <pc:sldMk cId="2396968029" sldId="263"/>
-            <ac:spMk id="122" creationId="{00000000-0000-0000-0000-000000000000}"/>
-          </ac:spMkLst>
-        </pc:spChg>
-        <pc:graphicFrameChg chg="add del mod">
-          <ac:chgData name="Shengmin Leong" userId="075411cc4697ef0d" providerId="LiveId" clId="{B47E0FA8-705D-450E-B7A5-9E4D249F3A5D}" dt="2018-10-14T07:41:47.160" v="6" actId="478"/>
-          <ac:graphicFrameMkLst>
-            <pc:docMk/>
-            <pc:sldMk cId="2396968029" sldId="263"/>
-            <ac:graphicFrameMk id="3" creationId="{C7D4C197-984F-4891-9CFB-0F09063E9078}"/>
-          </ac:graphicFrameMkLst>
-        </pc:graphicFrameChg>
-        <pc:graphicFrameChg chg="add del">
-          <ac:chgData name="Shengmin Leong" userId="075411cc4697ef0d" providerId="LiveId" clId="{B47E0FA8-705D-450E-B7A5-9E4D249F3A5D}" dt="2018-10-14T07:41:45.695" v="5" actId="478"/>
-          <ac:graphicFrameMkLst>
-            <pc:docMk/>
-            <pc:sldMk cId="2396968029" sldId="263"/>
-            <ac:graphicFrameMk id="4" creationId="{EF446414-F693-4EFA-BB3C-4D5F395969D5}"/>
-          </ac:graphicFrameMkLst>
-        </pc:graphicFrameChg>
-        <pc:graphicFrameChg chg="add del mod">
-          <ac:chgData name="Shengmin Leong" userId="075411cc4697ef0d" providerId="LiveId" clId="{B47E0FA8-705D-450E-B7A5-9E4D249F3A5D}" dt="2018-10-14T07:42:12.175" v="12" actId="478"/>
-          <ac:graphicFrameMkLst>
-            <pc:docMk/>
-            <pc:sldMk cId="2396968029" sldId="263"/>
-            <ac:graphicFrameMk id="7" creationId="{CBCC49C7-5877-41C1-AE37-B1D8F5396315}"/>
-          </ac:graphicFrameMkLst>
-        </pc:graphicFrameChg>
-        <pc:picChg chg="add del mod">
-          <ac:chgData name="Shengmin Leong" userId="075411cc4697ef0d" providerId="LiveId" clId="{B47E0FA8-705D-450E-B7A5-9E4D249F3A5D}" dt="2018-10-14T07:41:57.869" v="8" actId="478"/>
-          <ac:picMkLst>
-            <pc:docMk/>
-            <pc:sldMk cId="2396968029" sldId="263"/>
-            <ac:picMk id="6" creationId="{1F04E6A5-4F3D-4D7D-8427-3739ECFDB235}"/>
-          </ac:picMkLst>
-        </pc:picChg>
-        <pc:picChg chg="add mod">
-          <ac:chgData name="Shengmin Leong" userId="075411cc4697ef0d" providerId="LiveId" clId="{B47E0FA8-705D-450E-B7A5-9E4D249F3A5D}" dt="2018-10-14T07:42:59.888" v="16" actId="1076"/>
-          <ac:picMkLst>
-            <pc:docMk/>
-            <pc:sldMk cId="2396968029" sldId="263"/>
-            <ac:picMk id="10" creationId="{B254752A-BE3D-4520-A588-D36130F38AEE}"/>
-          </ac:picMkLst>
-        </pc:picChg>
-        <pc:cxnChg chg="del mod">
-          <ac:chgData name="Shengmin Leong" userId="075411cc4697ef0d" providerId="LiveId" clId="{B47E0FA8-705D-450E-B7A5-9E4D249F3A5D}" dt="2018-10-14T07:28:33.185" v="0" actId="478"/>
-          <ac:cxnSpMkLst>
-            <pc:docMk/>
-            <pc:sldMk cId="2396968029" sldId="263"/>
-            <ac:cxnSpMk id="21" creationId="{00000000-0000-0000-0000-000000000000}"/>
-          </ac:cxnSpMkLst>
-        </pc:cxnChg>
-        <pc:cxnChg chg="del mod">
-          <ac:chgData name="Shengmin Leong" userId="075411cc4697ef0d" providerId="LiveId" clId="{B47E0FA8-705D-450E-B7A5-9E4D249F3A5D}" dt="2018-10-14T07:28:33.185" v="0" actId="478"/>
-          <ac:cxnSpMkLst>
-            <pc:docMk/>
-            <pc:sldMk cId="2396968029" sldId="263"/>
-            <ac:cxnSpMk id="30" creationId="{00000000-0000-0000-0000-000000000000}"/>
-          </ac:cxnSpMkLst>
-        </pc:cxnChg>
-        <pc:cxnChg chg="del mod">
-          <ac:chgData name="Shengmin Leong" userId="075411cc4697ef0d" providerId="LiveId" clId="{B47E0FA8-705D-450E-B7A5-9E4D249F3A5D}" dt="2018-10-14T07:28:33.185" v="0" actId="478"/>
-          <ac:cxnSpMkLst>
-            <pc:docMk/>
-            <pc:sldMk cId="2396968029" sldId="263"/>
-            <ac:cxnSpMk id="47" creationId="{00000000-0000-0000-0000-000000000000}"/>
-          </ac:cxnSpMkLst>
-        </pc:cxnChg>
-        <pc:cxnChg chg="del mod">
-          <ac:chgData name="Shengmin Leong" userId="075411cc4697ef0d" providerId="LiveId" clId="{B47E0FA8-705D-450E-B7A5-9E4D249F3A5D}" dt="2018-10-14T07:28:33.185" v="0" actId="478"/>
-          <ac:cxnSpMkLst>
-            <pc:docMk/>
-            <pc:sldMk cId="2396968029" sldId="263"/>
-            <ac:cxnSpMk id="53" creationId="{B97967F8-618A-448B-81FD-CDFD4AF0EC64}"/>
-          </ac:cxnSpMkLst>
-        </pc:cxnChg>
-        <pc:cxnChg chg="del mod">
-          <ac:chgData name="Shengmin Leong" userId="075411cc4697ef0d" providerId="LiveId" clId="{B47E0FA8-705D-450E-B7A5-9E4D249F3A5D}" dt="2018-10-14T07:28:33.185" v="0" actId="478"/>
-          <ac:cxnSpMkLst>
-            <pc:docMk/>
-            <pc:sldMk cId="2396968029" sldId="263"/>
-            <ac:cxnSpMk id="58" creationId="{00000000-0000-0000-0000-000000000000}"/>
-          </ac:cxnSpMkLst>
-        </pc:cxnChg>
-        <pc:cxnChg chg="del mod">
-          <ac:chgData name="Shengmin Leong" userId="075411cc4697ef0d" providerId="LiveId" clId="{B47E0FA8-705D-450E-B7A5-9E4D249F3A5D}" dt="2018-10-14T07:28:33.185" v="0" actId="478"/>
-          <ac:cxnSpMkLst>
-            <pc:docMk/>
-            <pc:sldMk cId="2396968029" sldId="263"/>
-            <ac:cxnSpMk id="59" creationId="{E2D6A56C-A223-4236-A1F0-7EFEBA2FC940}"/>
-          </ac:cxnSpMkLst>
-        </pc:cxnChg>
-        <pc:cxnChg chg="del mod">
-          <ac:chgData name="Shengmin Leong" userId="075411cc4697ef0d" providerId="LiveId" clId="{B47E0FA8-705D-450E-B7A5-9E4D249F3A5D}" dt="2018-10-14T07:28:33.185" v="0" actId="478"/>
-          <ac:cxnSpMkLst>
-            <pc:docMk/>
-            <pc:sldMk cId="2396968029" sldId="263"/>
-            <ac:cxnSpMk id="64" creationId="{00000000-0000-0000-0000-000000000000}"/>
-          </ac:cxnSpMkLst>
-        </pc:cxnChg>
-        <pc:cxnChg chg="del mod">
-          <ac:chgData name="Shengmin Leong" userId="075411cc4697ef0d" providerId="LiveId" clId="{B47E0FA8-705D-450E-B7A5-9E4D249F3A5D}" dt="2018-10-14T07:28:33.185" v="0" actId="478"/>
-          <ac:cxnSpMkLst>
-            <pc:docMk/>
-            <pc:sldMk cId="2396968029" sldId="263"/>
-            <ac:cxnSpMk id="72" creationId="{D5DFB8C5-B0B0-46C1-967B-4449112ABD6F}"/>
-          </ac:cxnSpMkLst>
-        </pc:cxnChg>
-        <pc:cxnChg chg="del">
-          <ac:chgData name="Shengmin Leong" userId="075411cc4697ef0d" providerId="LiveId" clId="{B47E0FA8-705D-450E-B7A5-9E4D249F3A5D}" dt="2018-10-14T07:28:33.185" v="0" actId="478"/>
-          <ac:cxnSpMkLst>
-            <pc:docMk/>
-            <pc:sldMk cId="2396968029" sldId="263"/>
-            <ac:cxnSpMk id="75" creationId="{00000000-0000-0000-0000-000000000000}"/>
-          </ac:cxnSpMkLst>
-        </pc:cxnChg>
-        <pc:cxnChg chg="del">
-          <ac:chgData name="Shengmin Leong" userId="075411cc4697ef0d" providerId="LiveId" clId="{B47E0FA8-705D-450E-B7A5-9E4D249F3A5D}" dt="2018-10-14T07:28:33.185" v="0" actId="478"/>
-          <ac:cxnSpMkLst>
-            <pc:docMk/>
-            <pc:sldMk cId="2396968029" sldId="263"/>
-            <ac:cxnSpMk id="79" creationId="{00000000-0000-0000-0000-000000000000}"/>
-          </ac:cxnSpMkLst>
-        </pc:cxnChg>
-        <pc:cxnChg chg="del mod">
-          <ac:chgData name="Shengmin Leong" userId="075411cc4697ef0d" providerId="LiveId" clId="{B47E0FA8-705D-450E-B7A5-9E4D249F3A5D}" dt="2018-10-14T07:28:33.185" v="0" actId="478"/>
-          <ac:cxnSpMkLst>
-            <pc:docMk/>
-            <pc:sldMk cId="2396968029" sldId="263"/>
-            <ac:cxnSpMk id="81" creationId="{00000000-0000-0000-0000-000000000000}"/>
-          </ac:cxnSpMkLst>
-        </pc:cxnChg>
-        <pc:cxnChg chg="del mod">
-          <ac:chgData name="Shengmin Leong" userId="075411cc4697ef0d" providerId="LiveId" clId="{B47E0FA8-705D-450E-B7A5-9E4D249F3A5D}" dt="2018-10-14T07:28:33.185" v="0" actId="478"/>
-          <ac:cxnSpMkLst>
-            <pc:docMk/>
-            <pc:sldMk cId="2396968029" sldId="263"/>
-            <ac:cxnSpMk id="84" creationId="{00000000-0000-0000-0000-000000000000}"/>
-          </ac:cxnSpMkLst>
-        </pc:cxnChg>
-        <pc:cxnChg chg="del mod">
-          <ac:chgData name="Shengmin Leong" userId="075411cc4697ef0d" providerId="LiveId" clId="{B47E0FA8-705D-450E-B7A5-9E4D249F3A5D}" dt="2018-10-14T07:28:33.185" v="0" actId="478"/>
-          <ac:cxnSpMkLst>
-            <pc:docMk/>
-            <pc:sldMk cId="2396968029" sldId="263"/>
-            <ac:cxnSpMk id="86" creationId="{00000000-0000-0000-0000-000000000000}"/>
-          </ac:cxnSpMkLst>
-        </pc:cxnChg>
-        <pc:cxnChg chg="del mod">
-          <ac:chgData name="Shengmin Leong" userId="075411cc4697ef0d" providerId="LiveId" clId="{B47E0FA8-705D-450E-B7A5-9E4D249F3A5D}" dt="2018-10-14T07:28:33.185" v="0" actId="478"/>
-          <ac:cxnSpMkLst>
-            <pc:docMk/>
-            <pc:sldMk cId="2396968029" sldId="263"/>
-            <ac:cxnSpMk id="90" creationId="{00000000-0000-0000-0000-000000000000}"/>
-          </ac:cxnSpMkLst>
-        </pc:cxnChg>
-        <pc:cxnChg chg="del mod">
-          <ac:chgData name="Shengmin Leong" userId="075411cc4697ef0d" providerId="LiveId" clId="{B47E0FA8-705D-450E-B7A5-9E4D249F3A5D}" dt="2018-10-14T07:28:33.185" v="0" actId="478"/>
-          <ac:cxnSpMkLst>
-            <pc:docMk/>
-            <pc:sldMk cId="2396968029" sldId="263"/>
-            <ac:cxnSpMk id="95" creationId="{00000000-0000-0000-0000-000000000000}"/>
-          </ac:cxnSpMkLst>
-        </pc:cxnChg>
-        <pc:cxnChg chg="del">
-          <ac:chgData name="Shengmin Leong" userId="075411cc4697ef0d" providerId="LiveId" clId="{B47E0FA8-705D-450E-B7A5-9E4D249F3A5D}" dt="2018-10-14T07:28:33.185" v="0" actId="478"/>
-          <ac:cxnSpMkLst>
-            <pc:docMk/>
-            <pc:sldMk cId="2396968029" sldId="263"/>
-            <ac:cxnSpMk id="107" creationId="{00000000-0000-0000-0000-000000000000}"/>
-          </ac:cxnSpMkLst>
-        </pc:cxnChg>
-        <pc:cxnChg chg="del mod">
-          <ac:chgData name="Shengmin Leong" userId="075411cc4697ef0d" providerId="LiveId" clId="{B47E0FA8-705D-450E-B7A5-9E4D249F3A5D}" dt="2018-10-14T07:28:33.185" v="0" actId="478"/>
-          <ac:cxnSpMkLst>
-            <pc:docMk/>
-            <pc:sldMk cId="2396968029" sldId="263"/>
-            <ac:cxnSpMk id="124" creationId="{00000000-0000-0000-0000-000000000000}"/>
-          </ac:cxnSpMkLst>
-        </pc:cxnChg>
-      </pc:sldChg>
-    </pc:docChg>
-  </pc:docChgLst>
-</pc:chgInfo>
-</file>
-
 <file path=ppt/notesMasters/notesMaster1.xml><?xml version="1.0" encoding="utf-8"?>
 <p:notesMaster xmlns:a="http://schemas.openxmlformats.org/drawingml/2006/main" xmlns:r="http://schemas.openxmlformats.org/officeDocument/2006/relationships" xmlns:p="http://schemas.openxmlformats.org/presentationml/2006/main">
   <p:cSld>
@@ -685,7 +208,7 @@
           <a:p>
             <a:fld id="{F5CC4B3F-88C1-4FFA-B1B6-F41C21DC6924}" type="datetimeFigureOut">
               <a:rPr lang="en-US" smtClean="0"/>
-              <a:t>10/14/2018</a:t>
+              <a:t>6/27/2018</a:t>
             </a:fld>
             <a:endParaRPr lang="en-US"/>
           </a:p>
@@ -952,96 +475,6 @@
 </p:notesMaster>
 </file>
 
-<file path=ppt/notesSlides/notesSlide1.xml><?xml version="1.0" encoding="utf-8"?>
-<p:notes xmlns:a="http://schemas.openxmlformats.org/drawingml/2006/main" xmlns:r="http://schemas.openxmlformats.org/officeDocument/2006/relationships" xmlns:p="http://schemas.openxmlformats.org/presentationml/2006/main">
-  <p:cSld>
-    <p:spTree>
-      <p:nvGrpSpPr>
-        <p:cNvPr id="1" name=""/>
-        <p:cNvGrpSpPr/>
-        <p:nvPr/>
-      </p:nvGrpSpPr>
-      <p:grpSpPr>
-        <a:xfrm>
-          <a:off x="0" y="0"/>
-          <a:ext cx="0" cy="0"/>
-          <a:chOff x="0" y="0"/>
-          <a:chExt cx="0" cy="0"/>
-        </a:xfrm>
-      </p:grpSpPr>
-      <p:sp>
-        <p:nvSpPr>
-          <p:cNvPr id="2" name="Slide Image Placeholder 1"/>
-          <p:cNvSpPr>
-            <a:spLocks noGrp="1" noRot="1" noChangeAspect="1"/>
-          </p:cNvSpPr>
-          <p:nvPr>
-            <p:ph type="sldImg"/>
-          </p:nvPr>
-        </p:nvSpPr>
-        <p:spPr/>
-      </p:sp>
-      <p:sp>
-        <p:nvSpPr>
-          <p:cNvPr id="3" name="Notes Placeholder 2"/>
-          <p:cNvSpPr>
-            <a:spLocks noGrp="1"/>
-          </p:cNvSpPr>
-          <p:nvPr>
-            <p:ph type="body" idx="1"/>
-          </p:nvPr>
-        </p:nvSpPr>
-        <p:spPr/>
-        <p:txBody>
-          <a:bodyPr/>
-          <a:lstStyle/>
-          <a:p>
-            <a:r>
-              <a:rPr lang="en-US" dirty="0"/>
-              <a:t>https://www.draw.io/?lightbox=1&amp;highlight=0000ff&amp;edit=_blank&amp;layers=1&amp;nav=1&amp;title=ModelComponentClassDiagram.xml#R7V1bk5s2FP41fulMdgAhgR%2FXzqZ9SNtMN2nSR2y0NglGW2Bv%2FfUVRgJ0wYttCXs9yUNmOYjb%2Bc79SPIEzDfPv%2BbR%2Ffp3EuN04jnx8wS8n3heECL6f0V4qQk%2BgjVhlSdxTXJbwm3yH2ZEh1EfkhgXwsCSkLRM7kXikmQZXpYCLcpz8iQOuyOp%2BNT7aIUVwu0ySlXq1yQu1zU1hE5L%2Fw0nqzV%2FsuuwM4to%2BWOVk4eMPW%2Figbvtv%2Fr0JuL3YuOLdRSTpw4J3EzAPCekrP%2FaPM9xWrGWs62%2B7kPP2ea9c5yVQy4A9QWPUfqA%2BRtv36t84bzYfg2uxrsTMHtaJyW%2BvY%2BW1dknCj6lrctNyk7fJWk6JynJt9eCeTi7mdNnz4oyJz8wP5ORjF4%2BI%2FQ2SVmJSOjQQ%2FXd2ec84rzEzx0S%2B5ZfMdngMn%2BhQ%2FhZzlcmdwCx46cWRRQy2rqDIACMGDHJWTX3brlH%2F2AM1DPT1zATpfQJswX9Y1Vuv7Em3BH6jZX8clahfx9IPQD4N44znXdJ9bVMy%2Bob0Hep7yHel5I7z5KQpEwsRbi0sHQxZKQoTVYZPVxSaDClzypIEqov1%2BzEJonj6jFa%2BWglyLGDui%2BhHqio%2BxrQPQOYByrmc29yPUsqRt1VbKCHswafRS4jFiePMqlB8C8cxX9m6cvXpFjPCPmhR7mhCbeSsO%2FX0fez984NsITEVEXCBTr9MwAFcFUsZDbgmNp5dkjyck1WJIvSm5YqCWuHbXFUrBszWJRRXl5XnoYSFilZ%2FuDED0n1gtuLcRbzIUyPKKVz%2Fjsuyxfm%2FKKHklTK0bzTR0Lu2cMoHvnLt%2BqiK8gP%2F2H36AWtIA%2F5kn11yFxolK8wH8VoFUN2IpvjNCqTR9Ex6mDaXkq%2FN3rpDLgnVBGKzp0%2FVYRWYBpV5YEChKK%2FksdP4a7x9I%2F6DVqBaT5lkAyFvSa8o1wadTy96gH3ddWbWtK86QDFa3WBq4ugUKJm0COmF64naiF%2BTspvfBT9%2Bx9RLb51VaY9d6iWBAOVpGveeMixn%2BIokt6AxSXdheIt6ldnV%2B1SGUevYs2N6g9WbnSA9nAR7AjClwLvkgVyjzMVb0EyOuD3wngKgEKJraFzGD6yz1RuZBAfaNVDDvVnsuKrwtAxBYNU1%2BVJYtfD%2BWfh4VwEBHghdHeKgyfZcWn80R7O1URJ%2B0Wsi76EpD%2Fz6HeBMw%2BhDx%2B2UlVSFEiVTLybGksHRd77KFR8oi4b9GG%2FEAz1ia4mGzyQz38uCpw%2FRosUf0yK8kiGNzFHh%2BGm2I0k0dVk302lxDi%2FNZnYKNE%2FC%2B3l4H94cK8ERq0B3On0BAOINAZwqHMcbACHYqGthIyBRZxEG5LFn9dJtjsf07qawZDxGPTKp1LXxqH83CecJ5RnVaFkDxemQ3BqxYWpPkeOZabhoFim3xceEaQEdtP4IbprSlD2At42yAhKIAcSyD1x5r4BT2PNmwBGKkG%2F8l77juffYSxAQhr5U2oA29jn9yiLVjg%2Fug7QHwSJBdpJlcxV%2F8z4a0%2FODBG8gorH1hUNoIGigbbWMoaTYCq9Q%2BlFN2JT93WVOeP2oAcRsvhe9c48J40WOO0i0FRUQefJDL7TufAh2aJ1dIA3Ejr0kAHUU3O7HDfZ1relyh3NoZRqAT17WHylAZObtlMXweWiNthdBPelEsG%2B48HUrMec%2BiYlr42uYQCFKq8T7miGHJSkmcwIDpPK6dlKpe9JUhkGu6VMHg92x3G%2BnHSI44%2BP49T44m%2BcFzS6wnHbwdm%2FbmIg8AJA6WJpAq9mMoPQszZQKuHZnWF9VToyx6ijWgsx7t4t6Zkq6EDu5Fgr8E%2FVBozB6QiN%2Buwo%2FJ5RR1Q2SCDUlCN1OgYM6BgcMTwbp%2Bo1SKd4eNz1Z77xKtbgGSGeAsKXLPn3AVf2v66ln0Yy5d4u1Fh%2FXaHciPXX1TfGyLvPwuhrAy54KgF1HTuhs%2BCKA2F2hCZsPr%2BSqAYk4%2FOVBmOkzm4R4sjPeZQV0XJbtjuTcDLUmBNkyZy4vM1kO5rsqxJsxfvsRJjblPMQYdeoiecYuf0YuVeuYGbeOVe95Zs3gV0ATgee3Vk7o%2FpoITo4GAz3TOb2%2BNL8EvRayWP3%2BOMLcaqknImHQt6V1BWcerqShwNteSlz03Gut5yck80myuIqi8CZ0AM8alaOCWZDkdXI1%2BS9UMNo30RXb8hc4Lfb1euE0Z4SRw%2ByZ816tlO0%2FFS41DLFlwLnn3J8t4f0Nv1rq%2B1qOcyFrq5qGliKc4HdtFmQ5WUaFUWynOzsf%2FaJ8z4zcY%2BeMw98jTTbWVoyoA3WuBTDU1p8JD8J7Pbz8nhktuEG7E6dOEE%2FvrcFfIwggqHLN%2BxGiUiu%2F78iPa%2BMP1561FCorop%2BjlbnVBT1NGGLraIo1DRObGnU4EjFcqk%2BUDXGfKn%2BMI2Rp%2FhBwX7uO%2F54jVHnllNdOURPqjXbXIacXpiGKw2SS3%2BeLq2COq0xEOyjs2hyjT4vjGtJV3OQ8WbyYBAG7OHwEwTbINhd8fAThCEgBCOCcA516vPiPm86jdZj0KQKb0lPgpO1g%2FjuTD%2BRGojUySawsCmXP5EyvpSxJ5EIQzGcRsMWwik3CvgSyKYlb2exVeDqVzj3vpc8PjSbKYVWppa%2BXYF91bQYL1EN3qxMbdRUvUIFvnGKP0oeC9WV%2BtayWLVrehs94vh6Q%2BXyVNWwgF8ir9bstjqmdhgSjjCjx3ttyx5Dzb19uiGDtBhq1hGdboYrVDsBf0QbdcudkYTWl4QWqCVcW1rsq%2F25XxQ2qDsg5rhI%2Fqu21mAixRwuHQ1nE%2FieUiqJKdjmRJN2K8QU31W3kjdCLCtpmhXVHofZ6vNWtN75hmykvJsJUCt92iUjJrirVkBVI%2FGmuav07FzV4FrjrqrFl85dNJ7sQu%2FyLYMcLKh21xp31aLbhcmuJ%2B9RyXcoGYO7amx6YdwFrjSrBziaDpYt%2FiK173uziZJU4fGJAigIFFZYS4Mu30zyT%2BTc9cdT5EDlLpWjEuc4TnVzLk7HaBsb8SF5U0MHKZzXTtwzwXm1P3phJhTJVkOz0NWaXKsO6tKshi%2BlXZrFmta4q6Zdn%2FJkeS75PXTcEWebBGqW9BfeRPmpdnFQuOGhMbmh1m%2B%2F5OcSt%2FA93MZgRLNm5HINPABSW8obL3BxnYsvrPnSPniQm91R2Kua%2BKekWN%2FSIAxrZ%2BNeVmQIQslygGDgHoRGuO%2BqwaFzdXVh8o2Q1FzTxIe6H2Uxw2HVa1MOX5iB7v2xBvO%2FQEQP258Hqzv07U%2BwgZv%2FAQ%3D%3D </a:t>
-            </a:r>
-          </a:p>
-          <a:p>
-            <a:endParaRPr lang="en-US" dirty="0"/>
-          </a:p>
-        </p:txBody>
-      </p:sp>
-      <p:sp>
-        <p:nvSpPr>
-          <p:cNvPr id="4" name="Slide Number Placeholder 3"/>
-          <p:cNvSpPr>
-            <a:spLocks noGrp="1"/>
-          </p:cNvSpPr>
-          <p:nvPr>
-            <p:ph type="sldNum" sz="quarter" idx="5"/>
-          </p:nvPr>
-        </p:nvSpPr>
-        <p:spPr/>
-        <p:txBody>
-          <a:bodyPr/>
-          <a:lstStyle/>
-          <a:p>
-            <a:fld id="{5A7AB025-77E3-4BD1-A2FD-B3183DBA47A3}" type="slidenum">
-              <a:rPr lang="en-US" smtClean="0"/>
-              <a:t>1</a:t>
-            </a:fld>
-            <a:endParaRPr lang="en-US"/>
-          </a:p>
-        </p:txBody>
-      </p:sp>
-    </p:spTree>
-    <p:extLst>
-      <p:ext uri="{BB962C8B-B14F-4D97-AF65-F5344CB8AC3E}">
-        <p14:creationId xmlns:p14="http://schemas.microsoft.com/office/powerpoint/2010/main" val="1080312137"/>
-      </p:ext>
-    </p:extLst>
-  </p:cSld>
-  <p:clrMapOvr>
-    <a:masterClrMapping/>
-  </p:clrMapOvr>
-</p:notes>
-</file>
-
 <file path=ppt/slideLayouts/slideLayout1.xml><?xml version="1.0" encoding="utf-8"?>
 <p:sldLayout xmlns:a="http://schemas.openxmlformats.org/drawingml/2006/main" xmlns:r="http://schemas.openxmlformats.org/officeDocument/2006/relationships" xmlns:p="http://schemas.openxmlformats.org/presentationml/2006/main" type="title" preserve="1">
   <p:cSld name="Title Slide">
@@ -1221,7 +654,7 @@
           <a:p>
             <a:fld id="{78C97017-6FC3-485B-9764-EAC9E56C1D49}" type="datetimeFigureOut">
               <a:rPr lang="en-US" smtClean="0"/>
-              <a:t>10/14/2018</a:t>
+              <a:t>6/27/2018</a:t>
             </a:fld>
             <a:endParaRPr lang="en-US"/>
           </a:p>
@@ -1389,7 +822,7 @@
           <a:p>
             <a:fld id="{78C97017-6FC3-485B-9764-EAC9E56C1D49}" type="datetimeFigureOut">
               <a:rPr lang="en-US" smtClean="0"/>
-              <a:t>10/14/2018</a:t>
+              <a:t>6/27/2018</a:t>
             </a:fld>
             <a:endParaRPr lang="en-US"/>
           </a:p>
@@ -1567,7 +1000,7 @@
           <a:p>
             <a:fld id="{78C97017-6FC3-485B-9764-EAC9E56C1D49}" type="datetimeFigureOut">
               <a:rPr lang="en-US" smtClean="0"/>
-              <a:t>10/14/2018</a:t>
+              <a:t>6/27/2018</a:t>
             </a:fld>
             <a:endParaRPr lang="en-US"/>
           </a:p>
@@ -1735,7 +1168,7 @@
           <a:p>
             <a:fld id="{78C97017-6FC3-485B-9764-EAC9E56C1D49}" type="datetimeFigureOut">
               <a:rPr lang="en-US" smtClean="0"/>
-              <a:t>10/14/2018</a:t>
+              <a:t>6/27/2018</a:t>
             </a:fld>
             <a:endParaRPr lang="en-US"/>
           </a:p>
@@ -1980,7 +1413,7 @@
           <a:p>
             <a:fld id="{78C97017-6FC3-485B-9764-EAC9E56C1D49}" type="datetimeFigureOut">
               <a:rPr lang="en-US" smtClean="0"/>
-              <a:t>10/14/2018</a:t>
+              <a:t>6/27/2018</a:t>
             </a:fld>
             <a:endParaRPr lang="en-US"/>
           </a:p>
@@ -2265,7 +1698,7 @@
           <a:p>
             <a:fld id="{78C97017-6FC3-485B-9764-EAC9E56C1D49}" type="datetimeFigureOut">
               <a:rPr lang="en-US" smtClean="0"/>
-              <a:t>10/14/2018</a:t>
+              <a:t>6/27/2018</a:t>
             </a:fld>
             <a:endParaRPr lang="en-US"/>
           </a:p>
@@ -2684,7 +2117,7 @@
           <a:p>
             <a:fld id="{78C97017-6FC3-485B-9764-EAC9E56C1D49}" type="datetimeFigureOut">
               <a:rPr lang="en-US" smtClean="0"/>
-              <a:t>10/14/2018</a:t>
+              <a:t>6/27/2018</a:t>
             </a:fld>
             <a:endParaRPr lang="en-US"/>
           </a:p>
@@ -2801,7 +2234,7 @@
           <a:p>
             <a:fld id="{78C97017-6FC3-485B-9764-EAC9E56C1D49}" type="datetimeFigureOut">
               <a:rPr lang="en-US" smtClean="0"/>
-              <a:t>10/14/2018</a:t>
+              <a:t>6/27/2018</a:t>
             </a:fld>
             <a:endParaRPr lang="en-US"/>
           </a:p>
@@ -2896,7 +2329,7 @@
           <a:p>
             <a:fld id="{78C97017-6FC3-485B-9764-EAC9E56C1D49}" type="datetimeFigureOut">
               <a:rPr lang="en-US" smtClean="0"/>
-              <a:t>10/14/2018</a:t>
+              <a:t>6/27/2018</a:t>
             </a:fld>
             <a:endParaRPr lang="en-US"/>
           </a:p>
@@ -3171,7 +2604,7 @@
           <a:p>
             <a:fld id="{78C97017-6FC3-485B-9764-EAC9E56C1D49}" type="datetimeFigureOut">
               <a:rPr lang="en-US" smtClean="0"/>
-              <a:t>10/14/2018</a:t>
+              <a:t>6/27/2018</a:t>
             </a:fld>
             <a:endParaRPr lang="en-US"/>
           </a:p>
@@ -3423,7 +2856,7 @@
           <a:p>
             <a:fld id="{78C97017-6FC3-485B-9764-EAC9E56C1D49}" type="datetimeFigureOut">
               <a:rPr lang="en-US" smtClean="0"/>
-              <a:t>10/14/2018</a:t>
+              <a:t>6/27/2018</a:t>
             </a:fld>
             <a:endParaRPr lang="en-US"/>
           </a:p>
@@ -3634,7 +3067,7 @@
           <a:p>
             <a:fld id="{78C97017-6FC3-485B-9764-EAC9E56C1D49}" type="datetimeFigureOut">
               <a:rPr lang="en-US" smtClean="0"/>
-              <a:t>10/14/2018</a:t>
+              <a:t>6/27/2018</a:t>
             </a:fld>
             <a:endParaRPr lang="en-US"/>
           </a:p>
@@ -4009,42 +3442,2555 @@
           <a:chExt cx="0" cy="0"/>
         </a:xfrm>
       </p:grpSpPr>
-      <p:pic>
-        <p:nvPicPr>
-          <p:cNvPr id="10" name="Picture 9">
+      <p:sp>
+        <p:nvSpPr>
+          <p:cNvPr id="118" name="Rectangle 65"/>
+          <p:cNvSpPr/>
+          <p:nvPr/>
+        </p:nvSpPr>
+        <p:spPr>
+          <a:xfrm>
+            <a:off x="1119865" y="1676400"/>
+            <a:ext cx="7490735" cy="3059747"/>
+          </a:xfrm>
+          <a:prstGeom prst="roundRect">
+            <a:avLst>
+              <a:gd name="adj" fmla="val 3484"/>
+            </a:avLst>
+          </a:prstGeom>
+          <a:solidFill>
+            <a:schemeClr val="accent4">
+              <a:lumMod val="20000"/>
+              <a:lumOff val="80000"/>
+            </a:schemeClr>
+          </a:solidFill>
+          <a:ln w="19050">
+            <a:noFill/>
+          </a:ln>
+          <a:effectLst/>
+        </p:spPr>
+        <p:style>
+          <a:lnRef idx="1">
+            <a:schemeClr val="accent2"/>
+          </a:lnRef>
+          <a:fillRef idx="2">
+            <a:schemeClr val="accent2"/>
+          </a:fillRef>
+          <a:effectRef idx="1">
+            <a:schemeClr val="accent2"/>
+          </a:effectRef>
+          <a:fontRef idx="minor">
+            <a:schemeClr val="dk1"/>
+          </a:fontRef>
+        </p:style>
+        <p:txBody>
+          <a:bodyPr rtlCol="0" anchor="t"/>
+          <a:lstStyle/>
+          <a:p>
+            <a:r>
+              <a:rPr lang="en-US" sz="1200" b="1" dirty="0">
+                <a:solidFill>
+                  <a:srgbClr val="7030A0"/>
+                </a:solidFill>
+              </a:rPr>
+              <a:t>Model</a:t>
+            </a:r>
+            <a:endParaRPr lang="en-SG" sz="1200" b="1" dirty="0">
+              <a:solidFill>
+                <a:srgbClr val="7030A0"/>
+              </a:solidFill>
+            </a:endParaRPr>
+          </a:p>
+        </p:txBody>
+      </p:sp>
+      <p:sp>
+        <p:nvSpPr>
+          <p:cNvPr id="2" name="Rectangle 8"/>
+          <p:cNvSpPr/>
+          <p:nvPr/>
+        </p:nvSpPr>
+        <p:spPr>
+          <a:xfrm>
+            <a:off x="2877180" y="3463240"/>
+            <a:ext cx="1093635" cy="346760"/>
+          </a:xfrm>
+          <a:prstGeom prst="rect">
+            <a:avLst/>
+          </a:prstGeom>
+          <a:solidFill>
+            <a:srgbClr val="7030A0"/>
+          </a:solidFill>
+          <a:ln w="19050">
+            <a:solidFill>
+              <a:srgbClr val="7030A0"/>
+            </a:solidFill>
+          </a:ln>
+          <a:effectLst/>
+        </p:spPr>
+        <p:style>
+          <a:lnRef idx="1">
+            <a:schemeClr val="accent2"/>
+          </a:lnRef>
+          <a:fillRef idx="2">
+            <a:schemeClr val="accent2"/>
+          </a:fillRef>
+          <a:effectRef idx="1">
+            <a:schemeClr val="accent2"/>
+          </a:effectRef>
+          <a:fontRef idx="minor">
+            <a:schemeClr val="dk1"/>
+          </a:fontRef>
+        </p:style>
+        <p:txBody>
+          <a:bodyPr rtlCol="0" anchor="ctr"/>
+          <a:lstStyle/>
+          <a:p>
+            <a:pPr algn="ctr"/>
+            <a:r>
+              <a:rPr lang="en-US" sz="1050" dirty="0" err="1">
+                <a:solidFill>
+                  <a:schemeClr val="bg1"/>
+                </a:solidFill>
+              </a:rPr>
+              <a:t>UserPref</a:t>
+            </a:r>
+            <a:endParaRPr lang="en-SG" sz="1050" dirty="0">
+              <a:solidFill>
+                <a:schemeClr val="bg1"/>
+              </a:solidFill>
+            </a:endParaRPr>
+          </a:p>
+        </p:txBody>
+      </p:sp>
+      <p:sp>
+        <p:nvSpPr>
+          <p:cNvPr id="9" name="Rectangle 62"/>
+          <p:cNvSpPr/>
+          <p:nvPr/>
+        </p:nvSpPr>
+        <p:spPr>
+          <a:xfrm rot="16200000">
+            <a:off x="1661548" y="3097750"/>
+            <a:ext cx="1093635" cy="346760"/>
+          </a:xfrm>
+          <a:prstGeom prst="rect">
+            <a:avLst/>
+          </a:prstGeom>
+          <a:solidFill>
+            <a:srgbClr val="7030A0"/>
+          </a:solidFill>
+          <a:ln w="19050">
+            <a:solidFill>
+              <a:srgbClr val="7030A0"/>
+            </a:solidFill>
+          </a:ln>
+          <a:effectLst/>
+        </p:spPr>
+        <p:style>
+          <a:lnRef idx="1">
+            <a:schemeClr val="accent2"/>
+          </a:lnRef>
+          <a:fillRef idx="2">
+            <a:schemeClr val="accent2"/>
+          </a:fillRef>
+          <a:effectRef idx="1">
+            <a:schemeClr val="accent2"/>
+          </a:effectRef>
+          <a:fontRef idx="minor">
+            <a:schemeClr val="dk1"/>
+          </a:fontRef>
+        </p:style>
+        <p:txBody>
+          <a:bodyPr rtlCol="0" anchor="ctr"/>
+          <a:lstStyle/>
+          <a:p>
+            <a:pPr algn="ctr"/>
+            <a:r>
+              <a:rPr lang="en-US" sz="1050" dirty="0" err="1">
+                <a:solidFill>
+                  <a:schemeClr val="bg1"/>
+                </a:solidFill>
+              </a:rPr>
+              <a:t>ModelManager</a:t>
+            </a:r>
+            <a:endParaRPr lang="en-SG" sz="1050" dirty="0">
+              <a:solidFill>
+                <a:schemeClr val="bg1"/>
+              </a:solidFill>
+            </a:endParaRPr>
+          </a:p>
+        </p:txBody>
+      </p:sp>
+      <p:cxnSp>
+        <p:nvCxnSpPr>
+          <p:cNvPr id="107" name="Elbow Connector 106"/>
+          <p:cNvCxnSpPr>
+            <a:cxnSpLocks/>
+          </p:cNvCxnSpPr>
+          <p:nvPr/>
+        </p:nvCxnSpPr>
+        <p:spPr>
+          <a:xfrm rot="5400000" flipH="1" flipV="1">
+            <a:off x="4155901" y="1308943"/>
+            <a:ext cx="613122" cy="4459404"/>
+          </a:xfrm>
+          <a:prstGeom prst="bentConnector3">
+            <a:avLst>
+              <a:gd name="adj1" fmla="val -26668"/>
+            </a:avLst>
+          </a:prstGeom>
+          <a:ln w="19050">
+            <a:solidFill>
+              <a:srgbClr val="7030A0"/>
+            </a:solidFill>
+            <a:prstDash val="solid"/>
+            <a:headEnd type="none" w="med" len="med"/>
+            <a:tailEnd type="arrow" w="med" len="med"/>
+          </a:ln>
+          <a:effectLst/>
+        </p:spPr>
+        <p:style>
+          <a:lnRef idx="1">
+            <a:schemeClr val="accent2"/>
+          </a:lnRef>
+          <a:fillRef idx="2">
+            <a:schemeClr val="accent2"/>
+          </a:fillRef>
+          <a:effectRef idx="1">
+            <a:schemeClr val="accent2"/>
+          </a:effectRef>
+          <a:fontRef idx="minor">
+            <a:schemeClr val="dk1"/>
+          </a:fontRef>
+        </p:style>
+      </p:cxnSp>
+      <p:sp>
+        <p:nvSpPr>
+          <p:cNvPr id="119" name="Rectangle 62"/>
+          <p:cNvSpPr/>
+          <p:nvPr/>
+        </p:nvSpPr>
+        <p:spPr>
+          <a:xfrm rot="16200000">
+            <a:off x="956202" y="2861202"/>
+            <a:ext cx="1093635" cy="346760"/>
+          </a:xfrm>
+          <a:prstGeom prst="rect">
+            <a:avLst/>
+          </a:prstGeom>
+          <a:solidFill>
+            <a:srgbClr val="7030A0"/>
+          </a:solidFill>
+          <a:ln w="19050">
+            <a:solidFill>
+              <a:srgbClr val="7030A0"/>
+            </a:solidFill>
+          </a:ln>
+          <a:effectLst/>
+        </p:spPr>
+        <p:style>
+          <a:lnRef idx="1">
+            <a:schemeClr val="accent2"/>
+          </a:lnRef>
+          <a:fillRef idx="2">
+            <a:schemeClr val="accent2"/>
+          </a:fillRef>
+          <a:effectRef idx="1">
+            <a:schemeClr val="accent2"/>
+          </a:effectRef>
+          <a:fontRef idx="minor">
+            <a:schemeClr val="dk1"/>
+          </a:fontRef>
+        </p:style>
+        <p:txBody>
+          <a:bodyPr rtlCol="0" anchor="ctr"/>
+          <a:lstStyle/>
+          <a:p>
+            <a:pPr algn="ctr"/>
+            <a:r>
+              <a:rPr lang="en-US" sz="1050" dirty="0">
+                <a:solidFill>
+                  <a:schemeClr val="bg1"/>
+                </a:solidFill>
+              </a:rPr>
+              <a:t>&lt;&lt;interface&gt;&gt;</a:t>
+            </a:r>
+          </a:p>
+          <a:p>
+            <a:pPr algn="ctr"/>
+            <a:r>
+              <a:rPr lang="en-US" sz="1050" dirty="0">
+                <a:solidFill>
+                  <a:schemeClr val="bg1"/>
+                </a:solidFill>
+              </a:rPr>
+              <a:t>Model</a:t>
+            </a:r>
+            <a:endParaRPr lang="en-SG" sz="1050" dirty="0">
+              <a:solidFill>
+                <a:schemeClr val="bg1"/>
+              </a:solidFill>
+            </a:endParaRPr>
+          </a:p>
+        </p:txBody>
+      </p:sp>
+      <p:sp>
+        <p:nvSpPr>
+          <p:cNvPr id="120" name="Isosceles Triangle 102"/>
+          <p:cNvSpPr/>
+          <p:nvPr/>
+        </p:nvSpPr>
+        <p:spPr>
+          <a:xfrm rot="16200000">
+            <a:off x="1626910" y="2952291"/>
+            <a:ext cx="270504" cy="175523"/>
+          </a:xfrm>
+          <a:prstGeom prst="triangle">
+            <a:avLst/>
+          </a:prstGeom>
+          <a:solidFill>
+            <a:srgbClr val="7030A0"/>
+          </a:solidFill>
+          <a:ln w="19050">
+            <a:solidFill>
+              <a:srgbClr val="7030A0"/>
+            </a:solidFill>
+          </a:ln>
+          <a:effectLst/>
+        </p:spPr>
+        <p:style>
+          <a:lnRef idx="1">
+            <a:schemeClr val="accent6"/>
+          </a:lnRef>
+          <a:fillRef idx="2">
+            <a:schemeClr val="accent6"/>
+          </a:fillRef>
+          <a:effectRef idx="1">
+            <a:schemeClr val="accent6"/>
+          </a:effectRef>
+          <a:fontRef idx="minor">
+            <a:schemeClr val="dk1"/>
+          </a:fontRef>
+        </p:style>
+        <p:txBody>
+          <a:bodyPr rtlCol="0" anchor="ctr"/>
+          <a:lstStyle/>
+          <a:p>
+            <a:pPr algn="ctr"/>
+            <a:endParaRPr lang="en-SG" sz="1050"/>
+          </a:p>
+        </p:txBody>
+      </p:sp>
+      <p:cxnSp>
+        <p:nvCxnSpPr>
+          <p:cNvPr id="58" name="Straight Arrow Connector 57"/>
+          <p:cNvCxnSpPr>
+            <a:stCxn id="42" idx="3"/>
+            <a:endCxn id="2" idx="1"/>
+          </p:cNvCxnSpPr>
+          <p:nvPr/>
+        </p:nvCxnSpPr>
+        <p:spPr>
+          <a:xfrm>
+            <a:off x="2609828" y="3636620"/>
+            <a:ext cx="267352" cy="0"/>
+          </a:xfrm>
+          <a:prstGeom prst="straightConnector1">
+            <a:avLst/>
+          </a:prstGeom>
+          <a:ln w="19050">
+            <a:solidFill>
+              <a:srgbClr val="7030A0"/>
+            </a:solidFill>
+            <a:headEnd type="none" w="med" len="med"/>
+            <a:tailEnd type="arrow" w="med" len="med"/>
+          </a:ln>
+          <a:effectLst/>
+        </p:spPr>
+        <p:style>
+          <a:lnRef idx="1">
+            <a:schemeClr val="accent2"/>
+          </a:lnRef>
+          <a:fillRef idx="2">
+            <a:schemeClr val="accent2"/>
+          </a:fillRef>
+          <a:effectRef idx="1">
+            <a:schemeClr val="accent2"/>
+          </a:effectRef>
+          <a:fontRef idx="minor">
+            <a:schemeClr val="dk1"/>
+          </a:fontRef>
+        </p:style>
+      </p:cxnSp>
+      <p:cxnSp>
+        <p:nvCxnSpPr>
+          <p:cNvPr id="75" name="Elbow Connector 122"/>
+          <p:cNvCxnSpPr/>
+          <p:nvPr/>
+        </p:nvCxnSpPr>
+        <p:spPr>
+          <a:xfrm>
+            <a:off x="910091" y="3040053"/>
+            <a:ext cx="419548" cy="2860"/>
+          </a:xfrm>
+          <a:prstGeom prst="bentConnector3">
+            <a:avLst>
+              <a:gd name="adj1" fmla="val 50000"/>
+            </a:avLst>
+          </a:prstGeom>
+          <a:ln w="19050">
+            <a:solidFill>
+              <a:schemeClr val="bg1">
+                <a:lumMod val="75000"/>
+              </a:schemeClr>
+            </a:solidFill>
+            <a:prstDash val="sysDot"/>
+            <a:headEnd type="none" w="med" len="med"/>
+            <a:tailEnd type="arrow" w="med" len="med"/>
+          </a:ln>
+          <a:effectLst/>
+        </p:spPr>
+        <p:style>
+          <a:lnRef idx="1">
+            <a:schemeClr val="accent2"/>
+          </a:lnRef>
+          <a:fillRef idx="2">
+            <a:schemeClr val="accent2"/>
+          </a:fillRef>
+          <a:effectRef idx="1">
+            <a:schemeClr val="accent2"/>
+          </a:effectRef>
+          <a:fontRef idx="minor">
+            <a:schemeClr val="dk1"/>
+          </a:fontRef>
+        </p:style>
+      </p:cxnSp>
+      <p:cxnSp>
+        <p:nvCxnSpPr>
+          <p:cNvPr id="21" name="Straight Connector 20"/>
+          <p:cNvCxnSpPr>
+            <a:stCxn id="120" idx="3"/>
+          </p:cNvCxnSpPr>
+          <p:nvPr/>
+        </p:nvCxnSpPr>
+        <p:spPr>
+          <a:xfrm flipV="1">
+            <a:off x="1849924" y="3040052"/>
+            <a:ext cx="216105" cy="1"/>
+          </a:xfrm>
+          <a:prstGeom prst="line">
+            <a:avLst/>
+          </a:prstGeom>
+          <a:ln w="19050">
+            <a:solidFill>
+              <a:srgbClr val="7030A0"/>
+            </a:solidFill>
+            <a:prstDash val="sysDot"/>
+            <a:headEnd type="none" w="med" len="med"/>
+            <a:tailEnd type="none" w="med" len="med"/>
+          </a:ln>
+          <a:effectLst/>
+        </p:spPr>
+        <p:style>
+          <a:lnRef idx="1">
+            <a:schemeClr val="accent2"/>
+          </a:lnRef>
+          <a:fillRef idx="2">
+            <a:schemeClr val="accent2"/>
+          </a:fillRef>
+          <a:effectRef idx="1">
+            <a:schemeClr val="accent2"/>
+          </a:effectRef>
+          <a:fontRef idx="minor">
+            <a:schemeClr val="dk1"/>
+          </a:fontRef>
+        </p:style>
+      </p:cxnSp>
+      <p:sp>
+        <p:nvSpPr>
+          <p:cNvPr id="42" name="Flowchart: Decision 96"/>
+          <p:cNvSpPr/>
+          <p:nvPr/>
+        </p:nvSpPr>
+        <p:spPr>
+          <a:xfrm>
+            <a:off x="2373780" y="3549930"/>
+            <a:ext cx="236048" cy="173380"/>
+          </a:xfrm>
+          <a:prstGeom prst="flowChartDecision">
+            <a:avLst/>
+          </a:prstGeom>
+          <a:noFill/>
+          <a:ln w="19050">
+            <a:solidFill>
+              <a:srgbClr val="7030A0"/>
+            </a:solidFill>
+          </a:ln>
+          <a:effectLst/>
+        </p:spPr>
+        <p:style>
+          <a:lnRef idx="1">
+            <a:schemeClr val="accent6"/>
+          </a:lnRef>
+          <a:fillRef idx="2">
+            <a:schemeClr val="accent6"/>
+          </a:fillRef>
+          <a:effectRef idx="1">
+            <a:schemeClr val="accent6"/>
+          </a:effectRef>
+          <a:fontRef idx="minor">
+            <a:schemeClr val="dk1"/>
+          </a:fontRef>
+        </p:style>
+        <p:txBody>
+          <a:bodyPr rtlCol="0" anchor="ctr"/>
+          <a:lstStyle/>
+          <a:p>
+            <a:pPr algn="ctr"/>
+            <a:endParaRPr lang="en-US" sz="1050"/>
+          </a:p>
+        </p:txBody>
+      </p:sp>
+      <p:sp>
+        <p:nvSpPr>
+          <p:cNvPr id="46" name="Rectangle 8"/>
+          <p:cNvSpPr/>
+          <p:nvPr/>
+        </p:nvSpPr>
+        <p:spPr>
+          <a:xfrm>
+            <a:off x="2786406" y="2834911"/>
+            <a:ext cx="1447688" cy="346760"/>
+          </a:xfrm>
+          <a:prstGeom prst="rect">
+            <a:avLst/>
+          </a:prstGeom>
+          <a:ln w="19050">
+            <a:solidFill>
+              <a:srgbClr val="7030A0"/>
+            </a:solidFill>
+          </a:ln>
+          <a:effectLst/>
+        </p:spPr>
+        <p:style>
+          <a:lnRef idx="1">
+            <a:schemeClr val="accent4"/>
+          </a:lnRef>
+          <a:fillRef idx="2">
+            <a:schemeClr val="accent4"/>
+          </a:fillRef>
+          <a:effectRef idx="1">
+            <a:schemeClr val="accent4"/>
+          </a:effectRef>
+          <a:fontRef idx="minor">
+            <a:schemeClr val="dk1"/>
+          </a:fontRef>
+        </p:style>
+        <p:txBody>
+          <a:bodyPr rtlCol="0" anchor="ctr"/>
+          <a:lstStyle/>
+          <a:p>
+            <a:pPr algn="ctr"/>
+            <a:r>
+              <a:rPr lang="en-US" sz="1050" dirty="0" err="1" smtClean="0">
+                <a:solidFill>
+                  <a:srgbClr val="7030A0"/>
+                </a:solidFill>
+              </a:rPr>
+              <a:t>VersionedAddressBook</a:t>
+            </a:r>
+            <a:endParaRPr lang="en-SG" sz="1050" dirty="0">
+              <a:solidFill>
+                <a:srgbClr val="7030A0"/>
+              </a:solidFill>
+            </a:endParaRPr>
+          </a:p>
+        </p:txBody>
+      </p:sp>
+      <p:cxnSp>
+        <p:nvCxnSpPr>
+          <p:cNvPr id="47" name="Straight Arrow Connector 46"/>
+          <p:cNvCxnSpPr>
+            <a:stCxn id="48" idx="3"/>
+            <a:endCxn id="46" idx="1"/>
+          </p:cNvCxnSpPr>
+          <p:nvPr/>
+        </p:nvCxnSpPr>
+        <p:spPr>
+          <a:xfrm>
+            <a:off x="2624360" y="3003033"/>
+            <a:ext cx="162046" cy="5258"/>
+          </a:xfrm>
+          <a:prstGeom prst="straightConnector1">
+            <a:avLst/>
+          </a:prstGeom>
+          <a:ln w="19050">
+            <a:solidFill>
+              <a:srgbClr val="7030A0"/>
+            </a:solidFill>
+            <a:headEnd type="none" w="med" len="med"/>
+            <a:tailEnd type="arrow" w="med" len="med"/>
+          </a:ln>
+          <a:effectLst/>
+        </p:spPr>
+        <p:style>
+          <a:lnRef idx="1">
+            <a:schemeClr val="accent2"/>
+          </a:lnRef>
+          <a:fillRef idx="2">
+            <a:schemeClr val="accent2"/>
+          </a:fillRef>
+          <a:effectRef idx="1">
+            <a:schemeClr val="accent2"/>
+          </a:effectRef>
+          <a:fontRef idx="minor">
+            <a:schemeClr val="dk1"/>
+          </a:fontRef>
+        </p:style>
+      </p:cxnSp>
+      <p:sp>
+        <p:nvSpPr>
+          <p:cNvPr id="48" name="Flowchart: Decision 96"/>
+          <p:cNvSpPr/>
+          <p:nvPr/>
+        </p:nvSpPr>
+        <p:spPr>
+          <a:xfrm>
+            <a:off x="2388312" y="2916343"/>
+            <a:ext cx="236048" cy="173380"/>
+          </a:xfrm>
+          <a:prstGeom prst="flowChartDecision">
+            <a:avLst/>
+          </a:prstGeom>
+          <a:noFill/>
+          <a:ln w="19050">
+            <a:solidFill>
+              <a:srgbClr val="7030A0"/>
+            </a:solidFill>
+          </a:ln>
+          <a:effectLst/>
+        </p:spPr>
+        <p:style>
+          <a:lnRef idx="1">
+            <a:schemeClr val="accent6"/>
+          </a:lnRef>
+          <a:fillRef idx="2">
+            <a:schemeClr val="accent6"/>
+          </a:fillRef>
+          <a:effectRef idx="1">
+            <a:schemeClr val="accent6"/>
+          </a:effectRef>
+          <a:fontRef idx="minor">
+            <a:schemeClr val="dk1"/>
+          </a:fontRef>
+        </p:style>
+        <p:txBody>
+          <a:bodyPr rtlCol="0" anchor="ctr"/>
+          <a:lstStyle/>
+          <a:p>
+            <a:pPr algn="ctr"/>
+            <a:endParaRPr lang="en-US" sz="1050"/>
+          </a:p>
+        </p:txBody>
+      </p:sp>
+      <p:sp>
+        <p:nvSpPr>
+          <p:cNvPr id="49" name="Rectangle 8"/>
+          <p:cNvSpPr/>
+          <p:nvPr/>
+        </p:nvSpPr>
+        <p:spPr>
+          <a:xfrm>
+            <a:off x="4762209" y="2863434"/>
+            <a:ext cx="1156969" cy="346760"/>
+          </a:xfrm>
+          <a:prstGeom prst="rect">
+            <a:avLst/>
+          </a:prstGeom>
+          <a:ln w="19050">
+            <a:solidFill>
+              <a:srgbClr val="7030A0"/>
+            </a:solidFill>
+          </a:ln>
+          <a:effectLst/>
+        </p:spPr>
+        <p:style>
+          <a:lnRef idx="1">
+            <a:schemeClr val="accent4"/>
+          </a:lnRef>
+          <a:fillRef idx="2">
+            <a:schemeClr val="accent4"/>
+          </a:fillRef>
+          <a:effectRef idx="1">
+            <a:schemeClr val="accent4"/>
+          </a:effectRef>
+          <a:fontRef idx="minor">
+            <a:schemeClr val="dk1"/>
+          </a:fontRef>
+        </p:style>
+        <p:txBody>
+          <a:bodyPr rtlCol="0" anchor="ctr"/>
+          <a:lstStyle/>
+          <a:p>
+            <a:pPr algn="ctr"/>
+            <a:r>
+              <a:rPr lang="en-US" sz="1050" dirty="0" err="1">
+                <a:solidFill>
+                  <a:srgbClr val="7030A0"/>
+                </a:solidFill>
+              </a:rPr>
+              <a:t>UniquePersonList</a:t>
+            </a:r>
+            <a:endParaRPr lang="en-SG" sz="1050" dirty="0">
+              <a:solidFill>
+                <a:srgbClr val="7030A0"/>
+              </a:solidFill>
+            </a:endParaRPr>
+          </a:p>
+        </p:txBody>
+      </p:sp>
+      <p:sp>
+        <p:nvSpPr>
+          <p:cNvPr id="51" name="Flowchart: Decision 96"/>
+          <p:cNvSpPr/>
+          <p:nvPr/>
+        </p:nvSpPr>
+        <p:spPr>
+          <a:xfrm>
+            <a:off x="4233246" y="2948201"/>
+            <a:ext cx="236048" cy="173380"/>
+          </a:xfrm>
+          <a:prstGeom prst="flowChartDecision">
+            <a:avLst/>
+          </a:prstGeom>
+          <a:solidFill>
+            <a:srgbClr val="7030A0"/>
+          </a:solidFill>
+          <a:ln w="19050">
+            <a:solidFill>
+              <a:srgbClr val="7030A0"/>
+            </a:solidFill>
+          </a:ln>
+          <a:effectLst/>
+        </p:spPr>
+        <p:style>
+          <a:lnRef idx="1">
+            <a:schemeClr val="accent6"/>
+          </a:lnRef>
+          <a:fillRef idx="2">
+            <a:schemeClr val="accent6"/>
+          </a:fillRef>
+          <a:effectRef idx="1">
+            <a:schemeClr val="accent6"/>
+          </a:effectRef>
+          <a:fontRef idx="minor">
+            <a:schemeClr val="dk1"/>
+          </a:fontRef>
+        </p:style>
+        <p:txBody>
+          <a:bodyPr rtlCol="0" anchor="ctr"/>
+          <a:lstStyle/>
+          <a:p>
+            <a:pPr algn="ctr"/>
+            <a:endParaRPr lang="en-US" sz="1050"/>
+          </a:p>
+        </p:txBody>
+      </p:sp>
+      <p:cxnSp>
+        <p:nvCxnSpPr>
+          <p:cNvPr id="30" name="Elbow Connector 29"/>
+          <p:cNvCxnSpPr>
+            <a:stCxn id="51" idx="3"/>
+            <a:endCxn id="49" idx="1"/>
+          </p:cNvCxnSpPr>
+          <p:nvPr/>
+        </p:nvCxnSpPr>
+        <p:spPr>
+          <a:xfrm>
+            <a:off x="4469294" y="3034891"/>
+            <a:ext cx="292915" cy="1923"/>
+          </a:xfrm>
+          <a:prstGeom prst="bentConnector3">
+            <a:avLst/>
+          </a:prstGeom>
+          <a:ln w="19050">
+            <a:solidFill>
+              <a:srgbClr val="7030A0"/>
+            </a:solidFill>
+            <a:headEnd type="none" w="med" len="med"/>
+            <a:tailEnd type="arrow" w="med" len="med"/>
+          </a:ln>
+          <a:effectLst/>
+        </p:spPr>
+        <p:style>
+          <a:lnRef idx="1">
+            <a:schemeClr val="accent2"/>
+          </a:lnRef>
+          <a:fillRef idx="2">
+            <a:schemeClr val="accent2"/>
+          </a:fillRef>
+          <a:effectRef idx="1">
+            <a:schemeClr val="accent2"/>
+          </a:effectRef>
+          <a:fontRef idx="minor">
+            <a:schemeClr val="dk1"/>
+          </a:fontRef>
+        </p:style>
+      </p:cxnSp>
+      <p:sp>
+        <p:nvSpPr>
+          <p:cNvPr id="62" name="Rectangle 8"/>
+          <p:cNvSpPr/>
+          <p:nvPr/>
+        </p:nvSpPr>
+        <p:spPr>
+          <a:xfrm>
+            <a:off x="6313677" y="2858066"/>
+            <a:ext cx="708186" cy="346760"/>
+          </a:xfrm>
+          <a:prstGeom prst="rect">
+            <a:avLst/>
+          </a:prstGeom>
+          <a:ln w="19050">
+            <a:solidFill>
+              <a:srgbClr val="7030A0"/>
+            </a:solidFill>
+          </a:ln>
+          <a:effectLst/>
+        </p:spPr>
+        <p:style>
+          <a:lnRef idx="1">
+            <a:schemeClr val="accent4"/>
+          </a:lnRef>
+          <a:fillRef idx="2">
+            <a:schemeClr val="accent4"/>
+          </a:fillRef>
+          <a:effectRef idx="1">
+            <a:schemeClr val="accent4"/>
+          </a:effectRef>
+          <a:fontRef idx="minor">
+            <a:schemeClr val="dk1"/>
+          </a:fontRef>
+        </p:style>
+        <p:txBody>
+          <a:bodyPr rtlCol="0" anchor="ctr"/>
+          <a:lstStyle/>
+          <a:p>
+            <a:pPr algn="ctr"/>
+            <a:r>
+              <a:rPr lang="en-US" sz="1050" dirty="0">
+                <a:solidFill>
+                  <a:srgbClr val="7030A0"/>
+                </a:solidFill>
+              </a:rPr>
+              <a:t>Person</a:t>
+            </a:r>
+            <a:endParaRPr lang="en-SG" sz="1050" dirty="0">
+              <a:solidFill>
+                <a:srgbClr val="7030A0"/>
+              </a:solidFill>
+            </a:endParaRPr>
+          </a:p>
+        </p:txBody>
+      </p:sp>
+      <p:sp>
+        <p:nvSpPr>
+          <p:cNvPr id="63" name="Flowchart: Decision 96"/>
+          <p:cNvSpPr/>
+          <p:nvPr/>
+        </p:nvSpPr>
+        <p:spPr>
+          <a:xfrm>
+            <a:off x="5918460" y="2941065"/>
+            <a:ext cx="236048" cy="173380"/>
+          </a:xfrm>
+          <a:prstGeom prst="flowChartDecision">
+            <a:avLst/>
+          </a:prstGeom>
+          <a:noFill/>
+          <a:ln w="19050">
+            <a:solidFill>
+              <a:srgbClr val="7030A0"/>
+            </a:solidFill>
+          </a:ln>
+          <a:effectLst/>
+        </p:spPr>
+        <p:style>
+          <a:lnRef idx="1">
+            <a:schemeClr val="accent6"/>
+          </a:lnRef>
+          <a:fillRef idx="2">
+            <a:schemeClr val="accent6"/>
+          </a:fillRef>
+          <a:effectRef idx="1">
+            <a:schemeClr val="accent6"/>
+          </a:effectRef>
+          <a:fontRef idx="minor">
+            <a:schemeClr val="dk1"/>
+          </a:fontRef>
+        </p:style>
+        <p:txBody>
+          <a:bodyPr rtlCol="0" anchor="ctr"/>
+          <a:lstStyle/>
+          <a:p>
+            <a:pPr algn="ctr"/>
+            <a:endParaRPr lang="en-US" sz="1050"/>
+          </a:p>
+        </p:txBody>
+      </p:sp>
+      <p:cxnSp>
+        <p:nvCxnSpPr>
+          <p:cNvPr id="64" name="Elbow Connector 63"/>
+          <p:cNvCxnSpPr>
+            <a:cxnSpLocks/>
+            <a:stCxn id="63" idx="3"/>
+            <a:endCxn id="62" idx="1"/>
+          </p:cNvCxnSpPr>
+          <p:nvPr/>
+        </p:nvCxnSpPr>
+        <p:spPr>
+          <a:xfrm>
+            <a:off x="6154508" y="3027755"/>
+            <a:ext cx="159169" cy="3691"/>
+          </a:xfrm>
+          <a:prstGeom prst="bentConnector3">
+            <a:avLst/>
+          </a:prstGeom>
+          <a:ln w="19050">
+            <a:solidFill>
+              <a:srgbClr val="7030A0"/>
+            </a:solidFill>
+            <a:headEnd type="none" w="med" len="med"/>
+            <a:tailEnd type="arrow" w="med" len="med"/>
+          </a:ln>
+          <a:effectLst/>
+        </p:spPr>
+        <p:style>
+          <a:lnRef idx="1">
+            <a:schemeClr val="accent2"/>
+          </a:lnRef>
+          <a:fillRef idx="2">
+            <a:schemeClr val="accent2"/>
+          </a:fillRef>
+          <a:effectRef idx="1">
+            <a:schemeClr val="accent2"/>
+          </a:effectRef>
+          <a:fontRef idx="minor">
+            <a:schemeClr val="dk1"/>
+          </a:fontRef>
+        </p:style>
+      </p:cxnSp>
+      <p:sp>
+        <p:nvSpPr>
+          <p:cNvPr id="76" name="Rectangle 8"/>
+          <p:cNvSpPr/>
+          <p:nvPr/>
+        </p:nvSpPr>
+        <p:spPr>
+          <a:xfrm>
+            <a:off x="7712397" y="2564238"/>
+            <a:ext cx="708186" cy="285783"/>
+          </a:xfrm>
+          <a:prstGeom prst="rect">
+            <a:avLst/>
+          </a:prstGeom>
+          <a:ln w="19050">
+            <a:solidFill>
+              <a:srgbClr val="7030A0"/>
+            </a:solidFill>
+          </a:ln>
+          <a:effectLst/>
+        </p:spPr>
+        <p:style>
+          <a:lnRef idx="1">
+            <a:schemeClr val="accent4"/>
+          </a:lnRef>
+          <a:fillRef idx="2">
+            <a:schemeClr val="accent4"/>
+          </a:fillRef>
+          <a:effectRef idx="1">
+            <a:schemeClr val="accent4"/>
+          </a:effectRef>
+          <a:fontRef idx="minor">
+            <a:schemeClr val="dk1"/>
+          </a:fontRef>
+        </p:style>
+        <p:txBody>
+          <a:bodyPr rtlCol="0" anchor="ctr"/>
+          <a:lstStyle/>
+          <a:p>
+            <a:pPr algn="ctr"/>
+            <a:r>
+              <a:rPr lang="en-US" sz="1050" dirty="0">
+                <a:solidFill>
+                  <a:srgbClr val="7030A0"/>
+                </a:solidFill>
+              </a:rPr>
+              <a:t>Name</a:t>
+            </a:r>
+            <a:endParaRPr lang="en-SG" sz="1050" dirty="0">
+              <a:solidFill>
+                <a:srgbClr val="7030A0"/>
+              </a:solidFill>
+            </a:endParaRPr>
+          </a:p>
+        </p:txBody>
+      </p:sp>
+      <p:sp>
+        <p:nvSpPr>
+          <p:cNvPr id="78" name="Flowchart: Decision 96"/>
+          <p:cNvSpPr/>
+          <p:nvPr/>
+        </p:nvSpPr>
+        <p:spPr>
+          <a:xfrm>
+            <a:off x="7041947" y="2948201"/>
+            <a:ext cx="236048" cy="173380"/>
+          </a:xfrm>
+          <a:prstGeom prst="flowChartDecision">
+            <a:avLst/>
+          </a:prstGeom>
+          <a:solidFill>
+            <a:srgbClr val="7030A0"/>
+          </a:solidFill>
+          <a:ln w="19050">
+            <a:solidFill>
+              <a:srgbClr val="7030A0"/>
+            </a:solidFill>
+          </a:ln>
+          <a:effectLst/>
+        </p:spPr>
+        <p:style>
+          <a:lnRef idx="1">
+            <a:schemeClr val="accent6"/>
+          </a:lnRef>
+          <a:fillRef idx="2">
+            <a:schemeClr val="accent6"/>
+          </a:fillRef>
+          <a:effectRef idx="1">
+            <a:schemeClr val="accent6"/>
+          </a:effectRef>
+          <a:fontRef idx="minor">
+            <a:schemeClr val="dk1"/>
+          </a:fontRef>
+        </p:style>
+        <p:txBody>
+          <a:bodyPr rtlCol="0" anchor="ctr"/>
+          <a:lstStyle/>
+          <a:p>
+            <a:pPr algn="ctr"/>
+            <a:endParaRPr lang="en-US" sz="1050"/>
+          </a:p>
+        </p:txBody>
+      </p:sp>
+      <p:cxnSp>
+        <p:nvCxnSpPr>
+          <p:cNvPr id="79" name="Elbow Connector 78"/>
+          <p:cNvCxnSpPr>
+            <a:cxnSpLocks/>
+          </p:cNvCxnSpPr>
+          <p:nvPr/>
+        </p:nvCxnSpPr>
+        <p:spPr>
+          <a:xfrm flipV="1">
+            <a:off x="7277995" y="2706821"/>
+            <a:ext cx="434402" cy="327761"/>
+          </a:xfrm>
+          <a:prstGeom prst="bentConnector3">
+            <a:avLst/>
+          </a:prstGeom>
+          <a:ln w="19050">
+            <a:solidFill>
+              <a:srgbClr val="7030A0"/>
+            </a:solidFill>
+            <a:headEnd type="none" w="med" len="med"/>
+            <a:tailEnd type="arrow" w="med" len="med"/>
+          </a:ln>
+          <a:effectLst/>
+        </p:spPr>
+        <p:style>
+          <a:lnRef idx="1">
+            <a:schemeClr val="accent2"/>
+          </a:lnRef>
+          <a:fillRef idx="2">
+            <a:schemeClr val="accent2"/>
+          </a:fillRef>
+          <a:effectRef idx="1">
+            <a:schemeClr val="accent2"/>
+          </a:effectRef>
+          <a:fontRef idx="minor">
+            <a:schemeClr val="dk1"/>
+          </a:fontRef>
+        </p:style>
+      </p:cxnSp>
+      <p:sp>
+        <p:nvSpPr>
+          <p:cNvPr id="80" name="Rectangle 8"/>
+          <p:cNvSpPr/>
+          <p:nvPr/>
+        </p:nvSpPr>
+        <p:spPr>
+          <a:xfrm>
+            <a:off x="7712397" y="2887216"/>
+            <a:ext cx="708186" cy="285783"/>
+          </a:xfrm>
+          <a:prstGeom prst="rect">
+            <a:avLst/>
+          </a:prstGeom>
+          <a:ln w="19050">
+            <a:solidFill>
+              <a:srgbClr val="7030A0"/>
+            </a:solidFill>
+          </a:ln>
+          <a:effectLst/>
+        </p:spPr>
+        <p:style>
+          <a:lnRef idx="1">
+            <a:schemeClr val="accent4"/>
+          </a:lnRef>
+          <a:fillRef idx="2">
+            <a:schemeClr val="accent4"/>
+          </a:fillRef>
+          <a:effectRef idx="1">
+            <a:schemeClr val="accent4"/>
+          </a:effectRef>
+          <a:fontRef idx="minor">
+            <a:schemeClr val="dk1"/>
+          </a:fontRef>
+        </p:style>
+        <p:txBody>
+          <a:bodyPr rtlCol="0" anchor="ctr"/>
+          <a:lstStyle/>
+          <a:p>
+            <a:pPr algn="ctr"/>
+            <a:r>
+              <a:rPr lang="en-US" sz="1050" dirty="0">
+                <a:solidFill>
+                  <a:srgbClr val="7030A0"/>
+                </a:solidFill>
+              </a:rPr>
+              <a:t>Phone</a:t>
+            </a:r>
+            <a:endParaRPr lang="en-SG" sz="1050" dirty="0">
+              <a:solidFill>
+                <a:srgbClr val="7030A0"/>
+              </a:solidFill>
+            </a:endParaRPr>
+          </a:p>
+        </p:txBody>
+      </p:sp>
+      <p:cxnSp>
+        <p:nvCxnSpPr>
+          <p:cNvPr id="81" name="Elbow Connector 80"/>
+          <p:cNvCxnSpPr>
+            <a:stCxn id="78" idx="3"/>
+            <a:endCxn id="80" idx="1"/>
+          </p:cNvCxnSpPr>
+          <p:nvPr/>
+        </p:nvCxnSpPr>
+        <p:spPr>
+          <a:xfrm flipV="1">
+            <a:off x="7277995" y="3030108"/>
+            <a:ext cx="434402" cy="4783"/>
+          </a:xfrm>
+          <a:prstGeom prst="bentConnector3">
+            <a:avLst/>
+          </a:prstGeom>
+          <a:ln w="19050">
+            <a:solidFill>
+              <a:srgbClr val="7030A0"/>
+            </a:solidFill>
+            <a:headEnd type="none" w="med" len="med"/>
+            <a:tailEnd type="arrow" w="med" len="med"/>
+          </a:ln>
+          <a:effectLst/>
+        </p:spPr>
+        <p:style>
+          <a:lnRef idx="1">
+            <a:schemeClr val="accent2"/>
+          </a:lnRef>
+          <a:fillRef idx="2">
+            <a:schemeClr val="accent2"/>
+          </a:fillRef>
+          <a:effectRef idx="1">
+            <a:schemeClr val="accent2"/>
+          </a:effectRef>
+          <a:fontRef idx="minor">
+            <a:schemeClr val="dk1"/>
+          </a:fontRef>
+        </p:style>
+      </p:cxnSp>
+      <p:sp>
+        <p:nvSpPr>
+          <p:cNvPr id="83" name="Rectangle 8"/>
+          <p:cNvSpPr/>
+          <p:nvPr/>
+        </p:nvSpPr>
+        <p:spPr>
+          <a:xfrm>
+            <a:off x="7712397" y="3210194"/>
+            <a:ext cx="708186" cy="285783"/>
+          </a:xfrm>
+          <a:prstGeom prst="rect">
+            <a:avLst/>
+          </a:prstGeom>
+          <a:ln w="19050">
+            <a:solidFill>
+              <a:srgbClr val="7030A0"/>
+            </a:solidFill>
+          </a:ln>
+          <a:effectLst/>
+        </p:spPr>
+        <p:style>
+          <a:lnRef idx="1">
+            <a:schemeClr val="accent4"/>
+          </a:lnRef>
+          <a:fillRef idx="2">
+            <a:schemeClr val="accent4"/>
+          </a:fillRef>
+          <a:effectRef idx="1">
+            <a:schemeClr val="accent4"/>
+          </a:effectRef>
+          <a:fontRef idx="minor">
+            <a:schemeClr val="dk1"/>
+          </a:fontRef>
+        </p:style>
+        <p:txBody>
+          <a:bodyPr rtlCol="0" anchor="ctr"/>
+          <a:lstStyle/>
+          <a:p>
+            <a:pPr algn="ctr"/>
+            <a:r>
+              <a:rPr lang="en-US" sz="1050" dirty="0">
+                <a:solidFill>
+                  <a:srgbClr val="7030A0"/>
+                </a:solidFill>
+              </a:rPr>
+              <a:t>Email</a:t>
+            </a:r>
+            <a:endParaRPr lang="en-SG" sz="1050" dirty="0">
+              <a:solidFill>
+                <a:srgbClr val="7030A0"/>
+              </a:solidFill>
+            </a:endParaRPr>
+          </a:p>
+        </p:txBody>
+      </p:sp>
+      <p:cxnSp>
+        <p:nvCxnSpPr>
+          <p:cNvPr id="84" name="Elbow Connector 83"/>
+          <p:cNvCxnSpPr>
+            <a:stCxn id="78" idx="3"/>
+            <a:endCxn id="83" idx="1"/>
+          </p:cNvCxnSpPr>
+          <p:nvPr/>
+        </p:nvCxnSpPr>
+        <p:spPr>
+          <a:xfrm>
+            <a:off x="7277995" y="3034891"/>
+            <a:ext cx="434402" cy="318195"/>
+          </a:xfrm>
+          <a:prstGeom prst="bentConnector3">
+            <a:avLst/>
+          </a:prstGeom>
+          <a:ln w="19050">
+            <a:solidFill>
+              <a:srgbClr val="7030A0"/>
+            </a:solidFill>
+            <a:headEnd type="none" w="med" len="med"/>
+            <a:tailEnd type="arrow" w="med" len="med"/>
+          </a:ln>
+          <a:effectLst/>
+        </p:spPr>
+        <p:style>
+          <a:lnRef idx="1">
+            <a:schemeClr val="accent2"/>
+          </a:lnRef>
+          <a:fillRef idx="2">
+            <a:schemeClr val="accent2"/>
+          </a:fillRef>
+          <a:effectRef idx="1">
+            <a:schemeClr val="accent2"/>
+          </a:effectRef>
+          <a:fontRef idx="minor">
+            <a:schemeClr val="dk1"/>
+          </a:fontRef>
+        </p:style>
+      </p:cxnSp>
+      <p:sp>
+        <p:nvSpPr>
+          <p:cNvPr id="85" name="Rectangle 8"/>
+          <p:cNvSpPr/>
+          <p:nvPr/>
+        </p:nvSpPr>
+        <p:spPr>
+          <a:xfrm>
+            <a:off x="7712397" y="3533171"/>
+            <a:ext cx="708186" cy="285783"/>
+          </a:xfrm>
+          <a:prstGeom prst="rect">
+            <a:avLst/>
+          </a:prstGeom>
+          <a:ln w="19050">
+            <a:solidFill>
+              <a:srgbClr val="7030A0"/>
+            </a:solidFill>
+          </a:ln>
+          <a:effectLst/>
+        </p:spPr>
+        <p:style>
+          <a:lnRef idx="1">
+            <a:schemeClr val="accent4"/>
+          </a:lnRef>
+          <a:fillRef idx="2">
+            <a:schemeClr val="accent4"/>
+          </a:fillRef>
+          <a:effectRef idx="1">
+            <a:schemeClr val="accent4"/>
+          </a:effectRef>
+          <a:fontRef idx="minor">
+            <a:schemeClr val="dk1"/>
+          </a:fontRef>
+        </p:style>
+        <p:txBody>
+          <a:bodyPr rtlCol="0" anchor="ctr"/>
+          <a:lstStyle/>
+          <a:p>
+            <a:pPr algn="ctr"/>
+            <a:r>
+              <a:rPr lang="en-US" sz="1050" dirty="0">
+                <a:solidFill>
+                  <a:srgbClr val="7030A0"/>
+                </a:solidFill>
+              </a:rPr>
+              <a:t>Address</a:t>
+            </a:r>
+            <a:endParaRPr lang="en-SG" sz="1050" dirty="0">
+              <a:solidFill>
+                <a:srgbClr val="7030A0"/>
+              </a:solidFill>
+            </a:endParaRPr>
+          </a:p>
+        </p:txBody>
+      </p:sp>
+      <p:cxnSp>
+        <p:nvCxnSpPr>
+          <p:cNvPr id="86" name="Elbow Connector 85"/>
+          <p:cNvCxnSpPr>
+            <a:stCxn id="78" idx="3"/>
+            <a:endCxn id="85" idx="1"/>
+          </p:cNvCxnSpPr>
+          <p:nvPr/>
+        </p:nvCxnSpPr>
+        <p:spPr>
+          <a:xfrm>
+            <a:off x="7277995" y="3034891"/>
+            <a:ext cx="434402" cy="641172"/>
+          </a:xfrm>
+          <a:prstGeom prst="bentConnector3">
+            <a:avLst/>
+          </a:prstGeom>
+          <a:ln w="19050">
+            <a:solidFill>
+              <a:srgbClr val="7030A0"/>
+            </a:solidFill>
+            <a:headEnd type="none" w="med" len="med"/>
+            <a:tailEnd type="arrow" w="med" len="med"/>
+          </a:ln>
+          <a:effectLst/>
+        </p:spPr>
+        <p:style>
+          <a:lnRef idx="1">
+            <a:schemeClr val="accent2"/>
+          </a:lnRef>
+          <a:fillRef idx="2">
+            <a:schemeClr val="accent2"/>
+          </a:fillRef>
+          <a:effectRef idx="1">
+            <a:schemeClr val="accent2"/>
+          </a:effectRef>
+          <a:fontRef idx="minor">
+            <a:schemeClr val="dk1"/>
+          </a:fontRef>
+        </p:style>
+      </p:cxnSp>
+      <p:sp>
+        <p:nvSpPr>
+          <p:cNvPr id="114" name="TextBox 113"/>
+          <p:cNvSpPr txBox="1"/>
+          <p:nvPr/>
+        </p:nvSpPr>
+        <p:spPr>
+          <a:xfrm rot="16200000">
+            <a:off x="6362886" y="3586305"/>
+            <a:ext cx="881018" cy="261610"/>
+          </a:xfrm>
+          <a:prstGeom prst="rect">
+            <a:avLst/>
+          </a:prstGeom>
+          <a:noFill/>
+        </p:spPr>
+        <p:txBody>
+          <a:bodyPr wrap="square" rtlCol="0">
+            <a:spAutoFit/>
+          </a:bodyPr>
+          <a:lstStyle/>
+          <a:p>
+            <a:pPr algn="r"/>
+            <a:r>
+              <a:rPr lang="en-US" sz="1100" dirty="0">
+                <a:solidFill>
+                  <a:srgbClr val="7030A0"/>
+                </a:solidFill>
+              </a:rPr>
+              <a:t>filtered list</a:t>
+            </a:r>
+            <a:endParaRPr lang="en-SG" sz="1100" dirty="0">
+              <a:solidFill>
+                <a:srgbClr val="7030A0"/>
+              </a:solidFill>
+            </a:endParaRPr>
+          </a:p>
+        </p:txBody>
+      </p:sp>
+      <p:sp>
+        <p:nvSpPr>
+          <p:cNvPr id="122" name="Rectangle 8"/>
+          <p:cNvSpPr/>
+          <p:nvPr/>
+        </p:nvSpPr>
+        <p:spPr>
+          <a:xfrm>
+            <a:off x="2057401" y="4239491"/>
+            <a:ext cx="1066800" cy="346760"/>
+          </a:xfrm>
+          <a:prstGeom prst="rect">
+            <a:avLst/>
+          </a:prstGeom>
+          <a:ln w="19050">
+            <a:solidFill>
+              <a:srgbClr val="7030A0"/>
+            </a:solidFill>
+          </a:ln>
+          <a:effectLst/>
+        </p:spPr>
+        <p:style>
+          <a:lnRef idx="1">
+            <a:schemeClr val="accent4"/>
+          </a:lnRef>
+          <a:fillRef idx="2">
+            <a:schemeClr val="accent4"/>
+          </a:fillRef>
+          <a:effectRef idx="1">
+            <a:schemeClr val="accent4"/>
+          </a:effectRef>
+          <a:fontRef idx="minor">
+            <a:schemeClr val="dk1"/>
+          </a:fontRef>
+        </p:style>
+        <p:txBody>
+          <a:bodyPr rtlCol="0" anchor="ctr"/>
+          <a:lstStyle/>
+          <a:p>
+            <a:pPr algn="ctr"/>
+            <a:r>
+              <a:rPr lang="en-US" sz="1050" dirty="0">
+                <a:solidFill>
+                  <a:srgbClr val="7030A0"/>
+                </a:solidFill>
+              </a:rPr>
+              <a:t>&lt;&lt;interface&gt;&gt;</a:t>
+            </a:r>
+            <a:r>
+              <a:rPr lang="en-US" sz="1050">
+                <a:solidFill>
+                  <a:srgbClr val="7030A0"/>
+                </a:solidFill>
+              </a:rPr>
+              <a:t/>
+            </a:r>
+            <a:br>
+              <a:rPr lang="en-US" sz="1050">
+                <a:solidFill>
+                  <a:srgbClr val="7030A0"/>
+                </a:solidFill>
+              </a:rPr>
+            </a:br>
+            <a:r>
+              <a:rPr lang="en-US" sz="1050" dirty="0" err="1">
+                <a:solidFill>
+                  <a:srgbClr val="7030A0"/>
+                </a:solidFill>
+              </a:rPr>
+              <a:t>ObservableList</a:t>
+            </a:r>
+            <a:endParaRPr lang="en-SG" sz="1050" dirty="0">
+              <a:solidFill>
+                <a:srgbClr val="7030A0"/>
+              </a:solidFill>
+            </a:endParaRPr>
+          </a:p>
+        </p:txBody>
+      </p:sp>
+      <p:cxnSp>
+        <p:nvCxnSpPr>
+          <p:cNvPr id="124" name="Elbow Connector 122"/>
+          <p:cNvCxnSpPr>
+            <a:stCxn id="119" idx="1"/>
+            <a:endCxn id="122" idx="1"/>
+          </p:cNvCxnSpPr>
+          <p:nvPr/>
+        </p:nvCxnSpPr>
+        <p:spPr>
+          <a:xfrm rot="16200000" flipH="1">
+            <a:off x="1364475" y="3719944"/>
+            <a:ext cx="831471" cy="554381"/>
+          </a:xfrm>
+          <a:prstGeom prst="bentConnector2">
+            <a:avLst/>
+          </a:prstGeom>
+          <a:ln w="19050">
+            <a:solidFill>
+              <a:srgbClr val="7030A0"/>
+            </a:solidFill>
+            <a:prstDash val="sysDot"/>
+            <a:headEnd type="none" w="med" len="med"/>
+            <a:tailEnd type="arrow" w="med" len="med"/>
+          </a:ln>
+          <a:effectLst/>
+        </p:spPr>
+        <p:style>
+          <a:lnRef idx="1">
+            <a:schemeClr val="accent2"/>
+          </a:lnRef>
+          <a:fillRef idx="2">
+            <a:schemeClr val="accent2"/>
+          </a:fillRef>
+          <a:effectRef idx="1">
+            <a:schemeClr val="accent2"/>
+          </a:effectRef>
+          <a:fontRef idx="minor">
+            <a:schemeClr val="dk1"/>
+          </a:fontRef>
+        </p:style>
+      </p:cxnSp>
+      <p:sp>
+        <p:nvSpPr>
+          <p:cNvPr id="54" name="TextBox 53"/>
+          <p:cNvSpPr txBox="1"/>
+          <p:nvPr/>
+        </p:nvSpPr>
+        <p:spPr>
+          <a:xfrm>
+            <a:off x="4324972" y="3058864"/>
+            <a:ext cx="189257" cy="178683"/>
+          </a:xfrm>
+          <a:prstGeom prst="rect">
+            <a:avLst/>
+          </a:prstGeom>
+          <a:noFill/>
+        </p:spPr>
+        <p:txBody>
+          <a:bodyPr wrap="square" lIns="0" tIns="0" rIns="0" bIns="0" rtlCol="0">
+            <a:noAutofit/>
+          </a:bodyPr>
+          <a:lstStyle/>
+          <a:p>
+            <a:pPr algn="ctr"/>
+            <a:r>
+              <a:rPr lang="en-US" sz="1100" dirty="0">
+                <a:solidFill>
+                  <a:srgbClr val="7030A0"/>
+                </a:solidFill>
+              </a:rPr>
+              <a:t>1</a:t>
+            </a:r>
+            <a:endParaRPr lang="en-SG" sz="1100" dirty="0">
+              <a:solidFill>
+                <a:srgbClr val="7030A0"/>
+              </a:solidFill>
+            </a:endParaRPr>
+          </a:p>
+        </p:txBody>
+      </p:sp>
+      <p:sp>
+        <p:nvSpPr>
+          <p:cNvPr id="61" name="TextBox 60"/>
+          <p:cNvSpPr txBox="1"/>
+          <p:nvPr/>
+        </p:nvSpPr>
+        <p:spPr>
+          <a:xfrm>
+            <a:off x="6135256" y="3097917"/>
+            <a:ext cx="189257" cy="178683"/>
+          </a:xfrm>
+          <a:prstGeom prst="rect">
+            <a:avLst/>
+          </a:prstGeom>
+          <a:noFill/>
+        </p:spPr>
+        <p:txBody>
+          <a:bodyPr wrap="square" lIns="0" tIns="0" rIns="0" bIns="0" rtlCol="0">
+            <a:noAutofit/>
+          </a:bodyPr>
+          <a:lstStyle/>
+          <a:p>
+            <a:pPr algn="ctr"/>
+            <a:r>
+              <a:rPr lang="en-US" sz="1100" dirty="0">
+                <a:solidFill>
+                  <a:srgbClr val="7030A0"/>
+                </a:solidFill>
+              </a:rPr>
+              <a:t>*</a:t>
+            </a:r>
+            <a:endParaRPr lang="en-SG" sz="1100" dirty="0">
+              <a:solidFill>
+                <a:srgbClr val="7030A0"/>
+              </a:solidFill>
+            </a:endParaRPr>
+          </a:p>
+        </p:txBody>
+      </p:sp>
+      <p:sp>
+        <p:nvSpPr>
+          <p:cNvPr id="65" name="TextBox 64"/>
+          <p:cNvSpPr txBox="1"/>
+          <p:nvPr/>
+        </p:nvSpPr>
+        <p:spPr>
+          <a:xfrm>
+            <a:off x="2560167" y="2753818"/>
+            <a:ext cx="78378" cy="193767"/>
+          </a:xfrm>
+          <a:prstGeom prst="rect">
+            <a:avLst/>
+          </a:prstGeom>
+          <a:noFill/>
+        </p:spPr>
+        <p:txBody>
+          <a:bodyPr wrap="square" lIns="0" tIns="0" rIns="0" bIns="0" rtlCol="0">
+            <a:noAutofit/>
+          </a:bodyPr>
+          <a:lstStyle/>
+          <a:p>
+            <a:pPr algn="ctr"/>
+            <a:r>
+              <a:rPr lang="en-US" sz="1100" dirty="0">
+                <a:solidFill>
+                  <a:srgbClr val="7030A0"/>
+                </a:solidFill>
+              </a:rPr>
+              <a:t>1</a:t>
+            </a:r>
+            <a:endParaRPr lang="en-SG" sz="1100" dirty="0">
+              <a:solidFill>
+                <a:srgbClr val="7030A0"/>
+              </a:solidFill>
+            </a:endParaRPr>
+          </a:p>
+        </p:txBody>
+      </p:sp>
+      <p:sp>
+        <p:nvSpPr>
+          <p:cNvPr id="66" name="TextBox 65"/>
+          <p:cNvSpPr txBox="1"/>
+          <p:nvPr/>
+        </p:nvSpPr>
+        <p:spPr>
+          <a:xfrm>
+            <a:off x="2707070" y="3667737"/>
+            <a:ext cx="189257" cy="178683"/>
+          </a:xfrm>
+          <a:prstGeom prst="rect">
+            <a:avLst/>
+          </a:prstGeom>
+          <a:noFill/>
+        </p:spPr>
+        <p:txBody>
+          <a:bodyPr wrap="square" lIns="0" tIns="0" rIns="0" bIns="0" rtlCol="0">
+            <a:noAutofit/>
+          </a:bodyPr>
+          <a:lstStyle/>
+          <a:p>
+            <a:pPr algn="ctr"/>
+            <a:r>
+              <a:rPr lang="en-US" sz="1100" dirty="0">
+                <a:solidFill>
+                  <a:srgbClr val="7030A0"/>
+                </a:solidFill>
+              </a:rPr>
+              <a:t>1</a:t>
+            </a:r>
+            <a:endParaRPr lang="en-SG" sz="1100" dirty="0">
+              <a:solidFill>
+                <a:srgbClr val="7030A0"/>
+              </a:solidFill>
+            </a:endParaRPr>
+          </a:p>
+        </p:txBody>
+      </p:sp>
+      <p:sp>
+        <p:nvSpPr>
+          <p:cNvPr id="70" name="TextBox 69"/>
+          <p:cNvSpPr txBox="1"/>
+          <p:nvPr/>
+        </p:nvSpPr>
+        <p:spPr>
+          <a:xfrm>
+            <a:off x="6449896" y="3204826"/>
+            <a:ext cx="189257" cy="178683"/>
+          </a:xfrm>
+          <a:prstGeom prst="rect">
+            <a:avLst/>
+          </a:prstGeom>
+          <a:noFill/>
+        </p:spPr>
+        <p:txBody>
+          <a:bodyPr wrap="square" lIns="0" tIns="0" rIns="0" bIns="0" rtlCol="0">
+            <a:noAutofit/>
+          </a:bodyPr>
+          <a:lstStyle/>
+          <a:p>
+            <a:pPr algn="ctr"/>
+            <a:r>
+              <a:rPr lang="en-US" sz="1100" dirty="0">
+                <a:solidFill>
+                  <a:srgbClr val="7030A0"/>
+                </a:solidFill>
+              </a:rPr>
+              <a:t>1</a:t>
+            </a:r>
+            <a:endParaRPr lang="en-SG" sz="1100" dirty="0">
+              <a:solidFill>
+                <a:srgbClr val="7030A0"/>
+              </a:solidFill>
+            </a:endParaRPr>
+          </a:p>
+        </p:txBody>
+      </p:sp>
+      <p:sp>
+        <p:nvSpPr>
+          <p:cNvPr id="52" name="Rectangle 8">
             <a:extLst>
               <a:ext uri="{FF2B5EF4-FFF2-40B4-BE49-F238E27FC236}">
-                <a16:creationId xmlns:a16="http://schemas.microsoft.com/office/drawing/2014/main" id="{B254752A-BE3D-4520-A588-D36130F38AEE}"/>
+                <a16:creationId xmlns:a16="http://schemas.microsoft.com/office/drawing/2014/main" id="{ABDCDBD2-131A-4B66-A2F2-43BBEE82C773}"/>
               </a:ext>
             </a:extLst>
           </p:cNvPr>
-          <p:cNvPicPr>
-            <a:picLocks noChangeAspect="1"/>
-          </p:cNvPicPr>
+          <p:cNvSpPr/>
           <p:nvPr/>
-        </p:nvPicPr>
-        <p:blipFill>
-          <a:blip r:embed="rId3">
-            <a:extLst>
-              <a:ext uri="{28A0092B-C50C-407E-A947-70E740481C1C}">
-                <a14:useLocalDpi xmlns:a14="http://schemas.microsoft.com/office/drawing/2010/main" val="0"/>
-              </a:ext>
-            </a:extLst>
-          </a:blip>
-          <a:stretch>
-            <a:fillRect/>
-          </a:stretch>
-        </p:blipFill>
+        </p:nvSpPr>
         <p:spPr>
           <a:xfrm>
-            <a:off x="381000" y="1219200"/>
-            <a:ext cx="7720055" cy="3481387"/>
+            <a:off x="4755872" y="2206861"/>
+            <a:ext cx="1156969" cy="285783"/>
           </a:xfrm>
           <a:prstGeom prst="rect">
             <a:avLst/>
           </a:prstGeom>
-        </p:spPr>
-      </p:pic>
+          <a:ln w="19050">
+            <a:solidFill>
+              <a:srgbClr val="7030A0"/>
+            </a:solidFill>
+          </a:ln>
+          <a:effectLst/>
+        </p:spPr>
+        <p:style>
+          <a:lnRef idx="1">
+            <a:schemeClr val="accent4"/>
+          </a:lnRef>
+          <a:fillRef idx="2">
+            <a:schemeClr val="accent4"/>
+          </a:fillRef>
+          <a:effectRef idx="1">
+            <a:schemeClr val="accent4"/>
+          </a:effectRef>
+          <a:fontRef idx="minor">
+            <a:schemeClr val="dk1"/>
+          </a:fontRef>
+        </p:style>
+        <p:txBody>
+          <a:bodyPr rtlCol="0" anchor="ctr"/>
+          <a:lstStyle/>
+          <a:p>
+            <a:pPr algn="ctr"/>
+            <a:r>
+              <a:rPr lang="en-US" sz="1050" dirty="0" err="1">
+                <a:solidFill>
+                  <a:srgbClr val="7030A0"/>
+                </a:solidFill>
+              </a:rPr>
+              <a:t>UniqueTagList</a:t>
+            </a:r>
+            <a:endParaRPr lang="en-SG" sz="1050" dirty="0">
+              <a:solidFill>
+                <a:srgbClr val="7030A0"/>
+              </a:solidFill>
+            </a:endParaRPr>
+          </a:p>
+        </p:txBody>
+      </p:sp>
+      <p:cxnSp>
+        <p:nvCxnSpPr>
+          <p:cNvPr id="53" name="Elbow Connector 78">
+            <a:extLst>
+              <a:ext uri="{FF2B5EF4-FFF2-40B4-BE49-F238E27FC236}">
+                <a16:creationId xmlns:a16="http://schemas.microsoft.com/office/drawing/2014/main" id="{B97967F8-618A-448B-81FD-CDFD4AF0EC64}"/>
+              </a:ext>
+            </a:extLst>
+          </p:cNvPr>
+          <p:cNvCxnSpPr>
+            <a:cxnSpLocks/>
+            <a:stCxn id="54" idx="0"/>
+            <a:endCxn id="52" idx="1"/>
+          </p:cNvCxnSpPr>
+          <p:nvPr/>
+        </p:nvCxnSpPr>
+        <p:spPr>
+          <a:xfrm rot="5400000" flipH="1" flipV="1">
+            <a:off x="4233181" y="2536174"/>
+            <a:ext cx="709111" cy="336271"/>
+          </a:xfrm>
+          <a:prstGeom prst="bentConnector2">
+            <a:avLst/>
+          </a:prstGeom>
+          <a:ln w="19050">
+            <a:solidFill>
+              <a:srgbClr val="7030A0"/>
+            </a:solidFill>
+            <a:headEnd type="none" w="med" len="med"/>
+            <a:tailEnd type="arrow" w="med" len="med"/>
+          </a:ln>
+          <a:effectLst/>
+        </p:spPr>
+        <p:style>
+          <a:lnRef idx="1">
+            <a:schemeClr val="accent2"/>
+          </a:lnRef>
+          <a:fillRef idx="2">
+            <a:schemeClr val="accent2"/>
+          </a:fillRef>
+          <a:effectRef idx="1">
+            <a:schemeClr val="accent2"/>
+          </a:effectRef>
+          <a:fontRef idx="minor">
+            <a:schemeClr val="dk1"/>
+          </a:fontRef>
+        </p:style>
+      </p:cxnSp>
+      <p:sp>
+        <p:nvSpPr>
+          <p:cNvPr id="50" name="TextBox 49">
+            <a:extLst>
+              <a:ext uri="{FF2B5EF4-FFF2-40B4-BE49-F238E27FC236}">
+                <a16:creationId xmlns:a16="http://schemas.microsoft.com/office/drawing/2014/main" id="{B3FA9D57-880F-49C4-AD0B-A64E30D6F403}"/>
+              </a:ext>
+            </a:extLst>
+          </p:cNvPr>
+          <p:cNvSpPr txBox="1"/>
+          <p:nvPr/>
+        </p:nvSpPr>
+        <p:spPr>
+          <a:xfrm>
+            <a:off x="6714344" y="2430721"/>
+            <a:ext cx="189257" cy="178683"/>
+          </a:xfrm>
+          <a:prstGeom prst="rect">
+            <a:avLst/>
+          </a:prstGeom>
+          <a:noFill/>
+        </p:spPr>
+        <p:txBody>
+          <a:bodyPr wrap="square" lIns="0" tIns="0" rIns="0" bIns="0" rtlCol="0">
+            <a:noAutofit/>
+          </a:bodyPr>
+          <a:lstStyle/>
+          <a:p>
+            <a:pPr algn="ctr"/>
+            <a:r>
+              <a:rPr lang="en-US" sz="1100" dirty="0">
+                <a:solidFill>
+                  <a:srgbClr val="7030A0"/>
+                </a:solidFill>
+              </a:rPr>
+              <a:t>*</a:t>
+            </a:r>
+            <a:endParaRPr lang="en-SG" sz="1100" dirty="0">
+              <a:solidFill>
+                <a:srgbClr val="7030A0"/>
+              </a:solidFill>
+            </a:endParaRPr>
+          </a:p>
+        </p:txBody>
+      </p:sp>
+      <p:sp>
+        <p:nvSpPr>
+          <p:cNvPr id="55" name="Flowchart: Decision 96">
+            <a:extLst>
+              <a:ext uri="{FF2B5EF4-FFF2-40B4-BE49-F238E27FC236}">
+                <a16:creationId xmlns:a16="http://schemas.microsoft.com/office/drawing/2014/main" id="{B9F96195-942D-4692-91B7-CF34229E7461}"/>
+              </a:ext>
+            </a:extLst>
+          </p:cNvPr>
+          <p:cNvSpPr/>
+          <p:nvPr/>
+        </p:nvSpPr>
+        <p:spPr>
+          <a:xfrm rot="16200000">
+            <a:off x="6553482" y="2664721"/>
+            <a:ext cx="236048" cy="173380"/>
+          </a:xfrm>
+          <a:prstGeom prst="flowChartDecision">
+            <a:avLst/>
+          </a:prstGeom>
+          <a:noFill/>
+          <a:ln w="19050">
+            <a:solidFill>
+              <a:srgbClr val="7030A0"/>
+            </a:solidFill>
+          </a:ln>
+          <a:effectLst/>
+        </p:spPr>
+        <p:style>
+          <a:lnRef idx="1">
+            <a:schemeClr val="accent6"/>
+          </a:lnRef>
+          <a:fillRef idx="2">
+            <a:schemeClr val="accent6"/>
+          </a:fillRef>
+          <a:effectRef idx="1">
+            <a:schemeClr val="accent6"/>
+          </a:effectRef>
+          <a:fontRef idx="minor">
+            <a:schemeClr val="dk1"/>
+          </a:fontRef>
+        </p:style>
+        <p:txBody>
+          <a:bodyPr rtlCol="0" anchor="ctr"/>
+          <a:lstStyle/>
+          <a:p>
+            <a:pPr algn="ctr"/>
+            <a:endParaRPr lang="en-US" sz="1050"/>
+          </a:p>
+        </p:txBody>
+      </p:sp>
+      <p:cxnSp>
+        <p:nvCxnSpPr>
+          <p:cNvPr id="59" name="Elbow Connector 63">
+            <a:extLst>
+              <a:ext uri="{FF2B5EF4-FFF2-40B4-BE49-F238E27FC236}">
+                <a16:creationId xmlns:a16="http://schemas.microsoft.com/office/drawing/2014/main" id="{E2D6A56C-A223-4236-A1F0-7EFEBA2FC940}"/>
+              </a:ext>
+            </a:extLst>
+          </p:cNvPr>
+          <p:cNvCxnSpPr>
+            <a:cxnSpLocks/>
+            <a:endCxn id="67" idx="1"/>
+          </p:cNvCxnSpPr>
+          <p:nvPr/>
+        </p:nvCxnSpPr>
+        <p:spPr>
+          <a:xfrm flipV="1">
+            <a:off x="5884280" y="2233006"/>
+            <a:ext cx="432916" cy="111294"/>
+          </a:xfrm>
+          <a:prstGeom prst="bentConnector3">
+            <a:avLst/>
+          </a:prstGeom>
+          <a:ln w="19050">
+            <a:solidFill>
+              <a:srgbClr val="7030A0"/>
+            </a:solidFill>
+            <a:headEnd type="none" w="med" len="med"/>
+            <a:tailEnd type="arrow" w="med" len="med"/>
+          </a:ln>
+          <a:effectLst/>
+        </p:spPr>
+        <p:style>
+          <a:lnRef idx="1">
+            <a:schemeClr val="accent2"/>
+          </a:lnRef>
+          <a:fillRef idx="2">
+            <a:schemeClr val="accent2"/>
+          </a:fillRef>
+          <a:effectRef idx="1">
+            <a:schemeClr val="accent2"/>
+          </a:effectRef>
+          <a:fontRef idx="minor">
+            <a:schemeClr val="dk1"/>
+          </a:fontRef>
+        </p:style>
+      </p:cxnSp>
+      <p:sp>
+        <p:nvSpPr>
+          <p:cNvPr id="67" name="Rectangle 8">
+            <a:extLst>
+              <a:ext uri="{FF2B5EF4-FFF2-40B4-BE49-F238E27FC236}">
+                <a16:creationId xmlns:a16="http://schemas.microsoft.com/office/drawing/2014/main" id="{36D68104-33BB-4C8F-B764-F3F0B25E592B}"/>
+              </a:ext>
+            </a:extLst>
+          </p:cNvPr>
+          <p:cNvSpPr/>
+          <p:nvPr/>
+        </p:nvSpPr>
+        <p:spPr>
+          <a:xfrm>
+            <a:off x="6317196" y="2059626"/>
+            <a:ext cx="708186" cy="346760"/>
+          </a:xfrm>
+          <a:prstGeom prst="rect">
+            <a:avLst/>
+          </a:prstGeom>
+          <a:ln w="19050">
+            <a:solidFill>
+              <a:srgbClr val="7030A0"/>
+            </a:solidFill>
+          </a:ln>
+          <a:effectLst/>
+        </p:spPr>
+        <p:style>
+          <a:lnRef idx="1">
+            <a:schemeClr val="accent4"/>
+          </a:lnRef>
+          <a:fillRef idx="2">
+            <a:schemeClr val="accent4"/>
+          </a:fillRef>
+          <a:effectRef idx="1">
+            <a:schemeClr val="accent4"/>
+          </a:effectRef>
+          <a:fontRef idx="minor">
+            <a:schemeClr val="dk1"/>
+          </a:fontRef>
+        </p:style>
+        <p:txBody>
+          <a:bodyPr rtlCol="0" anchor="ctr"/>
+          <a:lstStyle/>
+          <a:p>
+            <a:pPr algn="ctr"/>
+            <a:r>
+              <a:rPr lang="en-US" sz="1050" dirty="0">
+                <a:solidFill>
+                  <a:srgbClr val="7030A0"/>
+                </a:solidFill>
+              </a:rPr>
+              <a:t>Tag</a:t>
+            </a:r>
+            <a:endParaRPr lang="en-SG" sz="1050" dirty="0">
+              <a:solidFill>
+                <a:srgbClr val="7030A0"/>
+              </a:solidFill>
+            </a:endParaRPr>
+          </a:p>
+        </p:txBody>
+      </p:sp>
+      <p:sp>
+        <p:nvSpPr>
+          <p:cNvPr id="68" name="TextBox 67">
+            <a:extLst>
+              <a:ext uri="{FF2B5EF4-FFF2-40B4-BE49-F238E27FC236}">
+                <a16:creationId xmlns:a16="http://schemas.microsoft.com/office/drawing/2014/main" id="{18A2ABF0-4DA8-43EE-BACE-A737C4E4CFEC}"/>
+              </a:ext>
+            </a:extLst>
+          </p:cNvPr>
+          <p:cNvSpPr txBox="1"/>
+          <p:nvPr/>
+        </p:nvSpPr>
+        <p:spPr>
+          <a:xfrm>
+            <a:off x="6135256" y="2278014"/>
+            <a:ext cx="189257" cy="178683"/>
+          </a:xfrm>
+          <a:prstGeom prst="rect">
+            <a:avLst/>
+          </a:prstGeom>
+          <a:noFill/>
+        </p:spPr>
+        <p:txBody>
+          <a:bodyPr wrap="square" lIns="0" tIns="0" rIns="0" bIns="0" rtlCol="0">
+            <a:noAutofit/>
+          </a:bodyPr>
+          <a:lstStyle/>
+          <a:p>
+            <a:pPr algn="ctr"/>
+            <a:r>
+              <a:rPr lang="en-US" sz="1100" dirty="0">
+                <a:solidFill>
+                  <a:srgbClr val="7030A0"/>
+                </a:solidFill>
+              </a:rPr>
+              <a:t>*</a:t>
+            </a:r>
+            <a:endParaRPr lang="en-SG" sz="1100" dirty="0">
+              <a:solidFill>
+                <a:srgbClr val="7030A0"/>
+              </a:solidFill>
+            </a:endParaRPr>
+          </a:p>
+        </p:txBody>
+      </p:sp>
+      <p:sp>
+        <p:nvSpPr>
+          <p:cNvPr id="69" name="TextBox 68">
+            <a:extLst>
+              <a:ext uri="{FF2B5EF4-FFF2-40B4-BE49-F238E27FC236}">
+                <a16:creationId xmlns:a16="http://schemas.microsoft.com/office/drawing/2014/main" id="{8CF9406A-39C7-4163-8880-BB65541FC08E}"/>
+              </a:ext>
+            </a:extLst>
+          </p:cNvPr>
+          <p:cNvSpPr txBox="1"/>
+          <p:nvPr/>
+        </p:nvSpPr>
+        <p:spPr>
+          <a:xfrm>
+            <a:off x="4367100" y="2172972"/>
+            <a:ext cx="189257" cy="178683"/>
+          </a:xfrm>
+          <a:prstGeom prst="rect">
+            <a:avLst/>
+          </a:prstGeom>
+          <a:noFill/>
+        </p:spPr>
+        <p:txBody>
+          <a:bodyPr wrap="square" lIns="0" tIns="0" rIns="0" bIns="0" rtlCol="0">
+            <a:noAutofit/>
+          </a:bodyPr>
+          <a:lstStyle/>
+          <a:p>
+            <a:pPr algn="ctr"/>
+            <a:r>
+              <a:rPr lang="en-US" sz="1100" dirty="0">
+                <a:solidFill>
+                  <a:srgbClr val="7030A0"/>
+                </a:solidFill>
+              </a:rPr>
+              <a:t>1</a:t>
+            </a:r>
+            <a:endParaRPr lang="en-SG" sz="1100" dirty="0">
+              <a:solidFill>
+                <a:srgbClr val="7030A0"/>
+              </a:solidFill>
+            </a:endParaRPr>
+          </a:p>
+        </p:txBody>
+      </p:sp>
+      <p:sp>
+        <p:nvSpPr>
+          <p:cNvPr id="71" name="Flowchart: Decision 96">
+            <a:extLst>
+              <a:ext uri="{FF2B5EF4-FFF2-40B4-BE49-F238E27FC236}">
+                <a16:creationId xmlns:a16="http://schemas.microsoft.com/office/drawing/2014/main" id="{233007D4-EEA2-4CA6-ACFE-1517B654224E}"/>
+              </a:ext>
+            </a:extLst>
+          </p:cNvPr>
+          <p:cNvSpPr/>
+          <p:nvPr/>
+        </p:nvSpPr>
+        <p:spPr>
+          <a:xfrm>
+            <a:off x="5911329" y="2262081"/>
+            <a:ext cx="236048" cy="173380"/>
+          </a:xfrm>
+          <a:prstGeom prst="flowChartDecision">
+            <a:avLst/>
+          </a:prstGeom>
+          <a:solidFill>
+            <a:srgbClr val="7030A0"/>
+          </a:solidFill>
+          <a:ln w="19050">
+            <a:solidFill>
+              <a:srgbClr val="7030A0"/>
+            </a:solidFill>
+          </a:ln>
+          <a:effectLst/>
+        </p:spPr>
+        <p:style>
+          <a:lnRef idx="1">
+            <a:schemeClr val="accent6"/>
+          </a:lnRef>
+          <a:fillRef idx="2">
+            <a:schemeClr val="accent6"/>
+          </a:fillRef>
+          <a:effectRef idx="1">
+            <a:schemeClr val="accent6"/>
+          </a:effectRef>
+          <a:fontRef idx="minor">
+            <a:schemeClr val="dk1"/>
+          </a:fontRef>
+        </p:style>
+        <p:txBody>
+          <a:bodyPr rtlCol="0" anchor="ctr"/>
+          <a:lstStyle/>
+          <a:p>
+            <a:pPr algn="ctr"/>
+            <a:endParaRPr lang="en-US" sz="1050"/>
+          </a:p>
+        </p:txBody>
+      </p:sp>
+      <p:cxnSp>
+        <p:nvCxnSpPr>
+          <p:cNvPr id="72" name="Elbow Connector 78">
+            <a:extLst>
+              <a:ext uri="{FF2B5EF4-FFF2-40B4-BE49-F238E27FC236}">
+                <a16:creationId xmlns:a16="http://schemas.microsoft.com/office/drawing/2014/main" id="{D5DFB8C5-B0B0-46C1-967B-4449112ABD6F}"/>
+              </a:ext>
+            </a:extLst>
+          </p:cNvPr>
+          <p:cNvCxnSpPr>
+            <a:cxnSpLocks/>
+            <a:stCxn id="55" idx="3"/>
+            <a:endCxn id="67" idx="2"/>
+          </p:cNvCxnSpPr>
+          <p:nvPr/>
+        </p:nvCxnSpPr>
+        <p:spPr>
+          <a:xfrm rot="16200000" flipV="1">
+            <a:off x="6557898" y="2519778"/>
+            <a:ext cx="227001" cy="217"/>
+          </a:xfrm>
+          <a:prstGeom prst="bentConnector3">
+            <a:avLst>
+              <a:gd name="adj1" fmla="val 50000"/>
+            </a:avLst>
+          </a:prstGeom>
+          <a:ln w="19050">
+            <a:solidFill>
+              <a:srgbClr val="7030A0"/>
+            </a:solidFill>
+            <a:headEnd type="none" w="med" len="med"/>
+            <a:tailEnd type="arrow" w="med" len="med"/>
+          </a:ln>
+          <a:effectLst/>
+        </p:spPr>
+        <p:style>
+          <a:lnRef idx="1">
+            <a:schemeClr val="accent2"/>
+          </a:lnRef>
+          <a:fillRef idx="2">
+            <a:schemeClr val="accent2"/>
+          </a:fillRef>
+          <a:effectRef idx="1">
+            <a:schemeClr val="accent2"/>
+          </a:effectRef>
+          <a:fontRef idx="minor">
+            <a:schemeClr val="dk1"/>
+          </a:fontRef>
+        </p:style>
+      </p:cxnSp>
+      <p:cxnSp>
+        <p:nvCxnSpPr>
+          <p:cNvPr id="90" name="Elbow Connector 63"/>
+          <p:cNvCxnSpPr>
+            <a:stCxn id="91" idx="3"/>
+          </p:cNvCxnSpPr>
+          <p:nvPr/>
+        </p:nvCxnSpPr>
+        <p:spPr>
+          <a:xfrm rot="5400000">
+            <a:off x="3470636" y="2687353"/>
+            <a:ext cx="293825" cy="5938"/>
+          </a:xfrm>
+          <a:prstGeom prst="bentConnector3">
+            <a:avLst>
+              <a:gd name="adj1" fmla="val 50000"/>
+            </a:avLst>
+          </a:prstGeom>
+          <a:ln w="19050">
+            <a:solidFill>
+              <a:srgbClr val="7030A0"/>
+            </a:solidFill>
+            <a:prstDash val="sysDot"/>
+            <a:headEnd type="none" w="med" len="med"/>
+            <a:tailEnd type="none" w="med" len="med"/>
+          </a:ln>
+          <a:effectLst/>
+        </p:spPr>
+        <p:style>
+          <a:lnRef idx="1">
+            <a:schemeClr val="accent2"/>
+          </a:lnRef>
+          <a:fillRef idx="2">
+            <a:schemeClr val="accent2"/>
+          </a:fillRef>
+          <a:effectRef idx="1">
+            <a:schemeClr val="accent2"/>
+          </a:effectRef>
+          <a:fontRef idx="minor">
+            <a:schemeClr val="dk1"/>
+          </a:fontRef>
+        </p:style>
+      </p:cxnSp>
+      <p:sp>
+        <p:nvSpPr>
+          <p:cNvPr id="91" name="Isosceles Triangle 102"/>
+          <p:cNvSpPr/>
+          <p:nvPr/>
+        </p:nvSpPr>
+        <p:spPr>
+          <a:xfrm rot="10800000" flipV="1">
+            <a:off x="3479324" y="2386348"/>
+            <a:ext cx="282387" cy="157062"/>
+          </a:xfrm>
+          <a:prstGeom prst="triangle">
+            <a:avLst/>
+          </a:prstGeom>
+          <a:ln w="19050">
+            <a:solidFill>
+              <a:srgbClr val="7030A0"/>
+            </a:solidFill>
+          </a:ln>
+          <a:effectLst/>
+        </p:spPr>
+        <p:style>
+          <a:lnRef idx="1">
+            <a:schemeClr val="accent4"/>
+          </a:lnRef>
+          <a:fillRef idx="2">
+            <a:schemeClr val="accent4"/>
+          </a:fillRef>
+          <a:effectRef idx="1">
+            <a:schemeClr val="accent4"/>
+          </a:effectRef>
+          <a:fontRef idx="minor">
+            <a:schemeClr val="dk1"/>
+          </a:fontRef>
+        </p:style>
+        <p:txBody>
+          <a:bodyPr rtlCol="0" anchor="ctr"/>
+          <a:lstStyle/>
+          <a:p>
+            <a:pPr algn="ctr"/>
+            <a:endParaRPr lang="en-SG" sz="1050" b="1">
+              <a:solidFill>
+                <a:srgbClr val="92D050"/>
+              </a:solidFill>
+            </a:endParaRPr>
+          </a:p>
+        </p:txBody>
+      </p:sp>
+      <p:sp>
+        <p:nvSpPr>
+          <p:cNvPr id="92" name="Rectangle 8"/>
+          <p:cNvSpPr/>
+          <p:nvPr/>
+        </p:nvSpPr>
+        <p:spPr>
+          <a:xfrm>
+            <a:off x="1177947" y="1998144"/>
+            <a:ext cx="1443661" cy="364396"/>
+          </a:xfrm>
+          <a:prstGeom prst="rect">
+            <a:avLst/>
+          </a:prstGeom>
+          <a:ln w="19050">
+            <a:solidFill>
+              <a:srgbClr val="7030A0"/>
+            </a:solidFill>
+          </a:ln>
+          <a:effectLst/>
+        </p:spPr>
+        <p:style>
+          <a:lnRef idx="1">
+            <a:schemeClr val="accent4"/>
+          </a:lnRef>
+          <a:fillRef idx="2">
+            <a:schemeClr val="accent4"/>
+          </a:fillRef>
+          <a:effectRef idx="1">
+            <a:schemeClr val="accent4"/>
+          </a:effectRef>
+          <a:fontRef idx="minor">
+            <a:schemeClr val="dk1"/>
+          </a:fontRef>
+        </p:style>
+        <p:txBody>
+          <a:bodyPr rtlCol="0" anchor="ctr"/>
+          <a:lstStyle/>
+          <a:p>
+            <a:pPr algn="ctr"/>
+            <a:r>
+              <a:rPr lang="en-US" sz="1050" dirty="0">
+                <a:solidFill>
+                  <a:srgbClr val="7030A0"/>
+                </a:solidFill>
+              </a:rPr>
+              <a:t>&lt;&lt;interface&gt;&gt;</a:t>
+            </a:r>
+            <a:br>
+              <a:rPr lang="en-US" sz="1050" dirty="0">
+                <a:solidFill>
+                  <a:srgbClr val="7030A0"/>
+                </a:solidFill>
+              </a:rPr>
+            </a:br>
+            <a:r>
+              <a:rPr lang="en-US" sz="1050" dirty="0" err="1">
+                <a:solidFill>
+                  <a:srgbClr val="7030A0"/>
+                </a:solidFill>
+              </a:rPr>
+              <a:t>ReadOnlyAddressBook</a:t>
+            </a:r>
+            <a:endParaRPr lang="en-SG" sz="1050" dirty="0">
+              <a:solidFill>
+                <a:srgbClr val="7030A0"/>
+              </a:solidFill>
+            </a:endParaRPr>
+          </a:p>
+        </p:txBody>
+      </p:sp>
+      <p:sp>
+        <p:nvSpPr>
+          <p:cNvPr id="93" name="Rectangle 8"/>
+          <p:cNvSpPr/>
+          <p:nvPr/>
+        </p:nvSpPr>
+        <p:spPr>
+          <a:xfrm>
+            <a:off x="3087206" y="1998144"/>
+            <a:ext cx="1060683" cy="364396"/>
+          </a:xfrm>
+          <a:prstGeom prst="rect">
+            <a:avLst/>
+          </a:prstGeom>
+          <a:ln w="19050">
+            <a:solidFill>
+              <a:srgbClr val="7030A0"/>
+            </a:solidFill>
+          </a:ln>
+          <a:effectLst/>
+        </p:spPr>
+        <p:style>
+          <a:lnRef idx="1">
+            <a:schemeClr val="accent4"/>
+          </a:lnRef>
+          <a:fillRef idx="2">
+            <a:schemeClr val="accent4"/>
+          </a:fillRef>
+          <a:effectRef idx="1">
+            <a:schemeClr val="accent4"/>
+          </a:effectRef>
+          <a:fontRef idx="minor">
+            <a:schemeClr val="dk1"/>
+          </a:fontRef>
+        </p:style>
+        <p:txBody>
+          <a:bodyPr rtlCol="0" anchor="ctr"/>
+          <a:lstStyle/>
+          <a:p>
+            <a:pPr algn="ctr"/>
+            <a:r>
+              <a:rPr lang="en-US" sz="1050" dirty="0" err="1">
+                <a:solidFill>
+                  <a:srgbClr val="7030A0"/>
+                </a:solidFill>
+              </a:rPr>
+              <a:t>AddressBook</a:t>
+            </a:r>
+            <a:endParaRPr lang="en-SG" sz="1050" dirty="0">
+              <a:solidFill>
+                <a:srgbClr val="7030A0"/>
+              </a:solidFill>
+            </a:endParaRPr>
+          </a:p>
+        </p:txBody>
+      </p:sp>
+      <p:sp>
+        <p:nvSpPr>
+          <p:cNvPr id="94" name="Isosceles Triangle 102"/>
+          <p:cNvSpPr/>
+          <p:nvPr/>
+        </p:nvSpPr>
+        <p:spPr>
+          <a:xfrm rot="16200000">
+            <a:off x="2586098" y="2068952"/>
+            <a:ext cx="271014" cy="187417"/>
+          </a:xfrm>
+          <a:prstGeom prst="triangle">
+            <a:avLst>
+              <a:gd name="adj" fmla="val 44517"/>
+            </a:avLst>
+          </a:prstGeom>
+          <a:solidFill>
+            <a:schemeClr val="accent4">
+              <a:lumMod val="20000"/>
+              <a:lumOff val="80000"/>
+            </a:schemeClr>
+          </a:solidFill>
+          <a:ln w="19050">
+            <a:solidFill>
+              <a:srgbClr val="7030A0"/>
+            </a:solidFill>
+          </a:ln>
+          <a:effectLst/>
+        </p:spPr>
+        <p:style>
+          <a:lnRef idx="1">
+            <a:schemeClr val="accent6"/>
+          </a:lnRef>
+          <a:fillRef idx="2">
+            <a:schemeClr val="accent6"/>
+          </a:fillRef>
+          <a:effectRef idx="1">
+            <a:schemeClr val="accent6"/>
+          </a:effectRef>
+          <a:fontRef idx="minor">
+            <a:schemeClr val="dk1"/>
+          </a:fontRef>
+        </p:style>
+        <p:txBody>
+          <a:bodyPr rtlCol="0" anchor="ctr"/>
+          <a:lstStyle/>
+          <a:p>
+            <a:pPr algn="ctr"/>
+            <a:endParaRPr lang="en-SG" sz="1050"/>
+          </a:p>
+        </p:txBody>
+      </p:sp>
+      <p:cxnSp>
+        <p:nvCxnSpPr>
+          <p:cNvPr id="95" name="Elbow Connector 63"/>
+          <p:cNvCxnSpPr>
+            <a:stCxn id="94" idx="3"/>
+            <a:endCxn id="93" idx="1"/>
+          </p:cNvCxnSpPr>
+          <p:nvPr/>
+        </p:nvCxnSpPr>
+        <p:spPr>
+          <a:xfrm>
+            <a:off x="2815314" y="2177521"/>
+            <a:ext cx="271892" cy="2821"/>
+          </a:xfrm>
+          <a:prstGeom prst="bentConnector3">
+            <a:avLst>
+              <a:gd name="adj1" fmla="val 50000"/>
+            </a:avLst>
+          </a:prstGeom>
+          <a:ln w="19050">
+            <a:solidFill>
+              <a:srgbClr val="7030A0"/>
+            </a:solidFill>
+            <a:prstDash val="sysDot"/>
+            <a:headEnd type="none" w="med" len="med"/>
+            <a:tailEnd type="none" w="med" len="med"/>
+          </a:ln>
+          <a:effectLst/>
+        </p:spPr>
+        <p:style>
+          <a:lnRef idx="1">
+            <a:schemeClr val="accent2"/>
+          </a:lnRef>
+          <a:fillRef idx="2">
+            <a:schemeClr val="accent2"/>
+          </a:fillRef>
+          <a:effectRef idx="1">
+            <a:schemeClr val="accent2"/>
+          </a:effectRef>
+          <a:fontRef idx="minor">
+            <a:schemeClr val="dk1"/>
+          </a:fontRef>
+        </p:style>
+      </p:cxnSp>
     </p:spTree>
     <p:extLst>
       <p:ext uri="{BB962C8B-B14F-4D97-AF65-F5344CB8AC3E}">
@@ -4626,24 +6572,4 @@
   <a:objectDefaults/>
   <a:extraClrSchemeLst/>
 </a:theme>
-</file>
-
-<file path=ppt/webextensions/taskpanes.xml><?xml version="1.0" encoding="utf-8"?>
-<wetp:taskpanes xmlns:wetp="http://schemas.microsoft.com/office/webextensions/taskpanes/2010/11">
-  <wetp:taskpane dockstate="right" visibility="0" width="525" row="2">
-    <wetp:webextensionref xmlns:r="http://schemas.openxmlformats.org/officeDocument/2006/relationships" r:id="rId1"/>
-  </wetp:taskpane>
-</wetp:taskpanes>
-</file>
-
-<file path=ppt/webextensions/webextension1.xml><?xml version="1.0" encoding="utf-8"?>
-<we:webextension xmlns:we="http://schemas.microsoft.com/office/webextensions/webextension/2010/11" id="{46533BE7-B6A3-41EE-97CE-56B239A70786}">
-  <we:reference id="wa104381637" version="1.0.0.0" store="en-US" storeType="OMEX"/>
-  <we:alternateReferences>
-    <we:reference id="wa104381637" version="1.0.0.0" store="WA104381637" storeType="OMEX"/>
-  </we:alternateReferences>
-  <we:properties/>
-  <we:bindings/>
-  <we:snapshot xmlns:r="http://schemas.openxmlformats.org/officeDocument/2006/relationships"/>
-</we:webextension>
 </file>
</xml_diff>

<commit_message>
docs/diagrams/ModelComponentSequenceDiagram.pptx & docs/images/ModelClassDiagram.png: - Update interface ReadOnlyAddressBook to   ReadOnlyScheduler - Rename class UserPref to UserPrefs - Update class AddressBook to Scheduler - Update class VersionedAddressBook to   VersionedScheduler - Remove interface ObservableList - Remove classes UniqueEventList and UniqueTagList - Update class Person to Event - Update attributes of Person class to attributes   of Event class
</commit_message>
<xml_diff>
--- a/docs/diagrams/ModelComponentClassBetterOopDiagram.pptx
+++ b/docs/diagrams/ModelComponentClassBetterOopDiagram.pptx
@@ -208,7 +208,7 @@
           <a:p>
             <a:fld id="{F5CC4B3F-88C1-4FFA-B1B6-F41C21DC6924}" type="datetimeFigureOut">
               <a:rPr lang="en-US" smtClean="0"/>
-              <a:t>6/27/2018</a:t>
+              <a:t>10/25/2018</a:t>
             </a:fld>
             <a:endParaRPr lang="en-US"/>
           </a:p>
@@ -654,7 +654,7 @@
           <a:p>
             <a:fld id="{78C97017-6FC3-485B-9764-EAC9E56C1D49}" type="datetimeFigureOut">
               <a:rPr lang="en-US" smtClean="0"/>
-              <a:t>6/27/2018</a:t>
+              <a:t>10/25/2018</a:t>
             </a:fld>
             <a:endParaRPr lang="en-US"/>
           </a:p>
@@ -822,7 +822,7 @@
           <a:p>
             <a:fld id="{78C97017-6FC3-485B-9764-EAC9E56C1D49}" type="datetimeFigureOut">
               <a:rPr lang="en-US" smtClean="0"/>
-              <a:t>6/27/2018</a:t>
+              <a:t>10/25/2018</a:t>
             </a:fld>
             <a:endParaRPr lang="en-US"/>
           </a:p>
@@ -1000,7 +1000,7 @@
           <a:p>
             <a:fld id="{78C97017-6FC3-485B-9764-EAC9E56C1D49}" type="datetimeFigureOut">
               <a:rPr lang="en-US" smtClean="0"/>
-              <a:t>6/27/2018</a:t>
+              <a:t>10/25/2018</a:t>
             </a:fld>
             <a:endParaRPr lang="en-US"/>
           </a:p>
@@ -1168,7 +1168,7 @@
           <a:p>
             <a:fld id="{78C97017-6FC3-485B-9764-EAC9E56C1D49}" type="datetimeFigureOut">
               <a:rPr lang="en-US" smtClean="0"/>
-              <a:t>6/27/2018</a:t>
+              <a:t>10/25/2018</a:t>
             </a:fld>
             <a:endParaRPr lang="en-US"/>
           </a:p>
@@ -1413,7 +1413,7 @@
           <a:p>
             <a:fld id="{78C97017-6FC3-485B-9764-EAC9E56C1D49}" type="datetimeFigureOut">
               <a:rPr lang="en-US" smtClean="0"/>
-              <a:t>6/27/2018</a:t>
+              <a:t>10/25/2018</a:t>
             </a:fld>
             <a:endParaRPr lang="en-US"/>
           </a:p>
@@ -1698,7 +1698,7 @@
           <a:p>
             <a:fld id="{78C97017-6FC3-485B-9764-EAC9E56C1D49}" type="datetimeFigureOut">
               <a:rPr lang="en-US" smtClean="0"/>
-              <a:t>6/27/2018</a:t>
+              <a:t>10/25/2018</a:t>
             </a:fld>
             <a:endParaRPr lang="en-US"/>
           </a:p>
@@ -2117,7 +2117,7 @@
           <a:p>
             <a:fld id="{78C97017-6FC3-485B-9764-EAC9E56C1D49}" type="datetimeFigureOut">
               <a:rPr lang="en-US" smtClean="0"/>
-              <a:t>6/27/2018</a:t>
+              <a:t>10/25/2018</a:t>
             </a:fld>
             <a:endParaRPr lang="en-US"/>
           </a:p>
@@ -2234,7 +2234,7 @@
           <a:p>
             <a:fld id="{78C97017-6FC3-485B-9764-EAC9E56C1D49}" type="datetimeFigureOut">
               <a:rPr lang="en-US" smtClean="0"/>
-              <a:t>6/27/2018</a:t>
+              <a:t>10/25/2018</a:t>
             </a:fld>
             <a:endParaRPr lang="en-US"/>
           </a:p>
@@ -2329,7 +2329,7 @@
           <a:p>
             <a:fld id="{78C97017-6FC3-485B-9764-EAC9E56C1D49}" type="datetimeFigureOut">
               <a:rPr lang="en-US" smtClean="0"/>
-              <a:t>6/27/2018</a:t>
+              <a:t>10/25/2018</a:t>
             </a:fld>
             <a:endParaRPr lang="en-US"/>
           </a:p>
@@ -2604,7 +2604,7 @@
           <a:p>
             <a:fld id="{78C97017-6FC3-485B-9764-EAC9E56C1D49}" type="datetimeFigureOut">
               <a:rPr lang="en-US" smtClean="0"/>
-              <a:t>6/27/2018</a:t>
+              <a:t>10/25/2018</a:t>
             </a:fld>
             <a:endParaRPr lang="en-US"/>
           </a:p>
@@ -2856,7 +2856,7 @@
           <a:p>
             <a:fld id="{78C97017-6FC3-485B-9764-EAC9E56C1D49}" type="datetimeFigureOut">
               <a:rPr lang="en-US" smtClean="0"/>
-              <a:t>6/27/2018</a:t>
+              <a:t>10/25/2018</a:t>
             </a:fld>
             <a:endParaRPr lang="en-US"/>
           </a:p>
@@ -3067,7 +3067,7 @@
           <a:p>
             <a:fld id="{78C97017-6FC3-485B-9764-EAC9E56C1D49}" type="datetimeFigureOut">
               <a:rPr lang="en-US" smtClean="0"/>
-              <a:t>6/27/2018</a:t>
+              <a:t>10/25/2018</a:t>
             </a:fld>
             <a:endParaRPr lang="en-US"/>
           </a:p>
@@ -3451,7 +3451,7 @@
         <p:spPr>
           <a:xfrm>
             <a:off x="1119865" y="1676400"/>
-            <a:ext cx="7490735" cy="3059747"/>
+            <a:ext cx="7490735" cy="3535537"/>
           </a:xfrm>
           <a:prstGeom prst="roundRect">
             <a:avLst>
@@ -3552,7 +3552,7 @@
                   <a:schemeClr val="bg1"/>
                 </a:solidFill>
               </a:rPr>
-              <a:t>UserPref</a:t>
+              <a:t>UserPrefs</a:t>
             </a:r>
             <a:endParaRPr lang="en-SG" sz="1050" dirty="0">
               <a:solidFill>
@@ -3992,12 +3992,12 @@
           <a:p>
             <a:pPr algn="ctr"/>
             <a:r>
-              <a:rPr lang="en-US" sz="1050" dirty="0" err="1" smtClean="0">
+              <a:rPr lang="en-US" sz="1050" dirty="0" err="1">
                 <a:solidFill>
                   <a:srgbClr val="7030A0"/>
                 </a:solidFill>
               </a:rPr>
-              <a:t>VersionedAddressBook</a:t>
+              <a:t>VersionedScheduler</a:t>
             </a:r>
             <a:endParaRPr lang="en-SG" sz="1050" dirty="0">
               <a:solidFill>
@@ -4139,7 +4139,7 @@
                   <a:srgbClr val="7030A0"/>
                 </a:solidFill>
               </a:rPr>
-              <a:t>UniquePersonList</a:t>
+              <a:t>UniqueEventList</a:t>
             </a:r>
             <a:endParaRPr lang="en-SG" sz="1050" dirty="0">
               <a:solidFill>
@@ -4283,7 +4283,7 @@
                   <a:srgbClr val="7030A0"/>
                 </a:solidFill>
               </a:rPr>
-              <a:t>Person</a:t>
+              <a:t>Event</a:t>
             </a:r>
             <a:endParaRPr lang="en-SG" sz="1050" dirty="0">
               <a:solidFill>
@@ -4382,14 +4382,100 @@
       </p:cxnSp>
       <p:sp>
         <p:nvSpPr>
-          <p:cNvPr id="76" name="Rectangle 8"/>
+          <p:cNvPr id="78" name="Flowchart: Decision 96"/>
           <p:cNvSpPr/>
           <p:nvPr/>
         </p:nvSpPr>
         <p:spPr>
           <a:xfrm>
-            <a:off x="7712397" y="2564238"/>
-            <a:ext cx="708186" cy="285783"/>
+            <a:off x="7041947" y="2948201"/>
+            <a:ext cx="236048" cy="173380"/>
+          </a:xfrm>
+          <a:prstGeom prst="flowChartDecision">
+            <a:avLst/>
+          </a:prstGeom>
+          <a:solidFill>
+            <a:srgbClr val="7030A0"/>
+          </a:solidFill>
+          <a:ln w="19050">
+            <a:solidFill>
+              <a:srgbClr val="7030A0"/>
+            </a:solidFill>
+          </a:ln>
+          <a:effectLst/>
+        </p:spPr>
+        <p:style>
+          <a:lnRef idx="1">
+            <a:schemeClr val="accent6"/>
+          </a:lnRef>
+          <a:fillRef idx="2">
+            <a:schemeClr val="accent6"/>
+          </a:fillRef>
+          <a:effectRef idx="1">
+            <a:schemeClr val="accent6"/>
+          </a:effectRef>
+          <a:fontRef idx="minor">
+            <a:schemeClr val="dk1"/>
+          </a:fontRef>
+        </p:style>
+        <p:txBody>
+          <a:bodyPr rtlCol="0" anchor="ctr"/>
+          <a:lstStyle/>
+          <a:p>
+            <a:pPr algn="ctr"/>
+            <a:endParaRPr lang="en-US" sz="1050"/>
+          </a:p>
+        </p:txBody>
+      </p:sp>
+      <p:sp>
+        <p:nvSpPr>
+          <p:cNvPr id="114" name="TextBox 113"/>
+          <p:cNvSpPr txBox="1"/>
+          <p:nvPr/>
+        </p:nvSpPr>
+        <p:spPr>
+          <a:xfrm rot="16200000">
+            <a:off x="6362886" y="3586305"/>
+            <a:ext cx="881018" cy="261610"/>
+          </a:xfrm>
+          <a:prstGeom prst="rect">
+            <a:avLst/>
+          </a:prstGeom>
+          <a:noFill/>
+        </p:spPr>
+        <p:txBody>
+          <a:bodyPr wrap="square" rtlCol="0">
+            <a:spAutoFit/>
+          </a:bodyPr>
+          <a:lstStyle/>
+          <a:p>
+            <a:pPr algn="r"/>
+            <a:r>
+              <a:rPr lang="en-US" sz="1100" dirty="0">
+                <a:solidFill>
+                  <a:srgbClr val="7030A0"/>
+                </a:solidFill>
+              </a:rPr>
+              <a:t>filtered list</a:t>
+            </a:r>
+            <a:endParaRPr lang="en-SG" sz="1100" dirty="0">
+              <a:solidFill>
+                <a:srgbClr val="7030A0"/>
+              </a:solidFill>
+            </a:endParaRPr>
+          </a:p>
+        </p:txBody>
+      </p:sp>
+      <p:sp>
+        <p:nvSpPr>
+          <p:cNvPr id="122" name="Rectangle 8"/>
+          <p:cNvSpPr/>
+          <p:nvPr/>
+        </p:nvSpPr>
+        <p:spPr>
+          <a:xfrm>
+            <a:off x="2057401" y="4239491"/>
+            <a:ext cx="1066800" cy="346760"/>
           </a:xfrm>
           <a:prstGeom prst="rect">
             <a:avLst/>
@@ -4426,488 +4512,7 @@
                   <a:srgbClr val="7030A0"/>
                 </a:solidFill>
               </a:rPr>
-              <a:t>Name</a:t>
-            </a:r>
-            <a:endParaRPr lang="en-SG" sz="1050" dirty="0">
-              <a:solidFill>
-                <a:srgbClr val="7030A0"/>
-              </a:solidFill>
-            </a:endParaRPr>
-          </a:p>
-        </p:txBody>
-      </p:sp>
-      <p:sp>
-        <p:nvSpPr>
-          <p:cNvPr id="78" name="Flowchart: Decision 96"/>
-          <p:cNvSpPr/>
-          <p:nvPr/>
-        </p:nvSpPr>
-        <p:spPr>
-          <a:xfrm>
-            <a:off x="7041947" y="2948201"/>
-            <a:ext cx="236048" cy="173380"/>
-          </a:xfrm>
-          <a:prstGeom prst="flowChartDecision">
-            <a:avLst/>
-          </a:prstGeom>
-          <a:solidFill>
-            <a:srgbClr val="7030A0"/>
-          </a:solidFill>
-          <a:ln w="19050">
-            <a:solidFill>
-              <a:srgbClr val="7030A0"/>
-            </a:solidFill>
-          </a:ln>
-          <a:effectLst/>
-        </p:spPr>
-        <p:style>
-          <a:lnRef idx="1">
-            <a:schemeClr val="accent6"/>
-          </a:lnRef>
-          <a:fillRef idx="2">
-            <a:schemeClr val="accent6"/>
-          </a:fillRef>
-          <a:effectRef idx="1">
-            <a:schemeClr val="accent6"/>
-          </a:effectRef>
-          <a:fontRef idx="minor">
-            <a:schemeClr val="dk1"/>
-          </a:fontRef>
-        </p:style>
-        <p:txBody>
-          <a:bodyPr rtlCol="0" anchor="ctr"/>
-          <a:lstStyle/>
-          <a:p>
-            <a:pPr algn="ctr"/>
-            <a:endParaRPr lang="en-US" sz="1050"/>
-          </a:p>
-        </p:txBody>
-      </p:sp>
-      <p:cxnSp>
-        <p:nvCxnSpPr>
-          <p:cNvPr id="79" name="Elbow Connector 78"/>
-          <p:cNvCxnSpPr>
-            <a:cxnSpLocks/>
-          </p:cNvCxnSpPr>
-          <p:nvPr/>
-        </p:nvCxnSpPr>
-        <p:spPr>
-          <a:xfrm flipV="1">
-            <a:off x="7277995" y="2706821"/>
-            <a:ext cx="434402" cy="327761"/>
-          </a:xfrm>
-          <a:prstGeom prst="bentConnector3">
-            <a:avLst/>
-          </a:prstGeom>
-          <a:ln w="19050">
-            <a:solidFill>
-              <a:srgbClr val="7030A0"/>
-            </a:solidFill>
-            <a:headEnd type="none" w="med" len="med"/>
-            <a:tailEnd type="arrow" w="med" len="med"/>
-          </a:ln>
-          <a:effectLst/>
-        </p:spPr>
-        <p:style>
-          <a:lnRef idx="1">
-            <a:schemeClr val="accent2"/>
-          </a:lnRef>
-          <a:fillRef idx="2">
-            <a:schemeClr val="accent2"/>
-          </a:fillRef>
-          <a:effectRef idx="1">
-            <a:schemeClr val="accent2"/>
-          </a:effectRef>
-          <a:fontRef idx="minor">
-            <a:schemeClr val="dk1"/>
-          </a:fontRef>
-        </p:style>
-      </p:cxnSp>
-      <p:sp>
-        <p:nvSpPr>
-          <p:cNvPr id="80" name="Rectangle 8"/>
-          <p:cNvSpPr/>
-          <p:nvPr/>
-        </p:nvSpPr>
-        <p:spPr>
-          <a:xfrm>
-            <a:off x="7712397" y="2887216"/>
-            <a:ext cx="708186" cy="285783"/>
-          </a:xfrm>
-          <a:prstGeom prst="rect">
-            <a:avLst/>
-          </a:prstGeom>
-          <a:ln w="19050">
-            <a:solidFill>
-              <a:srgbClr val="7030A0"/>
-            </a:solidFill>
-          </a:ln>
-          <a:effectLst/>
-        </p:spPr>
-        <p:style>
-          <a:lnRef idx="1">
-            <a:schemeClr val="accent4"/>
-          </a:lnRef>
-          <a:fillRef idx="2">
-            <a:schemeClr val="accent4"/>
-          </a:fillRef>
-          <a:effectRef idx="1">
-            <a:schemeClr val="accent4"/>
-          </a:effectRef>
-          <a:fontRef idx="minor">
-            <a:schemeClr val="dk1"/>
-          </a:fontRef>
-        </p:style>
-        <p:txBody>
-          <a:bodyPr rtlCol="0" anchor="ctr"/>
-          <a:lstStyle/>
-          <a:p>
-            <a:pPr algn="ctr"/>
-            <a:r>
-              <a:rPr lang="en-US" sz="1050" dirty="0">
-                <a:solidFill>
-                  <a:srgbClr val="7030A0"/>
-                </a:solidFill>
-              </a:rPr>
-              <a:t>Phone</a:t>
-            </a:r>
-            <a:endParaRPr lang="en-SG" sz="1050" dirty="0">
-              <a:solidFill>
-                <a:srgbClr val="7030A0"/>
-              </a:solidFill>
-            </a:endParaRPr>
-          </a:p>
-        </p:txBody>
-      </p:sp>
-      <p:cxnSp>
-        <p:nvCxnSpPr>
-          <p:cNvPr id="81" name="Elbow Connector 80"/>
-          <p:cNvCxnSpPr>
-            <a:stCxn id="78" idx="3"/>
-            <a:endCxn id="80" idx="1"/>
-          </p:cNvCxnSpPr>
-          <p:nvPr/>
-        </p:nvCxnSpPr>
-        <p:spPr>
-          <a:xfrm flipV="1">
-            <a:off x="7277995" y="3030108"/>
-            <a:ext cx="434402" cy="4783"/>
-          </a:xfrm>
-          <a:prstGeom prst="bentConnector3">
-            <a:avLst/>
-          </a:prstGeom>
-          <a:ln w="19050">
-            <a:solidFill>
-              <a:srgbClr val="7030A0"/>
-            </a:solidFill>
-            <a:headEnd type="none" w="med" len="med"/>
-            <a:tailEnd type="arrow" w="med" len="med"/>
-          </a:ln>
-          <a:effectLst/>
-        </p:spPr>
-        <p:style>
-          <a:lnRef idx="1">
-            <a:schemeClr val="accent2"/>
-          </a:lnRef>
-          <a:fillRef idx="2">
-            <a:schemeClr val="accent2"/>
-          </a:fillRef>
-          <a:effectRef idx="1">
-            <a:schemeClr val="accent2"/>
-          </a:effectRef>
-          <a:fontRef idx="minor">
-            <a:schemeClr val="dk1"/>
-          </a:fontRef>
-        </p:style>
-      </p:cxnSp>
-      <p:sp>
-        <p:nvSpPr>
-          <p:cNvPr id="83" name="Rectangle 8"/>
-          <p:cNvSpPr/>
-          <p:nvPr/>
-        </p:nvSpPr>
-        <p:spPr>
-          <a:xfrm>
-            <a:off x="7712397" y="3210194"/>
-            <a:ext cx="708186" cy="285783"/>
-          </a:xfrm>
-          <a:prstGeom prst="rect">
-            <a:avLst/>
-          </a:prstGeom>
-          <a:ln w="19050">
-            <a:solidFill>
-              <a:srgbClr val="7030A0"/>
-            </a:solidFill>
-          </a:ln>
-          <a:effectLst/>
-        </p:spPr>
-        <p:style>
-          <a:lnRef idx="1">
-            <a:schemeClr val="accent4"/>
-          </a:lnRef>
-          <a:fillRef idx="2">
-            <a:schemeClr val="accent4"/>
-          </a:fillRef>
-          <a:effectRef idx="1">
-            <a:schemeClr val="accent4"/>
-          </a:effectRef>
-          <a:fontRef idx="minor">
-            <a:schemeClr val="dk1"/>
-          </a:fontRef>
-        </p:style>
-        <p:txBody>
-          <a:bodyPr rtlCol="0" anchor="ctr"/>
-          <a:lstStyle/>
-          <a:p>
-            <a:pPr algn="ctr"/>
-            <a:r>
-              <a:rPr lang="en-US" sz="1050" dirty="0">
-                <a:solidFill>
-                  <a:srgbClr val="7030A0"/>
-                </a:solidFill>
-              </a:rPr>
-              <a:t>Email</a:t>
-            </a:r>
-            <a:endParaRPr lang="en-SG" sz="1050" dirty="0">
-              <a:solidFill>
-                <a:srgbClr val="7030A0"/>
-              </a:solidFill>
-            </a:endParaRPr>
-          </a:p>
-        </p:txBody>
-      </p:sp>
-      <p:cxnSp>
-        <p:nvCxnSpPr>
-          <p:cNvPr id="84" name="Elbow Connector 83"/>
-          <p:cNvCxnSpPr>
-            <a:stCxn id="78" idx="3"/>
-            <a:endCxn id="83" idx="1"/>
-          </p:cNvCxnSpPr>
-          <p:nvPr/>
-        </p:nvCxnSpPr>
-        <p:spPr>
-          <a:xfrm>
-            <a:off x="7277995" y="3034891"/>
-            <a:ext cx="434402" cy="318195"/>
-          </a:xfrm>
-          <a:prstGeom prst="bentConnector3">
-            <a:avLst/>
-          </a:prstGeom>
-          <a:ln w="19050">
-            <a:solidFill>
-              <a:srgbClr val="7030A0"/>
-            </a:solidFill>
-            <a:headEnd type="none" w="med" len="med"/>
-            <a:tailEnd type="arrow" w="med" len="med"/>
-          </a:ln>
-          <a:effectLst/>
-        </p:spPr>
-        <p:style>
-          <a:lnRef idx="1">
-            <a:schemeClr val="accent2"/>
-          </a:lnRef>
-          <a:fillRef idx="2">
-            <a:schemeClr val="accent2"/>
-          </a:fillRef>
-          <a:effectRef idx="1">
-            <a:schemeClr val="accent2"/>
-          </a:effectRef>
-          <a:fontRef idx="minor">
-            <a:schemeClr val="dk1"/>
-          </a:fontRef>
-        </p:style>
-      </p:cxnSp>
-      <p:sp>
-        <p:nvSpPr>
-          <p:cNvPr id="85" name="Rectangle 8"/>
-          <p:cNvSpPr/>
-          <p:nvPr/>
-        </p:nvSpPr>
-        <p:spPr>
-          <a:xfrm>
-            <a:off x="7712397" y="3533171"/>
-            <a:ext cx="708186" cy="285783"/>
-          </a:xfrm>
-          <a:prstGeom prst="rect">
-            <a:avLst/>
-          </a:prstGeom>
-          <a:ln w="19050">
-            <a:solidFill>
-              <a:srgbClr val="7030A0"/>
-            </a:solidFill>
-          </a:ln>
-          <a:effectLst/>
-        </p:spPr>
-        <p:style>
-          <a:lnRef idx="1">
-            <a:schemeClr val="accent4"/>
-          </a:lnRef>
-          <a:fillRef idx="2">
-            <a:schemeClr val="accent4"/>
-          </a:fillRef>
-          <a:effectRef idx="1">
-            <a:schemeClr val="accent4"/>
-          </a:effectRef>
-          <a:fontRef idx="minor">
-            <a:schemeClr val="dk1"/>
-          </a:fontRef>
-        </p:style>
-        <p:txBody>
-          <a:bodyPr rtlCol="0" anchor="ctr"/>
-          <a:lstStyle/>
-          <a:p>
-            <a:pPr algn="ctr"/>
-            <a:r>
-              <a:rPr lang="en-US" sz="1050" dirty="0">
-                <a:solidFill>
-                  <a:srgbClr val="7030A0"/>
-                </a:solidFill>
-              </a:rPr>
-              <a:t>Address</a:t>
-            </a:r>
-            <a:endParaRPr lang="en-SG" sz="1050" dirty="0">
-              <a:solidFill>
-                <a:srgbClr val="7030A0"/>
-              </a:solidFill>
-            </a:endParaRPr>
-          </a:p>
-        </p:txBody>
-      </p:sp>
-      <p:cxnSp>
-        <p:nvCxnSpPr>
-          <p:cNvPr id="86" name="Elbow Connector 85"/>
-          <p:cNvCxnSpPr>
-            <a:stCxn id="78" idx="3"/>
-            <a:endCxn id="85" idx="1"/>
-          </p:cNvCxnSpPr>
-          <p:nvPr/>
-        </p:nvCxnSpPr>
-        <p:spPr>
-          <a:xfrm>
-            <a:off x="7277995" y="3034891"/>
-            <a:ext cx="434402" cy="641172"/>
-          </a:xfrm>
-          <a:prstGeom prst="bentConnector3">
-            <a:avLst/>
-          </a:prstGeom>
-          <a:ln w="19050">
-            <a:solidFill>
-              <a:srgbClr val="7030A0"/>
-            </a:solidFill>
-            <a:headEnd type="none" w="med" len="med"/>
-            <a:tailEnd type="arrow" w="med" len="med"/>
-          </a:ln>
-          <a:effectLst/>
-        </p:spPr>
-        <p:style>
-          <a:lnRef idx="1">
-            <a:schemeClr val="accent2"/>
-          </a:lnRef>
-          <a:fillRef idx="2">
-            <a:schemeClr val="accent2"/>
-          </a:fillRef>
-          <a:effectRef idx="1">
-            <a:schemeClr val="accent2"/>
-          </a:effectRef>
-          <a:fontRef idx="minor">
-            <a:schemeClr val="dk1"/>
-          </a:fontRef>
-        </p:style>
-      </p:cxnSp>
-      <p:sp>
-        <p:nvSpPr>
-          <p:cNvPr id="114" name="TextBox 113"/>
-          <p:cNvSpPr txBox="1"/>
-          <p:nvPr/>
-        </p:nvSpPr>
-        <p:spPr>
-          <a:xfrm rot="16200000">
-            <a:off x="6362886" y="3586305"/>
-            <a:ext cx="881018" cy="261610"/>
-          </a:xfrm>
-          <a:prstGeom prst="rect">
-            <a:avLst/>
-          </a:prstGeom>
-          <a:noFill/>
-        </p:spPr>
-        <p:txBody>
-          <a:bodyPr wrap="square" rtlCol="0">
-            <a:spAutoFit/>
-          </a:bodyPr>
-          <a:lstStyle/>
-          <a:p>
-            <a:pPr algn="r"/>
-            <a:r>
-              <a:rPr lang="en-US" sz="1100" dirty="0">
-                <a:solidFill>
-                  <a:srgbClr val="7030A0"/>
-                </a:solidFill>
-              </a:rPr>
-              <a:t>filtered list</a:t>
-            </a:r>
-            <a:endParaRPr lang="en-SG" sz="1100" dirty="0">
-              <a:solidFill>
-                <a:srgbClr val="7030A0"/>
-              </a:solidFill>
-            </a:endParaRPr>
-          </a:p>
-        </p:txBody>
-      </p:sp>
-      <p:sp>
-        <p:nvSpPr>
-          <p:cNvPr id="122" name="Rectangle 8"/>
-          <p:cNvSpPr/>
-          <p:nvPr/>
-        </p:nvSpPr>
-        <p:spPr>
-          <a:xfrm>
-            <a:off x="2057401" y="4239491"/>
-            <a:ext cx="1066800" cy="346760"/>
-          </a:xfrm>
-          <a:prstGeom prst="rect">
-            <a:avLst/>
-          </a:prstGeom>
-          <a:ln w="19050">
-            <a:solidFill>
-              <a:srgbClr val="7030A0"/>
-            </a:solidFill>
-          </a:ln>
-          <a:effectLst/>
-        </p:spPr>
-        <p:style>
-          <a:lnRef idx="1">
-            <a:schemeClr val="accent4"/>
-          </a:lnRef>
-          <a:fillRef idx="2">
-            <a:schemeClr val="accent4"/>
-          </a:fillRef>
-          <a:effectRef idx="1">
-            <a:schemeClr val="accent4"/>
-          </a:effectRef>
-          <a:fontRef idx="minor">
-            <a:schemeClr val="dk1"/>
-          </a:fontRef>
-        </p:style>
-        <p:txBody>
-          <a:bodyPr rtlCol="0" anchor="ctr"/>
-          <a:lstStyle/>
-          <a:p>
-            <a:pPr algn="ctr"/>
-            <a:r>
-              <a:rPr lang="en-US" sz="1050" dirty="0">
-                <a:solidFill>
-                  <a:srgbClr val="7030A0"/>
-                </a:solidFill>
-              </a:rPr>
               <a:t>&lt;&lt;interface&gt;&gt;</a:t>
-            </a:r>
-            <a:r>
-              <a:rPr lang="en-US" sz="1050">
-                <a:solidFill>
-                  <a:srgbClr val="7030A0"/>
-                </a:solidFill>
-              </a:rPr>
-              <a:t/>
             </a:r>
             <a:br>
               <a:rPr lang="en-US" sz="1050">
@@ -5829,7 +5434,7 @@
                   <a:srgbClr val="7030A0"/>
                 </a:solidFill>
               </a:rPr>
-              <a:t>ReadOnlyAddressBook</a:t>
+              <a:t>ReadOnlyScheduler</a:t>
             </a:r>
             <a:endParaRPr lang="en-SG" sz="1050" dirty="0">
               <a:solidFill>
@@ -5880,12 +5485,12 @@
           <a:p>
             <a:pPr algn="ctr"/>
             <a:r>
-              <a:rPr lang="en-US" sz="1050" dirty="0" err="1">
+              <a:rPr lang="en-US" sz="1050" dirty="0">
                 <a:solidFill>
                   <a:srgbClr val="7030A0"/>
                 </a:solidFill>
               </a:rPr>
-              <a:t>AddressBook</a:t>
+              <a:t>Scheduler</a:t>
             </a:r>
             <a:endParaRPr lang="en-SG" sz="1050" dirty="0">
               <a:solidFill>
@@ -5973,6 +5578,1564 @@
             <a:prstDash val="sysDot"/>
             <a:headEnd type="none" w="med" len="med"/>
             <a:tailEnd type="none" w="med" len="med"/>
+          </a:ln>
+          <a:effectLst/>
+        </p:spPr>
+        <p:style>
+          <a:lnRef idx="1">
+            <a:schemeClr val="accent2"/>
+          </a:lnRef>
+          <a:fillRef idx="2">
+            <a:schemeClr val="accent2"/>
+          </a:fillRef>
+          <a:effectRef idx="1">
+            <a:schemeClr val="accent2"/>
+          </a:effectRef>
+          <a:fontRef idx="minor">
+            <a:schemeClr val="dk1"/>
+          </a:fontRef>
+        </p:style>
+      </p:cxnSp>
+      <p:cxnSp>
+        <p:nvCxnSpPr>
+          <p:cNvPr id="56" name="Straight Connector 55">
+            <a:extLst>
+              <a:ext uri="{FF2B5EF4-FFF2-40B4-BE49-F238E27FC236}">
+                <a16:creationId xmlns:a16="http://schemas.microsoft.com/office/drawing/2014/main" id="{5BE16AEA-8D04-4936-B134-3162110E0E2A}"/>
+              </a:ext>
+            </a:extLst>
+          </p:cNvPr>
+          <p:cNvCxnSpPr/>
+          <p:nvPr/>
+        </p:nvCxnSpPr>
+        <p:spPr>
+          <a:xfrm flipH="1">
+            <a:off x="1260922" y="4038600"/>
+            <a:ext cx="2301376" cy="547651"/>
+          </a:xfrm>
+          <a:prstGeom prst="line">
+            <a:avLst/>
+          </a:prstGeom>
+          <a:ln>
+            <a:solidFill>
+              <a:srgbClr val="FF0000"/>
+            </a:solidFill>
+          </a:ln>
+        </p:spPr>
+        <p:style>
+          <a:lnRef idx="1">
+            <a:schemeClr val="accent1"/>
+          </a:lnRef>
+          <a:fillRef idx="0">
+            <a:schemeClr val="accent1"/>
+          </a:fillRef>
+          <a:effectRef idx="0">
+            <a:schemeClr val="accent1"/>
+          </a:effectRef>
+          <a:fontRef idx="minor">
+            <a:schemeClr val="tx1"/>
+          </a:fontRef>
+        </p:style>
+      </p:cxnSp>
+      <p:cxnSp>
+        <p:nvCxnSpPr>
+          <p:cNvPr id="57" name="Straight Connector 56">
+            <a:extLst>
+              <a:ext uri="{FF2B5EF4-FFF2-40B4-BE49-F238E27FC236}">
+                <a16:creationId xmlns:a16="http://schemas.microsoft.com/office/drawing/2014/main" id="{16F6CE04-6B92-4D8A-B035-1DE268272BF8}"/>
+              </a:ext>
+            </a:extLst>
+          </p:cNvPr>
+          <p:cNvCxnSpPr/>
+          <p:nvPr/>
+        </p:nvCxnSpPr>
+        <p:spPr>
+          <a:xfrm>
+            <a:off x="1260922" y="3723310"/>
+            <a:ext cx="2091878" cy="924890"/>
+          </a:xfrm>
+          <a:prstGeom prst="line">
+            <a:avLst/>
+          </a:prstGeom>
+          <a:ln>
+            <a:solidFill>
+              <a:srgbClr val="FF0000"/>
+            </a:solidFill>
+          </a:ln>
+        </p:spPr>
+        <p:style>
+          <a:lnRef idx="1">
+            <a:schemeClr val="accent1"/>
+          </a:lnRef>
+          <a:fillRef idx="0">
+            <a:schemeClr val="accent1"/>
+          </a:fillRef>
+          <a:effectRef idx="0">
+            <a:schemeClr val="accent1"/>
+          </a:effectRef>
+          <a:fontRef idx="minor">
+            <a:schemeClr val="tx1"/>
+          </a:fontRef>
+        </p:style>
+      </p:cxnSp>
+      <p:cxnSp>
+        <p:nvCxnSpPr>
+          <p:cNvPr id="60" name="Straight Connector 59">
+            <a:extLst>
+              <a:ext uri="{FF2B5EF4-FFF2-40B4-BE49-F238E27FC236}">
+                <a16:creationId xmlns:a16="http://schemas.microsoft.com/office/drawing/2014/main" id="{CED94425-5A35-43DF-88F1-129C5093F067}"/>
+              </a:ext>
+            </a:extLst>
+          </p:cNvPr>
+          <p:cNvCxnSpPr/>
+          <p:nvPr/>
+        </p:nvCxnSpPr>
+        <p:spPr>
+          <a:xfrm flipV="1">
+            <a:off x="4324972" y="2706821"/>
+            <a:ext cx="1923428" cy="569779"/>
+          </a:xfrm>
+          <a:prstGeom prst="line">
+            <a:avLst/>
+          </a:prstGeom>
+          <a:ln>
+            <a:solidFill>
+              <a:srgbClr val="FF0000"/>
+            </a:solidFill>
+          </a:ln>
+        </p:spPr>
+        <p:style>
+          <a:lnRef idx="1">
+            <a:schemeClr val="accent1"/>
+          </a:lnRef>
+          <a:fillRef idx="0">
+            <a:schemeClr val="accent1"/>
+          </a:fillRef>
+          <a:effectRef idx="0">
+            <a:schemeClr val="accent1"/>
+          </a:effectRef>
+          <a:fontRef idx="minor">
+            <a:schemeClr val="tx1"/>
+          </a:fontRef>
+        </p:style>
+      </p:cxnSp>
+      <p:cxnSp>
+        <p:nvCxnSpPr>
+          <p:cNvPr id="73" name="Straight Connector 72">
+            <a:extLst>
+              <a:ext uri="{FF2B5EF4-FFF2-40B4-BE49-F238E27FC236}">
+                <a16:creationId xmlns:a16="http://schemas.microsoft.com/office/drawing/2014/main" id="{76B19419-1717-4E08-92A6-6D341519FE46}"/>
+              </a:ext>
+            </a:extLst>
+          </p:cNvPr>
+          <p:cNvCxnSpPr/>
+          <p:nvPr/>
+        </p:nvCxnSpPr>
+        <p:spPr>
+          <a:xfrm>
+            <a:off x="4315840" y="2724312"/>
+            <a:ext cx="1914045" cy="552288"/>
+          </a:xfrm>
+          <a:prstGeom prst="line">
+            <a:avLst/>
+          </a:prstGeom>
+          <a:ln>
+            <a:solidFill>
+              <a:srgbClr val="FF0000"/>
+            </a:solidFill>
+          </a:ln>
+        </p:spPr>
+        <p:style>
+          <a:lnRef idx="1">
+            <a:schemeClr val="accent1"/>
+          </a:lnRef>
+          <a:fillRef idx="0">
+            <a:schemeClr val="accent1"/>
+          </a:fillRef>
+          <a:effectRef idx="0">
+            <a:schemeClr val="accent1"/>
+          </a:effectRef>
+          <a:fontRef idx="minor">
+            <a:schemeClr val="tx1"/>
+          </a:fontRef>
+        </p:style>
+      </p:cxnSp>
+      <p:cxnSp>
+        <p:nvCxnSpPr>
+          <p:cNvPr id="74" name="Straight Connector 73">
+            <a:extLst>
+              <a:ext uri="{FF2B5EF4-FFF2-40B4-BE49-F238E27FC236}">
+                <a16:creationId xmlns:a16="http://schemas.microsoft.com/office/drawing/2014/main" id="{D32C1645-2633-4FDC-99D1-D3C0D6BDC40B}"/>
+              </a:ext>
+            </a:extLst>
+          </p:cNvPr>
+          <p:cNvCxnSpPr/>
+          <p:nvPr/>
+        </p:nvCxnSpPr>
+        <p:spPr>
+          <a:xfrm>
+            <a:off x="4338570" y="2032878"/>
+            <a:ext cx="1914045" cy="552288"/>
+          </a:xfrm>
+          <a:prstGeom prst="line">
+            <a:avLst/>
+          </a:prstGeom>
+          <a:ln>
+            <a:solidFill>
+              <a:srgbClr val="FF0000"/>
+            </a:solidFill>
+          </a:ln>
+        </p:spPr>
+        <p:style>
+          <a:lnRef idx="1">
+            <a:schemeClr val="accent1"/>
+          </a:lnRef>
+          <a:fillRef idx="0">
+            <a:schemeClr val="accent1"/>
+          </a:fillRef>
+          <a:effectRef idx="0">
+            <a:schemeClr val="accent1"/>
+          </a:effectRef>
+          <a:fontRef idx="minor">
+            <a:schemeClr val="tx1"/>
+          </a:fontRef>
+        </p:style>
+      </p:cxnSp>
+      <p:cxnSp>
+        <p:nvCxnSpPr>
+          <p:cNvPr id="82" name="Straight Connector 81">
+            <a:extLst>
+              <a:ext uri="{FF2B5EF4-FFF2-40B4-BE49-F238E27FC236}">
+                <a16:creationId xmlns:a16="http://schemas.microsoft.com/office/drawing/2014/main" id="{3B8BABFB-31B1-43BD-BC3D-25DBD37FEBDF}"/>
+              </a:ext>
+            </a:extLst>
+          </p:cNvPr>
+          <p:cNvCxnSpPr/>
+          <p:nvPr/>
+        </p:nvCxnSpPr>
+        <p:spPr>
+          <a:xfrm flipV="1">
+            <a:off x="4338570" y="1966407"/>
+            <a:ext cx="1923428" cy="569779"/>
+          </a:xfrm>
+          <a:prstGeom prst="line">
+            <a:avLst/>
+          </a:prstGeom>
+          <a:ln>
+            <a:solidFill>
+              <a:srgbClr val="FF0000"/>
+            </a:solidFill>
+          </a:ln>
+        </p:spPr>
+        <p:style>
+          <a:lnRef idx="1">
+            <a:schemeClr val="accent1"/>
+          </a:lnRef>
+          <a:fillRef idx="0">
+            <a:schemeClr val="accent1"/>
+          </a:fillRef>
+          <a:effectRef idx="0">
+            <a:schemeClr val="accent1"/>
+          </a:effectRef>
+          <a:fontRef idx="minor">
+            <a:schemeClr val="tx1"/>
+          </a:fontRef>
+        </p:style>
+      </p:cxnSp>
+      <p:sp>
+        <p:nvSpPr>
+          <p:cNvPr id="87" name="Rectangle 8">
+            <a:extLst>
+              <a:ext uri="{FF2B5EF4-FFF2-40B4-BE49-F238E27FC236}">
+                <a16:creationId xmlns:a16="http://schemas.microsoft.com/office/drawing/2014/main" id="{EB54C3B2-16F8-4559-88A4-5646A2D18433}"/>
+              </a:ext>
+            </a:extLst>
+          </p:cNvPr>
+          <p:cNvSpPr/>
+          <p:nvPr/>
+        </p:nvSpPr>
+        <p:spPr>
+          <a:xfrm>
+            <a:off x="7653592" y="1999377"/>
+            <a:ext cx="884377" cy="285783"/>
+          </a:xfrm>
+          <a:prstGeom prst="rect">
+            <a:avLst/>
+          </a:prstGeom>
+          <a:ln w="19050">
+            <a:solidFill>
+              <a:srgbClr val="7030A0"/>
+            </a:solidFill>
+          </a:ln>
+          <a:effectLst/>
+        </p:spPr>
+        <p:style>
+          <a:lnRef idx="1">
+            <a:schemeClr val="accent4"/>
+          </a:lnRef>
+          <a:fillRef idx="2">
+            <a:schemeClr val="accent4"/>
+          </a:fillRef>
+          <a:effectRef idx="1">
+            <a:schemeClr val="accent4"/>
+          </a:effectRef>
+          <a:fontRef idx="minor">
+            <a:schemeClr val="dk1"/>
+          </a:fontRef>
+        </p:style>
+        <p:txBody>
+          <a:bodyPr rtlCol="0" anchor="ctr"/>
+          <a:lstStyle/>
+          <a:p>
+            <a:pPr algn="ctr"/>
+            <a:r>
+              <a:rPr lang="en-US" sz="1050" dirty="0">
+                <a:solidFill>
+                  <a:srgbClr val="7030A0"/>
+                </a:solidFill>
+              </a:rPr>
+              <a:t>UUID</a:t>
+            </a:r>
+            <a:endParaRPr lang="en-SG" sz="1050" dirty="0">
+              <a:solidFill>
+                <a:srgbClr val="7030A0"/>
+              </a:solidFill>
+            </a:endParaRPr>
+          </a:p>
+        </p:txBody>
+      </p:sp>
+      <p:sp>
+        <p:nvSpPr>
+          <p:cNvPr id="88" name="Flowchart: Decision 96">
+            <a:extLst>
+              <a:ext uri="{FF2B5EF4-FFF2-40B4-BE49-F238E27FC236}">
+                <a16:creationId xmlns:a16="http://schemas.microsoft.com/office/drawing/2014/main" id="{8DE69F6B-F2B9-4CAA-A3C5-767BFCEC234A}"/>
+              </a:ext>
+            </a:extLst>
+          </p:cNvPr>
+          <p:cNvSpPr/>
+          <p:nvPr/>
+        </p:nvSpPr>
+        <p:spPr>
+          <a:xfrm>
+            <a:off x="7031905" y="2941676"/>
+            <a:ext cx="236048" cy="173380"/>
+          </a:xfrm>
+          <a:prstGeom prst="flowChartDecision">
+            <a:avLst/>
+          </a:prstGeom>
+          <a:solidFill>
+            <a:srgbClr val="7030A0"/>
+          </a:solidFill>
+          <a:ln w="19050">
+            <a:solidFill>
+              <a:srgbClr val="7030A0"/>
+            </a:solidFill>
+          </a:ln>
+          <a:effectLst/>
+        </p:spPr>
+        <p:style>
+          <a:lnRef idx="1">
+            <a:schemeClr val="accent6"/>
+          </a:lnRef>
+          <a:fillRef idx="2">
+            <a:schemeClr val="accent6"/>
+          </a:fillRef>
+          <a:effectRef idx="1">
+            <a:schemeClr val="accent6"/>
+          </a:effectRef>
+          <a:fontRef idx="minor">
+            <a:schemeClr val="dk1"/>
+          </a:fontRef>
+        </p:style>
+        <p:txBody>
+          <a:bodyPr rtlCol="0" anchor="ctr"/>
+          <a:lstStyle/>
+          <a:p>
+            <a:pPr algn="ctr"/>
+            <a:endParaRPr lang="en-US" sz="1050"/>
+          </a:p>
+        </p:txBody>
+      </p:sp>
+      <p:cxnSp>
+        <p:nvCxnSpPr>
+          <p:cNvPr id="89" name="Elbow Connector 78">
+            <a:extLst>
+              <a:ext uri="{FF2B5EF4-FFF2-40B4-BE49-F238E27FC236}">
+                <a16:creationId xmlns:a16="http://schemas.microsoft.com/office/drawing/2014/main" id="{962ECC97-EDFD-454A-B6AA-06D55446F5DB}"/>
+              </a:ext>
+            </a:extLst>
+          </p:cNvPr>
+          <p:cNvCxnSpPr>
+            <a:cxnSpLocks/>
+            <a:endCxn id="87" idx="1"/>
+          </p:cNvCxnSpPr>
+          <p:nvPr/>
+        </p:nvCxnSpPr>
+        <p:spPr>
+          <a:xfrm>
+            <a:off x="7431508" y="2142269"/>
+            <a:ext cx="222084" cy="12700"/>
+          </a:xfrm>
+          <a:prstGeom prst="bentConnector3">
+            <a:avLst>
+              <a:gd name="adj1" fmla="val 439"/>
+            </a:avLst>
+          </a:prstGeom>
+          <a:ln w="19050">
+            <a:solidFill>
+              <a:srgbClr val="7030A0"/>
+            </a:solidFill>
+            <a:headEnd type="none" w="med" len="med"/>
+            <a:tailEnd type="arrow" w="med" len="med"/>
+          </a:ln>
+          <a:effectLst/>
+        </p:spPr>
+        <p:style>
+          <a:lnRef idx="1">
+            <a:schemeClr val="accent2"/>
+          </a:lnRef>
+          <a:fillRef idx="2">
+            <a:schemeClr val="accent2"/>
+          </a:fillRef>
+          <a:effectRef idx="1">
+            <a:schemeClr val="accent2"/>
+          </a:effectRef>
+          <a:fontRef idx="minor">
+            <a:schemeClr val="dk1"/>
+          </a:fontRef>
+        </p:style>
+      </p:cxnSp>
+      <p:sp>
+        <p:nvSpPr>
+          <p:cNvPr id="96" name="Rectangle 8">
+            <a:extLst>
+              <a:ext uri="{FF2B5EF4-FFF2-40B4-BE49-F238E27FC236}">
+                <a16:creationId xmlns:a16="http://schemas.microsoft.com/office/drawing/2014/main" id="{F8A5FCA1-8EA9-4330-99C1-B3678D2C81D3}"/>
+              </a:ext>
+            </a:extLst>
+          </p:cNvPr>
+          <p:cNvSpPr/>
+          <p:nvPr/>
+        </p:nvSpPr>
+        <p:spPr>
+          <a:xfrm>
+            <a:off x="7655498" y="2322355"/>
+            <a:ext cx="884378" cy="285783"/>
+          </a:xfrm>
+          <a:prstGeom prst="rect">
+            <a:avLst/>
+          </a:prstGeom>
+          <a:ln w="19050">
+            <a:solidFill>
+              <a:srgbClr val="7030A0"/>
+            </a:solidFill>
+          </a:ln>
+          <a:effectLst/>
+        </p:spPr>
+        <p:style>
+          <a:lnRef idx="1">
+            <a:schemeClr val="accent4"/>
+          </a:lnRef>
+          <a:fillRef idx="2">
+            <a:schemeClr val="accent4"/>
+          </a:fillRef>
+          <a:effectRef idx="1">
+            <a:schemeClr val="accent4"/>
+          </a:effectRef>
+          <a:fontRef idx="minor">
+            <a:schemeClr val="dk1"/>
+          </a:fontRef>
+        </p:style>
+        <p:txBody>
+          <a:bodyPr rtlCol="0" anchor="ctr"/>
+          <a:lstStyle/>
+          <a:p>
+            <a:pPr algn="ctr"/>
+            <a:r>
+              <a:rPr lang="en-SG" sz="1050" dirty="0" err="1">
+                <a:solidFill>
+                  <a:srgbClr val="7030A0"/>
+                </a:solidFill>
+              </a:rPr>
+              <a:t>EventName</a:t>
+            </a:r>
+            <a:endParaRPr lang="en-SG" sz="1050" dirty="0">
+              <a:solidFill>
+                <a:srgbClr val="7030A0"/>
+              </a:solidFill>
+            </a:endParaRPr>
+          </a:p>
+        </p:txBody>
+      </p:sp>
+      <p:cxnSp>
+        <p:nvCxnSpPr>
+          <p:cNvPr id="97" name="Elbow Connector 80">
+            <a:extLst>
+              <a:ext uri="{FF2B5EF4-FFF2-40B4-BE49-F238E27FC236}">
+                <a16:creationId xmlns:a16="http://schemas.microsoft.com/office/drawing/2014/main" id="{C5DB95D7-0B57-4A6B-AB73-A6F86104AD94}"/>
+              </a:ext>
+            </a:extLst>
+          </p:cNvPr>
+          <p:cNvCxnSpPr>
+            <a:cxnSpLocks/>
+            <a:endCxn id="96" idx="1"/>
+          </p:cNvCxnSpPr>
+          <p:nvPr/>
+        </p:nvCxnSpPr>
+        <p:spPr>
+          <a:xfrm flipV="1">
+            <a:off x="7429602" y="2465247"/>
+            <a:ext cx="225896" cy="11517"/>
+          </a:xfrm>
+          <a:prstGeom prst="bentConnector3">
+            <a:avLst>
+              <a:gd name="adj1" fmla="val 1275"/>
+            </a:avLst>
+          </a:prstGeom>
+          <a:ln w="19050">
+            <a:solidFill>
+              <a:srgbClr val="7030A0"/>
+            </a:solidFill>
+            <a:headEnd type="none" w="med" len="med"/>
+            <a:tailEnd type="arrow" w="med" len="med"/>
+          </a:ln>
+          <a:effectLst/>
+        </p:spPr>
+        <p:style>
+          <a:lnRef idx="1">
+            <a:schemeClr val="accent2"/>
+          </a:lnRef>
+          <a:fillRef idx="2">
+            <a:schemeClr val="accent2"/>
+          </a:fillRef>
+          <a:effectRef idx="1">
+            <a:schemeClr val="accent2"/>
+          </a:effectRef>
+          <a:fontRef idx="minor">
+            <a:schemeClr val="dk1"/>
+          </a:fontRef>
+        </p:style>
+      </p:cxnSp>
+      <p:sp>
+        <p:nvSpPr>
+          <p:cNvPr id="98" name="Rectangle 8">
+            <a:extLst>
+              <a:ext uri="{FF2B5EF4-FFF2-40B4-BE49-F238E27FC236}">
+                <a16:creationId xmlns:a16="http://schemas.microsoft.com/office/drawing/2014/main" id="{FF70482F-FADD-47DF-AEDD-B2542157CF67}"/>
+              </a:ext>
+            </a:extLst>
+          </p:cNvPr>
+          <p:cNvSpPr/>
+          <p:nvPr/>
+        </p:nvSpPr>
+        <p:spPr>
+          <a:xfrm>
+            <a:off x="7655498" y="2645333"/>
+            <a:ext cx="884377" cy="285783"/>
+          </a:xfrm>
+          <a:prstGeom prst="rect">
+            <a:avLst/>
+          </a:prstGeom>
+          <a:ln w="19050">
+            <a:solidFill>
+              <a:srgbClr val="7030A0"/>
+            </a:solidFill>
+          </a:ln>
+          <a:effectLst/>
+        </p:spPr>
+        <p:style>
+          <a:lnRef idx="1">
+            <a:schemeClr val="accent4"/>
+          </a:lnRef>
+          <a:fillRef idx="2">
+            <a:schemeClr val="accent4"/>
+          </a:fillRef>
+          <a:effectRef idx="1">
+            <a:schemeClr val="accent4"/>
+          </a:effectRef>
+          <a:fontRef idx="minor">
+            <a:schemeClr val="dk1"/>
+          </a:fontRef>
+        </p:style>
+        <p:txBody>
+          <a:bodyPr rtlCol="0" anchor="ctr"/>
+          <a:lstStyle/>
+          <a:p>
+            <a:pPr algn="ctr"/>
+            <a:r>
+              <a:rPr lang="en-US" sz="1050" dirty="0" err="1">
+                <a:solidFill>
+                  <a:srgbClr val="7030A0"/>
+                </a:solidFill>
+              </a:rPr>
+              <a:t>DateTime</a:t>
+            </a:r>
+            <a:endParaRPr lang="en-SG" sz="1050" dirty="0">
+              <a:solidFill>
+                <a:srgbClr val="7030A0"/>
+              </a:solidFill>
+            </a:endParaRPr>
+          </a:p>
+        </p:txBody>
+      </p:sp>
+      <p:cxnSp>
+        <p:nvCxnSpPr>
+          <p:cNvPr id="99" name="Elbow Connector 83">
+            <a:extLst>
+              <a:ext uri="{FF2B5EF4-FFF2-40B4-BE49-F238E27FC236}">
+                <a16:creationId xmlns:a16="http://schemas.microsoft.com/office/drawing/2014/main" id="{B91FDF14-6216-4534-AD8E-267D0C6042F6}"/>
+              </a:ext>
+            </a:extLst>
+          </p:cNvPr>
+          <p:cNvCxnSpPr>
+            <a:cxnSpLocks/>
+            <a:endCxn id="100" idx="1"/>
+          </p:cNvCxnSpPr>
+          <p:nvPr/>
+        </p:nvCxnSpPr>
+        <p:spPr>
+          <a:xfrm>
+            <a:off x="7429602" y="3106619"/>
+            <a:ext cx="225896" cy="4583"/>
+          </a:xfrm>
+          <a:prstGeom prst="bentConnector3">
+            <a:avLst>
+              <a:gd name="adj1" fmla="val 5024"/>
+            </a:avLst>
+          </a:prstGeom>
+          <a:ln w="19050">
+            <a:solidFill>
+              <a:srgbClr val="7030A0"/>
+            </a:solidFill>
+            <a:headEnd type="none" w="med" len="med"/>
+            <a:tailEnd type="arrow" w="med" len="med"/>
+          </a:ln>
+          <a:effectLst/>
+        </p:spPr>
+        <p:style>
+          <a:lnRef idx="1">
+            <a:schemeClr val="accent2"/>
+          </a:lnRef>
+          <a:fillRef idx="2">
+            <a:schemeClr val="accent2"/>
+          </a:fillRef>
+          <a:effectRef idx="1">
+            <a:schemeClr val="accent2"/>
+          </a:effectRef>
+          <a:fontRef idx="minor">
+            <a:schemeClr val="dk1"/>
+          </a:fontRef>
+        </p:style>
+      </p:cxnSp>
+      <p:sp>
+        <p:nvSpPr>
+          <p:cNvPr id="100" name="Rectangle 8">
+            <a:extLst>
+              <a:ext uri="{FF2B5EF4-FFF2-40B4-BE49-F238E27FC236}">
+                <a16:creationId xmlns:a16="http://schemas.microsoft.com/office/drawing/2014/main" id="{BF2F2253-A9BD-4682-9C66-DAE37D19CCEF}"/>
+              </a:ext>
+            </a:extLst>
+          </p:cNvPr>
+          <p:cNvSpPr/>
+          <p:nvPr/>
+        </p:nvSpPr>
+        <p:spPr>
+          <a:xfrm>
+            <a:off x="7655498" y="2968310"/>
+            <a:ext cx="884377" cy="285783"/>
+          </a:xfrm>
+          <a:prstGeom prst="rect">
+            <a:avLst/>
+          </a:prstGeom>
+          <a:ln w="19050">
+            <a:solidFill>
+              <a:srgbClr val="7030A0"/>
+            </a:solidFill>
+          </a:ln>
+          <a:effectLst/>
+        </p:spPr>
+        <p:style>
+          <a:lnRef idx="1">
+            <a:schemeClr val="accent4"/>
+          </a:lnRef>
+          <a:fillRef idx="2">
+            <a:schemeClr val="accent4"/>
+          </a:fillRef>
+          <a:effectRef idx="1">
+            <a:schemeClr val="accent4"/>
+          </a:effectRef>
+          <a:fontRef idx="minor">
+            <a:schemeClr val="dk1"/>
+          </a:fontRef>
+        </p:style>
+        <p:txBody>
+          <a:bodyPr rtlCol="0" anchor="ctr"/>
+          <a:lstStyle/>
+          <a:p>
+            <a:pPr algn="ctr"/>
+            <a:r>
+              <a:rPr lang="en-US" sz="1050" dirty="0" err="1">
+                <a:solidFill>
+                  <a:srgbClr val="7030A0"/>
+                </a:solidFill>
+              </a:rPr>
+              <a:t>DateTime</a:t>
+            </a:r>
+            <a:endParaRPr lang="en-SG" sz="1050" dirty="0">
+              <a:solidFill>
+                <a:srgbClr val="7030A0"/>
+              </a:solidFill>
+            </a:endParaRPr>
+          </a:p>
+        </p:txBody>
+      </p:sp>
+      <p:cxnSp>
+        <p:nvCxnSpPr>
+          <p:cNvPr id="101" name="Elbow Connector 85">
+            <a:extLst>
+              <a:ext uri="{FF2B5EF4-FFF2-40B4-BE49-F238E27FC236}">
+                <a16:creationId xmlns:a16="http://schemas.microsoft.com/office/drawing/2014/main" id="{6C34281C-2596-4EB0-B94B-42099C719C8B}"/>
+              </a:ext>
+            </a:extLst>
+          </p:cNvPr>
+          <p:cNvCxnSpPr>
+            <a:cxnSpLocks/>
+            <a:endCxn id="104" idx="1"/>
+          </p:cNvCxnSpPr>
+          <p:nvPr/>
+        </p:nvCxnSpPr>
+        <p:spPr>
+          <a:xfrm flipV="1">
+            <a:off x="7428651" y="3434179"/>
+            <a:ext cx="226847" cy="1"/>
+          </a:xfrm>
+          <a:prstGeom prst="bentConnector3">
+            <a:avLst>
+              <a:gd name="adj1" fmla="val 50000"/>
+            </a:avLst>
+          </a:prstGeom>
+          <a:ln w="19050">
+            <a:solidFill>
+              <a:srgbClr val="7030A0"/>
+            </a:solidFill>
+            <a:headEnd type="none" w="med" len="med"/>
+            <a:tailEnd type="arrow" w="med" len="med"/>
+          </a:ln>
+          <a:effectLst/>
+        </p:spPr>
+        <p:style>
+          <a:lnRef idx="1">
+            <a:schemeClr val="accent2"/>
+          </a:lnRef>
+          <a:fillRef idx="2">
+            <a:schemeClr val="accent2"/>
+          </a:fillRef>
+          <a:effectRef idx="1">
+            <a:schemeClr val="accent2"/>
+          </a:effectRef>
+          <a:fontRef idx="minor">
+            <a:schemeClr val="dk1"/>
+          </a:fontRef>
+        </p:style>
+      </p:cxnSp>
+      <p:sp>
+        <p:nvSpPr>
+          <p:cNvPr id="102" name="Rectangle 8">
+            <a:extLst>
+              <a:ext uri="{FF2B5EF4-FFF2-40B4-BE49-F238E27FC236}">
+                <a16:creationId xmlns:a16="http://schemas.microsoft.com/office/drawing/2014/main" id="{2209D832-5744-4488-BA07-E878877A0929}"/>
+              </a:ext>
+            </a:extLst>
+          </p:cNvPr>
+          <p:cNvSpPr/>
+          <p:nvPr/>
+        </p:nvSpPr>
+        <p:spPr>
+          <a:xfrm>
+            <a:off x="7653592" y="1676400"/>
+            <a:ext cx="884377" cy="285783"/>
+          </a:xfrm>
+          <a:prstGeom prst="rect">
+            <a:avLst/>
+          </a:prstGeom>
+          <a:ln w="19050">
+            <a:solidFill>
+              <a:srgbClr val="7030A0"/>
+            </a:solidFill>
+          </a:ln>
+          <a:effectLst/>
+        </p:spPr>
+        <p:style>
+          <a:lnRef idx="1">
+            <a:schemeClr val="accent4"/>
+          </a:lnRef>
+          <a:fillRef idx="2">
+            <a:schemeClr val="accent4"/>
+          </a:fillRef>
+          <a:effectRef idx="1">
+            <a:schemeClr val="accent4"/>
+          </a:effectRef>
+          <a:fontRef idx="minor">
+            <a:schemeClr val="dk1"/>
+          </a:fontRef>
+        </p:style>
+        <p:txBody>
+          <a:bodyPr rtlCol="0" anchor="ctr"/>
+          <a:lstStyle/>
+          <a:p>
+            <a:pPr algn="ctr"/>
+            <a:r>
+              <a:rPr lang="en-US" sz="1050" dirty="0">
+                <a:solidFill>
+                  <a:srgbClr val="7030A0"/>
+                </a:solidFill>
+              </a:rPr>
+              <a:t>UUID</a:t>
+            </a:r>
+            <a:endParaRPr lang="en-SG" sz="1050" dirty="0">
+              <a:solidFill>
+                <a:srgbClr val="7030A0"/>
+              </a:solidFill>
+            </a:endParaRPr>
+          </a:p>
+        </p:txBody>
+      </p:sp>
+      <p:cxnSp>
+        <p:nvCxnSpPr>
+          <p:cNvPr id="103" name="Elbow Connector 78">
+            <a:extLst>
+              <a:ext uri="{FF2B5EF4-FFF2-40B4-BE49-F238E27FC236}">
+                <a16:creationId xmlns:a16="http://schemas.microsoft.com/office/drawing/2014/main" id="{2E388171-C8FC-4689-A5A3-D5156322630B}"/>
+              </a:ext>
+            </a:extLst>
+          </p:cNvPr>
+          <p:cNvCxnSpPr>
+            <a:cxnSpLocks/>
+            <a:endCxn id="102" idx="1"/>
+          </p:cNvCxnSpPr>
+          <p:nvPr/>
+        </p:nvCxnSpPr>
+        <p:spPr>
+          <a:xfrm rot="5400000" flipH="1" flipV="1">
+            <a:off x="6937060" y="2311834"/>
+            <a:ext cx="1209074" cy="223990"/>
+          </a:xfrm>
+          <a:prstGeom prst="bentConnector2">
+            <a:avLst/>
+          </a:prstGeom>
+          <a:ln w="19050">
+            <a:solidFill>
+              <a:srgbClr val="7030A0"/>
+            </a:solidFill>
+            <a:headEnd type="none" w="med" len="med"/>
+            <a:tailEnd type="arrow" w="med" len="med"/>
+          </a:ln>
+          <a:effectLst/>
+        </p:spPr>
+        <p:style>
+          <a:lnRef idx="1">
+            <a:schemeClr val="accent2"/>
+          </a:lnRef>
+          <a:fillRef idx="2">
+            <a:schemeClr val="accent2"/>
+          </a:fillRef>
+          <a:effectRef idx="1">
+            <a:schemeClr val="accent2"/>
+          </a:effectRef>
+          <a:fontRef idx="minor">
+            <a:schemeClr val="dk1"/>
+          </a:fontRef>
+        </p:style>
+      </p:cxnSp>
+      <p:sp>
+        <p:nvSpPr>
+          <p:cNvPr id="104" name="Rectangle 8">
+            <a:extLst>
+              <a:ext uri="{FF2B5EF4-FFF2-40B4-BE49-F238E27FC236}">
+                <a16:creationId xmlns:a16="http://schemas.microsoft.com/office/drawing/2014/main" id="{0956E1C7-7889-46EB-A574-D7EFF5FD0731}"/>
+              </a:ext>
+            </a:extLst>
+          </p:cNvPr>
+          <p:cNvSpPr/>
+          <p:nvPr/>
+        </p:nvSpPr>
+        <p:spPr>
+          <a:xfrm>
+            <a:off x="7655498" y="3291287"/>
+            <a:ext cx="882473" cy="285783"/>
+          </a:xfrm>
+          <a:prstGeom prst="rect">
+            <a:avLst/>
+          </a:prstGeom>
+          <a:ln w="19050">
+            <a:solidFill>
+              <a:srgbClr val="7030A0"/>
+            </a:solidFill>
+          </a:ln>
+          <a:effectLst/>
+        </p:spPr>
+        <p:style>
+          <a:lnRef idx="1">
+            <a:schemeClr val="accent4"/>
+          </a:lnRef>
+          <a:fillRef idx="2">
+            <a:schemeClr val="accent4"/>
+          </a:fillRef>
+          <a:effectRef idx="1">
+            <a:schemeClr val="accent4"/>
+          </a:effectRef>
+          <a:fontRef idx="minor">
+            <a:schemeClr val="dk1"/>
+          </a:fontRef>
+        </p:style>
+        <p:txBody>
+          <a:bodyPr rtlCol="0" anchor="ctr"/>
+          <a:lstStyle/>
+          <a:p>
+            <a:pPr algn="ctr"/>
+            <a:r>
+              <a:rPr lang="en-US" sz="1050" dirty="0">
+                <a:solidFill>
+                  <a:srgbClr val="7030A0"/>
+                </a:solidFill>
+              </a:rPr>
+              <a:t>Description</a:t>
+            </a:r>
+            <a:endParaRPr lang="en-SG" sz="1050" dirty="0">
+              <a:solidFill>
+                <a:srgbClr val="7030A0"/>
+              </a:solidFill>
+            </a:endParaRPr>
+          </a:p>
+        </p:txBody>
+      </p:sp>
+      <p:sp>
+        <p:nvSpPr>
+          <p:cNvPr id="105" name="Rectangle 8">
+            <a:extLst>
+              <a:ext uri="{FF2B5EF4-FFF2-40B4-BE49-F238E27FC236}">
+                <a16:creationId xmlns:a16="http://schemas.microsoft.com/office/drawing/2014/main" id="{EC7BB66C-6BE4-4C4E-BD39-67173CBD892A}"/>
+              </a:ext>
+            </a:extLst>
+          </p:cNvPr>
+          <p:cNvSpPr/>
+          <p:nvPr/>
+        </p:nvSpPr>
+        <p:spPr>
+          <a:xfrm>
+            <a:off x="7655500" y="3613676"/>
+            <a:ext cx="882471" cy="285783"/>
+          </a:xfrm>
+          <a:prstGeom prst="rect">
+            <a:avLst/>
+          </a:prstGeom>
+          <a:ln w="19050">
+            <a:solidFill>
+              <a:srgbClr val="7030A0"/>
+            </a:solidFill>
+          </a:ln>
+          <a:effectLst/>
+        </p:spPr>
+        <p:style>
+          <a:lnRef idx="1">
+            <a:schemeClr val="accent4"/>
+          </a:lnRef>
+          <a:fillRef idx="2">
+            <a:schemeClr val="accent4"/>
+          </a:fillRef>
+          <a:effectRef idx="1">
+            <a:schemeClr val="accent4"/>
+          </a:effectRef>
+          <a:fontRef idx="minor">
+            <a:schemeClr val="dk1"/>
+          </a:fontRef>
+        </p:style>
+        <p:txBody>
+          <a:bodyPr rtlCol="0" anchor="ctr"/>
+          <a:lstStyle/>
+          <a:p>
+            <a:pPr algn="ctr"/>
+            <a:r>
+              <a:rPr lang="en-US" sz="1050" dirty="0">
+                <a:solidFill>
+                  <a:srgbClr val="7030A0"/>
+                </a:solidFill>
+              </a:rPr>
+              <a:t>Venue</a:t>
+            </a:r>
+            <a:endParaRPr lang="en-SG" sz="1050" dirty="0">
+              <a:solidFill>
+                <a:srgbClr val="7030A0"/>
+              </a:solidFill>
+            </a:endParaRPr>
+          </a:p>
+        </p:txBody>
+      </p:sp>
+      <p:sp>
+        <p:nvSpPr>
+          <p:cNvPr id="106" name="Rectangle 8">
+            <a:extLst>
+              <a:ext uri="{FF2B5EF4-FFF2-40B4-BE49-F238E27FC236}">
+                <a16:creationId xmlns:a16="http://schemas.microsoft.com/office/drawing/2014/main" id="{18F4098C-90C5-421E-B86F-E7910BE00B2C}"/>
+              </a:ext>
+            </a:extLst>
+          </p:cNvPr>
+          <p:cNvSpPr/>
+          <p:nvPr/>
+        </p:nvSpPr>
+        <p:spPr>
+          <a:xfrm>
+            <a:off x="7655500" y="3936065"/>
+            <a:ext cx="882471" cy="285783"/>
+          </a:xfrm>
+          <a:prstGeom prst="rect">
+            <a:avLst/>
+          </a:prstGeom>
+          <a:ln w="19050">
+            <a:solidFill>
+              <a:srgbClr val="7030A0"/>
+            </a:solidFill>
+          </a:ln>
+          <a:effectLst/>
+        </p:spPr>
+        <p:style>
+          <a:lnRef idx="1">
+            <a:schemeClr val="accent4"/>
+          </a:lnRef>
+          <a:fillRef idx="2">
+            <a:schemeClr val="accent4"/>
+          </a:fillRef>
+          <a:effectRef idx="1">
+            <a:schemeClr val="accent4"/>
+          </a:effectRef>
+          <a:fontRef idx="minor">
+            <a:schemeClr val="dk1"/>
+          </a:fontRef>
+        </p:style>
+        <p:txBody>
+          <a:bodyPr rtlCol="0" anchor="ctr"/>
+          <a:lstStyle/>
+          <a:p>
+            <a:pPr algn="ctr"/>
+            <a:r>
+              <a:rPr lang="en-SG" sz="1050" dirty="0" err="1">
+                <a:solidFill>
+                  <a:srgbClr val="7030A0"/>
+                </a:solidFill>
+              </a:rPr>
+              <a:t>RepeatType</a:t>
+            </a:r>
+            <a:endParaRPr lang="en-SG" sz="1050" dirty="0">
+              <a:solidFill>
+                <a:srgbClr val="7030A0"/>
+              </a:solidFill>
+            </a:endParaRPr>
+          </a:p>
+        </p:txBody>
+      </p:sp>
+      <p:sp>
+        <p:nvSpPr>
+          <p:cNvPr id="108" name="Rectangle 8">
+            <a:extLst>
+              <a:ext uri="{FF2B5EF4-FFF2-40B4-BE49-F238E27FC236}">
+                <a16:creationId xmlns:a16="http://schemas.microsoft.com/office/drawing/2014/main" id="{A7DC9710-1E73-484E-ABE4-5324D520EF94}"/>
+              </a:ext>
+            </a:extLst>
+          </p:cNvPr>
+          <p:cNvSpPr/>
+          <p:nvPr/>
+        </p:nvSpPr>
+        <p:spPr>
+          <a:xfrm>
+            <a:off x="7655500" y="4255033"/>
+            <a:ext cx="882471" cy="285783"/>
+          </a:xfrm>
+          <a:prstGeom prst="rect">
+            <a:avLst/>
+          </a:prstGeom>
+          <a:ln w="19050">
+            <a:solidFill>
+              <a:srgbClr val="7030A0"/>
+            </a:solidFill>
+          </a:ln>
+          <a:effectLst/>
+        </p:spPr>
+        <p:style>
+          <a:lnRef idx="1">
+            <a:schemeClr val="accent4"/>
+          </a:lnRef>
+          <a:fillRef idx="2">
+            <a:schemeClr val="accent4"/>
+          </a:fillRef>
+          <a:effectRef idx="1">
+            <a:schemeClr val="accent4"/>
+          </a:effectRef>
+          <a:fontRef idx="minor">
+            <a:schemeClr val="dk1"/>
+          </a:fontRef>
+        </p:style>
+        <p:txBody>
+          <a:bodyPr rtlCol="0" anchor="ctr"/>
+          <a:lstStyle/>
+          <a:p>
+            <a:pPr algn="ctr"/>
+            <a:r>
+              <a:rPr lang="en-SG" sz="1050" dirty="0" err="1">
+                <a:solidFill>
+                  <a:srgbClr val="7030A0"/>
+                </a:solidFill>
+              </a:rPr>
+              <a:t>DateTime</a:t>
+            </a:r>
+            <a:endParaRPr lang="en-SG" sz="1050" dirty="0">
+              <a:solidFill>
+                <a:srgbClr val="7030A0"/>
+              </a:solidFill>
+            </a:endParaRPr>
+          </a:p>
+        </p:txBody>
+      </p:sp>
+      <p:sp>
+        <p:nvSpPr>
+          <p:cNvPr id="109" name="Rectangle 8">
+            <a:extLst>
+              <a:ext uri="{FF2B5EF4-FFF2-40B4-BE49-F238E27FC236}">
+                <a16:creationId xmlns:a16="http://schemas.microsoft.com/office/drawing/2014/main" id="{6100C448-D63F-49E6-A97E-650395D78650}"/>
+              </a:ext>
+            </a:extLst>
+          </p:cNvPr>
+          <p:cNvSpPr/>
+          <p:nvPr/>
+        </p:nvSpPr>
+        <p:spPr>
+          <a:xfrm>
+            <a:off x="7655498" y="4574001"/>
+            <a:ext cx="882472" cy="285783"/>
+          </a:xfrm>
+          <a:prstGeom prst="rect">
+            <a:avLst/>
+          </a:prstGeom>
+          <a:ln w="19050">
+            <a:solidFill>
+              <a:srgbClr val="7030A0"/>
+            </a:solidFill>
+          </a:ln>
+          <a:effectLst/>
+        </p:spPr>
+        <p:style>
+          <a:lnRef idx="1">
+            <a:schemeClr val="accent4"/>
+          </a:lnRef>
+          <a:fillRef idx="2">
+            <a:schemeClr val="accent4"/>
+          </a:fillRef>
+          <a:effectRef idx="1">
+            <a:schemeClr val="accent4"/>
+          </a:effectRef>
+          <a:fontRef idx="minor">
+            <a:schemeClr val="dk1"/>
+          </a:fontRef>
+        </p:style>
+        <p:txBody>
+          <a:bodyPr rtlCol="0" anchor="ctr"/>
+          <a:lstStyle/>
+          <a:p>
+            <a:pPr algn="ctr"/>
+            <a:r>
+              <a:rPr lang="en-SG" sz="1050" dirty="0">
+                <a:solidFill>
+                  <a:srgbClr val="7030A0"/>
+                </a:solidFill>
+              </a:rPr>
+              <a:t>Set&lt;Tags&gt;</a:t>
+            </a:r>
+          </a:p>
+        </p:txBody>
+      </p:sp>
+      <p:sp>
+        <p:nvSpPr>
+          <p:cNvPr id="110" name="Rectangle 8">
+            <a:extLst>
+              <a:ext uri="{FF2B5EF4-FFF2-40B4-BE49-F238E27FC236}">
+                <a16:creationId xmlns:a16="http://schemas.microsoft.com/office/drawing/2014/main" id="{CEB8A7A1-7A8F-4B83-B303-EC5C46FBD219}"/>
+              </a:ext>
+            </a:extLst>
+          </p:cNvPr>
+          <p:cNvSpPr/>
+          <p:nvPr/>
+        </p:nvSpPr>
+        <p:spPr>
+          <a:xfrm>
+            <a:off x="7162800" y="4892969"/>
+            <a:ext cx="1375170" cy="285783"/>
+          </a:xfrm>
+          <a:prstGeom prst="rect">
+            <a:avLst/>
+          </a:prstGeom>
+          <a:ln w="19050">
+            <a:solidFill>
+              <a:srgbClr val="7030A0"/>
+            </a:solidFill>
+          </a:ln>
+          <a:effectLst/>
+        </p:spPr>
+        <p:style>
+          <a:lnRef idx="1">
+            <a:schemeClr val="accent4"/>
+          </a:lnRef>
+          <a:fillRef idx="2">
+            <a:schemeClr val="accent4"/>
+          </a:fillRef>
+          <a:effectRef idx="1">
+            <a:schemeClr val="accent4"/>
+          </a:effectRef>
+          <a:fontRef idx="minor">
+            <a:schemeClr val="dk1"/>
+          </a:fontRef>
+        </p:style>
+        <p:txBody>
+          <a:bodyPr rtlCol="0" anchor="ctr"/>
+          <a:lstStyle/>
+          <a:p>
+            <a:pPr algn="ctr"/>
+            <a:r>
+              <a:rPr lang="en-SG" sz="1050" dirty="0" err="1">
+                <a:solidFill>
+                  <a:srgbClr val="7030A0"/>
+                </a:solidFill>
+              </a:rPr>
+              <a:t>ReminderDurationList</a:t>
+            </a:r>
+            <a:endParaRPr lang="en-SG" sz="1050" dirty="0">
+              <a:solidFill>
+                <a:srgbClr val="7030A0"/>
+              </a:solidFill>
+            </a:endParaRPr>
+          </a:p>
+        </p:txBody>
+      </p:sp>
+      <p:cxnSp>
+        <p:nvCxnSpPr>
+          <p:cNvPr id="111" name="Elbow Connector 80">
+            <a:extLst>
+              <a:ext uri="{FF2B5EF4-FFF2-40B4-BE49-F238E27FC236}">
+                <a16:creationId xmlns:a16="http://schemas.microsoft.com/office/drawing/2014/main" id="{C1D91576-41EB-443D-89E7-8F97ABE42AF9}"/>
+              </a:ext>
+            </a:extLst>
+          </p:cNvPr>
+          <p:cNvCxnSpPr>
+            <a:cxnSpLocks/>
+            <a:endCxn id="98" idx="1"/>
+          </p:cNvCxnSpPr>
+          <p:nvPr/>
+        </p:nvCxnSpPr>
+        <p:spPr>
+          <a:xfrm>
+            <a:off x="7429602" y="2783780"/>
+            <a:ext cx="225896" cy="4445"/>
+          </a:xfrm>
+          <a:prstGeom prst="bentConnector3">
+            <a:avLst>
+              <a:gd name="adj1" fmla="val 5024"/>
+            </a:avLst>
+          </a:prstGeom>
+          <a:ln w="19050">
+            <a:solidFill>
+              <a:srgbClr val="7030A0"/>
+            </a:solidFill>
+            <a:headEnd type="none" w="med" len="med"/>
+            <a:tailEnd type="arrow" w="med" len="med"/>
+          </a:ln>
+          <a:effectLst/>
+        </p:spPr>
+        <p:style>
+          <a:lnRef idx="1">
+            <a:schemeClr val="accent2"/>
+          </a:lnRef>
+          <a:fillRef idx="2">
+            <a:schemeClr val="accent2"/>
+          </a:fillRef>
+          <a:effectRef idx="1">
+            <a:schemeClr val="accent2"/>
+          </a:effectRef>
+          <a:fontRef idx="minor">
+            <a:schemeClr val="dk1"/>
+          </a:fontRef>
+        </p:style>
+      </p:cxnSp>
+      <p:cxnSp>
+        <p:nvCxnSpPr>
+          <p:cNvPr id="112" name="Straight Connector 111">
+            <a:extLst>
+              <a:ext uri="{FF2B5EF4-FFF2-40B4-BE49-F238E27FC236}">
+                <a16:creationId xmlns:a16="http://schemas.microsoft.com/office/drawing/2014/main" id="{36EDB6DE-8593-44E7-A037-9996AAB3952E}"/>
+              </a:ext>
+            </a:extLst>
+          </p:cNvPr>
+          <p:cNvCxnSpPr>
+            <a:cxnSpLocks/>
+            <a:stCxn id="88" idx="3"/>
+          </p:cNvCxnSpPr>
+          <p:nvPr/>
+        </p:nvCxnSpPr>
+        <p:spPr>
+          <a:xfrm>
+            <a:off x="7267953" y="3028366"/>
+            <a:ext cx="161649" cy="0"/>
+          </a:xfrm>
+          <a:prstGeom prst="line">
+            <a:avLst/>
+          </a:prstGeom>
+          <a:ln w="19050">
+            <a:solidFill>
+              <a:srgbClr val="7030A0"/>
+            </a:solidFill>
+          </a:ln>
+        </p:spPr>
+        <p:style>
+          <a:lnRef idx="1">
+            <a:schemeClr val="accent1"/>
+          </a:lnRef>
+          <a:fillRef idx="0">
+            <a:schemeClr val="accent1"/>
+          </a:fillRef>
+          <a:effectRef idx="0">
+            <a:schemeClr val="accent1"/>
+          </a:effectRef>
+          <a:fontRef idx="minor">
+            <a:schemeClr val="tx1"/>
+          </a:fontRef>
+        </p:style>
+      </p:cxnSp>
+      <p:cxnSp>
+        <p:nvCxnSpPr>
+          <p:cNvPr id="113" name="Elbow Connector 78">
+            <a:extLst>
+              <a:ext uri="{FF2B5EF4-FFF2-40B4-BE49-F238E27FC236}">
+                <a16:creationId xmlns:a16="http://schemas.microsoft.com/office/drawing/2014/main" id="{11EB3F69-4F40-45B1-BAC3-50E602768832}"/>
+              </a:ext>
+            </a:extLst>
+          </p:cNvPr>
+          <p:cNvCxnSpPr>
+            <a:cxnSpLocks/>
+            <a:endCxn id="110" idx="1"/>
+          </p:cNvCxnSpPr>
+          <p:nvPr/>
+        </p:nvCxnSpPr>
+        <p:spPr>
+          <a:xfrm rot="5400000">
+            <a:off x="6292454" y="3898712"/>
+            <a:ext cx="2007496" cy="266803"/>
+          </a:xfrm>
+          <a:prstGeom prst="bentConnector4">
+            <a:avLst>
+              <a:gd name="adj1" fmla="val 89038"/>
+              <a:gd name="adj2" fmla="val 172986"/>
+            </a:avLst>
+          </a:prstGeom>
+          <a:ln w="19050">
+            <a:solidFill>
+              <a:srgbClr val="7030A0"/>
+            </a:solidFill>
+            <a:headEnd type="none" w="med" len="med"/>
+            <a:tailEnd type="arrow" w="med" len="med"/>
+          </a:ln>
+          <a:effectLst/>
+        </p:spPr>
+        <p:style>
+          <a:lnRef idx="1">
+            <a:schemeClr val="accent2"/>
+          </a:lnRef>
+          <a:fillRef idx="2">
+            <a:schemeClr val="accent2"/>
+          </a:fillRef>
+          <a:effectRef idx="1">
+            <a:schemeClr val="accent2"/>
+          </a:effectRef>
+          <a:fontRef idx="minor">
+            <a:schemeClr val="dk1"/>
+          </a:fontRef>
+        </p:style>
+      </p:cxnSp>
+      <p:cxnSp>
+        <p:nvCxnSpPr>
+          <p:cNvPr id="115" name="Elbow Connector 85">
+            <a:extLst>
+              <a:ext uri="{FF2B5EF4-FFF2-40B4-BE49-F238E27FC236}">
+                <a16:creationId xmlns:a16="http://schemas.microsoft.com/office/drawing/2014/main" id="{84ED7744-1B92-4F11-930E-894454A1DC7F}"/>
+              </a:ext>
+            </a:extLst>
+          </p:cNvPr>
+          <p:cNvCxnSpPr>
+            <a:cxnSpLocks/>
+            <a:endCxn id="105" idx="1"/>
+          </p:cNvCxnSpPr>
+          <p:nvPr/>
+        </p:nvCxnSpPr>
+        <p:spPr>
+          <a:xfrm flipV="1">
+            <a:off x="7428651" y="3756568"/>
+            <a:ext cx="226849" cy="588"/>
+          </a:xfrm>
+          <a:prstGeom prst="bentConnector3">
+            <a:avLst>
+              <a:gd name="adj1" fmla="val 50000"/>
+            </a:avLst>
+          </a:prstGeom>
+          <a:ln w="19050">
+            <a:solidFill>
+              <a:srgbClr val="7030A0"/>
+            </a:solidFill>
+            <a:headEnd type="none" w="med" len="med"/>
+            <a:tailEnd type="arrow" w="med" len="med"/>
+          </a:ln>
+          <a:effectLst/>
+        </p:spPr>
+        <p:style>
+          <a:lnRef idx="1">
+            <a:schemeClr val="accent2"/>
+          </a:lnRef>
+          <a:fillRef idx="2">
+            <a:schemeClr val="accent2"/>
+          </a:fillRef>
+          <a:effectRef idx="1">
+            <a:schemeClr val="accent2"/>
+          </a:effectRef>
+          <a:fontRef idx="minor">
+            <a:schemeClr val="dk1"/>
+          </a:fontRef>
+        </p:style>
+      </p:cxnSp>
+      <p:cxnSp>
+        <p:nvCxnSpPr>
+          <p:cNvPr id="116" name="Elbow Connector 85">
+            <a:extLst>
+              <a:ext uri="{FF2B5EF4-FFF2-40B4-BE49-F238E27FC236}">
+                <a16:creationId xmlns:a16="http://schemas.microsoft.com/office/drawing/2014/main" id="{022D003A-0711-47E9-BBBA-649C770811CB}"/>
+              </a:ext>
+            </a:extLst>
+          </p:cNvPr>
+          <p:cNvCxnSpPr>
+            <a:cxnSpLocks/>
+            <a:endCxn id="106" idx="1"/>
+          </p:cNvCxnSpPr>
+          <p:nvPr/>
+        </p:nvCxnSpPr>
+        <p:spPr>
+          <a:xfrm flipV="1">
+            <a:off x="7428175" y="4078957"/>
+            <a:ext cx="227325" cy="2"/>
+          </a:xfrm>
+          <a:prstGeom prst="bentConnector3">
+            <a:avLst>
+              <a:gd name="adj1" fmla="val 50000"/>
+            </a:avLst>
+          </a:prstGeom>
+          <a:ln w="19050">
+            <a:solidFill>
+              <a:srgbClr val="7030A0"/>
+            </a:solidFill>
+            <a:headEnd type="none" w="med" len="med"/>
+            <a:tailEnd type="arrow" w="med" len="med"/>
+          </a:ln>
+          <a:effectLst/>
+        </p:spPr>
+        <p:style>
+          <a:lnRef idx="1">
+            <a:schemeClr val="accent2"/>
+          </a:lnRef>
+          <a:fillRef idx="2">
+            <a:schemeClr val="accent2"/>
+          </a:fillRef>
+          <a:effectRef idx="1">
+            <a:schemeClr val="accent2"/>
+          </a:effectRef>
+          <a:fontRef idx="minor">
+            <a:schemeClr val="dk1"/>
+          </a:fontRef>
+        </p:style>
+      </p:cxnSp>
+      <p:cxnSp>
+        <p:nvCxnSpPr>
+          <p:cNvPr id="117" name="Elbow Connector 85">
+            <a:extLst>
+              <a:ext uri="{FF2B5EF4-FFF2-40B4-BE49-F238E27FC236}">
+                <a16:creationId xmlns:a16="http://schemas.microsoft.com/office/drawing/2014/main" id="{D8E29979-2D7D-4FB1-BEA1-A1937614AF1A}"/>
+              </a:ext>
+            </a:extLst>
+          </p:cNvPr>
+          <p:cNvCxnSpPr>
+            <a:cxnSpLocks/>
+            <a:endCxn id="108" idx="1"/>
+          </p:cNvCxnSpPr>
+          <p:nvPr/>
+        </p:nvCxnSpPr>
+        <p:spPr>
+          <a:xfrm>
+            <a:off x="7428175" y="4397924"/>
+            <a:ext cx="227325" cy="1"/>
+          </a:xfrm>
+          <a:prstGeom prst="bentConnector3">
+            <a:avLst>
+              <a:gd name="adj1" fmla="val 50000"/>
+            </a:avLst>
+          </a:prstGeom>
+          <a:ln w="19050">
+            <a:solidFill>
+              <a:srgbClr val="7030A0"/>
+            </a:solidFill>
+            <a:headEnd type="none" w="med" len="med"/>
+            <a:tailEnd type="arrow" w="med" len="med"/>
+          </a:ln>
+          <a:effectLst/>
+        </p:spPr>
+        <p:style>
+          <a:lnRef idx="1">
+            <a:schemeClr val="accent2"/>
+          </a:lnRef>
+          <a:fillRef idx="2">
+            <a:schemeClr val="accent2"/>
+          </a:fillRef>
+          <a:effectRef idx="1">
+            <a:schemeClr val="accent2"/>
+          </a:effectRef>
+          <a:fontRef idx="minor">
+            <a:schemeClr val="dk1"/>
+          </a:fontRef>
+        </p:style>
+      </p:cxnSp>
+      <p:cxnSp>
+        <p:nvCxnSpPr>
+          <p:cNvPr id="121" name="Elbow Connector 85">
+            <a:extLst>
+              <a:ext uri="{FF2B5EF4-FFF2-40B4-BE49-F238E27FC236}">
+                <a16:creationId xmlns:a16="http://schemas.microsoft.com/office/drawing/2014/main" id="{06926E0F-197B-4582-908F-AC41AB2B03B8}"/>
+              </a:ext>
+            </a:extLst>
+          </p:cNvPr>
+          <p:cNvCxnSpPr>
+            <a:cxnSpLocks/>
+            <a:endCxn id="109" idx="1"/>
+          </p:cNvCxnSpPr>
+          <p:nvPr/>
+        </p:nvCxnSpPr>
+        <p:spPr>
+          <a:xfrm>
+            <a:off x="7428175" y="4716890"/>
+            <a:ext cx="227323" cy="3"/>
+          </a:xfrm>
+          <a:prstGeom prst="bentConnector3">
+            <a:avLst>
+              <a:gd name="adj1" fmla="val 50000"/>
+            </a:avLst>
+          </a:prstGeom>
+          <a:ln w="19050">
+            <a:solidFill>
+              <a:srgbClr val="7030A0"/>
+            </a:solidFill>
+            <a:headEnd type="none" w="med" len="med"/>
+            <a:tailEnd type="arrow" w="med" len="med"/>
           </a:ln>
           <a:effectLst/>
         </p:spPr>

</xml_diff>

<commit_message>
Update model to include user
</commit_message>
<xml_diff>
--- a/docs/diagrams/ModelComponentClassBetterOopDiagram.pptx
+++ b/docs/diagrams/ModelComponentClassBetterOopDiagram.pptx
@@ -208,7 +208,7 @@
           <a:p>
             <a:fld id="{F5CC4B3F-88C1-4FFA-B1B6-F41C21DC6924}" type="datetimeFigureOut">
               <a:rPr lang="en-US" smtClean="0"/>
-              <a:t>6/27/2018</a:t>
+              <a:t>10/29/2018</a:t>
             </a:fld>
             <a:endParaRPr lang="en-US"/>
           </a:p>
@@ -654,7 +654,7 @@
           <a:p>
             <a:fld id="{78C97017-6FC3-485B-9764-EAC9E56C1D49}" type="datetimeFigureOut">
               <a:rPr lang="en-US" smtClean="0"/>
-              <a:t>6/27/2018</a:t>
+              <a:t>10/29/2018</a:t>
             </a:fld>
             <a:endParaRPr lang="en-US"/>
           </a:p>
@@ -822,7 +822,7 @@
           <a:p>
             <a:fld id="{78C97017-6FC3-485B-9764-EAC9E56C1D49}" type="datetimeFigureOut">
               <a:rPr lang="en-US" smtClean="0"/>
-              <a:t>6/27/2018</a:t>
+              <a:t>10/29/2018</a:t>
             </a:fld>
             <a:endParaRPr lang="en-US"/>
           </a:p>
@@ -1000,7 +1000,7 @@
           <a:p>
             <a:fld id="{78C97017-6FC3-485B-9764-EAC9E56C1D49}" type="datetimeFigureOut">
               <a:rPr lang="en-US" smtClean="0"/>
-              <a:t>6/27/2018</a:t>
+              <a:t>10/29/2018</a:t>
             </a:fld>
             <a:endParaRPr lang="en-US"/>
           </a:p>
@@ -1168,7 +1168,7 @@
           <a:p>
             <a:fld id="{78C97017-6FC3-485B-9764-EAC9E56C1D49}" type="datetimeFigureOut">
               <a:rPr lang="en-US" smtClean="0"/>
-              <a:t>6/27/2018</a:t>
+              <a:t>10/29/2018</a:t>
             </a:fld>
             <a:endParaRPr lang="en-US"/>
           </a:p>
@@ -1413,7 +1413,7 @@
           <a:p>
             <a:fld id="{78C97017-6FC3-485B-9764-EAC9E56C1D49}" type="datetimeFigureOut">
               <a:rPr lang="en-US" smtClean="0"/>
-              <a:t>6/27/2018</a:t>
+              <a:t>10/29/2018</a:t>
             </a:fld>
             <a:endParaRPr lang="en-US"/>
           </a:p>
@@ -1698,7 +1698,7 @@
           <a:p>
             <a:fld id="{78C97017-6FC3-485B-9764-EAC9E56C1D49}" type="datetimeFigureOut">
               <a:rPr lang="en-US" smtClean="0"/>
-              <a:t>6/27/2018</a:t>
+              <a:t>10/29/2018</a:t>
             </a:fld>
             <a:endParaRPr lang="en-US"/>
           </a:p>
@@ -2117,7 +2117,7 @@
           <a:p>
             <a:fld id="{78C97017-6FC3-485B-9764-EAC9E56C1D49}" type="datetimeFigureOut">
               <a:rPr lang="en-US" smtClean="0"/>
-              <a:t>6/27/2018</a:t>
+              <a:t>10/29/2018</a:t>
             </a:fld>
             <a:endParaRPr lang="en-US"/>
           </a:p>
@@ -2234,7 +2234,7 @@
           <a:p>
             <a:fld id="{78C97017-6FC3-485B-9764-EAC9E56C1D49}" type="datetimeFigureOut">
               <a:rPr lang="en-US" smtClean="0"/>
-              <a:t>6/27/2018</a:t>
+              <a:t>10/29/2018</a:t>
             </a:fld>
             <a:endParaRPr lang="en-US"/>
           </a:p>
@@ -2329,7 +2329,7 @@
           <a:p>
             <a:fld id="{78C97017-6FC3-485B-9764-EAC9E56C1D49}" type="datetimeFigureOut">
               <a:rPr lang="en-US" smtClean="0"/>
-              <a:t>6/27/2018</a:t>
+              <a:t>10/29/2018</a:t>
             </a:fld>
             <a:endParaRPr lang="en-US"/>
           </a:p>
@@ -2604,7 +2604,7 @@
           <a:p>
             <a:fld id="{78C97017-6FC3-485B-9764-EAC9E56C1D49}" type="datetimeFigureOut">
               <a:rPr lang="en-US" smtClean="0"/>
-              <a:t>6/27/2018</a:t>
+              <a:t>10/29/2018</a:t>
             </a:fld>
             <a:endParaRPr lang="en-US"/>
           </a:p>
@@ -2856,7 +2856,7 @@
           <a:p>
             <a:fld id="{78C97017-6FC3-485B-9764-EAC9E56C1D49}" type="datetimeFigureOut">
               <a:rPr lang="en-US" smtClean="0"/>
-              <a:t>6/27/2018</a:t>
+              <a:t>10/29/2018</a:t>
             </a:fld>
             <a:endParaRPr lang="en-US"/>
           </a:p>
@@ -3067,7 +3067,7 @@
           <a:p>
             <a:fld id="{78C97017-6FC3-485B-9764-EAC9E56C1D49}" type="datetimeFigureOut">
               <a:rPr lang="en-US" smtClean="0"/>
-              <a:t>6/27/2018</a:t>
+              <a:t>10/29/2018</a:t>
             </a:fld>
             <a:endParaRPr lang="en-US"/>
           </a:p>
@@ -3992,7 +3992,7 @@
           <a:p>
             <a:pPr algn="ctr"/>
             <a:r>
-              <a:rPr lang="en-US" sz="1050" dirty="0" err="1" smtClean="0">
+              <a:rPr lang="en-US" sz="1050" dirty="0" err="1">
                 <a:solidFill>
                   <a:srgbClr val="7030A0"/>
                 </a:solidFill>
@@ -4901,14 +4901,6 @@
               </a:rPr>
               <a:t>&lt;&lt;interface&gt;&gt;</a:t>
             </a:r>
-            <a:r>
-              <a:rPr lang="en-US" sz="1050">
-                <a:solidFill>
-                  <a:srgbClr val="7030A0"/>
-                </a:solidFill>
-              </a:rPr>
-              <a:t/>
-            </a:r>
             <a:br>
               <a:rPr lang="en-US" sz="1050">
                 <a:solidFill>
@@ -5138,7 +5130,7 @@
         </p:nvSpPr>
         <p:spPr>
           <a:xfrm>
-            <a:off x="6449896" y="3204826"/>
+            <a:off x="6500686" y="3198524"/>
             <a:ext cx="189257" cy="178683"/>
           </a:xfrm>
           <a:prstGeom prst="rect">
@@ -5991,6 +5983,440 @@
           </a:fontRef>
         </p:style>
       </p:cxnSp>
+      <p:sp>
+        <p:nvSpPr>
+          <p:cNvPr id="56" name="Rectangle 8">
+            <a:extLst>
+              <a:ext uri="{FF2B5EF4-FFF2-40B4-BE49-F238E27FC236}">
+                <a16:creationId xmlns:a16="http://schemas.microsoft.com/office/drawing/2014/main" id="{209316A9-9E44-42A8-BFA7-1E49FD4E2CF4}"/>
+              </a:ext>
+            </a:extLst>
+          </p:cNvPr>
+          <p:cNvSpPr/>
+          <p:nvPr/>
+        </p:nvSpPr>
+        <p:spPr>
+          <a:xfrm>
+            <a:off x="4112504" y="3279142"/>
+            <a:ext cx="1060683" cy="364396"/>
+          </a:xfrm>
+          <a:prstGeom prst="rect">
+            <a:avLst/>
+          </a:prstGeom>
+          <a:ln w="19050">
+            <a:solidFill>
+              <a:srgbClr val="7030A0"/>
+            </a:solidFill>
+          </a:ln>
+          <a:effectLst/>
+        </p:spPr>
+        <p:style>
+          <a:lnRef idx="1">
+            <a:schemeClr val="accent4"/>
+          </a:lnRef>
+          <a:fillRef idx="2">
+            <a:schemeClr val="accent4"/>
+          </a:fillRef>
+          <a:effectRef idx="1">
+            <a:schemeClr val="accent4"/>
+          </a:effectRef>
+          <a:fontRef idx="minor">
+            <a:schemeClr val="dk1"/>
+          </a:fontRef>
+        </p:style>
+        <p:txBody>
+          <a:bodyPr rtlCol="0" anchor="ctr"/>
+          <a:lstStyle/>
+          <a:p>
+            <a:pPr algn="ctr"/>
+            <a:r>
+              <a:rPr lang="en-US" sz="1050" dirty="0">
+                <a:solidFill>
+                  <a:srgbClr val="7030A0"/>
+                </a:solidFill>
+              </a:rPr>
+              <a:t>User</a:t>
+            </a:r>
+            <a:endParaRPr lang="en-SG" sz="1050" dirty="0">
+              <a:solidFill>
+                <a:srgbClr val="7030A0"/>
+              </a:solidFill>
+            </a:endParaRPr>
+          </a:p>
+        </p:txBody>
+      </p:sp>
+      <p:cxnSp>
+        <p:nvCxnSpPr>
+          <p:cNvPr id="73" name="Elbow Connector 80">
+            <a:extLst>
+              <a:ext uri="{FF2B5EF4-FFF2-40B4-BE49-F238E27FC236}">
+                <a16:creationId xmlns:a16="http://schemas.microsoft.com/office/drawing/2014/main" id="{E244A4DE-707C-4A34-BAA7-7E54E28697DC}"/>
+              </a:ext>
+            </a:extLst>
+          </p:cNvPr>
+          <p:cNvCxnSpPr>
+            <a:cxnSpLocks/>
+          </p:cNvCxnSpPr>
+          <p:nvPr/>
+        </p:nvCxnSpPr>
+        <p:spPr>
+          <a:xfrm>
+            <a:off x="2315329" y="3337877"/>
+            <a:ext cx="1797943" cy="1"/>
+          </a:xfrm>
+          <a:prstGeom prst="bentConnector3">
+            <a:avLst/>
+          </a:prstGeom>
+          <a:ln w="19050">
+            <a:solidFill>
+              <a:srgbClr val="7030A0"/>
+            </a:solidFill>
+            <a:headEnd type="none" w="med" len="med"/>
+            <a:tailEnd type="arrow" w="med" len="med"/>
+          </a:ln>
+          <a:effectLst/>
+        </p:spPr>
+        <p:style>
+          <a:lnRef idx="1">
+            <a:schemeClr val="accent2"/>
+          </a:lnRef>
+          <a:fillRef idx="2">
+            <a:schemeClr val="accent2"/>
+          </a:fillRef>
+          <a:effectRef idx="1">
+            <a:schemeClr val="accent2"/>
+          </a:effectRef>
+          <a:fontRef idx="minor">
+            <a:schemeClr val="dk1"/>
+          </a:fontRef>
+        </p:style>
+      </p:cxnSp>
+      <p:cxnSp>
+        <p:nvCxnSpPr>
+          <p:cNvPr id="77" name="Elbow Connector 78">
+            <a:extLst>
+              <a:ext uri="{FF2B5EF4-FFF2-40B4-BE49-F238E27FC236}">
+                <a16:creationId xmlns:a16="http://schemas.microsoft.com/office/drawing/2014/main" id="{61F82AB3-64CE-4CCD-B2E7-04AFA61C4045}"/>
+              </a:ext>
+            </a:extLst>
+          </p:cNvPr>
+          <p:cNvCxnSpPr>
+            <a:cxnSpLocks/>
+          </p:cNvCxnSpPr>
+          <p:nvPr/>
+        </p:nvCxnSpPr>
+        <p:spPr>
+          <a:xfrm flipV="1">
+            <a:off x="5188605" y="3189457"/>
+            <a:ext cx="1206868" cy="282413"/>
+          </a:xfrm>
+          <a:prstGeom prst="bentConnector3">
+            <a:avLst>
+              <a:gd name="adj1" fmla="val 100104"/>
+            </a:avLst>
+          </a:prstGeom>
+          <a:ln w="19050">
+            <a:solidFill>
+              <a:srgbClr val="7030A0"/>
+            </a:solidFill>
+            <a:headEnd type="none" w="med" len="med"/>
+            <a:tailEnd type="arrow" w="med" len="med"/>
+          </a:ln>
+          <a:effectLst/>
+        </p:spPr>
+        <p:style>
+          <a:lnRef idx="1">
+            <a:schemeClr val="accent2"/>
+          </a:lnRef>
+          <a:fillRef idx="2">
+            <a:schemeClr val="accent2"/>
+          </a:fillRef>
+          <a:effectRef idx="1">
+            <a:schemeClr val="accent2"/>
+          </a:effectRef>
+          <a:fontRef idx="minor">
+            <a:schemeClr val="dk1"/>
+          </a:fontRef>
+        </p:style>
+      </p:cxnSp>
+      <p:sp>
+        <p:nvSpPr>
+          <p:cNvPr id="87" name="TextBox 86">
+            <a:extLst>
+              <a:ext uri="{FF2B5EF4-FFF2-40B4-BE49-F238E27FC236}">
+                <a16:creationId xmlns:a16="http://schemas.microsoft.com/office/drawing/2014/main" id="{0C35B220-0F75-464B-9E6D-C4E43B0023D2}"/>
+              </a:ext>
+            </a:extLst>
+          </p:cNvPr>
+          <p:cNvSpPr txBox="1"/>
+          <p:nvPr/>
+        </p:nvSpPr>
+        <p:spPr>
+          <a:xfrm>
+            <a:off x="6232605" y="3277824"/>
+            <a:ext cx="189257" cy="178683"/>
+          </a:xfrm>
+          <a:prstGeom prst="rect">
+            <a:avLst/>
+          </a:prstGeom>
+          <a:noFill/>
+        </p:spPr>
+        <p:txBody>
+          <a:bodyPr wrap="square" lIns="0" tIns="0" rIns="0" bIns="0" rtlCol="0">
+            <a:noAutofit/>
+          </a:bodyPr>
+          <a:lstStyle/>
+          <a:p>
+            <a:pPr algn="ctr"/>
+            <a:r>
+              <a:rPr lang="en-US" sz="1100" dirty="0">
+                <a:solidFill>
+                  <a:srgbClr val="7030A0"/>
+                </a:solidFill>
+              </a:rPr>
+              <a:t>1</a:t>
+            </a:r>
+            <a:endParaRPr lang="en-SG" sz="1100" dirty="0">
+              <a:solidFill>
+                <a:srgbClr val="7030A0"/>
+              </a:solidFill>
+            </a:endParaRPr>
+          </a:p>
+        </p:txBody>
+      </p:sp>
+      <p:sp>
+        <p:nvSpPr>
+          <p:cNvPr id="88" name="TextBox 87">
+            <a:extLst>
+              <a:ext uri="{FF2B5EF4-FFF2-40B4-BE49-F238E27FC236}">
+                <a16:creationId xmlns:a16="http://schemas.microsoft.com/office/drawing/2014/main" id="{0C76ED49-3916-4479-B471-4CA39FFA547C}"/>
+              </a:ext>
+            </a:extLst>
+          </p:cNvPr>
+          <p:cNvSpPr txBox="1"/>
+          <p:nvPr/>
+        </p:nvSpPr>
+        <p:spPr>
+          <a:xfrm>
+            <a:off x="5149889" y="3315077"/>
+            <a:ext cx="189257" cy="178683"/>
+          </a:xfrm>
+          <a:prstGeom prst="rect">
+            <a:avLst/>
+          </a:prstGeom>
+          <a:noFill/>
+        </p:spPr>
+        <p:txBody>
+          <a:bodyPr wrap="square" lIns="0" tIns="0" rIns="0" bIns="0" rtlCol="0">
+            <a:noAutofit/>
+          </a:bodyPr>
+          <a:lstStyle/>
+          <a:p>
+            <a:pPr algn="ctr"/>
+            <a:r>
+              <a:rPr lang="en-US" sz="1100" dirty="0">
+                <a:solidFill>
+                  <a:srgbClr val="7030A0"/>
+                </a:solidFill>
+              </a:rPr>
+              <a:t>1</a:t>
+            </a:r>
+            <a:endParaRPr lang="en-SG" sz="1100" dirty="0">
+              <a:solidFill>
+                <a:srgbClr val="7030A0"/>
+              </a:solidFill>
+            </a:endParaRPr>
+          </a:p>
+        </p:txBody>
+      </p:sp>
+      <p:sp>
+        <p:nvSpPr>
+          <p:cNvPr id="96" name="Flowchart: Decision 96">
+            <a:extLst>
+              <a:ext uri="{FF2B5EF4-FFF2-40B4-BE49-F238E27FC236}">
+                <a16:creationId xmlns:a16="http://schemas.microsoft.com/office/drawing/2014/main" id="{E2866399-1283-41AD-B806-7C9B513C699D}"/>
+              </a:ext>
+            </a:extLst>
+          </p:cNvPr>
+          <p:cNvSpPr/>
+          <p:nvPr/>
+        </p:nvSpPr>
+        <p:spPr>
+          <a:xfrm>
+            <a:off x="2373780" y="3248121"/>
+            <a:ext cx="236048" cy="173380"/>
+          </a:xfrm>
+          <a:prstGeom prst="flowChartDecision">
+            <a:avLst/>
+          </a:prstGeom>
+          <a:solidFill>
+            <a:srgbClr val="7030A0"/>
+          </a:solidFill>
+          <a:ln w="19050">
+            <a:solidFill>
+              <a:srgbClr val="7030A0"/>
+            </a:solidFill>
+          </a:ln>
+          <a:effectLst/>
+        </p:spPr>
+        <p:style>
+          <a:lnRef idx="1">
+            <a:schemeClr val="accent6"/>
+          </a:lnRef>
+          <a:fillRef idx="2">
+            <a:schemeClr val="accent6"/>
+          </a:fillRef>
+          <a:effectRef idx="1">
+            <a:schemeClr val="accent6"/>
+          </a:effectRef>
+          <a:fontRef idx="minor">
+            <a:schemeClr val="dk1"/>
+          </a:fontRef>
+        </p:style>
+        <p:txBody>
+          <a:bodyPr rtlCol="0" anchor="ctr"/>
+          <a:lstStyle/>
+          <a:p>
+            <a:pPr algn="ctr"/>
+            <a:endParaRPr lang="en-US" sz="1050"/>
+          </a:p>
+        </p:txBody>
+      </p:sp>
+      <p:sp>
+        <p:nvSpPr>
+          <p:cNvPr id="97" name="TextBox 96">
+            <a:extLst>
+              <a:ext uri="{FF2B5EF4-FFF2-40B4-BE49-F238E27FC236}">
+                <a16:creationId xmlns:a16="http://schemas.microsoft.com/office/drawing/2014/main" id="{338DE5D0-DD50-41E8-97BC-62F441CFAC81}"/>
+              </a:ext>
+            </a:extLst>
+          </p:cNvPr>
+          <p:cNvSpPr txBox="1"/>
+          <p:nvPr/>
+        </p:nvSpPr>
+        <p:spPr>
+          <a:xfrm>
+            <a:off x="3016588" y="3174117"/>
+            <a:ext cx="763996" cy="178683"/>
+          </a:xfrm>
+          <a:prstGeom prst="rect">
+            <a:avLst/>
+          </a:prstGeom>
+          <a:noFill/>
+        </p:spPr>
+        <p:txBody>
+          <a:bodyPr wrap="square" lIns="0" tIns="0" rIns="0" bIns="0" rtlCol="0">
+            <a:noAutofit/>
+          </a:bodyPr>
+          <a:lstStyle/>
+          <a:p>
+            <a:pPr algn="ctr"/>
+            <a:r>
+              <a:rPr lang="en-SG" sz="1100" dirty="0" err="1">
+                <a:solidFill>
+                  <a:srgbClr val="7030A0"/>
+                </a:solidFill>
+              </a:rPr>
+              <a:t>loggedInUser</a:t>
+            </a:r>
+            <a:endParaRPr lang="en-SG" sz="1100" dirty="0">
+              <a:solidFill>
+                <a:srgbClr val="7030A0"/>
+              </a:solidFill>
+            </a:endParaRPr>
+          </a:p>
+        </p:txBody>
+      </p:sp>
+      <p:sp>
+        <p:nvSpPr>
+          <p:cNvPr id="98" name="TextBox 97">
+            <a:extLst>
+              <a:ext uri="{FF2B5EF4-FFF2-40B4-BE49-F238E27FC236}">
+                <a16:creationId xmlns:a16="http://schemas.microsoft.com/office/drawing/2014/main" id="{D48D31EE-BA15-4733-AB93-AEDE5649365D}"/>
+              </a:ext>
+            </a:extLst>
+          </p:cNvPr>
+          <p:cNvSpPr txBox="1"/>
+          <p:nvPr/>
+        </p:nvSpPr>
+        <p:spPr>
+          <a:xfrm>
+            <a:off x="2506271" y="3157505"/>
+            <a:ext cx="189257" cy="178683"/>
+          </a:xfrm>
+          <a:prstGeom prst="rect">
+            <a:avLst/>
+          </a:prstGeom>
+          <a:noFill/>
+        </p:spPr>
+        <p:txBody>
+          <a:bodyPr wrap="square" lIns="0" tIns="0" rIns="0" bIns="0" rtlCol="0">
+            <a:noAutofit/>
+          </a:bodyPr>
+          <a:lstStyle/>
+          <a:p>
+            <a:pPr algn="ctr"/>
+            <a:r>
+              <a:rPr lang="en-US" sz="1100" dirty="0">
+                <a:solidFill>
+                  <a:srgbClr val="7030A0"/>
+                </a:solidFill>
+              </a:rPr>
+              <a:t>1</a:t>
+            </a:r>
+            <a:endParaRPr lang="en-SG" sz="1100" dirty="0">
+              <a:solidFill>
+                <a:srgbClr val="7030A0"/>
+              </a:solidFill>
+            </a:endParaRPr>
+          </a:p>
+        </p:txBody>
+      </p:sp>
+      <p:sp>
+        <p:nvSpPr>
+          <p:cNvPr id="99" name="TextBox 98">
+            <a:extLst>
+              <a:ext uri="{FF2B5EF4-FFF2-40B4-BE49-F238E27FC236}">
+                <a16:creationId xmlns:a16="http://schemas.microsoft.com/office/drawing/2014/main" id="{A6A3FEBA-7A70-410D-BA65-C9B7AF2E2ABD}"/>
+              </a:ext>
+            </a:extLst>
+          </p:cNvPr>
+          <p:cNvSpPr txBox="1"/>
+          <p:nvPr/>
+        </p:nvSpPr>
+        <p:spPr>
+          <a:xfrm>
+            <a:off x="3871602" y="3164096"/>
+            <a:ext cx="261699" cy="178683"/>
+          </a:xfrm>
+          <a:prstGeom prst="rect">
+            <a:avLst/>
+          </a:prstGeom>
+          <a:noFill/>
+        </p:spPr>
+        <p:txBody>
+          <a:bodyPr wrap="square" lIns="0" tIns="0" rIns="0" bIns="0" rtlCol="0">
+            <a:noAutofit/>
+          </a:bodyPr>
+          <a:lstStyle/>
+          <a:p>
+            <a:pPr algn="ctr"/>
+            <a:r>
+              <a:rPr lang="en-US" sz="1100" dirty="0">
+                <a:solidFill>
+                  <a:srgbClr val="7030A0"/>
+                </a:solidFill>
+              </a:rPr>
+              <a:t>0..1</a:t>
+            </a:r>
+            <a:endParaRPr lang="en-SG" sz="1100" dirty="0">
+              <a:solidFill>
+                <a:srgbClr val="7030A0"/>
+              </a:solidFill>
+            </a:endParaRPr>
+          </a:p>
+        </p:txBody>
+      </p:sp>
     </p:spTree>
     <p:extLst>
       <p:ext uri="{BB962C8B-B14F-4D97-AF65-F5344CB8AC3E}">

</xml_diff>

<commit_message>
rename ppp, update class diagram
</commit_message>
<xml_diff>
--- a/docs/diagrams/ModelComponentClassBetterOopDiagram.pptx
+++ b/docs/diagrams/ModelComponentClassBetterOopDiagram.pptx
@@ -126,203 +126,6 @@
 </p:presentation>
 </file>
 
-<file path=ppt/changesInfos/changesInfo1.xml><?xml version="1.0" encoding="utf-8"?>
-<pc:chgInfo xmlns:a="http://schemas.openxmlformats.org/drawingml/2006/main" xmlns:r="http://schemas.openxmlformats.org/officeDocument/2006/relationships" xmlns:ac="http://schemas.microsoft.com/office/drawing/2013/main/command" xmlns:pc="http://schemas.microsoft.com/office/powerpoint/2013/main/command">
-  <pc:docChgLst>
-    <pc:chgData name="Lionel Tan Junzer" userId="04b849c6f1991e6b" providerId="LiveId" clId="{AABA3595-B6E9-4D27-B036-D442B87C3090}"/>
-    <pc:docChg chg="modSld">
-      <pc:chgData name="Lionel Tan Junzer" userId="04b849c6f1991e6b" providerId="LiveId" clId="{AABA3595-B6E9-4D27-B036-D442B87C3090}" dt="2018-10-18T03:07:24.861" v="8" actId="1037"/>
-      <pc:docMkLst>
-        <pc:docMk/>
-      </pc:docMkLst>
-      <pc:sldChg chg="modSp">
-        <pc:chgData name="Lionel Tan Junzer" userId="04b849c6f1991e6b" providerId="LiveId" clId="{AABA3595-B6E9-4D27-B036-D442B87C3090}" dt="2018-10-18T03:07:24.861" v="8" actId="1037"/>
-        <pc:sldMkLst>
-          <pc:docMk/>
-          <pc:sldMk cId="2396968029" sldId="263"/>
-        </pc:sldMkLst>
-        <pc:spChg chg="mod">
-          <ac:chgData name="Lionel Tan Junzer" userId="04b849c6f1991e6b" providerId="LiveId" clId="{AABA3595-B6E9-4D27-B036-D442B87C3090}" dt="2018-10-18T03:07:24.861" v="8" actId="1037"/>
-          <ac:spMkLst>
-            <pc:docMk/>
-            <pc:sldMk cId="2396968029" sldId="263"/>
-            <ac:spMk id="69" creationId="{8CF9406A-39C7-4163-8880-BB65541FC08E}"/>
-          </ac:spMkLst>
-        </pc:spChg>
-        <pc:spChg chg="mod">
-          <ac:chgData name="Lionel Tan Junzer" userId="04b849c6f1991e6b" providerId="LiveId" clId="{AABA3595-B6E9-4D27-B036-D442B87C3090}" dt="2018-10-17T02:03:53.885" v="3" actId="1036"/>
-          <ac:spMkLst>
-            <pc:docMk/>
-            <pc:sldMk cId="2396968029" sldId="263"/>
-            <ac:spMk id="85" creationId="{00000000-0000-0000-0000-000000000000}"/>
-          </ac:spMkLst>
-        </pc:spChg>
-        <pc:cxnChg chg="mod">
-          <ac:chgData name="Lionel Tan Junzer" userId="04b849c6f1991e6b" providerId="LiveId" clId="{AABA3595-B6E9-4D27-B036-D442B87C3090}" dt="2018-10-17T02:03:53.885" v="3" actId="1036"/>
-          <ac:cxnSpMkLst>
-            <pc:docMk/>
-            <pc:sldMk cId="2396968029" sldId="263"/>
-            <ac:cxnSpMk id="86" creationId="{00000000-0000-0000-0000-000000000000}"/>
-          </ac:cxnSpMkLst>
-        </pc:cxnChg>
-      </pc:sldChg>
-    </pc:docChg>
-  </pc:docChgLst>
-  <pc:docChgLst>
-    <pc:chgData name="Lionel Tan Junzer" userId="04b849c6f1991e6b" providerId="LiveId" clId="{7FBAAF90-FF42-4F7F-A09E-6A965B25EC3F}"/>
-    <pc:docChg chg="undo custSel modSld">
-      <pc:chgData name="Lionel Tan Junzer" userId="04b849c6f1991e6b" providerId="LiveId" clId="{7FBAAF90-FF42-4F7F-A09E-6A965B25EC3F}" dt="2018-10-15T06:19:19.807" v="153" actId="1076"/>
-      <pc:docMkLst>
-        <pc:docMk/>
-      </pc:docMkLst>
-      <pc:sldChg chg="addSp delSp modSp">
-        <pc:chgData name="Lionel Tan Junzer" userId="04b849c6f1991e6b" providerId="LiveId" clId="{7FBAAF90-FF42-4F7F-A09E-6A965B25EC3F}" dt="2018-10-15T06:19:19.807" v="153" actId="1076"/>
-        <pc:sldMkLst>
-          <pc:docMk/>
-          <pc:sldMk cId="2396968029" sldId="263"/>
-        </pc:sldMkLst>
-        <pc:spChg chg="mod">
-          <ac:chgData name="Lionel Tan Junzer" userId="04b849c6f1991e6b" providerId="LiveId" clId="{7FBAAF90-FF42-4F7F-A09E-6A965B25EC3F}" dt="2018-10-15T06:08:46.425" v="60" actId="20577"/>
-          <ac:spMkLst>
-            <pc:docMk/>
-            <pc:sldMk cId="2396968029" sldId="263"/>
-            <ac:spMk id="46" creationId="{00000000-0000-0000-0000-000000000000}"/>
-          </ac:spMkLst>
-        </pc:spChg>
-        <pc:spChg chg="mod">
-          <ac:chgData name="Lionel Tan Junzer" userId="04b849c6f1991e6b" providerId="LiveId" clId="{7FBAAF90-FF42-4F7F-A09E-6A965B25EC3F}" dt="2018-10-15T06:08:29.379" v="27" actId="20577"/>
-          <ac:spMkLst>
-            <pc:docMk/>
-            <pc:sldMk cId="2396968029" sldId="263"/>
-            <ac:spMk id="49" creationId="{00000000-0000-0000-0000-000000000000}"/>
-          </ac:spMkLst>
-        </pc:spChg>
-        <pc:spChg chg="mod">
-          <ac:chgData name="Lionel Tan Junzer" userId="04b849c6f1991e6b" providerId="LiveId" clId="{7FBAAF90-FF42-4F7F-A09E-6A965B25EC3F}" dt="2018-10-15T06:08:25.864" v="17" actId="20577"/>
-          <ac:spMkLst>
-            <pc:docMk/>
-            <pc:sldMk cId="2396968029" sldId="263"/>
-            <ac:spMk id="62" creationId="{00000000-0000-0000-0000-000000000000}"/>
-          </ac:spMkLst>
-        </pc:spChg>
-        <pc:spChg chg="mod">
-          <ac:chgData name="Lionel Tan Junzer" userId="04b849c6f1991e6b" providerId="LiveId" clId="{7FBAAF90-FF42-4F7F-A09E-6A965B25EC3F}" dt="2018-10-15T06:08:15.763" v="7" actId="20577"/>
-          <ac:spMkLst>
-            <pc:docMk/>
-            <pc:sldMk cId="2396968029" sldId="263"/>
-            <ac:spMk id="80" creationId="{00000000-0000-0000-0000-000000000000}"/>
-          </ac:spMkLst>
-        </pc:spChg>
-        <pc:spChg chg="mod">
-          <ac:chgData name="Lionel Tan Junzer" userId="04b849c6f1991e6b" providerId="LiveId" clId="{7FBAAF90-FF42-4F7F-A09E-6A965B25EC3F}" dt="2018-10-15T06:13:29.629" v="92" actId="20577"/>
-          <ac:spMkLst>
-            <pc:docMk/>
-            <pc:sldMk cId="2396968029" sldId="263"/>
-            <ac:spMk id="83" creationId="{00000000-0000-0000-0000-000000000000}"/>
-          </ac:spMkLst>
-        </pc:spChg>
-        <pc:spChg chg="mod">
-          <ac:chgData name="Lionel Tan Junzer" userId="04b849c6f1991e6b" providerId="LiveId" clId="{7FBAAF90-FF42-4F7F-A09E-6A965B25EC3F}" dt="2018-10-15T06:15:16.147" v="105" actId="20577"/>
-          <ac:spMkLst>
-            <pc:docMk/>
-            <pc:sldMk cId="2396968029" sldId="263"/>
-            <ac:spMk id="85" creationId="{00000000-0000-0000-0000-000000000000}"/>
-          </ac:spMkLst>
-        </pc:spChg>
-        <pc:spChg chg="add mod">
-          <ac:chgData name="Lionel Tan Junzer" userId="04b849c6f1991e6b" providerId="LiveId" clId="{7FBAAF90-FF42-4F7F-A09E-6A965B25EC3F}" dt="2018-10-15T06:19:19.807" v="153" actId="1076"/>
-          <ac:spMkLst>
-            <pc:docMk/>
-            <pc:sldMk cId="2396968029" sldId="263"/>
-            <ac:spMk id="87" creationId="{639CEC8B-F7BC-4EB0-A49A-E2D79338A141}"/>
-          </ac:spMkLst>
-        </pc:spChg>
-        <pc:spChg chg="mod">
-          <ac:chgData name="Lionel Tan Junzer" userId="04b849c6f1991e6b" providerId="LiveId" clId="{7FBAAF90-FF42-4F7F-A09E-6A965B25EC3F}" dt="2018-10-15T06:08:38.987" v="49" actId="20577"/>
-          <ac:spMkLst>
-            <pc:docMk/>
-            <pc:sldMk cId="2396968029" sldId="263"/>
-            <ac:spMk id="92" creationId="{00000000-0000-0000-0000-000000000000}"/>
-          </ac:spMkLst>
-        </pc:spChg>
-        <pc:spChg chg="mod">
-          <ac:chgData name="Lionel Tan Junzer" userId="04b849c6f1991e6b" providerId="LiveId" clId="{7FBAAF90-FF42-4F7F-A09E-6A965B25EC3F}" dt="2018-10-15T06:08:35.347" v="38" actId="20577"/>
-          <ac:spMkLst>
-            <pc:docMk/>
-            <pc:sldMk cId="2396968029" sldId="263"/>
-            <ac:spMk id="93" creationId="{00000000-0000-0000-0000-000000000000}"/>
-          </ac:spMkLst>
-        </pc:spChg>
-        <pc:spChg chg="mod">
-          <ac:chgData name="Lionel Tan Junzer" userId="04b849c6f1991e6b" providerId="LiveId" clId="{7FBAAF90-FF42-4F7F-A09E-6A965B25EC3F}" dt="2018-10-15T06:15:49.426" v="114" actId="1076"/>
-          <ac:spMkLst>
-            <pc:docMk/>
-            <pc:sldMk cId="2396968029" sldId="263"/>
-            <ac:spMk id="118" creationId="{00000000-0000-0000-0000-000000000000}"/>
-          </ac:spMkLst>
-        </pc:spChg>
-        <pc:cxnChg chg="add del mod">
-          <ac:chgData name="Lionel Tan Junzer" userId="04b849c6f1991e6b" providerId="LiveId" clId="{7FBAAF90-FF42-4F7F-A09E-6A965B25EC3F}" dt="2018-10-15T06:17:24.844" v="139" actId="478"/>
-          <ac:cxnSpMkLst>
-            <pc:docMk/>
-            <pc:sldMk cId="2396968029" sldId="263"/>
-            <ac:cxnSpMk id="56" creationId="{02618794-E56D-48EF-8069-F153C3AE6B86}"/>
-          </ac:cxnSpMkLst>
-        </pc:cxnChg>
-        <pc:cxnChg chg="add del">
-          <ac:chgData name="Lionel Tan Junzer" userId="04b849c6f1991e6b" providerId="LiveId" clId="{7FBAAF90-FF42-4F7F-A09E-6A965B25EC3F}" dt="2018-10-15T06:15:42.952" v="111"/>
-          <ac:cxnSpMkLst>
-            <pc:docMk/>
-            <pc:sldMk cId="2396968029" sldId="263"/>
-            <ac:cxnSpMk id="57" creationId="{053E2D98-C0CA-4F04-9BDB-6ECF830782FF}"/>
-          </ac:cxnSpMkLst>
-        </pc:cxnChg>
-        <pc:cxnChg chg="add del mod">
-          <ac:chgData name="Lionel Tan Junzer" userId="04b849c6f1991e6b" providerId="LiveId" clId="{7FBAAF90-FF42-4F7F-A09E-6A965B25EC3F}" dt="2018-10-15T06:16:49.826" v="131"/>
-          <ac:cxnSpMkLst>
-            <pc:docMk/>
-            <pc:sldMk cId="2396968029" sldId="263"/>
-            <ac:cxnSpMk id="60" creationId="{124F4CE2-15A6-4846-89CD-A91F90484CBA}"/>
-          </ac:cxnSpMkLst>
-        </pc:cxnChg>
-        <pc:cxnChg chg="add del mod">
-          <ac:chgData name="Lionel Tan Junzer" userId="04b849c6f1991e6b" providerId="LiveId" clId="{7FBAAF90-FF42-4F7F-A09E-6A965B25EC3F}" dt="2018-10-15T06:17:22.450" v="137"/>
-          <ac:cxnSpMkLst>
-            <pc:docMk/>
-            <pc:sldMk cId="2396968029" sldId="263"/>
-            <ac:cxnSpMk id="73" creationId="{3D6042AC-9F32-4797-8C32-63EB5771D524}"/>
-          </ac:cxnSpMkLst>
-        </pc:cxnChg>
-        <pc:cxnChg chg="add del mod">
-          <ac:chgData name="Lionel Tan Junzer" userId="04b849c6f1991e6b" providerId="LiveId" clId="{7FBAAF90-FF42-4F7F-A09E-6A965B25EC3F}" dt="2018-10-15T06:17:47.148" v="145"/>
-          <ac:cxnSpMkLst>
-            <pc:docMk/>
-            <pc:sldMk cId="2396968029" sldId="263"/>
-            <ac:cxnSpMk id="74" creationId="{0FF30D97-BA38-4295-9FAA-93246E45A60A}"/>
-          </ac:cxnSpMkLst>
-        </pc:cxnChg>
-        <pc:cxnChg chg="add del mod">
-          <ac:chgData name="Lionel Tan Junzer" userId="04b849c6f1991e6b" providerId="LiveId" clId="{7FBAAF90-FF42-4F7F-A09E-6A965B25EC3F}" dt="2018-10-15T06:18:32.320" v="150" actId="478"/>
-          <ac:cxnSpMkLst>
-            <pc:docMk/>
-            <pc:sldMk cId="2396968029" sldId="263"/>
-            <ac:cxnSpMk id="77" creationId="{D5571516-585C-418B-8435-D0816EE10FF4}"/>
-          </ac:cxnSpMkLst>
-        </pc:cxnChg>
-        <pc:cxnChg chg="add">
-          <ac:chgData name="Lionel Tan Junzer" userId="04b849c6f1991e6b" providerId="LiveId" clId="{7FBAAF90-FF42-4F7F-A09E-6A965B25EC3F}" dt="2018-10-15T06:19:03.991" v="151"/>
-          <ac:cxnSpMkLst>
-            <pc:docMk/>
-            <pc:sldMk cId="2396968029" sldId="263"/>
-            <ac:cxnSpMk id="82" creationId="{40F0CCFC-B539-432E-B250-440E301ACC11}"/>
-          </ac:cxnSpMkLst>
-        </pc:cxnChg>
-      </pc:sldChg>
-    </pc:docChg>
-  </pc:docChgLst>
-</pc:chgInfo>
-</file>
-
 <file path=ppt/notesMasters/notesMaster1.xml><?xml version="1.0" encoding="utf-8"?>
 <p:notesMaster xmlns:a="http://schemas.openxmlformats.org/drawingml/2006/main" xmlns:r="http://schemas.openxmlformats.org/officeDocument/2006/relationships" xmlns:p="http://schemas.openxmlformats.org/presentationml/2006/main">
   <p:cSld>
@@ -405,7 +208,7 @@
           <a:p>
             <a:fld id="{F5CC4B3F-88C1-4FFA-B1B6-F41C21DC6924}" type="datetimeFigureOut">
               <a:rPr lang="en-US" smtClean="0"/>
-              <a:t>10/18/2018</a:t>
+              <a:t>11/12/2018</a:t>
             </a:fld>
             <a:endParaRPr lang="en-US"/>
           </a:p>
@@ -851,7 +654,7 @@
           <a:p>
             <a:fld id="{78C97017-6FC3-485B-9764-EAC9E56C1D49}" type="datetimeFigureOut">
               <a:rPr lang="en-US" smtClean="0"/>
-              <a:t>10/18/2018</a:t>
+              <a:t>11/12/2018</a:t>
             </a:fld>
             <a:endParaRPr lang="en-US"/>
           </a:p>
@@ -1019,7 +822,7 @@
           <a:p>
             <a:fld id="{78C97017-6FC3-485B-9764-EAC9E56C1D49}" type="datetimeFigureOut">
               <a:rPr lang="en-US" smtClean="0"/>
-              <a:t>10/18/2018</a:t>
+              <a:t>11/12/2018</a:t>
             </a:fld>
             <a:endParaRPr lang="en-US"/>
           </a:p>
@@ -1197,7 +1000,7 @@
           <a:p>
             <a:fld id="{78C97017-6FC3-485B-9764-EAC9E56C1D49}" type="datetimeFigureOut">
               <a:rPr lang="en-US" smtClean="0"/>
-              <a:t>10/18/2018</a:t>
+              <a:t>11/12/2018</a:t>
             </a:fld>
             <a:endParaRPr lang="en-US"/>
           </a:p>
@@ -1365,7 +1168,7 @@
           <a:p>
             <a:fld id="{78C97017-6FC3-485B-9764-EAC9E56C1D49}" type="datetimeFigureOut">
               <a:rPr lang="en-US" smtClean="0"/>
-              <a:t>10/18/2018</a:t>
+              <a:t>11/12/2018</a:t>
             </a:fld>
             <a:endParaRPr lang="en-US"/>
           </a:p>
@@ -1610,7 +1413,7 @@
           <a:p>
             <a:fld id="{78C97017-6FC3-485B-9764-EAC9E56C1D49}" type="datetimeFigureOut">
               <a:rPr lang="en-US" smtClean="0"/>
-              <a:t>10/18/2018</a:t>
+              <a:t>11/12/2018</a:t>
             </a:fld>
             <a:endParaRPr lang="en-US"/>
           </a:p>
@@ -1895,7 +1698,7 @@
           <a:p>
             <a:fld id="{78C97017-6FC3-485B-9764-EAC9E56C1D49}" type="datetimeFigureOut">
               <a:rPr lang="en-US" smtClean="0"/>
-              <a:t>10/18/2018</a:t>
+              <a:t>11/12/2018</a:t>
             </a:fld>
             <a:endParaRPr lang="en-US"/>
           </a:p>
@@ -2314,7 +2117,7 @@
           <a:p>
             <a:fld id="{78C97017-6FC3-485B-9764-EAC9E56C1D49}" type="datetimeFigureOut">
               <a:rPr lang="en-US" smtClean="0"/>
-              <a:t>10/18/2018</a:t>
+              <a:t>11/12/2018</a:t>
             </a:fld>
             <a:endParaRPr lang="en-US"/>
           </a:p>
@@ -2431,7 +2234,7 @@
           <a:p>
             <a:fld id="{78C97017-6FC3-485B-9764-EAC9E56C1D49}" type="datetimeFigureOut">
               <a:rPr lang="en-US" smtClean="0"/>
-              <a:t>10/18/2018</a:t>
+              <a:t>11/12/2018</a:t>
             </a:fld>
             <a:endParaRPr lang="en-US"/>
           </a:p>
@@ -2526,7 +2329,7 @@
           <a:p>
             <a:fld id="{78C97017-6FC3-485B-9764-EAC9E56C1D49}" type="datetimeFigureOut">
               <a:rPr lang="en-US" smtClean="0"/>
-              <a:t>10/18/2018</a:t>
+              <a:t>11/12/2018</a:t>
             </a:fld>
             <a:endParaRPr lang="en-US"/>
           </a:p>
@@ -2801,7 +2604,7 @@
           <a:p>
             <a:fld id="{78C97017-6FC3-485B-9764-EAC9E56C1D49}" type="datetimeFigureOut">
               <a:rPr lang="en-US" smtClean="0"/>
-              <a:t>10/18/2018</a:t>
+              <a:t>11/12/2018</a:t>
             </a:fld>
             <a:endParaRPr lang="en-US"/>
           </a:p>
@@ -3053,7 +2856,7 @@
           <a:p>
             <a:fld id="{78C97017-6FC3-485B-9764-EAC9E56C1D49}" type="datetimeFigureOut">
               <a:rPr lang="en-US" smtClean="0"/>
-              <a:t>10/18/2018</a:t>
+              <a:t>11/12/2018</a:t>
             </a:fld>
             <a:endParaRPr lang="en-US"/>
           </a:p>
@@ -3264,7 +3067,7 @@
           <a:p>
             <a:fld id="{78C97017-6FC3-485B-9764-EAC9E56C1D49}" type="datetimeFigureOut">
               <a:rPr lang="en-US" smtClean="0"/>
-              <a:t>10/18/2018</a:t>
+              <a:t>11/12/2018</a:t>
             </a:fld>
             <a:endParaRPr lang="en-US"/>
           </a:p>
@@ -3639,2657 +3442,42 @@
           <a:chExt cx="0" cy="0"/>
         </a:xfrm>
       </p:grpSpPr>
-      <p:sp>
-        <p:nvSpPr>
-          <p:cNvPr id="118" name="Rectangle 65"/>
-          <p:cNvSpPr/>
+      <p:pic>
+        <p:nvPicPr>
+          <p:cNvPr id="57" name="Picture 56">
+            <a:extLst>
+              <a:ext uri="{FF2B5EF4-FFF2-40B4-BE49-F238E27FC236}">
+                <a16:creationId xmlns:a16="http://schemas.microsoft.com/office/drawing/2014/main" id="{CA464AFE-92EC-45C3-8294-35E6B6A5F030}"/>
+              </a:ext>
+            </a:extLst>
+          </p:cNvPr>
+          <p:cNvPicPr>
+            <a:picLocks noChangeAspect="1"/>
+          </p:cNvPicPr>
           <p:nvPr/>
-        </p:nvSpPr>
+        </p:nvPicPr>
+        <p:blipFill>
+          <a:blip r:embed="rId2">
+            <a:extLst>
+              <a:ext uri="{28A0092B-C50C-407E-A947-70E740481C1C}">
+                <a14:useLocalDpi xmlns:a14="http://schemas.microsoft.com/office/drawing/2010/main" val="0"/>
+              </a:ext>
+            </a:extLst>
+          </a:blip>
+          <a:stretch>
+            <a:fillRect/>
+          </a:stretch>
+        </p:blipFill>
         <p:spPr>
           <a:xfrm>
-            <a:off x="1119865" y="1676400"/>
-            <a:ext cx="7490735" cy="3059747"/>
-          </a:xfrm>
-          <a:prstGeom prst="roundRect">
-            <a:avLst>
-              <a:gd name="adj" fmla="val 3484"/>
-            </a:avLst>
-          </a:prstGeom>
-          <a:solidFill>
-            <a:schemeClr val="accent4">
-              <a:lumMod val="20000"/>
-              <a:lumOff val="80000"/>
-            </a:schemeClr>
-          </a:solidFill>
-          <a:ln w="19050">
-            <a:noFill/>
-          </a:ln>
-          <a:effectLst/>
-        </p:spPr>
-        <p:style>
-          <a:lnRef idx="1">
-            <a:schemeClr val="accent2"/>
-          </a:lnRef>
-          <a:fillRef idx="2">
-            <a:schemeClr val="accent2"/>
-          </a:fillRef>
-          <a:effectRef idx="1">
-            <a:schemeClr val="accent2"/>
-          </a:effectRef>
-          <a:fontRef idx="minor">
-            <a:schemeClr val="dk1"/>
-          </a:fontRef>
-        </p:style>
-        <p:txBody>
-          <a:bodyPr rtlCol="0" anchor="t"/>
-          <a:lstStyle/>
-          <a:p>
-            <a:r>
-              <a:rPr lang="en-US" sz="1200" b="1" dirty="0">
-                <a:solidFill>
-                  <a:srgbClr val="7030A0"/>
-                </a:solidFill>
-              </a:rPr>
-              <a:t>Model</a:t>
-            </a:r>
-            <a:endParaRPr lang="en-SG" sz="1200" b="1" dirty="0">
-              <a:solidFill>
-                <a:srgbClr val="7030A0"/>
-              </a:solidFill>
-            </a:endParaRPr>
-          </a:p>
-        </p:txBody>
-      </p:sp>
-      <p:sp>
-        <p:nvSpPr>
-          <p:cNvPr id="2" name="Rectangle 8"/>
-          <p:cNvSpPr/>
-          <p:nvPr/>
-        </p:nvSpPr>
-        <p:spPr>
-          <a:xfrm>
-            <a:off x="2877180" y="3463240"/>
-            <a:ext cx="1093635" cy="346760"/>
+            <a:off x="1076325" y="1852612"/>
+            <a:ext cx="6991350" cy="3152775"/>
           </a:xfrm>
           <a:prstGeom prst="rect">
             <a:avLst/>
           </a:prstGeom>
-          <a:solidFill>
-            <a:srgbClr val="7030A0"/>
-          </a:solidFill>
-          <a:ln w="19050">
-            <a:solidFill>
-              <a:srgbClr val="7030A0"/>
-            </a:solidFill>
-          </a:ln>
-          <a:effectLst/>
         </p:spPr>
-        <p:style>
-          <a:lnRef idx="1">
-            <a:schemeClr val="accent2"/>
-          </a:lnRef>
-          <a:fillRef idx="2">
-            <a:schemeClr val="accent2"/>
-          </a:fillRef>
-          <a:effectRef idx="1">
-            <a:schemeClr val="accent2"/>
-          </a:effectRef>
-          <a:fontRef idx="minor">
-            <a:schemeClr val="dk1"/>
-          </a:fontRef>
-        </p:style>
-        <p:txBody>
-          <a:bodyPr rtlCol="0" anchor="ctr"/>
-          <a:lstStyle/>
-          <a:p>
-            <a:pPr algn="ctr"/>
-            <a:r>
-              <a:rPr lang="en-US" sz="1050" dirty="0" err="1">
-                <a:solidFill>
-                  <a:schemeClr val="bg1"/>
-                </a:solidFill>
-              </a:rPr>
-              <a:t>UserPref</a:t>
-            </a:r>
-            <a:endParaRPr lang="en-SG" sz="1050" dirty="0">
-              <a:solidFill>
-                <a:schemeClr val="bg1"/>
-              </a:solidFill>
-            </a:endParaRPr>
-          </a:p>
-        </p:txBody>
-      </p:sp>
-      <p:sp>
-        <p:nvSpPr>
-          <p:cNvPr id="9" name="Rectangle 62"/>
-          <p:cNvSpPr/>
-          <p:nvPr/>
-        </p:nvSpPr>
-        <p:spPr>
-          <a:xfrm rot="16200000">
-            <a:off x="1661548" y="3097750"/>
-            <a:ext cx="1093635" cy="346760"/>
-          </a:xfrm>
-          <a:prstGeom prst="rect">
-            <a:avLst/>
-          </a:prstGeom>
-          <a:solidFill>
-            <a:srgbClr val="7030A0"/>
-          </a:solidFill>
-          <a:ln w="19050">
-            <a:solidFill>
-              <a:srgbClr val="7030A0"/>
-            </a:solidFill>
-          </a:ln>
-          <a:effectLst/>
-        </p:spPr>
-        <p:style>
-          <a:lnRef idx="1">
-            <a:schemeClr val="accent2"/>
-          </a:lnRef>
-          <a:fillRef idx="2">
-            <a:schemeClr val="accent2"/>
-          </a:fillRef>
-          <a:effectRef idx="1">
-            <a:schemeClr val="accent2"/>
-          </a:effectRef>
-          <a:fontRef idx="minor">
-            <a:schemeClr val="dk1"/>
-          </a:fontRef>
-        </p:style>
-        <p:txBody>
-          <a:bodyPr rtlCol="0" anchor="ctr"/>
-          <a:lstStyle/>
-          <a:p>
-            <a:pPr algn="ctr"/>
-            <a:r>
-              <a:rPr lang="en-US" sz="1050" dirty="0" err="1">
-                <a:solidFill>
-                  <a:schemeClr val="bg1"/>
-                </a:solidFill>
-              </a:rPr>
-              <a:t>ModelManager</a:t>
-            </a:r>
-            <a:endParaRPr lang="en-SG" sz="1050" dirty="0">
-              <a:solidFill>
-                <a:schemeClr val="bg1"/>
-              </a:solidFill>
-            </a:endParaRPr>
-          </a:p>
-        </p:txBody>
-      </p:sp>
-      <p:cxnSp>
-        <p:nvCxnSpPr>
-          <p:cNvPr id="107" name="Elbow Connector 106"/>
-          <p:cNvCxnSpPr>
-            <a:cxnSpLocks/>
-          </p:cNvCxnSpPr>
-          <p:nvPr/>
-        </p:nvCxnSpPr>
-        <p:spPr>
-          <a:xfrm rot="5400000" flipH="1" flipV="1">
-            <a:off x="4155901" y="1308943"/>
-            <a:ext cx="613122" cy="4459404"/>
-          </a:xfrm>
-          <a:prstGeom prst="bentConnector3">
-            <a:avLst>
-              <a:gd name="adj1" fmla="val -26668"/>
-            </a:avLst>
-          </a:prstGeom>
-          <a:ln w="19050">
-            <a:solidFill>
-              <a:srgbClr val="7030A0"/>
-            </a:solidFill>
-            <a:prstDash val="solid"/>
-            <a:headEnd type="none" w="med" len="med"/>
-            <a:tailEnd type="arrow" w="med" len="med"/>
-          </a:ln>
-          <a:effectLst/>
-        </p:spPr>
-        <p:style>
-          <a:lnRef idx="1">
-            <a:schemeClr val="accent2"/>
-          </a:lnRef>
-          <a:fillRef idx="2">
-            <a:schemeClr val="accent2"/>
-          </a:fillRef>
-          <a:effectRef idx="1">
-            <a:schemeClr val="accent2"/>
-          </a:effectRef>
-          <a:fontRef idx="minor">
-            <a:schemeClr val="dk1"/>
-          </a:fontRef>
-        </p:style>
-      </p:cxnSp>
-      <p:sp>
-        <p:nvSpPr>
-          <p:cNvPr id="119" name="Rectangle 62"/>
-          <p:cNvSpPr/>
-          <p:nvPr/>
-        </p:nvSpPr>
-        <p:spPr>
-          <a:xfrm rot="16200000">
-            <a:off x="956202" y="2861202"/>
-            <a:ext cx="1093635" cy="346760"/>
-          </a:xfrm>
-          <a:prstGeom prst="rect">
-            <a:avLst/>
-          </a:prstGeom>
-          <a:solidFill>
-            <a:srgbClr val="7030A0"/>
-          </a:solidFill>
-          <a:ln w="19050">
-            <a:solidFill>
-              <a:srgbClr val="7030A0"/>
-            </a:solidFill>
-          </a:ln>
-          <a:effectLst/>
-        </p:spPr>
-        <p:style>
-          <a:lnRef idx="1">
-            <a:schemeClr val="accent2"/>
-          </a:lnRef>
-          <a:fillRef idx="2">
-            <a:schemeClr val="accent2"/>
-          </a:fillRef>
-          <a:effectRef idx="1">
-            <a:schemeClr val="accent2"/>
-          </a:effectRef>
-          <a:fontRef idx="minor">
-            <a:schemeClr val="dk1"/>
-          </a:fontRef>
-        </p:style>
-        <p:txBody>
-          <a:bodyPr rtlCol="0" anchor="ctr"/>
-          <a:lstStyle/>
-          <a:p>
-            <a:pPr algn="ctr"/>
-            <a:r>
-              <a:rPr lang="en-US" sz="1050" dirty="0">
-                <a:solidFill>
-                  <a:schemeClr val="bg1"/>
-                </a:solidFill>
-              </a:rPr>
-              <a:t>&lt;&lt;interface&gt;&gt;</a:t>
-            </a:r>
-          </a:p>
-          <a:p>
-            <a:pPr algn="ctr"/>
-            <a:r>
-              <a:rPr lang="en-US" sz="1050" dirty="0">
-                <a:solidFill>
-                  <a:schemeClr val="bg1"/>
-                </a:solidFill>
-              </a:rPr>
-              <a:t>Model</a:t>
-            </a:r>
-            <a:endParaRPr lang="en-SG" sz="1050" dirty="0">
-              <a:solidFill>
-                <a:schemeClr val="bg1"/>
-              </a:solidFill>
-            </a:endParaRPr>
-          </a:p>
-        </p:txBody>
-      </p:sp>
-      <p:sp>
-        <p:nvSpPr>
-          <p:cNvPr id="120" name="Isosceles Triangle 102"/>
-          <p:cNvSpPr/>
-          <p:nvPr/>
-        </p:nvSpPr>
-        <p:spPr>
-          <a:xfrm rot="16200000">
-            <a:off x="1626910" y="2952291"/>
-            <a:ext cx="270504" cy="175523"/>
-          </a:xfrm>
-          <a:prstGeom prst="triangle">
-            <a:avLst/>
-          </a:prstGeom>
-          <a:solidFill>
-            <a:srgbClr val="7030A0"/>
-          </a:solidFill>
-          <a:ln w="19050">
-            <a:solidFill>
-              <a:srgbClr val="7030A0"/>
-            </a:solidFill>
-          </a:ln>
-          <a:effectLst/>
-        </p:spPr>
-        <p:style>
-          <a:lnRef idx="1">
-            <a:schemeClr val="accent6"/>
-          </a:lnRef>
-          <a:fillRef idx="2">
-            <a:schemeClr val="accent6"/>
-          </a:fillRef>
-          <a:effectRef idx="1">
-            <a:schemeClr val="accent6"/>
-          </a:effectRef>
-          <a:fontRef idx="minor">
-            <a:schemeClr val="dk1"/>
-          </a:fontRef>
-        </p:style>
-        <p:txBody>
-          <a:bodyPr rtlCol="0" anchor="ctr"/>
-          <a:lstStyle/>
-          <a:p>
-            <a:pPr algn="ctr"/>
-            <a:endParaRPr lang="en-SG" sz="1050"/>
-          </a:p>
-        </p:txBody>
-      </p:sp>
-      <p:cxnSp>
-        <p:nvCxnSpPr>
-          <p:cNvPr id="58" name="Straight Arrow Connector 57"/>
-          <p:cNvCxnSpPr>
-            <a:stCxn id="42" idx="3"/>
-            <a:endCxn id="2" idx="1"/>
-          </p:cNvCxnSpPr>
-          <p:nvPr/>
-        </p:nvCxnSpPr>
-        <p:spPr>
-          <a:xfrm>
-            <a:off x="2609828" y="3636620"/>
-            <a:ext cx="267352" cy="0"/>
-          </a:xfrm>
-          <a:prstGeom prst="straightConnector1">
-            <a:avLst/>
-          </a:prstGeom>
-          <a:ln w="19050">
-            <a:solidFill>
-              <a:srgbClr val="7030A0"/>
-            </a:solidFill>
-            <a:headEnd type="none" w="med" len="med"/>
-            <a:tailEnd type="arrow" w="med" len="med"/>
-          </a:ln>
-          <a:effectLst/>
-        </p:spPr>
-        <p:style>
-          <a:lnRef idx="1">
-            <a:schemeClr val="accent2"/>
-          </a:lnRef>
-          <a:fillRef idx="2">
-            <a:schemeClr val="accent2"/>
-          </a:fillRef>
-          <a:effectRef idx="1">
-            <a:schemeClr val="accent2"/>
-          </a:effectRef>
-          <a:fontRef idx="minor">
-            <a:schemeClr val="dk1"/>
-          </a:fontRef>
-        </p:style>
-      </p:cxnSp>
-      <p:cxnSp>
-        <p:nvCxnSpPr>
-          <p:cNvPr id="75" name="Elbow Connector 122"/>
-          <p:cNvCxnSpPr/>
-          <p:nvPr/>
-        </p:nvCxnSpPr>
-        <p:spPr>
-          <a:xfrm>
-            <a:off x="910091" y="3040053"/>
-            <a:ext cx="419548" cy="2860"/>
-          </a:xfrm>
-          <a:prstGeom prst="bentConnector3">
-            <a:avLst>
-              <a:gd name="adj1" fmla="val 50000"/>
-            </a:avLst>
-          </a:prstGeom>
-          <a:ln w="19050">
-            <a:solidFill>
-              <a:schemeClr val="bg1">
-                <a:lumMod val="75000"/>
-              </a:schemeClr>
-            </a:solidFill>
-            <a:prstDash val="sysDot"/>
-            <a:headEnd type="none" w="med" len="med"/>
-            <a:tailEnd type="arrow" w="med" len="med"/>
-          </a:ln>
-          <a:effectLst/>
-        </p:spPr>
-        <p:style>
-          <a:lnRef idx="1">
-            <a:schemeClr val="accent2"/>
-          </a:lnRef>
-          <a:fillRef idx="2">
-            <a:schemeClr val="accent2"/>
-          </a:fillRef>
-          <a:effectRef idx="1">
-            <a:schemeClr val="accent2"/>
-          </a:effectRef>
-          <a:fontRef idx="minor">
-            <a:schemeClr val="dk1"/>
-          </a:fontRef>
-        </p:style>
-      </p:cxnSp>
-      <p:cxnSp>
-        <p:nvCxnSpPr>
-          <p:cNvPr id="21" name="Straight Connector 20"/>
-          <p:cNvCxnSpPr>
-            <a:stCxn id="120" idx="3"/>
-          </p:cNvCxnSpPr>
-          <p:nvPr/>
-        </p:nvCxnSpPr>
-        <p:spPr>
-          <a:xfrm flipV="1">
-            <a:off x="1849924" y="3040052"/>
-            <a:ext cx="216105" cy="1"/>
-          </a:xfrm>
-          <a:prstGeom prst="line">
-            <a:avLst/>
-          </a:prstGeom>
-          <a:ln w="19050">
-            <a:solidFill>
-              <a:srgbClr val="7030A0"/>
-            </a:solidFill>
-            <a:prstDash val="sysDot"/>
-            <a:headEnd type="none" w="med" len="med"/>
-            <a:tailEnd type="none" w="med" len="med"/>
-          </a:ln>
-          <a:effectLst/>
-        </p:spPr>
-        <p:style>
-          <a:lnRef idx="1">
-            <a:schemeClr val="accent2"/>
-          </a:lnRef>
-          <a:fillRef idx="2">
-            <a:schemeClr val="accent2"/>
-          </a:fillRef>
-          <a:effectRef idx="1">
-            <a:schemeClr val="accent2"/>
-          </a:effectRef>
-          <a:fontRef idx="minor">
-            <a:schemeClr val="dk1"/>
-          </a:fontRef>
-        </p:style>
-      </p:cxnSp>
-      <p:sp>
-        <p:nvSpPr>
-          <p:cNvPr id="42" name="Flowchart: Decision 96"/>
-          <p:cNvSpPr/>
-          <p:nvPr/>
-        </p:nvSpPr>
-        <p:spPr>
-          <a:xfrm>
-            <a:off x="2373780" y="3549930"/>
-            <a:ext cx="236048" cy="173380"/>
-          </a:xfrm>
-          <a:prstGeom prst="flowChartDecision">
-            <a:avLst/>
-          </a:prstGeom>
-          <a:noFill/>
-          <a:ln w="19050">
-            <a:solidFill>
-              <a:srgbClr val="7030A0"/>
-            </a:solidFill>
-          </a:ln>
-          <a:effectLst/>
-        </p:spPr>
-        <p:style>
-          <a:lnRef idx="1">
-            <a:schemeClr val="accent6"/>
-          </a:lnRef>
-          <a:fillRef idx="2">
-            <a:schemeClr val="accent6"/>
-          </a:fillRef>
-          <a:effectRef idx="1">
-            <a:schemeClr val="accent6"/>
-          </a:effectRef>
-          <a:fontRef idx="minor">
-            <a:schemeClr val="dk1"/>
-          </a:fontRef>
-        </p:style>
-        <p:txBody>
-          <a:bodyPr rtlCol="0" anchor="ctr"/>
-          <a:lstStyle/>
-          <a:p>
-            <a:pPr algn="ctr"/>
-            <a:endParaRPr lang="en-US" sz="1050"/>
-          </a:p>
-        </p:txBody>
-      </p:sp>
-      <p:sp>
-        <p:nvSpPr>
-          <p:cNvPr id="46" name="Rectangle 8"/>
-          <p:cNvSpPr/>
-          <p:nvPr/>
-        </p:nvSpPr>
-        <p:spPr>
-          <a:xfrm>
-            <a:off x="2786406" y="2834911"/>
-            <a:ext cx="1447688" cy="346760"/>
-          </a:xfrm>
-          <a:prstGeom prst="rect">
-            <a:avLst/>
-          </a:prstGeom>
-          <a:ln w="19050">
-            <a:solidFill>
-              <a:srgbClr val="7030A0"/>
-            </a:solidFill>
-          </a:ln>
-          <a:effectLst/>
-        </p:spPr>
-        <p:style>
-          <a:lnRef idx="1">
-            <a:schemeClr val="accent4"/>
-          </a:lnRef>
-          <a:fillRef idx="2">
-            <a:schemeClr val="accent4"/>
-          </a:fillRef>
-          <a:effectRef idx="1">
-            <a:schemeClr val="accent4"/>
-          </a:effectRef>
-          <a:fontRef idx="minor">
-            <a:schemeClr val="dk1"/>
-          </a:fontRef>
-        </p:style>
-        <p:txBody>
-          <a:bodyPr rtlCol="0" anchor="ctr"/>
-          <a:lstStyle/>
-          <a:p>
-            <a:pPr algn="ctr"/>
-            <a:r>
-              <a:rPr lang="en-US" sz="1050" dirty="0" err="1">
-                <a:solidFill>
-                  <a:srgbClr val="7030A0"/>
-                </a:solidFill>
-              </a:rPr>
-              <a:t>VersionedWishBook</a:t>
-            </a:r>
-            <a:endParaRPr lang="en-SG" sz="1050" dirty="0">
-              <a:solidFill>
-                <a:srgbClr val="7030A0"/>
-              </a:solidFill>
-            </a:endParaRPr>
-          </a:p>
-        </p:txBody>
-      </p:sp>
-      <p:cxnSp>
-        <p:nvCxnSpPr>
-          <p:cNvPr id="47" name="Straight Arrow Connector 46"/>
-          <p:cNvCxnSpPr>
-            <a:stCxn id="48" idx="3"/>
-            <a:endCxn id="46" idx="1"/>
-          </p:cNvCxnSpPr>
-          <p:nvPr/>
-        </p:nvCxnSpPr>
-        <p:spPr>
-          <a:xfrm>
-            <a:off x="2624360" y="3003033"/>
-            <a:ext cx="162046" cy="5258"/>
-          </a:xfrm>
-          <a:prstGeom prst="straightConnector1">
-            <a:avLst/>
-          </a:prstGeom>
-          <a:ln w="19050">
-            <a:solidFill>
-              <a:srgbClr val="7030A0"/>
-            </a:solidFill>
-            <a:headEnd type="none" w="med" len="med"/>
-            <a:tailEnd type="arrow" w="med" len="med"/>
-          </a:ln>
-          <a:effectLst/>
-        </p:spPr>
-        <p:style>
-          <a:lnRef idx="1">
-            <a:schemeClr val="accent2"/>
-          </a:lnRef>
-          <a:fillRef idx="2">
-            <a:schemeClr val="accent2"/>
-          </a:fillRef>
-          <a:effectRef idx="1">
-            <a:schemeClr val="accent2"/>
-          </a:effectRef>
-          <a:fontRef idx="minor">
-            <a:schemeClr val="dk1"/>
-          </a:fontRef>
-        </p:style>
-      </p:cxnSp>
-      <p:sp>
-        <p:nvSpPr>
-          <p:cNvPr id="48" name="Flowchart: Decision 96"/>
-          <p:cNvSpPr/>
-          <p:nvPr/>
-        </p:nvSpPr>
-        <p:spPr>
-          <a:xfrm>
-            <a:off x="2388312" y="2916343"/>
-            <a:ext cx="236048" cy="173380"/>
-          </a:xfrm>
-          <a:prstGeom prst="flowChartDecision">
-            <a:avLst/>
-          </a:prstGeom>
-          <a:noFill/>
-          <a:ln w="19050">
-            <a:solidFill>
-              <a:srgbClr val="7030A0"/>
-            </a:solidFill>
-          </a:ln>
-          <a:effectLst/>
-        </p:spPr>
-        <p:style>
-          <a:lnRef idx="1">
-            <a:schemeClr val="accent6"/>
-          </a:lnRef>
-          <a:fillRef idx="2">
-            <a:schemeClr val="accent6"/>
-          </a:fillRef>
-          <a:effectRef idx="1">
-            <a:schemeClr val="accent6"/>
-          </a:effectRef>
-          <a:fontRef idx="minor">
-            <a:schemeClr val="dk1"/>
-          </a:fontRef>
-        </p:style>
-        <p:txBody>
-          <a:bodyPr rtlCol="0" anchor="ctr"/>
-          <a:lstStyle/>
-          <a:p>
-            <a:pPr algn="ctr"/>
-            <a:endParaRPr lang="en-US" sz="1050"/>
-          </a:p>
-        </p:txBody>
-      </p:sp>
-      <p:sp>
-        <p:nvSpPr>
-          <p:cNvPr id="49" name="Rectangle 8"/>
-          <p:cNvSpPr/>
-          <p:nvPr/>
-        </p:nvSpPr>
-        <p:spPr>
-          <a:xfrm>
-            <a:off x="4762209" y="2863434"/>
-            <a:ext cx="1156969" cy="346760"/>
-          </a:xfrm>
-          <a:prstGeom prst="rect">
-            <a:avLst/>
-          </a:prstGeom>
-          <a:ln w="19050">
-            <a:solidFill>
-              <a:srgbClr val="7030A0"/>
-            </a:solidFill>
-          </a:ln>
-          <a:effectLst/>
-        </p:spPr>
-        <p:style>
-          <a:lnRef idx="1">
-            <a:schemeClr val="accent4"/>
-          </a:lnRef>
-          <a:fillRef idx="2">
-            <a:schemeClr val="accent4"/>
-          </a:fillRef>
-          <a:effectRef idx="1">
-            <a:schemeClr val="accent4"/>
-          </a:effectRef>
-          <a:fontRef idx="minor">
-            <a:schemeClr val="dk1"/>
-          </a:fontRef>
-        </p:style>
-        <p:txBody>
-          <a:bodyPr rtlCol="0" anchor="ctr"/>
-          <a:lstStyle/>
-          <a:p>
-            <a:pPr algn="ctr"/>
-            <a:r>
-              <a:rPr lang="en-US" sz="1050" dirty="0" err="1">
-                <a:solidFill>
-                  <a:srgbClr val="7030A0"/>
-                </a:solidFill>
-              </a:rPr>
-              <a:t>UniqueWishList</a:t>
-            </a:r>
-            <a:endParaRPr lang="en-SG" sz="1050" dirty="0">
-              <a:solidFill>
-                <a:srgbClr val="7030A0"/>
-              </a:solidFill>
-            </a:endParaRPr>
-          </a:p>
-        </p:txBody>
-      </p:sp>
-      <p:sp>
-        <p:nvSpPr>
-          <p:cNvPr id="51" name="Flowchart: Decision 96"/>
-          <p:cNvSpPr/>
-          <p:nvPr/>
-        </p:nvSpPr>
-        <p:spPr>
-          <a:xfrm>
-            <a:off x="4233246" y="2948201"/>
-            <a:ext cx="236048" cy="173380"/>
-          </a:xfrm>
-          <a:prstGeom prst="flowChartDecision">
-            <a:avLst/>
-          </a:prstGeom>
-          <a:solidFill>
-            <a:srgbClr val="7030A0"/>
-          </a:solidFill>
-          <a:ln w="19050">
-            <a:solidFill>
-              <a:srgbClr val="7030A0"/>
-            </a:solidFill>
-          </a:ln>
-          <a:effectLst/>
-        </p:spPr>
-        <p:style>
-          <a:lnRef idx="1">
-            <a:schemeClr val="accent6"/>
-          </a:lnRef>
-          <a:fillRef idx="2">
-            <a:schemeClr val="accent6"/>
-          </a:fillRef>
-          <a:effectRef idx="1">
-            <a:schemeClr val="accent6"/>
-          </a:effectRef>
-          <a:fontRef idx="minor">
-            <a:schemeClr val="dk1"/>
-          </a:fontRef>
-        </p:style>
-        <p:txBody>
-          <a:bodyPr rtlCol="0" anchor="ctr"/>
-          <a:lstStyle/>
-          <a:p>
-            <a:pPr algn="ctr"/>
-            <a:endParaRPr lang="en-US" sz="1050"/>
-          </a:p>
-        </p:txBody>
-      </p:sp>
-      <p:cxnSp>
-        <p:nvCxnSpPr>
-          <p:cNvPr id="30" name="Elbow Connector 29"/>
-          <p:cNvCxnSpPr>
-            <a:stCxn id="51" idx="3"/>
-            <a:endCxn id="49" idx="1"/>
-          </p:cNvCxnSpPr>
-          <p:nvPr/>
-        </p:nvCxnSpPr>
-        <p:spPr>
-          <a:xfrm>
-            <a:off x="4469294" y="3034891"/>
-            <a:ext cx="292915" cy="1923"/>
-          </a:xfrm>
-          <a:prstGeom prst="bentConnector3">
-            <a:avLst/>
-          </a:prstGeom>
-          <a:ln w="19050">
-            <a:solidFill>
-              <a:srgbClr val="7030A0"/>
-            </a:solidFill>
-            <a:headEnd type="none" w="med" len="med"/>
-            <a:tailEnd type="arrow" w="med" len="med"/>
-          </a:ln>
-          <a:effectLst/>
-        </p:spPr>
-        <p:style>
-          <a:lnRef idx="1">
-            <a:schemeClr val="accent2"/>
-          </a:lnRef>
-          <a:fillRef idx="2">
-            <a:schemeClr val="accent2"/>
-          </a:fillRef>
-          <a:effectRef idx="1">
-            <a:schemeClr val="accent2"/>
-          </a:effectRef>
-          <a:fontRef idx="minor">
-            <a:schemeClr val="dk1"/>
-          </a:fontRef>
-        </p:style>
-      </p:cxnSp>
-      <p:sp>
-        <p:nvSpPr>
-          <p:cNvPr id="62" name="Rectangle 8"/>
-          <p:cNvSpPr/>
-          <p:nvPr/>
-        </p:nvSpPr>
-        <p:spPr>
-          <a:xfrm>
-            <a:off x="6313677" y="2858066"/>
-            <a:ext cx="708186" cy="346760"/>
-          </a:xfrm>
-          <a:prstGeom prst="rect">
-            <a:avLst/>
-          </a:prstGeom>
-          <a:ln w="19050">
-            <a:solidFill>
-              <a:srgbClr val="7030A0"/>
-            </a:solidFill>
-          </a:ln>
-          <a:effectLst/>
-        </p:spPr>
-        <p:style>
-          <a:lnRef idx="1">
-            <a:schemeClr val="accent4"/>
-          </a:lnRef>
-          <a:fillRef idx="2">
-            <a:schemeClr val="accent4"/>
-          </a:fillRef>
-          <a:effectRef idx="1">
-            <a:schemeClr val="accent4"/>
-          </a:effectRef>
-          <a:fontRef idx="minor">
-            <a:schemeClr val="dk1"/>
-          </a:fontRef>
-        </p:style>
-        <p:txBody>
-          <a:bodyPr rtlCol="0" anchor="ctr"/>
-          <a:lstStyle/>
-          <a:p>
-            <a:pPr algn="ctr"/>
-            <a:r>
-              <a:rPr lang="en-US" sz="1050" dirty="0">
-                <a:solidFill>
-                  <a:srgbClr val="7030A0"/>
-                </a:solidFill>
-              </a:rPr>
-              <a:t>Wish</a:t>
-            </a:r>
-            <a:endParaRPr lang="en-SG" sz="1050" dirty="0">
-              <a:solidFill>
-                <a:srgbClr val="7030A0"/>
-              </a:solidFill>
-            </a:endParaRPr>
-          </a:p>
-        </p:txBody>
-      </p:sp>
-      <p:sp>
-        <p:nvSpPr>
-          <p:cNvPr id="63" name="Flowchart: Decision 96"/>
-          <p:cNvSpPr/>
-          <p:nvPr/>
-        </p:nvSpPr>
-        <p:spPr>
-          <a:xfrm>
-            <a:off x="5918460" y="2941065"/>
-            <a:ext cx="236048" cy="173380"/>
-          </a:xfrm>
-          <a:prstGeom prst="flowChartDecision">
-            <a:avLst/>
-          </a:prstGeom>
-          <a:noFill/>
-          <a:ln w="19050">
-            <a:solidFill>
-              <a:srgbClr val="7030A0"/>
-            </a:solidFill>
-          </a:ln>
-          <a:effectLst/>
-        </p:spPr>
-        <p:style>
-          <a:lnRef idx="1">
-            <a:schemeClr val="accent6"/>
-          </a:lnRef>
-          <a:fillRef idx="2">
-            <a:schemeClr val="accent6"/>
-          </a:fillRef>
-          <a:effectRef idx="1">
-            <a:schemeClr val="accent6"/>
-          </a:effectRef>
-          <a:fontRef idx="minor">
-            <a:schemeClr val="dk1"/>
-          </a:fontRef>
-        </p:style>
-        <p:txBody>
-          <a:bodyPr rtlCol="0" anchor="ctr"/>
-          <a:lstStyle/>
-          <a:p>
-            <a:pPr algn="ctr"/>
-            <a:endParaRPr lang="en-US" sz="1050"/>
-          </a:p>
-        </p:txBody>
-      </p:sp>
-      <p:cxnSp>
-        <p:nvCxnSpPr>
-          <p:cNvPr id="64" name="Elbow Connector 63"/>
-          <p:cNvCxnSpPr>
-            <a:cxnSpLocks/>
-            <a:stCxn id="63" idx="3"/>
-            <a:endCxn id="62" idx="1"/>
-          </p:cNvCxnSpPr>
-          <p:nvPr/>
-        </p:nvCxnSpPr>
-        <p:spPr>
-          <a:xfrm>
-            <a:off x="6154508" y="3027755"/>
-            <a:ext cx="159169" cy="3691"/>
-          </a:xfrm>
-          <a:prstGeom prst="bentConnector3">
-            <a:avLst/>
-          </a:prstGeom>
-          <a:ln w="19050">
-            <a:solidFill>
-              <a:srgbClr val="7030A0"/>
-            </a:solidFill>
-            <a:headEnd type="none" w="med" len="med"/>
-            <a:tailEnd type="arrow" w="med" len="med"/>
-          </a:ln>
-          <a:effectLst/>
-        </p:spPr>
-        <p:style>
-          <a:lnRef idx="1">
-            <a:schemeClr val="accent2"/>
-          </a:lnRef>
-          <a:fillRef idx="2">
-            <a:schemeClr val="accent2"/>
-          </a:fillRef>
-          <a:effectRef idx="1">
-            <a:schemeClr val="accent2"/>
-          </a:effectRef>
-          <a:fontRef idx="minor">
-            <a:schemeClr val="dk1"/>
-          </a:fontRef>
-        </p:style>
-      </p:cxnSp>
-      <p:sp>
-        <p:nvSpPr>
-          <p:cNvPr id="76" name="Rectangle 8"/>
-          <p:cNvSpPr/>
-          <p:nvPr/>
-        </p:nvSpPr>
-        <p:spPr>
-          <a:xfrm>
-            <a:off x="7712397" y="2564238"/>
-            <a:ext cx="708186" cy="285783"/>
-          </a:xfrm>
-          <a:prstGeom prst="rect">
-            <a:avLst/>
-          </a:prstGeom>
-          <a:ln w="19050">
-            <a:solidFill>
-              <a:srgbClr val="7030A0"/>
-            </a:solidFill>
-          </a:ln>
-          <a:effectLst/>
-        </p:spPr>
-        <p:style>
-          <a:lnRef idx="1">
-            <a:schemeClr val="accent4"/>
-          </a:lnRef>
-          <a:fillRef idx="2">
-            <a:schemeClr val="accent4"/>
-          </a:fillRef>
-          <a:effectRef idx="1">
-            <a:schemeClr val="accent4"/>
-          </a:effectRef>
-          <a:fontRef idx="minor">
-            <a:schemeClr val="dk1"/>
-          </a:fontRef>
-        </p:style>
-        <p:txBody>
-          <a:bodyPr rtlCol="0" anchor="ctr"/>
-          <a:lstStyle/>
-          <a:p>
-            <a:pPr algn="ctr"/>
-            <a:r>
-              <a:rPr lang="en-US" sz="1050" dirty="0">
-                <a:solidFill>
-                  <a:srgbClr val="7030A0"/>
-                </a:solidFill>
-              </a:rPr>
-              <a:t>Name</a:t>
-            </a:r>
-            <a:endParaRPr lang="en-SG" sz="1050" dirty="0">
-              <a:solidFill>
-                <a:srgbClr val="7030A0"/>
-              </a:solidFill>
-            </a:endParaRPr>
-          </a:p>
-        </p:txBody>
-      </p:sp>
-      <p:sp>
-        <p:nvSpPr>
-          <p:cNvPr id="78" name="Flowchart: Decision 96"/>
-          <p:cNvSpPr/>
-          <p:nvPr/>
-        </p:nvSpPr>
-        <p:spPr>
-          <a:xfrm>
-            <a:off x="7041947" y="2948201"/>
-            <a:ext cx="236048" cy="173380"/>
-          </a:xfrm>
-          <a:prstGeom prst="flowChartDecision">
-            <a:avLst/>
-          </a:prstGeom>
-          <a:solidFill>
-            <a:srgbClr val="7030A0"/>
-          </a:solidFill>
-          <a:ln w="19050">
-            <a:solidFill>
-              <a:srgbClr val="7030A0"/>
-            </a:solidFill>
-          </a:ln>
-          <a:effectLst/>
-        </p:spPr>
-        <p:style>
-          <a:lnRef idx="1">
-            <a:schemeClr val="accent6"/>
-          </a:lnRef>
-          <a:fillRef idx="2">
-            <a:schemeClr val="accent6"/>
-          </a:fillRef>
-          <a:effectRef idx="1">
-            <a:schemeClr val="accent6"/>
-          </a:effectRef>
-          <a:fontRef idx="minor">
-            <a:schemeClr val="dk1"/>
-          </a:fontRef>
-        </p:style>
-        <p:txBody>
-          <a:bodyPr rtlCol="0" anchor="ctr"/>
-          <a:lstStyle/>
-          <a:p>
-            <a:pPr algn="ctr"/>
-            <a:endParaRPr lang="en-US" sz="1050"/>
-          </a:p>
-        </p:txBody>
-      </p:sp>
-      <p:cxnSp>
-        <p:nvCxnSpPr>
-          <p:cNvPr id="79" name="Elbow Connector 78"/>
-          <p:cNvCxnSpPr>
-            <a:cxnSpLocks/>
-          </p:cNvCxnSpPr>
-          <p:nvPr/>
-        </p:nvCxnSpPr>
-        <p:spPr>
-          <a:xfrm flipV="1">
-            <a:off x="7277995" y="2706821"/>
-            <a:ext cx="434402" cy="327761"/>
-          </a:xfrm>
-          <a:prstGeom prst="bentConnector3">
-            <a:avLst/>
-          </a:prstGeom>
-          <a:ln w="19050">
-            <a:solidFill>
-              <a:srgbClr val="7030A0"/>
-            </a:solidFill>
-            <a:headEnd type="none" w="med" len="med"/>
-            <a:tailEnd type="arrow" w="med" len="med"/>
-          </a:ln>
-          <a:effectLst/>
-        </p:spPr>
-        <p:style>
-          <a:lnRef idx="1">
-            <a:schemeClr val="accent2"/>
-          </a:lnRef>
-          <a:fillRef idx="2">
-            <a:schemeClr val="accent2"/>
-          </a:fillRef>
-          <a:effectRef idx="1">
-            <a:schemeClr val="accent2"/>
-          </a:effectRef>
-          <a:fontRef idx="minor">
-            <a:schemeClr val="dk1"/>
-          </a:fontRef>
-        </p:style>
-      </p:cxnSp>
-      <p:sp>
-        <p:nvSpPr>
-          <p:cNvPr id="80" name="Rectangle 8"/>
-          <p:cNvSpPr/>
-          <p:nvPr/>
-        </p:nvSpPr>
-        <p:spPr>
-          <a:xfrm>
-            <a:off x="7712397" y="2887216"/>
-            <a:ext cx="708186" cy="285783"/>
-          </a:xfrm>
-          <a:prstGeom prst="rect">
-            <a:avLst/>
-          </a:prstGeom>
-          <a:ln w="19050">
-            <a:solidFill>
-              <a:srgbClr val="7030A0"/>
-            </a:solidFill>
-          </a:ln>
-          <a:effectLst/>
-        </p:spPr>
-        <p:style>
-          <a:lnRef idx="1">
-            <a:schemeClr val="accent4"/>
-          </a:lnRef>
-          <a:fillRef idx="2">
-            <a:schemeClr val="accent4"/>
-          </a:fillRef>
-          <a:effectRef idx="1">
-            <a:schemeClr val="accent4"/>
-          </a:effectRef>
-          <a:fontRef idx="minor">
-            <a:schemeClr val="dk1"/>
-          </a:fontRef>
-        </p:style>
-        <p:txBody>
-          <a:bodyPr rtlCol="0" anchor="ctr"/>
-          <a:lstStyle/>
-          <a:p>
-            <a:pPr algn="ctr"/>
-            <a:r>
-              <a:rPr lang="en-US" sz="1050" dirty="0">
-                <a:solidFill>
-                  <a:srgbClr val="7030A0"/>
-                </a:solidFill>
-              </a:rPr>
-              <a:t>Price</a:t>
-            </a:r>
-            <a:endParaRPr lang="en-SG" sz="1050" dirty="0">
-              <a:solidFill>
-                <a:srgbClr val="7030A0"/>
-              </a:solidFill>
-            </a:endParaRPr>
-          </a:p>
-        </p:txBody>
-      </p:sp>
-      <p:cxnSp>
-        <p:nvCxnSpPr>
-          <p:cNvPr id="81" name="Elbow Connector 80"/>
-          <p:cNvCxnSpPr>
-            <a:stCxn id="78" idx="3"/>
-            <a:endCxn id="80" idx="1"/>
-          </p:cNvCxnSpPr>
-          <p:nvPr/>
-        </p:nvCxnSpPr>
-        <p:spPr>
-          <a:xfrm flipV="1">
-            <a:off x="7277995" y="3030108"/>
-            <a:ext cx="434402" cy="4783"/>
-          </a:xfrm>
-          <a:prstGeom prst="bentConnector3">
-            <a:avLst/>
-          </a:prstGeom>
-          <a:ln w="19050">
-            <a:solidFill>
-              <a:srgbClr val="7030A0"/>
-            </a:solidFill>
-            <a:headEnd type="none" w="med" len="med"/>
-            <a:tailEnd type="arrow" w="med" len="med"/>
-          </a:ln>
-          <a:effectLst/>
-        </p:spPr>
-        <p:style>
-          <a:lnRef idx="1">
-            <a:schemeClr val="accent2"/>
-          </a:lnRef>
-          <a:fillRef idx="2">
-            <a:schemeClr val="accent2"/>
-          </a:fillRef>
-          <a:effectRef idx="1">
-            <a:schemeClr val="accent2"/>
-          </a:effectRef>
-          <a:fontRef idx="minor">
-            <a:schemeClr val="dk1"/>
-          </a:fontRef>
-        </p:style>
-      </p:cxnSp>
-      <p:sp>
-        <p:nvSpPr>
-          <p:cNvPr id="83" name="Rectangle 8"/>
-          <p:cNvSpPr/>
-          <p:nvPr/>
-        </p:nvSpPr>
-        <p:spPr>
-          <a:xfrm>
-            <a:off x="7712397" y="3210194"/>
-            <a:ext cx="708186" cy="285783"/>
-          </a:xfrm>
-          <a:prstGeom prst="rect">
-            <a:avLst/>
-          </a:prstGeom>
-          <a:ln w="19050">
-            <a:solidFill>
-              <a:srgbClr val="7030A0"/>
-            </a:solidFill>
-          </a:ln>
-          <a:effectLst/>
-        </p:spPr>
-        <p:style>
-          <a:lnRef idx="1">
-            <a:schemeClr val="accent4"/>
-          </a:lnRef>
-          <a:fillRef idx="2">
-            <a:schemeClr val="accent4"/>
-          </a:fillRef>
-          <a:effectRef idx="1">
-            <a:schemeClr val="accent4"/>
-          </a:effectRef>
-          <a:fontRef idx="minor">
-            <a:schemeClr val="dk1"/>
-          </a:fontRef>
-        </p:style>
-        <p:txBody>
-          <a:bodyPr rtlCol="0" anchor="ctr"/>
-          <a:lstStyle/>
-          <a:p>
-            <a:pPr algn="ctr"/>
-            <a:r>
-              <a:rPr lang="en-US" sz="1050" dirty="0">
-                <a:solidFill>
-                  <a:srgbClr val="7030A0"/>
-                </a:solidFill>
-              </a:rPr>
-              <a:t>Duration</a:t>
-            </a:r>
-            <a:endParaRPr lang="en-SG" sz="1050" dirty="0">
-              <a:solidFill>
-                <a:srgbClr val="7030A0"/>
-              </a:solidFill>
-            </a:endParaRPr>
-          </a:p>
-        </p:txBody>
-      </p:sp>
-      <p:cxnSp>
-        <p:nvCxnSpPr>
-          <p:cNvPr id="84" name="Elbow Connector 83"/>
-          <p:cNvCxnSpPr>
-            <a:stCxn id="78" idx="3"/>
-            <a:endCxn id="83" idx="1"/>
-          </p:cNvCxnSpPr>
-          <p:nvPr/>
-        </p:nvCxnSpPr>
-        <p:spPr>
-          <a:xfrm>
-            <a:off x="7277995" y="3034891"/>
-            <a:ext cx="434402" cy="318195"/>
-          </a:xfrm>
-          <a:prstGeom prst="bentConnector3">
-            <a:avLst/>
-          </a:prstGeom>
-          <a:ln w="19050">
-            <a:solidFill>
-              <a:srgbClr val="7030A0"/>
-            </a:solidFill>
-            <a:headEnd type="none" w="med" len="med"/>
-            <a:tailEnd type="arrow" w="med" len="med"/>
-          </a:ln>
-          <a:effectLst/>
-        </p:spPr>
-        <p:style>
-          <a:lnRef idx="1">
-            <a:schemeClr val="accent2"/>
-          </a:lnRef>
-          <a:fillRef idx="2">
-            <a:schemeClr val="accent2"/>
-          </a:fillRef>
-          <a:effectRef idx="1">
-            <a:schemeClr val="accent2"/>
-          </a:effectRef>
-          <a:fontRef idx="minor">
-            <a:schemeClr val="dk1"/>
-          </a:fontRef>
-        </p:style>
-      </p:cxnSp>
-      <p:sp>
-        <p:nvSpPr>
-          <p:cNvPr id="85" name="Rectangle 8"/>
-          <p:cNvSpPr/>
-          <p:nvPr/>
-        </p:nvSpPr>
-        <p:spPr>
-          <a:xfrm>
-            <a:off x="7712397" y="3524217"/>
-            <a:ext cx="708186" cy="285783"/>
-          </a:xfrm>
-          <a:prstGeom prst="rect">
-            <a:avLst/>
-          </a:prstGeom>
-          <a:ln w="19050">
-            <a:solidFill>
-              <a:srgbClr val="7030A0"/>
-            </a:solidFill>
-          </a:ln>
-          <a:effectLst/>
-        </p:spPr>
-        <p:style>
-          <a:lnRef idx="1">
-            <a:schemeClr val="accent4"/>
-          </a:lnRef>
-          <a:fillRef idx="2">
-            <a:schemeClr val="accent4"/>
-          </a:fillRef>
-          <a:effectRef idx="1">
-            <a:schemeClr val="accent4"/>
-          </a:effectRef>
-          <a:fontRef idx="minor">
-            <a:schemeClr val="dk1"/>
-          </a:fontRef>
-        </p:style>
-        <p:txBody>
-          <a:bodyPr rtlCol="0" anchor="ctr"/>
-          <a:lstStyle/>
-          <a:p>
-            <a:pPr algn="ctr"/>
-            <a:r>
-              <a:rPr lang="en-SG" sz="1050" dirty="0" err="1">
-                <a:solidFill>
-                  <a:srgbClr val="7030A0"/>
-                </a:solidFill>
-              </a:rPr>
-              <a:t>savedAmount</a:t>
-            </a:r>
-            <a:endParaRPr lang="en-SG" sz="1050" dirty="0">
-              <a:solidFill>
-                <a:srgbClr val="7030A0"/>
-              </a:solidFill>
-            </a:endParaRPr>
-          </a:p>
-        </p:txBody>
-      </p:sp>
-      <p:cxnSp>
-        <p:nvCxnSpPr>
-          <p:cNvPr id="86" name="Elbow Connector 85"/>
-          <p:cNvCxnSpPr>
-            <a:stCxn id="78" idx="3"/>
-            <a:endCxn id="85" idx="1"/>
-          </p:cNvCxnSpPr>
-          <p:nvPr/>
-        </p:nvCxnSpPr>
-        <p:spPr>
-          <a:xfrm>
-            <a:off x="7277995" y="3034891"/>
-            <a:ext cx="434402" cy="632218"/>
-          </a:xfrm>
-          <a:prstGeom prst="bentConnector3">
-            <a:avLst/>
-          </a:prstGeom>
-          <a:ln w="19050">
-            <a:solidFill>
-              <a:srgbClr val="7030A0"/>
-            </a:solidFill>
-            <a:headEnd type="none" w="med" len="med"/>
-            <a:tailEnd type="arrow" w="med" len="med"/>
-          </a:ln>
-          <a:effectLst/>
-        </p:spPr>
-        <p:style>
-          <a:lnRef idx="1">
-            <a:schemeClr val="accent2"/>
-          </a:lnRef>
-          <a:fillRef idx="2">
-            <a:schemeClr val="accent2"/>
-          </a:fillRef>
-          <a:effectRef idx="1">
-            <a:schemeClr val="accent2"/>
-          </a:effectRef>
-          <a:fontRef idx="minor">
-            <a:schemeClr val="dk1"/>
-          </a:fontRef>
-        </p:style>
-      </p:cxnSp>
-      <p:sp>
-        <p:nvSpPr>
-          <p:cNvPr id="114" name="TextBox 113"/>
-          <p:cNvSpPr txBox="1"/>
-          <p:nvPr/>
-        </p:nvSpPr>
-        <p:spPr>
-          <a:xfrm rot="16200000">
-            <a:off x="6362886" y="3586305"/>
-            <a:ext cx="881018" cy="261610"/>
-          </a:xfrm>
-          <a:prstGeom prst="rect">
-            <a:avLst/>
-          </a:prstGeom>
-          <a:noFill/>
-        </p:spPr>
-        <p:txBody>
-          <a:bodyPr wrap="square" rtlCol="0">
-            <a:spAutoFit/>
-          </a:bodyPr>
-          <a:lstStyle/>
-          <a:p>
-            <a:pPr algn="r"/>
-            <a:r>
-              <a:rPr lang="en-US" sz="1100" dirty="0">
-                <a:solidFill>
-                  <a:srgbClr val="7030A0"/>
-                </a:solidFill>
-              </a:rPr>
-              <a:t>filtered list</a:t>
-            </a:r>
-            <a:endParaRPr lang="en-SG" sz="1100" dirty="0">
-              <a:solidFill>
-                <a:srgbClr val="7030A0"/>
-              </a:solidFill>
-            </a:endParaRPr>
-          </a:p>
-        </p:txBody>
-      </p:sp>
-      <p:sp>
-        <p:nvSpPr>
-          <p:cNvPr id="122" name="Rectangle 8"/>
-          <p:cNvSpPr/>
-          <p:nvPr/>
-        </p:nvSpPr>
-        <p:spPr>
-          <a:xfrm>
-            <a:off x="2057401" y="4239491"/>
-            <a:ext cx="1066800" cy="346760"/>
-          </a:xfrm>
-          <a:prstGeom prst="rect">
-            <a:avLst/>
-          </a:prstGeom>
-          <a:ln w="19050">
-            <a:solidFill>
-              <a:srgbClr val="7030A0"/>
-            </a:solidFill>
-          </a:ln>
-          <a:effectLst/>
-        </p:spPr>
-        <p:style>
-          <a:lnRef idx="1">
-            <a:schemeClr val="accent4"/>
-          </a:lnRef>
-          <a:fillRef idx="2">
-            <a:schemeClr val="accent4"/>
-          </a:fillRef>
-          <a:effectRef idx="1">
-            <a:schemeClr val="accent4"/>
-          </a:effectRef>
-          <a:fontRef idx="minor">
-            <a:schemeClr val="dk1"/>
-          </a:fontRef>
-        </p:style>
-        <p:txBody>
-          <a:bodyPr rtlCol="0" anchor="ctr"/>
-          <a:lstStyle/>
-          <a:p>
-            <a:pPr algn="ctr"/>
-            <a:r>
-              <a:rPr lang="en-US" sz="1050" dirty="0">
-                <a:solidFill>
-                  <a:srgbClr val="7030A0"/>
-                </a:solidFill>
-              </a:rPr>
-              <a:t>&lt;&lt;interface&gt;&gt;</a:t>
-            </a:r>
-            <a:br>
-              <a:rPr lang="en-US" sz="1050">
-                <a:solidFill>
-                  <a:srgbClr val="7030A0"/>
-                </a:solidFill>
-              </a:rPr>
-            </a:br>
-            <a:r>
-              <a:rPr lang="en-US" sz="1050" dirty="0" err="1">
-                <a:solidFill>
-                  <a:srgbClr val="7030A0"/>
-                </a:solidFill>
-              </a:rPr>
-              <a:t>ObservableList</a:t>
-            </a:r>
-            <a:endParaRPr lang="en-SG" sz="1050" dirty="0">
-              <a:solidFill>
-                <a:srgbClr val="7030A0"/>
-              </a:solidFill>
-            </a:endParaRPr>
-          </a:p>
-        </p:txBody>
-      </p:sp>
-      <p:cxnSp>
-        <p:nvCxnSpPr>
-          <p:cNvPr id="124" name="Elbow Connector 122"/>
-          <p:cNvCxnSpPr>
-            <a:stCxn id="119" idx="1"/>
-            <a:endCxn id="122" idx="1"/>
-          </p:cNvCxnSpPr>
-          <p:nvPr/>
-        </p:nvCxnSpPr>
-        <p:spPr>
-          <a:xfrm rot="16200000" flipH="1">
-            <a:off x="1364475" y="3719944"/>
-            <a:ext cx="831471" cy="554381"/>
-          </a:xfrm>
-          <a:prstGeom prst="bentConnector2">
-            <a:avLst/>
-          </a:prstGeom>
-          <a:ln w="19050">
-            <a:solidFill>
-              <a:srgbClr val="7030A0"/>
-            </a:solidFill>
-            <a:prstDash val="sysDot"/>
-            <a:headEnd type="none" w="med" len="med"/>
-            <a:tailEnd type="arrow" w="med" len="med"/>
-          </a:ln>
-          <a:effectLst/>
-        </p:spPr>
-        <p:style>
-          <a:lnRef idx="1">
-            <a:schemeClr val="accent2"/>
-          </a:lnRef>
-          <a:fillRef idx="2">
-            <a:schemeClr val="accent2"/>
-          </a:fillRef>
-          <a:effectRef idx="1">
-            <a:schemeClr val="accent2"/>
-          </a:effectRef>
-          <a:fontRef idx="minor">
-            <a:schemeClr val="dk1"/>
-          </a:fontRef>
-        </p:style>
-      </p:cxnSp>
-      <p:sp>
-        <p:nvSpPr>
-          <p:cNvPr id="54" name="TextBox 53"/>
-          <p:cNvSpPr txBox="1"/>
-          <p:nvPr/>
-        </p:nvSpPr>
-        <p:spPr>
-          <a:xfrm>
-            <a:off x="4324972" y="3058864"/>
-            <a:ext cx="189257" cy="178683"/>
-          </a:xfrm>
-          <a:prstGeom prst="rect">
-            <a:avLst/>
-          </a:prstGeom>
-          <a:noFill/>
-        </p:spPr>
-        <p:txBody>
-          <a:bodyPr wrap="square" lIns="0" tIns="0" rIns="0" bIns="0" rtlCol="0">
-            <a:noAutofit/>
-          </a:bodyPr>
-          <a:lstStyle/>
-          <a:p>
-            <a:pPr algn="ctr"/>
-            <a:r>
-              <a:rPr lang="en-US" sz="1100" dirty="0">
-                <a:solidFill>
-                  <a:srgbClr val="7030A0"/>
-                </a:solidFill>
-              </a:rPr>
-              <a:t>1</a:t>
-            </a:r>
-            <a:endParaRPr lang="en-SG" sz="1100" dirty="0">
-              <a:solidFill>
-                <a:srgbClr val="7030A0"/>
-              </a:solidFill>
-            </a:endParaRPr>
-          </a:p>
-        </p:txBody>
-      </p:sp>
-      <p:sp>
-        <p:nvSpPr>
-          <p:cNvPr id="61" name="TextBox 60"/>
-          <p:cNvSpPr txBox="1"/>
-          <p:nvPr/>
-        </p:nvSpPr>
-        <p:spPr>
-          <a:xfrm>
-            <a:off x="6135256" y="3097917"/>
-            <a:ext cx="189257" cy="178683"/>
-          </a:xfrm>
-          <a:prstGeom prst="rect">
-            <a:avLst/>
-          </a:prstGeom>
-          <a:noFill/>
-        </p:spPr>
-        <p:txBody>
-          <a:bodyPr wrap="square" lIns="0" tIns="0" rIns="0" bIns="0" rtlCol="0">
-            <a:noAutofit/>
-          </a:bodyPr>
-          <a:lstStyle/>
-          <a:p>
-            <a:pPr algn="ctr"/>
-            <a:r>
-              <a:rPr lang="en-US" sz="1100" dirty="0">
-                <a:solidFill>
-                  <a:srgbClr val="7030A0"/>
-                </a:solidFill>
-              </a:rPr>
-              <a:t>*</a:t>
-            </a:r>
-            <a:endParaRPr lang="en-SG" sz="1100" dirty="0">
-              <a:solidFill>
-                <a:srgbClr val="7030A0"/>
-              </a:solidFill>
-            </a:endParaRPr>
-          </a:p>
-        </p:txBody>
-      </p:sp>
-      <p:sp>
-        <p:nvSpPr>
-          <p:cNvPr id="65" name="TextBox 64"/>
-          <p:cNvSpPr txBox="1"/>
-          <p:nvPr/>
-        </p:nvSpPr>
-        <p:spPr>
-          <a:xfrm>
-            <a:off x="2560167" y="2753818"/>
-            <a:ext cx="78378" cy="193767"/>
-          </a:xfrm>
-          <a:prstGeom prst="rect">
-            <a:avLst/>
-          </a:prstGeom>
-          <a:noFill/>
-        </p:spPr>
-        <p:txBody>
-          <a:bodyPr wrap="square" lIns="0" tIns="0" rIns="0" bIns="0" rtlCol="0">
-            <a:noAutofit/>
-          </a:bodyPr>
-          <a:lstStyle/>
-          <a:p>
-            <a:pPr algn="ctr"/>
-            <a:r>
-              <a:rPr lang="en-US" sz="1100" dirty="0">
-                <a:solidFill>
-                  <a:srgbClr val="7030A0"/>
-                </a:solidFill>
-              </a:rPr>
-              <a:t>1</a:t>
-            </a:r>
-            <a:endParaRPr lang="en-SG" sz="1100" dirty="0">
-              <a:solidFill>
-                <a:srgbClr val="7030A0"/>
-              </a:solidFill>
-            </a:endParaRPr>
-          </a:p>
-        </p:txBody>
-      </p:sp>
-      <p:sp>
-        <p:nvSpPr>
-          <p:cNvPr id="66" name="TextBox 65"/>
-          <p:cNvSpPr txBox="1"/>
-          <p:nvPr/>
-        </p:nvSpPr>
-        <p:spPr>
-          <a:xfrm>
-            <a:off x="2707070" y="3667737"/>
-            <a:ext cx="189257" cy="178683"/>
-          </a:xfrm>
-          <a:prstGeom prst="rect">
-            <a:avLst/>
-          </a:prstGeom>
-          <a:noFill/>
-        </p:spPr>
-        <p:txBody>
-          <a:bodyPr wrap="square" lIns="0" tIns="0" rIns="0" bIns="0" rtlCol="0">
-            <a:noAutofit/>
-          </a:bodyPr>
-          <a:lstStyle/>
-          <a:p>
-            <a:pPr algn="ctr"/>
-            <a:r>
-              <a:rPr lang="en-US" sz="1100" dirty="0">
-                <a:solidFill>
-                  <a:srgbClr val="7030A0"/>
-                </a:solidFill>
-              </a:rPr>
-              <a:t>1</a:t>
-            </a:r>
-            <a:endParaRPr lang="en-SG" sz="1100" dirty="0">
-              <a:solidFill>
-                <a:srgbClr val="7030A0"/>
-              </a:solidFill>
-            </a:endParaRPr>
-          </a:p>
-        </p:txBody>
-      </p:sp>
-      <p:sp>
-        <p:nvSpPr>
-          <p:cNvPr id="70" name="TextBox 69"/>
-          <p:cNvSpPr txBox="1"/>
-          <p:nvPr/>
-        </p:nvSpPr>
-        <p:spPr>
-          <a:xfrm>
-            <a:off x="6449896" y="3204826"/>
-            <a:ext cx="189257" cy="178683"/>
-          </a:xfrm>
-          <a:prstGeom prst="rect">
-            <a:avLst/>
-          </a:prstGeom>
-          <a:noFill/>
-        </p:spPr>
-        <p:txBody>
-          <a:bodyPr wrap="square" lIns="0" tIns="0" rIns="0" bIns="0" rtlCol="0">
-            <a:noAutofit/>
-          </a:bodyPr>
-          <a:lstStyle/>
-          <a:p>
-            <a:pPr algn="ctr"/>
-            <a:r>
-              <a:rPr lang="en-US" sz="1100" dirty="0">
-                <a:solidFill>
-                  <a:srgbClr val="7030A0"/>
-                </a:solidFill>
-              </a:rPr>
-              <a:t>1</a:t>
-            </a:r>
-            <a:endParaRPr lang="en-SG" sz="1100" dirty="0">
-              <a:solidFill>
-                <a:srgbClr val="7030A0"/>
-              </a:solidFill>
-            </a:endParaRPr>
-          </a:p>
-        </p:txBody>
-      </p:sp>
-      <p:sp>
-        <p:nvSpPr>
-          <p:cNvPr id="52" name="Rectangle 8">
-            <a:extLst>
-              <a:ext uri="{FF2B5EF4-FFF2-40B4-BE49-F238E27FC236}">
-                <a16:creationId xmlns:a16="http://schemas.microsoft.com/office/drawing/2014/main" id="{ABDCDBD2-131A-4B66-A2F2-43BBEE82C773}"/>
-              </a:ext>
-            </a:extLst>
-          </p:cNvPr>
-          <p:cNvSpPr/>
-          <p:nvPr/>
-        </p:nvSpPr>
-        <p:spPr>
-          <a:xfrm>
-            <a:off x="4755872" y="2206861"/>
-            <a:ext cx="1156969" cy="285783"/>
-          </a:xfrm>
-          <a:prstGeom prst="rect">
-            <a:avLst/>
-          </a:prstGeom>
-          <a:ln w="19050">
-            <a:solidFill>
-              <a:srgbClr val="7030A0"/>
-            </a:solidFill>
-          </a:ln>
-          <a:effectLst/>
-        </p:spPr>
-        <p:style>
-          <a:lnRef idx="1">
-            <a:schemeClr val="accent4"/>
-          </a:lnRef>
-          <a:fillRef idx="2">
-            <a:schemeClr val="accent4"/>
-          </a:fillRef>
-          <a:effectRef idx="1">
-            <a:schemeClr val="accent4"/>
-          </a:effectRef>
-          <a:fontRef idx="minor">
-            <a:schemeClr val="dk1"/>
-          </a:fontRef>
-        </p:style>
-        <p:txBody>
-          <a:bodyPr rtlCol="0" anchor="ctr"/>
-          <a:lstStyle/>
-          <a:p>
-            <a:pPr algn="ctr"/>
-            <a:r>
-              <a:rPr lang="en-US" sz="1050" dirty="0" err="1">
-                <a:solidFill>
-                  <a:srgbClr val="7030A0"/>
-                </a:solidFill>
-              </a:rPr>
-              <a:t>UniqueTagList</a:t>
-            </a:r>
-            <a:endParaRPr lang="en-SG" sz="1050" dirty="0">
-              <a:solidFill>
-                <a:srgbClr val="7030A0"/>
-              </a:solidFill>
-            </a:endParaRPr>
-          </a:p>
-        </p:txBody>
-      </p:sp>
-      <p:cxnSp>
-        <p:nvCxnSpPr>
-          <p:cNvPr id="53" name="Elbow Connector 78">
-            <a:extLst>
-              <a:ext uri="{FF2B5EF4-FFF2-40B4-BE49-F238E27FC236}">
-                <a16:creationId xmlns:a16="http://schemas.microsoft.com/office/drawing/2014/main" id="{B97967F8-618A-448B-81FD-CDFD4AF0EC64}"/>
-              </a:ext>
-            </a:extLst>
-          </p:cNvPr>
-          <p:cNvCxnSpPr>
-            <a:cxnSpLocks/>
-            <a:stCxn id="54" idx="0"/>
-            <a:endCxn id="52" idx="1"/>
-          </p:cNvCxnSpPr>
-          <p:nvPr/>
-        </p:nvCxnSpPr>
-        <p:spPr>
-          <a:xfrm rot="5400000" flipH="1" flipV="1">
-            <a:off x="4233181" y="2536174"/>
-            <a:ext cx="709111" cy="336271"/>
-          </a:xfrm>
-          <a:prstGeom prst="bentConnector2">
-            <a:avLst/>
-          </a:prstGeom>
-          <a:ln w="19050">
-            <a:solidFill>
-              <a:srgbClr val="7030A0"/>
-            </a:solidFill>
-            <a:headEnd type="none" w="med" len="med"/>
-            <a:tailEnd type="arrow" w="med" len="med"/>
-          </a:ln>
-          <a:effectLst/>
-        </p:spPr>
-        <p:style>
-          <a:lnRef idx="1">
-            <a:schemeClr val="accent2"/>
-          </a:lnRef>
-          <a:fillRef idx="2">
-            <a:schemeClr val="accent2"/>
-          </a:fillRef>
-          <a:effectRef idx="1">
-            <a:schemeClr val="accent2"/>
-          </a:effectRef>
-          <a:fontRef idx="minor">
-            <a:schemeClr val="dk1"/>
-          </a:fontRef>
-        </p:style>
-      </p:cxnSp>
-      <p:sp>
-        <p:nvSpPr>
-          <p:cNvPr id="50" name="TextBox 49">
-            <a:extLst>
-              <a:ext uri="{FF2B5EF4-FFF2-40B4-BE49-F238E27FC236}">
-                <a16:creationId xmlns:a16="http://schemas.microsoft.com/office/drawing/2014/main" id="{B3FA9D57-880F-49C4-AD0B-A64E30D6F403}"/>
-              </a:ext>
-            </a:extLst>
-          </p:cNvPr>
-          <p:cNvSpPr txBox="1"/>
-          <p:nvPr/>
-        </p:nvSpPr>
-        <p:spPr>
-          <a:xfrm>
-            <a:off x="6714344" y="2430721"/>
-            <a:ext cx="189257" cy="178683"/>
-          </a:xfrm>
-          <a:prstGeom prst="rect">
-            <a:avLst/>
-          </a:prstGeom>
-          <a:noFill/>
-        </p:spPr>
-        <p:txBody>
-          <a:bodyPr wrap="square" lIns="0" tIns="0" rIns="0" bIns="0" rtlCol="0">
-            <a:noAutofit/>
-          </a:bodyPr>
-          <a:lstStyle/>
-          <a:p>
-            <a:pPr algn="ctr"/>
-            <a:r>
-              <a:rPr lang="en-US" sz="1100" dirty="0">
-                <a:solidFill>
-                  <a:srgbClr val="7030A0"/>
-                </a:solidFill>
-              </a:rPr>
-              <a:t>*</a:t>
-            </a:r>
-            <a:endParaRPr lang="en-SG" sz="1100" dirty="0">
-              <a:solidFill>
-                <a:srgbClr val="7030A0"/>
-              </a:solidFill>
-            </a:endParaRPr>
-          </a:p>
-        </p:txBody>
-      </p:sp>
-      <p:sp>
-        <p:nvSpPr>
-          <p:cNvPr id="55" name="Flowchart: Decision 96">
-            <a:extLst>
-              <a:ext uri="{FF2B5EF4-FFF2-40B4-BE49-F238E27FC236}">
-                <a16:creationId xmlns:a16="http://schemas.microsoft.com/office/drawing/2014/main" id="{B9F96195-942D-4692-91B7-CF34229E7461}"/>
-              </a:ext>
-            </a:extLst>
-          </p:cNvPr>
-          <p:cNvSpPr/>
-          <p:nvPr/>
-        </p:nvSpPr>
-        <p:spPr>
-          <a:xfrm rot="16200000">
-            <a:off x="6553482" y="2664721"/>
-            <a:ext cx="236048" cy="173380"/>
-          </a:xfrm>
-          <a:prstGeom prst="flowChartDecision">
-            <a:avLst/>
-          </a:prstGeom>
-          <a:noFill/>
-          <a:ln w="19050">
-            <a:solidFill>
-              <a:srgbClr val="7030A0"/>
-            </a:solidFill>
-          </a:ln>
-          <a:effectLst/>
-        </p:spPr>
-        <p:style>
-          <a:lnRef idx="1">
-            <a:schemeClr val="accent6"/>
-          </a:lnRef>
-          <a:fillRef idx="2">
-            <a:schemeClr val="accent6"/>
-          </a:fillRef>
-          <a:effectRef idx="1">
-            <a:schemeClr val="accent6"/>
-          </a:effectRef>
-          <a:fontRef idx="minor">
-            <a:schemeClr val="dk1"/>
-          </a:fontRef>
-        </p:style>
-        <p:txBody>
-          <a:bodyPr rtlCol="0" anchor="ctr"/>
-          <a:lstStyle/>
-          <a:p>
-            <a:pPr algn="ctr"/>
-            <a:endParaRPr lang="en-US" sz="1050"/>
-          </a:p>
-        </p:txBody>
-      </p:sp>
-      <p:cxnSp>
-        <p:nvCxnSpPr>
-          <p:cNvPr id="59" name="Elbow Connector 63">
-            <a:extLst>
-              <a:ext uri="{FF2B5EF4-FFF2-40B4-BE49-F238E27FC236}">
-                <a16:creationId xmlns:a16="http://schemas.microsoft.com/office/drawing/2014/main" id="{E2D6A56C-A223-4236-A1F0-7EFEBA2FC940}"/>
-              </a:ext>
-            </a:extLst>
-          </p:cNvPr>
-          <p:cNvCxnSpPr>
-            <a:cxnSpLocks/>
-            <a:endCxn id="67" idx="1"/>
-          </p:cNvCxnSpPr>
-          <p:nvPr/>
-        </p:nvCxnSpPr>
-        <p:spPr>
-          <a:xfrm flipV="1">
-            <a:off x="5884280" y="2233006"/>
-            <a:ext cx="432916" cy="111294"/>
-          </a:xfrm>
-          <a:prstGeom prst="bentConnector3">
-            <a:avLst/>
-          </a:prstGeom>
-          <a:ln w="19050">
-            <a:solidFill>
-              <a:srgbClr val="7030A0"/>
-            </a:solidFill>
-            <a:headEnd type="none" w="med" len="med"/>
-            <a:tailEnd type="arrow" w="med" len="med"/>
-          </a:ln>
-          <a:effectLst/>
-        </p:spPr>
-        <p:style>
-          <a:lnRef idx="1">
-            <a:schemeClr val="accent2"/>
-          </a:lnRef>
-          <a:fillRef idx="2">
-            <a:schemeClr val="accent2"/>
-          </a:fillRef>
-          <a:effectRef idx="1">
-            <a:schemeClr val="accent2"/>
-          </a:effectRef>
-          <a:fontRef idx="minor">
-            <a:schemeClr val="dk1"/>
-          </a:fontRef>
-        </p:style>
-      </p:cxnSp>
-      <p:sp>
-        <p:nvSpPr>
-          <p:cNvPr id="67" name="Rectangle 8">
-            <a:extLst>
-              <a:ext uri="{FF2B5EF4-FFF2-40B4-BE49-F238E27FC236}">
-                <a16:creationId xmlns:a16="http://schemas.microsoft.com/office/drawing/2014/main" id="{36D68104-33BB-4C8F-B764-F3F0B25E592B}"/>
-              </a:ext>
-            </a:extLst>
-          </p:cNvPr>
-          <p:cNvSpPr/>
-          <p:nvPr/>
-        </p:nvSpPr>
-        <p:spPr>
-          <a:xfrm>
-            <a:off x="6317196" y="2059626"/>
-            <a:ext cx="708186" cy="346760"/>
-          </a:xfrm>
-          <a:prstGeom prst="rect">
-            <a:avLst/>
-          </a:prstGeom>
-          <a:ln w="19050">
-            <a:solidFill>
-              <a:srgbClr val="7030A0"/>
-            </a:solidFill>
-          </a:ln>
-          <a:effectLst/>
-        </p:spPr>
-        <p:style>
-          <a:lnRef idx="1">
-            <a:schemeClr val="accent4"/>
-          </a:lnRef>
-          <a:fillRef idx="2">
-            <a:schemeClr val="accent4"/>
-          </a:fillRef>
-          <a:effectRef idx="1">
-            <a:schemeClr val="accent4"/>
-          </a:effectRef>
-          <a:fontRef idx="minor">
-            <a:schemeClr val="dk1"/>
-          </a:fontRef>
-        </p:style>
-        <p:txBody>
-          <a:bodyPr rtlCol="0" anchor="ctr"/>
-          <a:lstStyle/>
-          <a:p>
-            <a:pPr algn="ctr"/>
-            <a:r>
-              <a:rPr lang="en-US" sz="1050" dirty="0">
-                <a:solidFill>
-                  <a:srgbClr val="7030A0"/>
-                </a:solidFill>
-              </a:rPr>
-              <a:t>Tag</a:t>
-            </a:r>
-            <a:endParaRPr lang="en-SG" sz="1050" dirty="0">
-              <a:solidFill>
-                <a:srgbClr val="7030A0"/>
-              </a:solidFill>
-            </a:endParaRPr>
-          </a:p>
-        </p:txBody>
-      </p:sp>
-      <p:sp>
-        <p:nvSpPr>
-          <p:cNvPr id="68" name="TextBox 67">
-            <a:extLst>
-              <a:ext uri="{FF2B5EF4-FFF2-40B4-BE49-F238E27FC236}">
-                <a16:creationId xmlns:a16="http://schemas.microsoft.com/office/drawing/2014/main" id="{18A2ABF0-4DA8-43EE-BACE-A737C4E4CFEC}"/>
-              </a:ext>
-            </a:extLst>
-          </p:cNvPr>
-          <p:cNvSpPr txBox="1"/>
-          <p:nvPr/>
-        </p:nvSpPr>
-        <p:spPr>
-          <a:xfrm>
-            <a:off x="6135256" y="2278014"/>
-            <a:ext cx="189257" cy="178683"/>
-          </a:xfrm>
-          <a:prstGeom prst="rect">
-            <a:avLst/>
-          </a:prstGeom>
-          <a:noFill/>
-        </p:spPr>
-        <p:txBody>
-          <a:bodyPr wrap="square" lIns="0" tIns="0" rIns="0" bIns="0" rtlCol="0">
-            <a:noAutofit/>
-          </a:bodyPr>
-          <a:lstStyle/>
-          <a:p>
-            <a:pPr algn="ctr"/>
-            <a:r>
-              <a:rPr lang="en-US" sz="1100" dirty="0">
-                <a:solidFill>
-                  <a:srgbClr val="7030A0"/>
-                </a:solidFill>
-              </a:rPr>
-              <a:t>*</a:t>
-            </a:r>
-            <a:endParaRPr lang="en-SG" sz="1100" dirty="0">
-              <a:solidFill>
-                <a:srgbClr val="7030A0"/>
-              </a:solidFill>
-            </a:endParaRPr>
-          </a:p>
-        </p:txBody>
-      </p:sp>
-      <p:sp>
-        <p:nvSpPr>
-          <p:cNvPr id="69" name="TextBox 68">
-            <a:extLst>
-              <a:ext uri="{FF2B5EF4-FFF2-40B4-BE49-F238E27FC236}">
-                <a16:creationId xmlns:a16="http://schemas.microsoft.com/office/drawing/2014/main" id="{8CF9406A-39C7-4163-8880-BB65541FC08E}"/>
-              </a:ext>
-            </a:extLst>
-          </p:cNvPr>
-          <p:cNvSpPr txBox="1"/>
-          <p:nvPr/>
-        </p:nvSpPr>
-        <p:spPr>
-          <a:xfrm>
-            <a:off x="4435090" y="2172972"/>
-            <a:ext cx="189257" cy="178683"/>
-          </a:xfrm>
-          <a:prstGeom prst="rect">
-            <a:avLst/>
-          </a:prstGeom>
-          <a:noFill/>
-        </p:spPr>
-        <p:txBody>
-          <a:bodyPr wrap="square" lIns="0" tIns="0" rIns="0" bIns="0" rtlCol="0">
-            <a:noAutofit/>
-          </a:bodyPr>
-          <a:lstStyle/>
-          <a:p>
-            <a:pPr algn="ctr"/>
-            <a:r>
-              <a:rPr lang="en-US" sz="1100" dirty="0">
-                <a:solidFill>
-                  <a:srgbClr val="7030A0"/>
-                </a:solidFill>
-              </a:rPr>
-              <a:t>1</a:t>
-            </a:r>
-            <a:endParaRPr lang="en-SG" sz="1100" dirty="0">
-              <a:solidFill>
-                <a:srgbClr val="7030A0"/>
-              </a:solidFill>
-            </a:endParaRPr>
-          </a:p>
-        </p:txBody>
-      </p:sp>
-      <p:sp>
-        <p:nvSpPr>
-          <p:cNvPr id="71" name="Flowchart: Decision 96">
-            <a:extLst>
-              <a:ext uri="{FF2B5EF4-FFF2-40B4-BE49-F238E27FC236}">
-                <a16:creationId xmlns:a16="http://schemas.microsoft.com/office/drawing/2014/main" id="{233007D4-EEA2-4CA6-ACFE-1517B654224E}"/>
-              </a:ext>
-            </a:extLst>
-          </p:cNvPr>
-          <p:cNvSpPr/>
-          <p:nvPr/>
-        </p:nvSpPr>
-        <p:spPr>
-          <a:xfrm>
-            <a:off x="5911329" y="2262081"/>
-            <a:ext cx="236048" cy="173380"/>
-          </a:xfrm>
-          <a:prstGeom prst="flowChartDecision">
-            <a:avLst/>
-          </a:prstGeom>
-          <a:solidFill>
-            <a:srgbClr val="7030A0"/>
-          </a:solidFill>
-          <a:ln w="19050">
-            <a:solidFill>
-              <a:srgbClr val="7030A0"/>
-            </a:solidFill>
-          </a:ln>
-          <a:effectLst/>
-        </p:spPr>
-        <p:style>
-          <a:lnRef idx="1">
-            <a:schemeClr val="accent6"/>
-          </a:lnRef>
-          <a:fillRef idx="2">
-            <a:schemeClr val="accent6"/>
-          </a:fillRef>
-          <a:effectRef idx="1">
-            <a:schemeClr val="accent6"/>
-          </a:effectRef>
-          <a:fontRef idx="minor">
-            <a:schemeClr val="dk1"/>
-          </a:fontRef>
-        </p:style>
-        <p:txBody>
-          <a:bodyPr rtlCol="0" anchor="ctr"/>
-          <a:lstStyle/>
-          <a:p>
-            <a:pPr algn="ctr"/>
-            <a:endParaRPr lang="en-US" sz="1050"/>
-          </a:p>
-        </p:txBody>
-      </p:sp>
-      <p:cxnSp>
-        <p:nvCxnSpPr>
-          <p:cNvPr id="72" name="Elbow Connector 78">
-            <a:extLst>
-              <a:ext uri="{FF2B5EF4-FFF2-40B4-BE49-F238E27FC236}">
-                <a16:creationId xmlns:a16="http://schemas.microsoft.com/office/drawing/2014/main" id="{D5DFB8C5-B0B0-46C1-967B-4449112ABD6F}"/>
-              </a:ext>
-            </a:extLst>
-          </p:cNvPr>
-          <p:cNvCxnSpPr>
-            <a:cxnSpLocks/>
-            <a:stCxn id="55" idx="3"/>
-            <a:endCxn id="67" idx="2"/>
-          </p:cNvCxnSpPr>
-          <p:nvPr/>
-        </p:nvCxnSpPr>
-        <p:spPr>
-          <a:xfrm rot="16200000" flipV="1">
-            <a:off x="6557898" y="2519778"/>
-            <a:ext cx="227001" cy="217"/>
-          </a:xfrm>
-          <a:prstGeom prst="bentConnector3">
-            <a:avLst>
-              <a:gd name="adj1" fmla="val 50000"/>
-            </a:avLst>
-          </a:prstGeom>
-          <a:ln w="19050">
-            <a:solidFill>
-              <a:srgbClr val="7030A0"/>
-            </a:solidFill>
-            <a:headEnd type="none" w="med" len="med"/>
-            <a:tailEnd type="arrow" w="med" len="med"/>
-          </a:ln>
-          <a:effectLst/>
-        </p:spPr>
-        <p:style>
-          <a:lnRef idx="1">
-            <a:schemeClr val="accent2"/>
-          </a:lnRef>
-          <a:fillRef idx="2">
-            <a:schemeClr val="accent2"/>
-          </a:fillRef>
-          <a:effectRef idx="1">
-            <a:schemeClr val="accent2"/>
-          </a:effectRef>
-          <a:fontRef idx="minor">
-            <a:schemeClr val="dk1"/>
-          </a:fontRef>
-        </p:style>
-      </p:cxnSp>
-      <p:cxnSp>
-        <p:nvCxnSpPr>
-          <p:cNvPr id="90" name="Elbow Connector 63"/>
-          <p:cNvCxnSpPr>
-            <a:stCxn id="91" idx="3"/>
-          </p:cNvCxnSpPr>
-          <p:nvPr/>
-        </p:nvCxnSpPr>
-        <p:spPr>
-          <a:xfrm rot="5400000">
-            <a:off x="3470636" y="2687353"/>
-            <a:ext cx="293825" cy="5938"/>
-          </a:xfrm>
-          <a:prstGeom prst="bentConnector3">
-            <a:avLst>
-              <a:gd name="adj1" fmla="val 50000"/>
-            </a:avLst>
-          </a:prstGeom>
-          <a:ln w="19050">
-            <a:solidFill>
-              <a:srgbClr val="7030A0"/>
-            </a:solidFill>
-            <a:prstDash val="sysDot"/>
-            <a:headEnd type="none" w="med" len="med"/>
-            <a:tailEnd type="none" w="med" len="med"/>
-          </a:ln>
-          <a:effectLst/>
-        </p:spPr>
-        <p:style>
-          <a:lnRef idx="1">
-            <a:schemeClr val="accent2"/>
-          </a:lnRef>
-          <a:fillRef idx="2">
-            <a:schemeClr val="accent2"/>
-          </a:fillRef>
-          <a:effectRef idx="1">
-            <a:schemeClr val="accent2"/>
-          </a:effectRef>
-          <a:fontRef idx="minor">
-            <a:schemeClr val="dk1"/>
-          </a:fontRef>
-        </p:style>
-      </p:cxnSp>
-      <p:sp>
-        <p:nvSpPr>
-          <p:cNvPr id="91" name="Isosceles Triangle 102"/>
-          <p:cNvSpPr/>
-          <p:nvPr/>
-        </p:nvSpPr>
-        <p:spPr>
-          <a:xfrm rot="10800000" flipV="1">
-            <a:off x="3479324" y="2386348"/>
-            <a:ext cx="282387" cy="157062"/>
-          </a:xfrm>
-          <a:prstGeom prst="triangle">
-            <a:avLst/>
-          </a:prstGeom>
-          <a:ln w="19050">
-            <a:solidFill>
-              <a:srgbClr val="7030A0"/>
-            </a:solidFill>
-          </a:ln>
-          <a:effectLst/>
-        </p:spPr>
-        <p:style>
-          <a:lnRef idx="1">
-            <a:schemeClr val="accent4"/>
-          </a:lnRef>
-          <a:fillRef idx="2">
-            <a:schemeClr val="accent4"/>
-          </a:fillRef>
-          <a:effectRef idx="1">
-            <a:schemeClr val="accent4"/>
-          </a:effectRef>
-          <a:fontRef idx="minor">
-            <a:schemeClr val="dk1"/>
-          </a:fontRef>
-        </p:style>
-        <p:txBody>
-          <a:bodyPr rtlCol="0" anchor="ctr"/>
-          <a:lstStyle/>
-          <a:p>
-            <a:pPr algn="ctr"/>
-            <a:endParaRPr lang="en-SG" sz="1050" b="1">
-              <a:solidFill>
-                <a:srgbClr val="92D050"/>
-              </a:solidFill>
-            </a:endParaRPr>
-          </a:p>
-        </p:txBody>
-      </p:sp>
-      <p:sp>
-        <p:nvSpPr>
-          <p:cNvPr id="92" name="Rectangle 8"/>
-          <p:cNvSpPr/>
-          <p:nvPr/>
-        </p:nvSpPr>
-        <p:spPr>
-          <a:xfrm>
-            <a:off x="1177947" y="1998144"/>
-            <a:ext cx="1443661" cy="364396"/>
-          </a:xfrm>
-          <a:prstGeom prst="rect">
-            <a:avLst/>
-          </a:prstGeom>
-          <a:ln w="19050">
-            <a:solidFill>
-              <a:srgbClr val="7030A0"/>
-            </a:solidFill>
-          </a:ln>
-          <a:effectLst/>
-        </p:spPr>
-        <p:style>
-          <a:lnRef idx="1">
-            <a:schemeClr val="accent4"/>
-          </a:lnRef>
-          <a:fillRef idx="2">
-            <a:schemeClr val="accent4"/>
-          </a:fillRef>
-          <a:effectRef idx="1">
-            <a:schemeClr val="accent4"/>
-          </a:effectRef>
-          <a:fontRef idx="minor">
-            <a:schemeClr val="dk1"/>
-          </a:fontRef>
-        </p:style>
-        <p:txBody>
-          <a:bodyPr rtlCol="0" anchor="ctr"/>
-          <a:lstStyle/>
-          <a:p>
-            <a:pPr algn="ctr"/>
-            <a:r>
-              <a:rPr lang="en-US" sz="1050" dirty="0">
-                <a:solidFill>
-                  <a:srgbClr val="7030A0"/>
-                </a:solidFill>
-              </a:rPr>
-              <a:t>&lt;&lt;interface&gt;&gt;</a:t>
-            </a:r>
-            <a:br>
-              <a:rPr lang="en-US" sz="1050" dirty="0">
-                <a:solidFill>
-                  <a:srgbClr val="7030A0"/>
-                </a:solidFill>
-              </a:rPr>
-            </a:br>
-            <a:r>
-              <a:rPr lang="en-US" sz="1050" dirty="0" err="1">
-                <a:solidFill>
-                  <a:srgbClr val="7030A0"/>
-                </a:solidFill>
-              </a:rPr>
-              <a:t>ReadOnlyWishBook</a:t>
-            </a:r>
-            <a:endParaRPr lang="en-SG" sz="1050" dirty="0">
-              <a:solidFill>
-                <a:srgbClr val="7030A0"/>
-              </a:solidFill>
-            </a:endParaRPr>
-          </a:p>
-        </p:txBody>
-      </p:sp>
-      <p:sp>
-        <p:nvSpPr>
-          <p:cNvPr id="93" name="Rectangle 8"/>
-          <p:cNvSpPr/>
-          <p:nvPr/>
-        </p:nvSpPr>
-        <p:spPr>
-          <a:xfrm>
-            <a:off x="3087206" y="1998144"/>
-            <a:ext cx="1060683" cy="364396"/>
-          </a:xfrm>
-          <a:prstGeom prst="rect">
-            <a:avLst/>
-          </a:prstGeom>
-          <a:ln w="19050">
-            <a:solidFill>
-              <a:srgbClr val="7030A0"/>
-            </a:solidFill>
-          </a:ln>
-          <a:effectLst/>
-        </p:spPr>
-        <p:style>
-          <a:lnRef idx="1">
-            <a:schemeClr val="accent4"/>
-          </a:lnRef>
-          <a:fillRef idx="2">
-            <a:schemeClr val="accent4"/>
-          </a:fillRef>
-          <a:effectRef idx="1">
-            <a:schemeClr val="accent4"/>
-          </a:effectRef>
-          <a:fontRef idx="minor">
-            <a:schemeClr val="dk1"/>
-          </a:fontRef>
-        </p:style>
-        <p:txBody>
-          <a:bodyPr rtlCol="0" anchor="ctr"/>
-          <a:lstStyle/>
-          <a:p>
-            <a:pPr algn="ctr"/>
-            <a:r>
-              <a:rPr lang="en-US" sz="1050" dirty="0" err="1">
-                <a:solidFill>
-                  <a:srgbClr val="7030A0"/>
-                </a:solidFill>
-              </a:rPr>
-              <a:t>WishBook</a:t>
-            </a:r>
-            <a:endParaRPr lang="en-SG" sz="1050" dirty="0">
-              <a:solidFill>
-                <a:srgbClr val="7030A0"/>
-              </a:solidFill>
-            </a:endParaRPr>
-          </a:p>
-        </p:txBody>
-      </p:sp>
-      <p:sp>
-        <p:nvSpPr>
-          <p:cNvPr id="94" name="Isosceles Triangle 102"/>
-          <p:cNvSpPr/>
-          <p:nvPr/>
-        </p:nvSpPr>
-        <p:spPr>
-          <a:xfrm rot="16200000">
-            <a:off x="2586098" y="2068952"/>
-            <a:ext cx="271014" cy="187417"/>
-          </a:xfrm>
-          <a:prstGeom prst="triangle">
-            <a:avLst>
-              <a:gd name="adj" fmla="val 44517"/>
-            </a:avLst>
-          </a:prstGeom>
-          <a:solidFill>
-            <a:schemeClr val="accent4">
-              <a:lumMod val="20000"/>
-              <a:lumOff val="80000"/>
-            </a:schemeClr>
-          </a:solidFill>
-          <a:ln w="19050">
-            <a:solidFill>
-              <a:srgbClr val="7030A0"/>
-            </a:solidFill>
-          </a:ln>
-          <a:effectLst/>
-        </p:spPr>
-        <p:style>
-          <a:lnRef idx="1">
-            <a:schemeClr val="accent6"/>
-          </a:lnRef>
-          <a:fillRef idx="2">
-            <a:schemeClr val="accent6"/>
-          </a:fillRef>
-          <a:effectRef idx="1">
-            <a:schemeClr val="accent6"/>
-          </a:effectRef>
-          <a:fontRef idx="minor">
-            <a:schemeClr val="dk1"/>
-          </a:fontRef>
-        </p:style>
-        <p:txBody>
-          <a:bodyPr rtlCol="0" anchor="ctr"/>
-          <a:lstStyle/>
-          <a:p>
-            <a:pPr algn="ctr"/>
-            <a:endParaRPr lang="en-SG" sz="1050"/>
-          </a:p>
-        </p:txBody>
-      </p:sp>
-      <p:cxnSp>
-        <p:nvCxnSpPr>
-          <p:cNvPr id="95" name="Elbow Connector 63"/>
-          <p:cNvCxnSpPr>
-            <a:stCxn id="94" idx="3"/>
-            <a:endCxn id="93" idx="1"/>
-          </p:cNvCxnSpPr>
-          <p:nvPr/>
-        </p:nvCxnSpPr>
-        <p:spPr>
-          <a:xfrm>
-            <a:off x="2815314" y="2177521"/>
-            <a:ext cx="271892" cy="2821"/>
-          </a:xfrm>
-          <a:prstGeom prst="bentConnector3">
-            <a:avLst>
-              <a:gd name="adj1" fmla="val 50000"/>
-            </a:avLst>
-          </a:prstGeom>
-          <a:ln w="19050">
-            <a:solidFill>
-              <a:srgbClr val="7030A0"/>
-            </a:solidFill>
-            <a:prstDash val="sysDot"/>
-            <a:headEnd type="none" w="med" len="med"/>
-            <a:tailEnd type="none" w="med" len="med"/>
-          </a:ln>
-          <a:effectLst/>
-        </p:spPr>
-        <p:style>
-          <a:lnRef idx="1">
-            <a:schemeClr val="accent2"/>
-          </a:lnRef>
-          <a:fillRef idx="2">
-            <a:schemeClr val="accent2"/>
-          </a:fillRef>
-          <a:effectRef idx="1">
-            <a:schemeClr val="accent2"/>
-          </a:effectRef>
-          <a:fontRef idx="minor">
-            <a:schemeClr val="dk1"/>
-          </a:fontRef>
-        </p:style>
-      </p:cxnSp>
-      <p:cxnSp>
-        <p:nvCxnSpPr>
-          <p:cNvPr id="82" name="Elbow Connector 78">
-            <a:extLst>
-              <a:ext uri="{FF2B5EF4-FFF2-40B4-BE49-F238E27FC236}">
-                <a16:creationId xmlns:a16="http://schemas.microsoft.com/office/drawing/2014/main" id="{40F0CCFC-B539-432E-B250-440E301ACC11}"/>
-              </a:ext>
-            </a:extLst>
-          </p:cNvPr>
-          <p:cNvCxnSpPr>
-            <a:cxnSpLocks/>
-          </p:cNvCxnSpPr>
-          <p:nvPr/>
-        </p:nvCxnSpPr>
-        <p:spPr>
-          <a:xfrm flipV="1">
-            <a:off x="7277995" y="2371709"/>
-            <a:ext cx="434402" cy="663182"/>
-          </a:xfrm>
-          <a:prstGeom prst="bentConnector3">
-            <a:avLst>
-              <a:gd name="adj1" fmla="val 50000"/>
-            </a:avLst>
-          </a:prstGeom>
-          <a:ln w="19050">
-            <a:solidFill>
-              <a:srgbClr val="7030A0"/>
-            </a:solidFill>
-            <a:headEnd type="none" w="med" len="med"/>
-            <a:tailEnd type="arrow" w="med" len="med"/>
-          </a:ln>
-          <a:effectLst/>
-        </p:spPr>
-        <p:style>
-          <a:lnRef idx="1">
-            <a:schemeClr val="accent2"/>
-          </a:lnRef>
-          <a:fillRef idx="2">
-            <a:schemeClr val="accent2"/>
-          </a:fillRef>
-          <a:effectRef idx="1">
-            <a:schemeClr val="accent2"/>
-          </a:effectRef>
-          <a:fontRef idx="minor">
-            <a:schemeClr val="dk1"/>
-          </a:fontRef>
-        </p:style>
-      </p:cxnSp>
-      <p:sp>
-        <p:nvSpPr>
-          <p:cNvPr id="87" name="Rectangle 8">
-            <a:extLst>
-              <a:ext uri="{FF2B5EF4-FFF2-40B4-BE49-F238E27FC236}">
-                <a16:creationId xmlns:a16="http://schemas.microsoft.com/office/drawing/2014/main" id="{639CEC8B-F7BC-4EB0-A49A-E2D79338A141}"/>
-              </a:ext>
-            </a:extLst>
-          </p:cNvPr>
-          <p:cNvSpPr/>
-          <p:nvPr/>
-        </p:nvSpPr>
-        <p:spPr>
-          <a:xfrm>
-            <a:off x="7712408" y="2241348"/>
-            <a:ext cx="708186" cy="285783"/>
-          </a:xfrm>
-          <a:prstGeom prst="rect">
-            <a:avLst/>
-          </a:prstGeom>
-          <a:ln w="19050">
-            <a:solidFill>
-              <a:srgbClr val="7030A0"/>
-            </a:solidFill>
-          </a:ln>
-          <a:effectLst/>
-        </p:spPr>
-        <p:style>
-          <a:lnRef idx="1">
-            <a:schemeClr val="accent4"/>
-          </a:lnRef>
-          <a:fillRef idx="2">
-            <a:schemeClr val="accent4"/>
-          </a:fillRef>
-          <a:effectRef idx="1">
-            <a:schemeClr val="accent4"/>
-          </a:effectRef>
-          <a:fontRef idx="minor">
-            <a:schemeClr val="dk1"/>
-          </a:fontRef>
-        </p:style>
-        <p:txBody>
-          <a:bodyPr rtlCol="0" anchor="ctr"/>
-          <a:lstStyle/>
-          <a:p>
-            <a:pPr algn="ctr"/>
-            <a:r>
-              <a:rPr lang="en-US" sz="1050" dirty="0">
-                <a:solidFill>
-                  <a:srgbClr val="7030A0"/>
-                </a:solidFill>
-              </a:rPr>
-              <a:t>URL</a:t>
-            </a:r>
-            <a:endParaRPr lang="en-SG" sz="1050" dirty="0">
-              <a:solidFill>
-                <a:srgbClr val="7030A0"/>
-              </a:solidFill>
-            </a:endParaRPr>
-          </a:p>
-        </p:txBody>
-      </p:sp>
+      </p:pic>
     </p:spTree>
     <p:extLst>
       <p:ext uri="{BB962C8B-B14F-4D97-AF65-F5344CB8AC3E}">

</xml_diff>

<commit_message>
Update DG (Model diagram)
</commit_message>
<xml_diff>
--- a/docs/diagrams/ModelComponentClassBetterOopDiagram.pptx
+++ b/docs/diagrams/ModelComponentClassBetterOopDiagram.pptx
@@ -208,7 +208,7 @@
           <a:p>
             <a:fld id="{F5CC4B3F-88C1-4FFA-B1B6-F41C21DC6924}" type="datetimeFigureOut">
               <a:rPr lang="en-US" smtClean="0"/>
-              <a:t>10/30/2018</a:t>
+              <a:t>12-Nov-18</a:t>
             </a:fld>
             <a:endParaRPr lang="en-US"/>
           </a:p>
@@ -654,7 +654,7 @@
           <a:p>
             <a:fld id="{78C97017-6FC3-485B-9764-EAC9E56C1D49}" type="datetimeFigureOut">
               <a:rPr lang="en-US" smtClean="0"/>
-              <a:t>10/30/2018</a:t>
+              <a:t>12-Nov-18</a:t>
             </a:fld>
             <a:endParaRPr lang="en-US"/>
           </a:p>
@@ -822,7 +822,7 @@
           <a:p>
             <a:fld id="{78C97017-6FC3-485B-9764-EAC9E56C1D49}" type="datetimeFigureOut">
               <a:rPr lang="en-US" smtClean="0"/>
-              <a:t>10/30/2018</a:t>
+              <a:t>12-Nov-18</a:t>
             </a:fld>
             <a:endParaRPr lang="en-US"/>
           </a:p>
@@ -1000,7 +1000,7 @@
           <a:p>
             <a:fld id="{78C97017-6FC3-485B-9764-EAC9E56C1D49}" type="datetimeFigureOut">
               <a:rPr lang="en-US" smtClean="0"/>
-              <a:t>10/30/2018</a:t>
+              <a:t>12-Nov-18</a:t>
             </a:fld>
             <a:endParaRPr lang="en-US"/>
           </a:p>
@@ -1168,7 +1168,7 @@
           <a:p>
             <a:fld id="{78C97017-6FC3-485B-9764-EAC9E56C1D49}" type="datetimeFigureOut">
               <a:rPr lang="en-US" smtClean="0"/>
-              <a:t>10/30/2018</a:t>
+              <a:t>12-Nov-18</a:t>
             </a:fld>
             <a:endParaRPr lang="en-US"/>
           </a:p>
@@ -1413,7 +1413,7 @@
           <a:p>
             <a:fld id="{78C97017-6FC3-485B-9764-EAC9E56C1D49}" type="datetimeFigureOut">
               <a:rPr lang="en-US" smtClean="0"/>
-              <a:t>10/30/2018</a:t>
+              <a:t>12-Nov-18</a:t>
             </a:fld>
             <a:endParaRPr lang="en-US"/>
           </a:p>
@@ -1698,7 +1698,7 @@
           <a:p>
             <a:fld id="{78C97017-6FC3-485B-9764-EAC9E56C1D49}" type="datetimeFigureOut">
               <a:rPr lang="en-US" smtClean="0"/>
-              <a:t>10/30/2018</a:t>
+              <a:t>12-Nov-18</a:t>
             </a:fld>
             <a:endParaRPr lang="en-US"/>
           </a:p>
@@ -2117,7 +2117,7 @@
           <a:p>
             <a:fld id="{78C97017-6FC3-485B-9764-EAC9E56C1D49}" type="datetimeFigureOut">
               <a:rPr lang="en-US" smtClean="0"/>
-              <a:t>10/30/2018</a:t>
+              <a:t>12-Nov-18</a:t>
             </a:fld>
             <a:endParaRPr lang="en-US"/>
           </a:p>
@@ -2234,7 +2234,7 @@
           <a:p>
             <a:fld id="{78C97017-6FC3-485B-9764-EAC9E56C1D49}" type="datetimeFigureOut">
               <a:rPr lang="en-US" smtClean="0"/>
-              <a:t>10/30/2018</a:t>
+              <a:t>12-Nov-18</a:t>
             </a:fld>
             <a:endParaRPr lang="en-US"/>
           </a:p>
@@ -2329,7 +2329,7 @@
           <a:p>
             <a:fld id="{78C97017-6FC3-485B-9764-EAC9E56C1D49}" type="datetimeFigureOut">
               <a:rPr lang="en-US" smtClean="0"/>
-              <a:t>10/30/2018</a:t>
+              <a:t>12-Nov-18</a:t>
             </a:fld>
             <a:endParaRPr lang="en-US"/>
           </a:p>
@@ -2604,7 +2604,7 @@
           <a:p>
             <a:fld id="{78C97017-6FC3-485B-9764-EAC9E56C1D49}" type="datetimeFigureOut">
               <a:rPr lang="en-US" smtClean="0"/>
-              <a:t>10/30/2018</a:t>
+              <a:t>12-Nov-18</a:t>
             </a:fld>
             <a:endParaRPr lang="en-US"/>
           </a:p>
@@ -2856,7 +2856,7 @@
           <a:p>
             <a:fld id="{78C97017-6FC3-485B-9764-EAC9E56C1D49}" type="datetimeFigureOut">
               <a:rPr lang="en-US" smtClean="0"/>
-              <a:t>10/30/2018</a:t>
+              <a:t>12-Nov-18</a:t>
             </a:fld>
             <a:endParaRPr lang="en-US"/>
           </a:p>
@@ -3067,7 +3067,7 @@
           <a:p>
             <a:fld id="{78C97017-6FC3-485B-9764-EAC9E56C1D49}" type="datetimeFigureOut">
               <a:rPr lang="en-US" smtClean="0"/>
-              <a:t>10/30/2018</a:t>
+              <a:t>12-Nov-18</a:t>
             </a:fld>
             <a:endParaRPr lang="en-US"/>
           </a:p>
@@ -3547,7 +3547,7 @@
           <a:p>
             <a:pPr algn="ctr"/>
             <a:r>
-              <a:rPr lang="en-US" sz="1050" dirty="0" err="1">
+              <a:rPr lang="en-US" sz="1050" dirty="0">
                 <a:solidFill>
                   <a:schemeClr val="bg1"/>
                 </a:solidFill>
@@ -3606,7 +3606,7 @@
           <a:p>
             <a:pPr algn="ctr"/>
             <a:r>
-              <a:rPr lang="en-US" sz="1050" dirty="0" err="1">
+              <a:rPr lang="en-US" sz="1050" dirty="0">
                 <a:solidFill>
                   <a:schemeClr val="bg1"/>
                 </a:solidFill>
@@ -3996,7 +3996,7 @@
           <a:p>
             <a:pPr algn="ctr"/>
             <a:r>
-              <a:rPr lang="en-US" sz="1050" dirty="0" err="1">
+              <a:rPr lang="en-US" sz="1050" dirty="0">
                 <a:solidFill>
                   <a:srgbClr val="7030A0"/>
                 </a:solidFill>
@@ -4139,7 +4139,7 @@
           <a:p>
             <a:pPr algn="ctr"/>
             <a:r>
-              <a:rPr lang="en-US" sz="1050" dirty="0" err="1">
+              <a:rPr lang="en-US" sz="1050" dirty="0">
                 <a:solidFill>
                   <a:srgbClr val="7030A0"/>
                 </a:solidFill>
@@ -4687,7 +4687,7 @@
               </a:rPr>
             </a:br>
             <a:r>
-              <a:rPr lang="en-US" sz="1050" dirty="0" err="1">
+              <a:rPr lang="en-US" sz="1050" dirty="0">
                 <a:solidFill>
                   <a:srgbClr val="7030A0"/>
                 </a:solidFill>
@@ -4989,7 +4989,7 @@
           <a:p>
             <a:pPr algn="ctr"/>
             <a:r>
-              <a:rPr lang="en-US" sz="1050" dirty="0" err="1">
+              <a:rPr lang="en-US" sz="1050" dirty="0">
                 <a:solidFill>
                   <a:srgbClr val="7030A0"/>
                 </a:solidFill>
@@ -5452,7 +5452,7 @@
               </a:rPr>
             </a:br>
             <a:r>
-              <a:rPr lang="en-US" sz="1050" dirty="0" err="1">
+              <a:rPr lang="en-US" sz="1050" dirty="0">
                 <a:solidFill>
                   <a:srgbClr val="7030A0"/>
                 </a:solidFill>
@@ -5508,7 +5508,7 @@
           <a:p>
             <a:pPr algn="ctr"/>
             <a:r>
-              <a:rPr lang="en-US" sz="1050" dirty="0" err="1">
+              <a:rPr lang="en-US" sz="1050" dirty="0">
                 <a:solidFill>
                   <a:srgbClr val="7030A0"/>
                 </a:solidFill>
@@ -5713,7 +5713,7 @@
           <a:p>
             <a:pPr algn="ctr"/>
             <a:r>
-              <a:rPr lang="en-US" sz="1050" dirty="0" err="1">
+              <a:rPr lang="en-US" sz="1050" dirty="0">
                 <a:solidFill>
                   <a:srgbClr val="7030A0"/>
                 </a:solidFill>
@@ -5946,7 +5946,7 @@
         </p:nvSpPr>
         <p:spPr>
           <a:xfrm>
-            <a:off x="7026079" y="2200459"/>
+            <a:off x="7139412" y="2270559"/>
             <a:ext cx="189257" cy="178683"/>
           </a:xfrm>
           <a:prstGeom prst="rect">
@@ -6605,7 +6605,7 @@
           <a:p>
             <a:pPr algn="ctr"/>
             <a:r>
-              <a:rPr lang="en-US" sz="1050" dirty="0" err="1">
+              <a:rPr lang="en-US" sz="1050" dirty="0">
                 <a:solidFill>
                   <a:srgbClr val="7030A0"/>
                 </a:solidFill>
@@ -6718,7 +6718,7 @@
           <a:p>
             <a:pPr algn="ctr"/>
             <a:r>
-              <a:rPr lang="en-US" sz="1050" dirty="0" err="1">
+              <a:rPr lang="en-US" sz="1050" dirty="0">
                 <a:solidFill>
                   <a:srgbClr val="7030A0"/>
                 </a:solidFill>
@@ -7048,7 +7048,7 @@
         </p:nvSpPr>
         <p:spPr>
           <a:xfrm>
-            <a:off x="8622069" y="4876800"/>
+            <a:off x="8640329" y="4769397"/>
             <a:ext cx="1030278" cy="259803"/>
           </a:xfrm>
           <a:prstGeom prst="rect">
@@ -7162,8 +7162,8 @@
         </p:nvCxnSpPr>
         <p:spPr>
           <a:xfrm flipV="1">
-            <a:off x="8101412" y="5006702"/>
-            <a:ext cx="520657" cy="344099"/>
+            <a:off x="8101412" y="4899299"/>
+            <a:ext cx="538917" cy="451502"/>
           </a:xfrm>
           <a:prstGeom prst="bentConnector3">
             <a:avLst>
@@ -7208,7 +7208,7 @@
         </p:nvSpPr>
         <p:spPr>
           <a:xfrm>
-            <a:off x="8630448" y="5221364"/>
+            <a:off x="8633717" y="5065304"/>
             <a:ext cx="1027103" cy="259803"/>
           </a:xfrm>
           <a:prstGeom prst="rect">
@@ -7273,9 +7273,9 @@
           <p:nvPr/>
         </p:nvCxnSpPr>
         <p:spPr>
-          <a:xfrm>
-            <a:off x="8101412" y="5350801"/>
-            <a:ext cx="529036" cy="465"/>
+          <a:xfrm flipV="1">
+            <a:off x="8101412" y="5195206"/>
+            <a:ext cx="532305" cy="155595"/>
           </a:xfrm>
           <a:prstGeom prst="bentConnector3">
             <a:avLst>
@@ -7320,7 +7320,7 @@
         </p:nvSpPr>
         <p:spPr>
           <a:xfrm>
-            <a:off x="8633623" y="5568002"/>
+            <a:off x="8633623" y="5374551"/>
             <a:ext cx="1027103" cy="259803"/>
           </a:xfrm>
           <a:prstGeom prst="rect">
@@ -7353,12 +7353,12 @@
           <a:p>
             <a:pPr algn="ctr"/>
             <a:r>
-              <a:rPr lang="en-US" sz="1050" dirty="0" err="1">
+              <a:rPr lang="en-US" sz="1050" dirty="0">
                 <a:solidFill>
                   <a:srgbClr val="7030A0"/>
                 </a:solidFill>
               </a:rPr>
-              <a:t>LocalDateTime</a:t>
+              <a:t>Date</a:t>
             </a:r>
             <a:endParaRPr lang="en-SG" sz="1050" dirty="0">
               <a:solidFill>
@@ -7387,7 +7387,7 @@
         <p:spPr>
           <a:xfrm>
             <a:off x="8101412" y="5350801"/>
-            <a:ext cx="532211" cy="347103"/>
+            <a:ext cx="532211" cy="153652"/>
           </a:xfrm>
           <a:prstGeom prst="bentConnector3">
             <a:avLst>
@@ -7516,7 +7516,7 @@
           <a:p>
             <a:pPr algn="ctr"/>
             <a:r>
-              <a:rPr lang="en-US" sz="1050" dirty="0" err="1">
+              <a:rPr lang="en-US" sz="1050" dirty="0">
                 <a:solidFill>
                   <a:srgbClr val="7030A0"/>
                 </a:solidFill>
@@ -7815,7 +7815,7 @@
           <a:p>
             <a:pPr algn="ctr"/>
             <a:r>
-              <a:rPr lang="en-US" sz="1050" dirty="0" err="1">
+              <a:rPr lang="en-US" sz="1050" dirty="0">
                 <a:solidFill>
                   <a:srgbClr val="7030A0"/>
                 </a:solidFill>
@@ -7989,7 +7989,7 @@
           <a:p>
             <a:pPr algn="ctr"/>
             <a:r>
-              <a:rPr lang="en-US" sz="1050" dirty="0" err="1">
+              <a:rPr lang="en-US" sz="1050" dirty="0">
                 <a:solidFill>
                   <a:srgbClr val="7030A0"/>
                 </a:solidFill>
@@ -8051,7 +8051,7 @@
           <a:p>
             <a:pPr algn="ctr"/>
             <a:r>
-              <a:rPr lang="en-US" sz="1050" dirty="0" err="1">
+              <a:rPr lang="en-US" sz="1050" dirty="0">
                 <a:solidFill>
                   <a:srgbClr val="7030A0"/>
                 </a:solidFill>
@@ -8429,7 +8429,7 @@
           <a:p>
             <a:pPr algn="ctr"/>
             <a:r>
-              <a:rPr lang="en-US" sz="1050" dirty="0" err="1">
+              <a:rPr lang="en-US" sz="1050" dirty="0">
                 <a:solidFill>
                   <a:srgbClr val="7030A0"/>
                 </a:solidFill>
@@ -8991,7 +8991,7 @@
           <a:p>
             <a:pPr algn="ctr"/>
             <a:r>
-              <a:rPr lang="en-US" sz="1050" dirty="0" err="1">
+              <a:rPr lang="en-US" sz="1050" dirty="0">
                 <a:solidFill>
                   <a:srgbClr val="7030A0"/>
                 </a:solidFill>
@@ -9053,7 +9053,7 @@
           <a:p>
             <a:pPr algn="ctr"/>
             <a:r>
-              <a:rPr lang="en-US" sz="1050" dirty="0" err="1">
+              <a:rPr lang="en-US" sz="1050" dirty="0">
                 <a:solidFill>
                   <a:srgbClr val="7030A0"/>
                 </a:solidFill>
@@ -9115,7 +9115,7 @@
           <a:p>
             <a:pPr algn="ctr"/>
             <a:r>
-              <a:rPr lang="en-US" sz="1050" dirty="0" err="1">
+              <a:rPr lang="en-US" sz="1050" dirty="0">
                 <a:solidFill>
                   <a:srgbClr val="7030A0"/>
                 </a:solidFill>
@@ -9177,18 +9177,13 @@
           <a:p>
             <a:pPr algn="ctr"/>
             <a:r>
-              <a:rPr lang="en-SG" sz="1050" dirty="0" err="1">
+              <a:rPr lang="en-SG" sz="1050" dirty="0">
                 <a:solidFill>
                   <a:srgbClr val="7030A0"/>
                 </a:solidFill>
               </a:rPr>
               <a:t>MinimumUnit</a:t>
             </a:r>
-            <a:endParaRPr lang="en-SG" sz="1050" dirty="0">
-              <a:solidFill>
-                <a:srgbClr val="7030A0"/>
-              </a:solidFill>
-            </a:endParaRPr>
           </a:p>
         </p:txBody>
       </p:sp>
@@ -9239,18 +9234,13 @@
           <a:p>
             <a:pPr algn="ctr"/>
             <a:r>
-              <a:rPr lang="en-SG" sz="1050" dirty="0" err="1">
+              <a:rPr lang="en-SG" sz="1050" dirty="0">
                 <a:solidFill>
                   <a:srgbClr val="7030A0"/>
                 </a:solidFill>
               </a:rPr>
               <a:t>NumUnits</a:t>
             </a:r>
-            <a:endParaRPr lang="en-SG" sz="1050" dirty="0">
-              <a:solidFill>
-                <a:srgbClr val="7030A0"/>
-              </a:solidFill>
-            </a:endParaRPr>
           </a:p>
         </p:txBody>
       </p:sp>
@@ -9539,6 +9529,116 @@
           </a:p>
         </p:txBody>
       </p:sp>
+      <p:sp>
+        <p:nvSpPr>
+          <p:cNvPr id="126" name="Rectangle 8">
+            <a:extLst>
+              <a:ext uri="{FF2B5EF4-FFF2-40B4-BE49-F238E27FC236}">
+                <a16:creationId xmlns:a16="http://schemas.microsoft.com/office/drawing/2014/main" id="{052C3459-DA5B-4546-9FA1-A7F70F783D11}"/>
+              </a:ext>
+            </a:extLst>
+          </p:cNvPr>
+          <p:cNvSpPr/>
+          <p:nvPr/>
+        </p:nvSpPr>
+        <p:spPr>
+          <a:xfrm>
+            <a:off x="8633623" y="5683797"/>
+            <a:ext cx="1027103" cy="259803"/>
+          </a:xfrm>
+          <a:prstGeom prst="rect">
+            <a:avLst/>
+          </a:prstGeom>
+          <a:ln w="19050">
+            <a:solidFill>
+              <a:srgbClr val="7030A0"/>
+            </a:solidFill>
+          </a:ln>
+          <a:effectLst/>
+        </p:spPr>
+        <p:style>
+          <a:lnRef idx="1">
+            <a:schemeClr val="accent4"/>
+          </a:lnRef>
+          <a:fillRef idx="2">
+            <a:schemeClr val="accent4"/>
+          </a:fillRef>
+          <a:effectRef idx="1">
+            <a:schemeClr val="accent4"/>
+          </a:effectRef>
+          <a:fontRef idx="minor">
+            <a:schemeClr val="dk1"/>
+          </a:fontRef>
+        </p:style>
+        <p:txBody>
+          <a:bodyPr rtlCol="0" anchor="ctr"/>
+          <a:lstStyle/>
+          <a:p>
+            <a:pPr algn="ctr"/>
+            <a:r>
+              <a:rPr lang="en-US" sz="1050" dirty="0">
+                <a:solidFill>
+                  <a:srgbClr val="7030A0"/>
+                </a:solidFill>
+              </a:rPr>
+              <a:t>Time</a:t>
+            </a:r>
+            <a:endParaRPr lang="en-SG" sz="1050" dirty="0">
+              <a:solidFill>
+                <a:srgbClr val="7030A0"/>
+              </a:solidFill>
+            </a:endParaRPr>
+          </a:p>
+        </p:txBody>
+      </p:sp>
+      <p:cxnSp>
+        <p:nvCxnSpPr>
+          <p:cNvPr id="156" name="Elbow Connector 78">
+            <a:extLst>
+              <a:ext uri="{FF2B5EF4-FFF2-40B4-BE49-F238E27FC236}">
+                <a16:creationId xmlns:a16="http://schemas.microsoft.com/office/drawing/2014/main" id="{AE965376-EB34-41CD-9681-DD9EC3BF04EA}"/>
+              </a:ext>
+            </a:extLst>
+          </p:cNvPr>
+          <p:cNvCxnSpPr>
+            <a:cxnSpLocks/>
+          </p:cNvCxnSpPr>
+          <p:nvPr/>
+        </p:nvCxnSpPr>
+        <p:spPr>
+          <a:xfrm>
+            <a:off x="8133318" y="5350220"/>
+            <a:ext cx="491901" cy="402872"/>
+          </a:xfrm>
+          <a:prstGeom prst="bentConnector3">
+            <a:avLst>
+              <a:gd name="adj1" fmla="val 48178"/>
+            </a:avLst>
+          </a:prstGeom>
+          <a:ln w="19050">
+            <a:solidFill>
+              <a:srgbClr val="7030A0"/>
+            </a:solidFill>
+            <a:headEnd type="none" w="med" len="med"/>
+            <a:tailEnd type="arrow" w="med" len="med"/>
+          </a:ln>
+          <a:effectLst/>
+        </p:spPr>
+        <p:style>
+          <a:lnRef idx="1">
+            <a:schemeClr val="accent2"/>
+          </a:lnRef>
+          <a:fillRef idx="2">
+            <a:schemeClr val="accent2"/>
+          </a:fillRef>
+          <a:effectRef idx="1">
+            <a:schemeClr val="accent2"/>
+          </a:effectRef>
+          <a:fontRef idx="minor">
+            <a:schemeClr val="dk1"/>
+          </a:fontRef>
+        </p:style>
+      </p:cxnSp>
     </p:spTree>
     <p:extLst>
       <p:ext uri="{BB962C8B-B14F-4D97-AF65-F5344CB8AC3E}">

</xml_diff>

<commit_message>
Updated model class diagram
</commit_message>
<xml_diff>
--- a/docs/diagrams/ModelComponentClassBetterOopDiagram.pptx
+++ b/docs/diagrams/ModelComponentClassBetterOopDiagram.pptx
@@ -208,7 +208,7 @@
           <a:p>
             <a:fld id="{F5CC4B3F-88C1-4FFA-B1B6-F41C21DC6924}" type="datetimeFigureOut">
               <a:rPr lang="en-US" smtClean="0"/>
-              <a:t>6/27/2018</a:t>
+              <a:t>11/12/2018</a:t>
             </a:fld>
             <a:endParaRPr lang="en-US"/>
           </a:p>
@@ -654,7 +654,7 @@
           <a:p>
             <a:fld id="{78C97017-6FC3-485B-9764-EAC9E56C1D49}" type="datetimeFigureOut">
               <a:rPr lang="en-US" smtClean="0"/>
-              <a:t>6/27/2018</a:t>
+              <a:t>11/12/2018</a:t>
             </a:fld>
             <a:endParaRPr lang="en-US"/>
           </a:p>
@@ -822,7 +822,7 @@
           <a:p>
             <a:fld id="{78C97017-6FC3-485B-9764-EAC9E56C1D49}" type="datetimeFigureOut">
               <a:rPr lang="en-US" smtClean="0"/>
-              <a:t>6/27/2018</a:t>
+              <a:t>11/12/2018</a:t>
             </a:fld>
             <a:endParaRPr lang="en-US"/>
           </a:p>
@@ -1000,7 +1000,7 @@
           <a:p>
             <a:fld id="{78C97017-6FC3-485B-9764-EAC9E56C1D49}" type="datetimeFigureOut">
               <a:rPr lang="en-US" smtClean="0"/>
-              <a:t>6/27/2018</a:t>
+              <a:t>11/12/2018</a:t>
             </a:fld>
             <a:endParaRPr lang="en-US"/>
           </a:p>
@@ -1168,7 +1168,7 @@
           <a:p>
             <a:fld id="{78C97017-6FC3-485B-9764-EAC9E56C1D49}" type="datetimeFigureOut">
               <a:rPr lang="en-US" smtClean="0"/>
-              <a:t>6/27/2018</a:t>
+              <a:t>11/12/2018</a:t>
             </a:fld>
             <a:endParaRPr lang="en-US"/>
           </a:p>
@@ -1413,7 +1413,7 @@
           <a:p>
             <a:fld id="{78C97017-6FC3-485B-9764-EAC9E56C1D49}" type="datetimeFigureOut">
               <a:rPr lang="en-US" smtClean="0"/>
-              <a:t>6/27/2018</a:t>
+              <a:t>11/12/2018</a:t>
             </a:fld>
             <a:endParaRPr lang="en-US"/>
           </a:p>
@@ -1698,7 +1698,7 @@
           <a:p>
             <a:fld id="{78C97017-6FC3-485B-9764-EAC9E56C1D49}" type="datetimeFigureOut">
               <a:rPr lang="en-US" smtClean="0"/>
-              <a:t>6/27/2018</a:t>
+              <a:t>11/12/2018</a:t>
             </a:fld>
             <a:endParaRPr lang="en-US"/>
           </a:p>
@@ -2117,7 +2117,7 @@
           <a:p>
             <a:fld id="{78C97017-6FC3-485B-9764-EAC9E56C1D49}" type="datetimeFigureOut">
               <a:rPr lang="en-US" smtClean="0"/>
-              <a:t>6/27/2018</a:t>
+              <a:t>11/12/2018</a:t>
             </a:fld>
             <a:endParaRPr lang="en-US"/>
           </a:p>
@@ -2234,7 +2234,7 @@
           <a:p>
             <a:fld id="{78C97017-6FC3-485B-9764-EAC9E56C1D49}" type="datetimeFigureOut">
               <a:rPr lang="en-US" smtClean="0"/>
-              <a:t>6/27/2018</a:t>
+              <a:t>11/12/2018</a:t>
             </a:fld>
             <a:endParaRPr lang="en-US"/>
           </a:p>
@@ -2329,7 +2329,7 @@
           <a:p>
             <a:fld id="{78C97017-6FC3-485B-9764-EAC9E56C1D49}" type="datetimeFigureOut">
               <a:rPr lang="en-US" smtClean="0"/>
-              <a:t>6/27/2018</a:t>
+              <a:t>11/12/2018</a:t>
             </a:fld>
             <a:endParaRPr lang="en-US"/>
           </a:p>
@@ -2604,7 +2604,7 @@
           <a:p>
             <a:fld id="{78C97017-6FC3-485B-9764-EAC9E56C1D49}" type="datetimeFigureOut">
               <a:rPr lang="en-US" smtClean="0"/>
-              <a:t>6/27/2018</a:t>
+              <a:t>11/12/2018</a:t>
             </a:fld>
             <a:endParaRPr lang="en-US"/>
           </a:p>
@@ -2856,7 +2856,7 @@
           <a:p>
             <a:fld id="{78C97017-6FC3-485B-9764-EAC9E56C1D49}" type="datetimeFigureOut">
               <a:rPr lang="en-US" smtClean="0"/>
-              <a:t>6/27/2018</a:t>
+              <a:t>11/12/2018</a:t>
             </a:fld>
             <a:endParaRPr lang="en-US"/>
           </a:p>
@@ -3067,7 +3067,7 @@
           <a:p>
             <a:fld id="{78C97017-6FC3-485B-9764-EAC9E56C1D49}" type="datetimeFigureOut">
               <a:rPr lang="en-US" smtClean="0"/>
-              <a:t>6/27/2018</a:t>
+              <a:t>11/12/2018</a:t>
             </a:fld>
             <a:endParaRPr lang="en-US"/>
           </a:p>
@@ -3450,8 +3450,8 @@
         </p:nvSpPr>
         <p:spPr>
           <a:xfrm>
-            <a:off x="1119865" y="1676400"/>
-            <a:ext cx="7490735" cy="3059747"/>
+            <a:off x="1119865" y="152400"/>
+            <a:ext cx="7490735" cy="6468420"/>
           </a:xfrm>
           <a:prstGeom prst="roundRect">
             <a:avLst>
@@ -3511,7 +3511,7 @@
         </p:nvSpPr>
         <p:spPr>
           <a:xfrm>
-            <a:off x="2877180" y="3463240"/>
+            <a:off x="2877180" y="1939240"/>
             <a:ext cx="1093635" cy="346760"/>
           </a:xfrm>
           <a:prstGeom prst="rect">
@@ -3570,8 +3570,8 @@
         </p:nvSpPr>
         <p:spPr>
           <a:xfrm rot="16200000">
-            <a:off x="1661548" y="3097750"/>
-            <a:ext cx="1093635" cy="346760"/>
+            <a:off x="-201378" y="3436677"/>
+            <a:ext cx="4819490" cy="346760"/>
           </a:xfrm>
           <a:prstGeom prst="rect">
             <a:avLst/>
@@ -3631,7 +3631,7 @@
         </p:nvCxnSpPr>
         <p:spPr>
           <a:xfrm rot="5400000" flipH="1" flipV="1">
-            <a:off x="4155901" y="1308943"/>
+            <a:off x="4155901" y="-215057"/>
             <a:ext cx="613122" cy="4459404"/>
           </a:xfrm>
           <a:prstGeom prst="bentConnector3">
@@ -3672,7 +3672,7 @@
         </p:nvSpPr>
         <p:spPr>
           <a:xfrm rot="16200000">
-            <a:off x="956202" y="2861202"/>
+            <a:off x="956202" y="1337202"/>
             <a:ext cx="1093635" cy="346760"/>
           </a:xfrm>
           <a:prstGeom prst="rect">
@@ -3742,7 +3742,7 @@
         </p:nvSpPr>
         <p:spPr>
           <a:xfrm rot="16200000">
-            <a:off x="1626910" y="2952291"/>
+            <a:off x="1626910" y="1428291"/>
             <a:ext cx="270504" cy="175523"/>
           </a:xfrm>
           <a:prstGeom prst="triangle">
@@ -3792,7 +3792,7 @@
         </p:nvCxnSpPr>
         <p:spPr>
           <a:xfrm>
-            <a:off x="2609828" y="3636620"/>
+            <a:off x="2609828" y="2112620"/>
             <a:ext cx="267352" cy="0"/>
           </a:xfrm>
           <a:prstGeom prst="straightConnector1">
@@ -3830,7 +3830,7 @@
         </p:nvCxnSpPr>
         <p:spPr>
           <a:xfrm>
-            <a:off x="910091" y="3040053"/>
+            <a:off x="910091" y="1516053"/>
             <a:ext cx="419548" cy="2860"/>
           </a:xfrm>
           <a:prstGeom prst="bentConnector3">
@@ -3875,7 +3875,7 @@
         </p:nvCxnSpPr>
         <p:spPr>
           <a:xfrm flipV="1">
-            <a:off x="1849924" y="3040052"/>
+            <a:off x="1849924" y="1516052"/>
             <a:ext cx="216105" cy="1"/>
           </a:xfrm>
           <a:prstGeom prst="line">
@@ -3914,7 +3914,7 @@
         </p:nvSpPr>
         <p:spPr>
           <a:xfrm>
-            <a:off x="2373780" y="3549930"/>
+            <a:off x="2373780" y="2025930"/>
             <a:ext cx="236048" cy="173380"/>
           </a:xfrm>
           <a:prstGeom prst="flowChartDecision">
@@ -3959,7 +3959,7 @@
         </p:nvSpPr>
         <p:spPr>
           <a:xfrm>
-            <a:off x="2786406" y="2834911"/>
+            <a:off x="2786406" y="1310911"/>
             <a:ext cx="1447688" cy="346760"/>
           </a:xfrm>
           <a:prstGeom prst="rect">
@@ -3992,7 +3992,7 @@
           <a:p>
             <a:pPr algn="ctr"/>
             <a:r>
-              <a:rPr lang="en-US" sz="1050" dirty="0" err="1" smtClean="0">
+              <a:rPr lang="en-US" sz="1050" dirty="0" err="1">
                 <a:solidFill>
                   <a:srgbClr val="7030A0"/>
                 </a:solidFill>
@@ -4018,7 +4018,7 @@
         </p:nvCxnSpPr>
         <p:spPr>
           <a:xfrm>
-            <a:off x="2624360" y="3003033"/>
+            <a:off x="2624360" y="1479033"/>
             <a:ext cx="162046" cy="5258"/>
           </a:xfrm>
           <a:prstGeom prst="straightConnector1">
@@ -4056,7 +4056,7 @@
         </p:nvSpPr>
         <p:spPr>
           <a:xfrm>
-            <a:off x="2388312" y="2916343"/>
+            <a:off x="2388312" y="1392343"/>
             <a:ext cx="236048" cy="173380"/>
           </a:xfrm>
           <a:prstGeom prst="flowChartDecision">
@@ -4101,7 +4101,7 @@
         </p:nvSpPr>
         <p:spPr>
           <a:xfrm>
-            <a:off x="4762209" y="2863434"/>
+            <a:off x="4762209" y="1339434"/>
             <a:ext cx="1156969" cy="346760"/>
           </a:xfrm>
           <a:prstGeom prst="rect">
@@ -4157,7 +4157,7 @@
         </p:nvSpPr>
         <p:spPr>
           <a:xfrm>
-            <a:off x="4233246" y="2948201"/>
+            <a:off x="4233246" y="1424201"/>
             <a:ext cx="236048" cy="173380"/>
           </a:xfrm>
           <a:prstGeom prst="flowChartDecision">
@@ -4207,7 +4207,7 @@
         </p:nvCxnSpPr>
         <p:spPr>
           <a:xfrm>
-            <a:off x="4469294" y="3034891"/>
+            <a:off x="4469294" y="1510891"/>
             <a:ext cx="292915" cy="1923"/>
           </a:xfrm>
           <a:prstGeom prst="bentConnector3">
@@ -4245,7 +4245,7 @@
         </p:nvSpPr>
         <p:spPr>
           <a:xfrm>
-            <a:off x="6313677" y="2858066"/>
+            <a:off x="6313677" y="1334066"/>
             <a:ext cx="708186" cy="346760"/>
           </a:xfrm>
           <a:prstGeom prst="rect">
@@ -4301,7 +4301,7 @@
         </p:nvSpPr>
         <p:spPr>
           <a:xfrm>
-            <a:off x="5918460" y="2941065"/>
+            <a:off x="5918460" y="1417065"/>
             <a:ext cx="236048" cy="173380"/>
           </a:xfrm>
           <a:prstGeom prst="flowChartDecision">
@@ -4350,7 +4350,7 @@
         </p:nvCxnSpPr>
         <p:spPr>
           <a:xfrm>
-            <a:off x="6154508" y="3027755"/>
+            <a:off x="6154508" y="1503755"/>
             <a:ext cx="159169" cy="3691"/>
           </a:xfrm>
           <a:prstGeom prst="bentConnector3">
@@ -4388,7 +4388,7 @@
         </p:nvSpPr>
         <p:spPr>
           <a:xfrm>
-            <a:off x="7712397" y="2564238"/>
+            <a:off x="7712397" y="1040238"/>
             <a:ext cx="708186" cy="285783"/>
           </a:xfrm>
           <a:prstGeom prst="rect">
@@ -4444,7 +4444,7 @@
         </p:nvSpPr>
         <p:spPr>
           <a:xfrm>
-            <a:off x="7041947" y="2948201"/>
+            <a:off x="7041947" y="1424201"/>
             <a:ext cx="236048" cy="173380"/>
           </a:xfrm>
           <a:prstGeom prst="flowChartDecision">
@@ -4493,7 +4493,7 @@
         </p:nvCxnSpPr>
         <p:spPr>
           <a:xfrm flipV="1">
-            <a:off x="7277995" y="2706821"/>
+            <a:off x="7277995" y="1182821"/>
             <a:ext cx="434402" cy="327761"/>
           </a:xfrm>
           <a:prstGeom prst="bentConnector3">
@@ -4531,7 +4531,7 @@
         </p:nvSpPr>
         <p:spPr>
           <a:xfrm>
-            <a:off x="7712397" y="2887216"/>
+            <a:off x="7712397" y="1363216"/>
             <a:ext cx="708186" cy="285783"/>
           </a:xfrm>
           <a:prstGeom prst="rect">
@@ -4590,7 +4590,7 @@
         </p:nvCxnSpPr>
         <p:spPr>
           <a:xfrm flipV="1">
-            <a:off x="7277995" y="3030108"/>
+            <a:off x="7277995" y="1506108"/>
             <a:ext cx="434402" cy="4783"/>
           </a:xfrm>
           <a:prstGeom prst="bentConnector3">
@@ -4628,7 +4628,7 @@
         </p:nvSpPr>
         <p:spPr>
           <a:xfrm>
-            <a:off x="7712397" y="3210194"/>
+            <a:off x="7712397" y="1686194"/>
             <a:ext cx="708186" cy="285783"/>
           </a:xfrm>
           <a:prstGeom prst="rect">
@@ -4687,7 +4687,7 @@
         </p:nvCxnSpPr>
         <p:spPr>
           <a:xfrm>
-            <a:off x="7277995" y="3034891"/>
+            <a:off x="7277995" y="1510891"/>
             <a:ext cx="434402" cy="318195"/>
           </a:xfrm>
           <a:prstGeom prst="bentConnector3">
@@ -4725,7 +4725,7 @@
         </p:nvSpPr>
         <p:spPr>
           <a:xfrm>
-            <a:off x="7712397" y="3533171"/>
+            <a:off x="7712397" y="2009171"/>
             <a:ext cx="708186" cy="285783"/>
           </a:xfrm>
           <a:prstGeom prst="rect">
@@ -4784,7 +4784,7 @@
         </p:nvCxnSpPr>
         <p:spPr>
           <a:xfrm>
-            <a:off x="7277995" y="3034891"/>
+            <a:off x="7277995" y="1510891"/>
             <a:ext cx="434402" cy="641172"/>
           </a:xfrm>
           <a:prstGeom prst="bentConnector3">
@@ -4822,7 +4822,7 @@
         </p:nvSpPr>
         <p:spPr>
           <a:xfrm rot="16200000">
-            <a:off x="6362886" y="3586305"/>
+            <a:off x="6362886" y="2062305"/>
             <a:ext cx="881018" cy="261610"/>
           </a:xfrm>
           <a:prstGeom prst="rect">
@@ -4861,7 +4861,7 @@
         </p:nvSpPr>
         <p:spPr>
           <a:xfrm>
-            <a:off x="2057401" y="4239491"/>
+            <a:off x="2020406" y="6168306"/>
             <a:ext cx="1066800" cy="346760"/>
           </a:xfrm>
           <a:prstGeom prst="rect">
@@ -4900,14 +4900,6 @@
                 </a:solidFill>
               </a:rPr>
               <a:t>&lt;&lt;interface&gt;&gt;</a:t>
-            </a:r>
-            <a:r>
-              <a:rPr lang="en-US" sz="1050">
-                <a:solidFill>
-                  <a:srgbClr val="7030A0"/>
-                </a:solidFill>
-              </a:rPr>
-              <a:t/>
             </a:r>
             <a:br>
               <a:rPr lang="en-US" sz="1050">
@@ -4943,8 +4935,8 @@
         </p:nvCxnSpPr>
         <p:spPr>
           <a:xfrm rot="16200000" flipH="1">
-            <a:off x="1364475" y="3719944"/>
-            <a:ext cx="831471" cy="554381"/>
+            <a:off x="-380430" y="3940850"/>
+            <a:ext cx="4284286" cy="517386"/>
           </a:xfrm>
           <a:prstGeom prst="bentConnector2">
             <a:avLst/>
@@ -4982,7 +4974,7 @@
         </p:nvSpPr>
         <p:spPr>
           <a:xfrm>
-            <a:off x="4324972" y="3058864"/>
+            <a:off x="4324972" y="1534864"/>
             <a:ext cx="189257" cy="178683"/>
           </a:xfrm>
           <a:prstGeom prst="rect">
@@ -5021,7 +5013,7 @@
         </p:nvSpPr>
         <p:spPr>
           <a:xfrm>
-            <a:off x="6135256" y="3097917"/>
+            <a:off x="6135256" y="1573917"/>
             <a:ext cx="189257" cy="178683"/>
           </a:xfrm>
           <a:prstGeom prst="rect">
@@ -5060,7 +5052,7 @@
         </p:nvSpPr>
         <p:spPr>
           <a:xfrm>
-            <a:off x="2560167" y="2753818"/>
+            <a:off x="2560167" y="1229818"/>
             <a:ext cx="78378" cy="193767"/>
           </a:xfrm>
           <a:prstGeom prst="rect">
@@ -5099,7 +5091,7 @@
         </p:nvSpPr>
         <p:spPr>
           <a:xfrm>
-            <a:off x="2707070" y="3667737"/>
+            <a:off x="2707070" y="2143737"/>
             <a:ext cx="189257" cy="178683"/>
           </a:xfrm>
           <a:prstGeom prst="rect">
@@ -5138,7 +5130,7 @@
         </p:nvSpPr>
         <p:spPr>
           <a:xfrm>
-            <a:off x="6449896" y="3204826"/>
+            <a:off x="6449896" y="1680826"/>
             <a:ext cx="189257" cy="178683"/>
           </a:xfrm>
           <a:prstGeom prst="rect">
@@ -5183,7 +5175,7 @@
         </p:nvSpPr>
         <p:spPr>
           <a:xfrm>
-            <a:off x="4755872" y="2206861"/>
+            <a:off x="4755872" y="682861"/>
             <a:ext cx="1156969" cy="285783"/>
           </a:xfrm>
           <a:prstGeom prst="rect">
@@ -5249,7 +5241,7 @@
         </p:nvCxnSpPr>
         <p:spPr>
           <a:xfrm rot="5400000" flipH="1" flipV="1">
-            <a:off x="4233181" y="2536174"/>
+            <a:off x="4233181" y="1012174"/>
             <a:ext cx="709111" cy="336271"/>
           </a:xfrm>
           <a:prstGeom prst="bentConnector2">
@@ -5293,7 +5285,7 @@
         </p:nvSpPr>
         <p:spPr>
           <a:xfrm>
-            <a:off x="6714344" y="2430721"/>
+            <a:off x="6714344" y="906721"/>
             <a:ext cx="189257" cy="178683"/>
           </a:xfrm>
           <a:prstGeom prst="rect">
@@ -5338,7 +5330,7 @@
         </p:nvSpPr>
         <p:spPr>
           <a:xfrm rot="16200000">
-            <a:off x="6553482" y="2664721"/>
+            <a:off x="6553482" y="1140721"/>
             <a:ext cx="236048" cy="173380"/>
           </a:xfrm>
           <a:prstGeom prst="flowChartDecision">
@@ -5392,7 +5384,7 @@
         </p:nvCxnSpPr>
         <p:spPr>
           <a:xfrm flipV="1">
-            <a:off x="5884280" y="2233006"/>
+            <a:off x="5884280" y="709006"/>
             <a:ext cx="432916" cy="111294"/>
           </a:xfrm>
           <a:prstGeom prst="bentConnector3">
@@ -5436,7 +5428,7 @@
         </p:nvSpPr>
         <p:spPr>
           <a:xfrm>
-            <a:off x="6317196" y="2059626"/>
+            <a:off x="6317196" y="535626"/>
             <a:ext cx="708186" cy="346760"/>
           </a:xfrm>
           <a:prstGeom prst="rect">
@@ -5498,7 +5490,7 @@
         </p:nvSpPr>
         <p:spPr>
           <a:xfrm>
-            <a:off x="6135256" y="2278014"/>
+            <a:off x="6135256" y="754014"/>
             <a:ext cx="189257" cy="178683"/>
           </a:xfrm>
           <a:prstGeom prst="rect">
@@ -5543,7 +5535,7 @@
         </p:nvSpPr>
         <p:spPr>
           <a:xfrm>
-            <a:off x="4367100" y="2172972"/>
+            <a:off x="4367100" y="648972"/>
             <a:ext cx="189257" cy="178683"/>
           </a:xfrm>
           <a:prstGeom prst="rect">
@@ -5588,7 +5580,7 @@
         </p:nvSpPr>
         <p:spPr>
           <a:xfrm>
-            <a:off x="5911329" y="2262081"/>
+            <a:off x="5911329" y="738081"/>
             <a:ext cx="236048" cy="173380"/>
           </a:xfrm>
           <a:prstGeom prst="flowChartDecision">
@@ -5645,7 +5637,7 @@
         </p:nvCxnSpPr>
         <p:spPr>
           <a:xfrm rot="16200000" flipV="1">
-            <a:off x="6557898" y="2519778"/>
+            <a:off x="6557898" y="995778"/>
             <a:ext cx="227001" cy="217"/>
           </a:xfrm>
           <a:prstGeom prst="bentConnector3">
@@ -5687,7 +5679,7 @@
         </p:nvCxnSpPr>
         <p:spPr>
           <a:xfrm rot="5400000">
-            <a:off x="3470636" y="2687353"/>
+            <a:off x="3470636" y="1163353"/>
             <a:ext cx="293825" cy="5938"/>
           </a:xfrm>
           <a:prstGeom prst="bentConnector3">
@@ -5728,7 +5720,7 @@
         </p:nvSpPr>
         <p:spPr>
           <a:xfrm rot="10800000" flipV="1">
-            <a:off x="3479324" y="2386348"/>
+            <a:off x="3479324" y="862348"/>
             <a:ext cx="282387" cy="157062"/>
           </a:xfrm>
           <a:prstGeom prst="triangle">
@@ -5776,7 +5768,7 @@
         </p:nvSpPr>
         <p:spPr>
           <a:xfrm>
-            <a:off x="1177947" y="1998144"/>
+            <a:off x="1177947" y="474144"/>
             <a:ext cx="1443661" cy="364396"/>
           </a:xfrm>
           <a:prstGeom prst="rect">
@@ -5847,7 +5839,7 @@
         </p:nvSpPr>
         <p:spPr>
           <a:xfrm>
-            <a:off x="3087206" y="1998144"/>
+            <a:off x="3087206" y="474144"/>
             <a:ext cx="1060683" cy="364396"/>
           </a:xfrm>
           <a:prstGeom prst="rect">
@@ -5903,7 +5895,7 @@
         </p:nvSpPr>
         <p:spPr>
           <a:xfrm rot="16200000">
-            <a:off x="2586098" y="2068952"/>
+            <a:off x="2586098" y="544952"/>
             <a:ext cx="271014" cy="187417"/>
           </a:xfrm>
           <a:prstGeom prst="triangle">
@@ -5958,7 +5950,7 @@
         </p:nvCxnSpPr>
         <p:spPr>
           <a:xfrm>
-            <a:off x="2815314" y="2177521"/>
+            <a:off x="2815314" y="653521"/>
             <a:ext cx="271892" cy="2821"/>
           </a:xfrm>
           <a:prstGeom prst="bentConnector3">
@@ -5991,6 +5983,3291 @@
           </a:fontRef>
         </p:style>
       </p:cxnSp>
+      <p:sp>
+        <p:nvSpPr>
+          <p:cNvPr id="56" name="TextBox 55">
+            <a:extLst>
+              <a:ext uri="{FF2B5EF4-FFF2-40B4-BE49-F238E27FC236}">
+                <a16:creationId xmlns:a16="http://schemas.microsoft.com/office/drawing/2014/main" id="{740A54C1-B15C-4C11-B6FD-DFB9CE137822}"/>
+              </a:ext>
+            </a:extLst>
+          </p:cNvPr>
+          <p:cNvSpPr txBox="1"/>
+          <p:nvPr/>
+        </p:nvSpPr>
+        <p:spPr>
+          <a:xfrm>
+            <a:off x="6139466" y="4979958"/>
+            <a:ext cx="189257" cy="178683"/>
+          </a:xfrm>
+          <a:prstGeom prst="rect">
+            <a:avLst/>
+          </a:prstGeom>
+          <a:noFill/>
+        </p:spPr>
+        <p:txBody>
+          <a:bodyPr wrap="square" lIns="0" tIns="0" rIns="0" bIns="0" rtlCol="0">
+            <a:noAutofit/>
+          </a:bodyPr>
+          <a:lstStyle/>
+          <a:p>
+            <a:pPr algn="ctr"/>
+            <a:r>
+              <a:rPr lang="en-US" sz="1100" dirty="0">
+                <a:solidFill>
+                  <a:srgbClr val="7030A0"/>
+                </a:solidFill>
+              </a:rPr>
+              <a:t>*</a:t>
+            </a:r>
+            <a:endParaRPr lang="en-SG" sz="1100" dirty="0">
+              <a:solidFill>
+                <a:srgbClr val="7030A0"/>
+              </a:solidFill>
+            </a:endParaRPr>
+          </a:p>
+        </p:txBody>
+      </p:sp>
+      <p:cxnSp>
+        <p:nvCxnSpPr>
+          <p:cNvPr id="74" name="Straight Arrow Connector 73">
+            <a:extLst>
+              <a:ext uri="{FF2B5EF4-FFF2-40B4-BE49-F238E27FC236}">
+                <a16:creationId xmlns:a16="http://schemas.microsoft.com/office/drawing/2014/main" id="{3758E2DB-2E32-4503-81E2-9E938F5BCF6C}"/>
+              </a:ext>
+            </a:extLst>
+          </p:cNvPr>
+          <p:cNvCxnSpPr>
+            <a:cxnSpLocks/>
+          </p:cNvCxnSpPr>
+          <p:nvPr/>
+        </p:nvCxnSpPr>
+        <p:spPr>
+          <a:xfrm>
+            <a:off x="2622681" y="2990600"/>
+            <a:ext cx="267352" cy="0"/>
+          </a:xfrm>
+          <a:prstGeom prst="straightConnector1">
+            <a:avLst/>
+          </a:prstGeom>
+          <a:ln w="19050">
+            <a:solidFill>
+              <a:srgbClr val="7030A0"/>
+            </a:solidFill>
+            <a:headEnd type="none" w="med" len="med"/>
+            <a:tailEnd type="arrow" w="med" len="med"/>
+          </a:ln>
+          <a:effectLst/>
+        </p:spPr>
+        <p:style>
+          <a:lnRef idx="1">
+            <a:schemeClr val="accent2"/>
+          </a:lnRef>
+          <a:fillRef idx="2">
+            <a:schemeClr val="accent2"/>
+          </a:fillRef>
+          <a:effectRef idx="1">
+            <a:schemeClr val="accent2"/>
+          </a:effectRef>
+          <a:fontRef idx="minor">
+            <a:schemeClr val="dk1"/>
+          </a:fontRef>
+        </p:style>
+      </p:cxnSp>
+      <p:sp>
+        <p:nvSpPr>
+          <p:cNvPr id="77" name="Flowchart: Decision 96">
+            <a:extLst>
+              <a:ext uri="{FF2B5EF4-FFF2-40B4-BE49-F238E27FC236}">
+                <a16:creationId xmlns:a16="http://schemas.microsoft.com/office/drawing/2014/main" id="{19AADBCB-5E7C-4695-A2D7-091505B3A2BE}"/>
+              </a:ext>
+            </a:extLst>
+          </p:cNvPr>
+          <p:cNvSpPr/>
+          <p:nvPr/>
+        </p:nvSpPr>
+        <p:spPr>
+          <a:xfrm>
+            <a:off x="2392294" y="2903752"/>
+            <a:ext cx="236048" cy="173380"/>
+          </a:xfrm>
+          <a:prstGeom prst="flowChartDecision">
+            <a:avLst/>
+          </a:prstGeom>
+          <a:noFill/>
+          <a:ln w="19050">
+            <a:solidFill>
+              <a:srgbClr val="7030A0"/>
+            </a:solidFill>
+          </a:ln>
+          <a:effectLst/>
+        </p:spPr>
+        <p:style>
+          <a:lnRef idx="1">
+            <a:schemeClr val="accent6"/>
+          </a:lnRef>
+          <a:fillRef idx="2">
+            <a:schemeClr val="accent6"/>
+          </a:fillRef>
+          <a:effectRef idx="1">
+            <a:schemeClr val="accent6"/>
+          </a:effectRef>
+          <a:fontRef idx="minor">
+            <a:schemeClr val="dk1"/>
+          </a:fontRef>
+        </p:style>
+        <p:txBody>
+          <a:bodyPr rtlCol="0" anchor="ctr"/>
+          <a:lstStyle/>
+          <a:p>
+            <a:pPr algn="ctr"/>
+            <a:endParaRPr lang="en-US" sz="1050"/>
+          </a:p>
+        </p:txBody>
+      </p:sp>
+      <p:sp>
+        <p:nvSpPr>
+          <p:cNvPr id="82" name="TextBox 81">
+            <a:extLst>
+              <a:ext uri="{FF2B5EF4-FFF2-40B4-BE49-F238E27FC236}">
+                <a16:creationId xmlns:a16="http://schemas.microsoft.com/office/drawing/2014/main" id="{A03EA2F1-3C35-4935-8021-3609DB936C2D}"/>
+              </a:ext>
+            </a:extLst>
+          </p:cNvPr>
+          <p:cNvSpPr txBox="1"/>
+          <p:nvPr/>
+        </p:nvSpPr>
+        <p:spPr>
+          <a:xfrm>
+            <a:off x="2719923" y="3021717"/>
+            <a:ext cx="189257" cy="178683"/>
+          </a:xfrm>
+          <a:prstGeom prst="rect">
+            <a:avLst/>
+          </a:prstGeom>
+          <a:noFill/>
+        </p:spPr>
+        <p:txBody>
+          <a:bodyPr wrap="square" lIns="0" tIns="0" rIns="0" bIns="0" rtlCol="0">
+            <a:noAutofit/>
+          </a:bodyPr>
+          <a:lstStyle/>
+          <a:p>
+            <a:pPr algn="ctr"/>
+            <a:r>
+              <a:rPr lang="en-US" sz="1100" dirty="0">
+                <a:solidFill>
+                  <a:srgbClr val="7030A0"/>
+                </a:solidFill>
+              </a:rPr>
+              <a:t>1</a:t>
+            </a:r>
+            <a:endParaRPr lang="en-SG" sz="1100" dirty="0">
+              <a:solidFill>
+                <a:srgbClr val="7030A0"/>
+              </a:solidFill>
+            </a:endParaRPr>
+          </a:p>
+        </p:txBody>
+      </p:sp>
+      <p:sp>
+        <p:nvSpPr>
+          <p:cNvPr id="87" name="Rectangle 8">
+            <a:extLst>
+              <a:ext uri="{FF2B5EF4-FFF2-40B4-BE49-F238E27FC236}">
+                <a16:creationId xmlns:a16="http://schemas.microsoft.com/office/drawing/2014/main" id="{97AEF4A5-CF76-42CF-AFB4-4170FE9EF9D6}"/>
+              </a:ext>
+            </a:extLst>
+          </p:cNvPr>
+          <p:cNvSpPr/>
+          <p:nvPr/>
+        </p:nvSpPr>
+        <p:spPr>
+          <a:xfrm>
+            <a:off x="2891396" y="2855040"/>
+            <a:ext cx="1473306" cy="334856"/>
+          </a:xfrm>
+          <a:prstGeom prst="rect">
+            <a:avLst/>
+          </a:prstGeom>
+          <a:ln w="19050">
+            <a:solidFill>
+              <a:srgbClr val="7030A0"/>
+            </a:solidFill>
+          </a:ln>
+          <a:effectLst/>
+        </p:spPr>
+        <p:style>
+          <a:lnRef idx="1">
+            <a:schemeClr val="accent4"/>
+          </a:lnRef>
+          <a:fillRef idx="2">
+            <a:schemeClr val="accent4"/>
+          </a:fillRef>
+          <a:effectRef idx="1">
+            <a:schemeClr val="accent4"/>
+          </a:effectRef>
+          <a:fontRef idx="minor">
+            <a:schemeClr val="dk1"/>
+          </a:fontRef>
+        </p:style>
+        <p:txBody>
+          <a:bodyPr rtlCol="0" anchor="ctr"/>
+          <a:lstStyle/>
+          <a:p>
+            <a:pPr algn="ctr"/>
+            <a:r>
+              <a:rPr lang="en-US" sz="1050" dirty="0" err="1">
+                <a:solidFill>
+                  <a:srgbClr val="7030A0"/>
+                </a:solidFill>
+              </a:rPr>
+              <a:t>EmailModel</a:t>
+            </a:r>
+            <a:endParaRPr lang="en-SG" sz="1050" dirty="0">
+              <a:solidFill>
+                <a:srgbClr val="7030A0"/>
+              </a:solidFill>
+            </a:endParaRPr>
+          </a:p>
+        </p:txBody>
+      </p:sp>
+      <p:cxnSp>
+        <p:nvCxnSpPr>
+          <p:cNvPr id="88" name="Straight Arrow Connector 87">
+            <a:extLst>
+              <a:ext uri="{FF2B5EF4-FFF2-40B4-BE49-F238E27FC236}">
+                <a16:creationId xmlns:a16="http://schemas.microsoft.com/office/drawing/2014/main" id="{BE3181BE-7540-481C-BE6A-6F256046447F}"/>
+              </a:ext>
+            </a:extLst>
+          </p:cNvPr>
+          <p:cNvCxnSpPr>
+            <a:cxnSpLocks/>
+          </p:cNvCxnSpPr>
+          <p:nvPr/>
+        </p:nvCxnSpPr>
+        <p:spPr>
+          <a:xfrm>
+            <a:off x="2622681" y="3981200"/>
+            <a:ext cx="267352" cy="0"/>
+          </a:xfrm>
+          <a:prstGeom prst="straightConnector1">
+            <a:avLst/>
+          </a:prstGeom>
+          <a:ln w="19050">
+            <a:solidFill>
+              <a:srgbClr val="7030A0"/>
+            </a:solidFill>
+            <a:headEnd type="none" w="med" len="med"/>
+            <a:tailEnd type="arrow" w="med" len="med"/>
+          </a:ln>
+          <a:effectLst/>
+        </p:spPr>
+        <p:style>
+          <a:lnRef idx="1">
+            <a:schemeClr val="accent2"/>
+          </a:lnRef>
+          <a:fillRef idx="2">
+            <a:schemeClr val="accent2"/>
+          </a:fillRef>
+          <a:effectRef idx="1">
+            <a:schemeClr val="accent2"/>
+          </a:effectRef>
+          <a:fontRef idx="minor">
+            <a:schemeClr val="dk1"/>
+          </a:fontRef>
+        </p:style>
+      </p:cxnSp>
+      <p:sp>
+        <p:nvSpPr>
+          <p:cNvPr id="89" name="Flowchart: Decision 96">
+            <a:extLst>
+              <a:ext uri="{FF2B5EF4-FFF2-40B4-BE49-F238E27FC236}">
+                <a16:creationId xmlns:a16="http://schemas.microsoft.com/office/drawing/2014/main" id="{E9A53EF7-2984-4A01-8B00-92ABF1EDBC2C}"/>
+              </a:ext>
+            </a:extLst>
+          </p:cNvPr>
+          <p:cNvSpPr/>
+          <p:nvPr/>
+        </p:nvSpPr>
+        <p:spPr>
+          <a:xfrm>
+            <a:off x="2392294" y="3894352"/>
+            <a:ext cx="236048" cy="173380"/>
+          </a:xfrm>
+          <a:prstGeom prst="flowChartDecision">
+            <a:avLst/>
+          </a:prstGeom>
+          <a:noFill/>
+          <a:ln w="19050">
+            <a:solidFill>
+              <a:srgbClr val="7030A0"/>
+            </a:solidFill>
+          </a:ln>
+          <a:effectLst/>
+        </p:spPr>
+        <p:style>
+          <a:lnRef idx="1">
+            <a:schemeClr val="accent6"/>
+          </a:lnRef>
+          <a:fillRef idx="2">
+            <a:schemeClr val="accent6"/>
+          </a:fillRef>
+          <a:effectRef idx="1">
+            <a:schemeClr val="accent6"/>
+          </a:effectRef>
+          <a:fontRef idx="minor">
+            <a:schemeClr val="dk1"/>
+          </a:fontRef>
+        </p:style>
+        <p:txBody>
+          <a:bodyPr rtlCol="0" anchor="ctr"/>
+          <a:lstStyle/>
+          <a:p>
+            <a:pPr algn="ctr"/>
+            <a:endParaRPr lang="en-US" sz="1050"/>
+          </a:p>
+        </p:txBody>
+      </p:sp>
+      <p:sp>
+        <p:nvSpPr>
+          <p:cNvPr id="96" name="TextBox 95">
+            <a:extLst>
+              <a:ext uri="{FF2B5EF4-FFF2-40B4-BE49-F238E27FC236}">
+                <a16:creationId xmlns:a16="http://schemas.microsoft.com/office/drawing/2014/main" id="{5C8B4C5C-D41B-4FF2-A4DA-339992F955F6}"/>
+              </a:ext>
+            </a:extLst>
+          </p:cNvPr>
+          <p:cNvSpPr txBox="1"/>
+          <p:nvPr/>
+        </p:nvSpPr>
+        <p:spPr>
+          <a:xfrm>
+            <a:off x="2719923" y="4012317"/>
+            <a:ext cx="189257" cy="178683"/>
+          </a:xfrm>
+          <a:prstGeom prst="rect">
+            <a:avLst/>
+          </a:prstGeom>
+          <a:noFill/>
+        </p:spPr>
+        <p:txBody>
+          <a:bodyPr wrap="square" lIns="0" tIns="0" rIns="0" bIns="0" rtlCol="0">
+            <a:noAutofit/>
+          </a:bodyPr>
+          <a:lstStyle/>
+          <a:p>
+            <a:pPr algn="ctr"/>
+            <a:r>
+              <a:rPr lang="en-US" sz="1100" dirty="0">
+                <a:solidFill>
+                  <a:srgbClr val="7030A0"/>
+                </a:solidFill>
+              </a:rPr>
+              <a:t>1</a:t>
+            </a:r>
+            <a:endParaRPr lang="en-SG" sz="1100" dirty="0">
+              <a:solidFill>
+                <a:srgbClr val="7030A0"/>
+              </a:solidFill>
+            </a:endParaRPr>
+          </a:p>
+        </p:txBody>
+      </p:sp>
+      <p:sp>
+        <p:nvSpPr>
+          <p:cNvPr id="97" name="Rectangle 8">
+            <a:extLst>
+              <a:ext uri="{FF2B5EF4-FFF2-40B4-BE49-F238E27FC236}">
+                <a16:creationId xmlns:a16="http://schemas.microsoft.com/office/drawing/2014/main" id="{5FFA72EA-DCED-4E76-9077-665C0750C94C}"/>
+              </a:ext>
+            </a:extLst>
+          </p:cNvPr>
+          <p:cNvSpPr/>
+          <p:nvPr/>
+        </p:nvSpPr>
+        <p:spPr>
+          <a:xfrm>
+            <a:off x="2891395" y="3845640"/>
+            <a:ext cx="3154189" cy="334856"/>
+          </a:xfrm>
+          <a:prstGeom prst="rect">
+            <a:avLst/>
+          </a:prstGeom>
+          <a:ln w="19050">
+            <a:solidFill>
+              <a:srgbClr val="7030A0"/>
+            </a:solidFill>
+          </a:ln>
+          <a:effectLst/>
+        </p:spPr>
+        <p:style>
+          <a:lnRef idx="1">
+            <a:schemeClr val="accent4"/>
+          </a:lnRef>
+          <a:fillRef idx="2">
+            <a:schemeClr val="accent4"/>
+          </a:fillRef>
+          <a:effectRef idx="1">
+            <a:schemeClr val="accent4"/>
+          </a:effectRef>
+          <a:fontRef idx="minor">
+            <a:schemeClr val="dk1"/>
+          </a:fontRef>
+        </p:style>
+        <p:txBody>
+          <a:bodyPr rtlCol="0" anchor="ctr"/>
+          <a:lstStyle/>
+          <a:p>
+            <a:pPr algn="ctr"/>
+            <a:r>
+              <a:rPr lang="en-US" sz="1050" dirty="0" err="1">
+                <a:solidFill>
+                  <a:srgbClr val="7030A0"/>
+                </a:solidFill>
+              </a:rPr>
+              <a:t>CalendarModel</a:t>
+            </a:r>
+            <a:endParaRPr lang="en-SG" sz="1050" dirty="0">
+              <a:solidFill>
+                <a:srgbClr val="7030A0"/>
+              </a:solidFill>
+            </a:endParaRPr>
+          </a:p>
+        </p:txBody>
+      </p:sp>
+      <p:cxnSp>
+        <p:nvCxnSpPr>
+          <p:cNvPr id="98" name="Straight Arrow Connector 97">
+            <a:extLst>
+              <a:ext uri="{FF2B5EF4-FFF2-40B4-BE49-F238E27FC236}">
+                <a16:creationId xmlns:a16="http://schemas.microsoft.com/office/drawing/2014/main" id="{C612D06B-D579-4FCC-AA88-BC0AC45C481F}"/>
+              </a:ext>
+            </a:extLst>
+          </p:cNvPr>
+          <p:cNvCxnSpPr>
+            <a:cxnSpLocks/>
+          </p:cNvCxnSpPr>
+          <p:nvPr/>
+        </p:nvCxnSpPr>
+        <p:spPr>
+          <a:xfrm>
+            <a:off x="2622681" y="4930312"/>
+            <a:ext cx="267352" cy="0"/>
+          </a:xfrm>
+          <a:prstGeom prst="straightConnector1">
+            <a:avLst/>
+          </a:prstGeom>
+          <a:ln w="19050">
+            <a:solidFill>
+              <a:srgbClr val="7030A0"/>
+            </a:solidFill>
+            <a:headEnd type="none" w="med" len="med"/>
+            <a:tailEnd type="arrow" w="med" len="med"/>
+          </a:ln>
+          <a:effectLst/>
+        </p:spPr>
+        <p:style>
+          <a:lnRef idx="1">
+            <a:schemeClr val="accent2"/>
+          </a:lnRef>
+          <a:fillRef idx="2">
+            <a:schemeClr val="accent2"/>
+          </a:fillRef>
+          <a:effectRef idx="1">
+            <a:schemeClr val="accent2"/>
+          </a:effectRef>
+          <a:fontRef idx="minor">
+            <a:schemeClr val="dk1"/>
+          </a:fontRef>
+        </p:style>
+      </p:cxnSp>
+      <p:sp>
+        <p:nvSpPr>
+          <p:cNvPr id="99" name="Flowchart: Decision 96">
+            <a:extLst>
+              <a:ext uri="{FF2B5EF4-FFF2-40B4-BE49-F238E27FC236}">
+                <a16:creationId xmlns:a16="http://schemas.microsoft.com/office/drawing/2014/main" id="{6BC194AF-C32D-4E4B-96C9-2C57C5E01FDA}"/>
+              </a:ext>
+            </a:extLst>
+          </p:cNvPr>
+          <p:cNvSpPr/>
+          <p:nvPr/>
+        </p:nvSpPr>
+        <p:spPr>
+          <a:xfrm>
+            <a:off x="2392294" y="4843464"/>
+            <a:ext cx="236048" cy="173380"/>
+          </a:xfrm>
+          <a:prstGeom prst="flowChartDecision">
+            <a:avLst/>
+          </a:prstGeom>
+          <a:noFill/>
+          <a:ln w="19050">
+            <a:solidFill>
+              <a:srgbClr val="7030A0"/>
+            </a:solidFill>
+          </a:ln>
+          <a:effectLst/>
+        </p:spPr>
+        <p:style>
+          <a:lnRef idx="1">
+            <a:schemeClr val="accent6"/>
+          </a:lnRef>
+          <a:fillRef idx="2">
+            <a:schemeClr val="accent6"/>
+          </a:fillRef>
+          <a:effectRef idx="1">
+            <a:schemeClr val="accent6"/>
+          </a:effectRef>
+          <a:fontRef idx="minor">
+            <a:schemeClr val="dk1"/>
+          </a:fontRef>
+        </p:style>
+        <p:txBody>
+          <a:bodyPr rtlCol="0" anchor="ctr"/>
+          <a:lstStyle/>
+          <a:p>
+            <a:pPr algn="ctr"/>
+            <a:endParaRPr lang="en-US" sz="1050"/>
+          </a:p>
+        </p:txBody>
+      </p:sp>
+      <p:sp>
+        <p:nvSpPr>
+          <p:cNvPr id="100" name="TextBox 99">
+            <a:extLst>
+              <a:ext uri="{FF2B5EF4-FFF2-40B4-BE49-F238E27FC236}">
+                <a16:creationId xmlns:a16="http://schemas.microsoft.com/office/drawing/2014/main" id="{382CEB97-570D-4B3B-AAC0-EDAC4C5E76EE}"/>
+              </a:ext>
+            </a:extLst>
+          </p:cNvPr>
+          <p:cNvSpPr txBox="1"/>
+          <p:nvPr/>
+        </p:nvSpPr>
+        <p:spPr>
+          <a:xfrm>
+            <a:off x="2719923" y="4961429"/>
+            <a:ext cx="189257" cy="178683"/>
+          </a:xfrm>
+          <a:prstGeom prst="rect">
+            <a:avLst/>
+          </a:prstGeom>
+          <a:noFill/>
+        </p:spPr>
+        <p:txBody>
+          <a:bodyPr wrap="square" lIns="0" tIns="0" rIns="0" bIns="0" rtlCol="0">
+            <a:noAutofit/>
+          </a:bodyPr>
+          <a:lstStyle/>
+          <a:p>
+            <a:pPr algn="ctr"/>
+            <a:r>
+              <a:rPr lang="en-US" sz="1100" dirty="0">
+                <a:solidFill>
+                  <a:srgbClr val="7030A0"/>
+                </a:solidFill>
+              </a:rPr>
+              <a:t>1</a:t>
+            </a:r>
+            <a:endParaRPr lang="en-SG" sz="1100" dirty="0">
+              <a:solidFill>
+                <a:srgbClr val="7030A0"/>
+              </a:solidFill>
+            </a:endParaRPr>
+          </a:p>
+        </p:txBody>
+      </p:sp>
+      <p:sp>
+        <p:nvSpPr>
+          <p:cNvPr id="101" name="Rectangle 8">
+            <a:extLst>
+              <a:ext uri="{FF2B5EF4-FFF2-40B4-BE49-F238E27FC236}">
+                <a16:creationId xmlns:a16="http://schemas.microsoft.com/office/drawing/2014/main" id="{D92ED0F1-8E21-4931-96AF-3C692DFB825A}"/>
+              </a:ext>
+            </a:extLst>
+          </p:cNvPr>
+          <p:cNvSpPr/>
+          <p:nvPr/>
+        </p:nvSpPr>
+        <p:spPr>
+          <a:xfrm>
+            <a:off x="2891396" y="4794752"/>
+            <a:ext cx="1490560" cy="334856"/>
+          </a:xfrm>
+          <a:prstGeom prst="rect">
+            <a:avLst/>
+          </a:prstGeom>
+          <a:ln w="19050">
+            <a:solidFill>
+              <a:srgbClr val="7030A0"/>
+            </a:solidFill>
+          </a:ln>
+          <a:effectLst/>
+        </p:spPr>
+        <p:style>
+          <a:lnRef idx="1">
+            <a:schemeClr val="accent4"/>
+          </a:lnRef>
+          <a:fillRef idx="2">
+            <a:schemeClr val="accent4"/>
+          </a:fillRef>
+          <a:effectRef idx="1">
+            <a:schemeClr val="accent4"/>
+          </a:effectRef>
+          <a:fontRef idx="minor">
+            <a:schemeClr val="dk1"/>
+          </a:fontRef>
+        </p:style>
+        <p:txBody>
+          <a:bodyPr rtlCol="0" anchor="ctr"/>
+          <a:lstStyle/>
+          <a:p>
+            <a:pPr algn="ctr"/>
+            <a:r>
+              <a:rPr lang="en-US" sz="1050" dirty="0" err="1">
+                <a:solidFill>
+                  <a:srgbClr val="7030A0"/>
+                </a:solidFill>
+              </a:rPr>
+              <a:t>VersionedBudgetBook</a:t>
+            </a:r>
+            <a:endParaRPr lang="en-SG" sz="1050" dirty="0">
+              <a:solidFill>
+                <a:srgbClr val="7030A0"/>
+              </a:solidFill>
+            </a:endParaRPr>
+          </a:p>
+        </p:txBody>
+      </p:sp>
+      <p:sp>
+        <p:nvSpPr>
+          <p:cNvPr id="102" name="Isosceles Triangle 102">
+            <a:extLst>
+              <a:ext uri="{FF2B5EF4-FFF2-40B4-BE49-F238E27FC236}">
+                <a16:creationId xmlns:a16="http://schemas.microsoft.com/office/drawing/2014/main" id="{B8A4C027-686A-4F92-9869-6D64CF58A113}"/>
+              </a:ext>
+            </a:extLst>
+          </p:cNvPr>
+          <p:cNvSpPr/>
+          <p:nvPr/>
+        </p:nvSpPr>
+        <p:spPr>
+          <a:xfrm rot="16200000" flipV="1">
+            <a:off x="3414515" y="5463479"/>
+            <a:ext cx="282387" cy="157062"/>
+          </a:xfrm>
+          <a:prstGeom prst="triangle">
+            <a:avLst>
+              <a:gd name="adj" fmla="val 52158"/>
+            </a:avLst>
+          </a:prstGeom>
+          <a:ln w="19050">
+            <a:solidFill>
+              <a:srgbClr val="7030A0"/>
+            </a:solidFill>
+          </a:ln>
+          <a:effectLst/>
+        </p:spPr>
+        <p:style>
+          <a:lnRef idx="1">
+            <a:schemeClr val="accent4"/>
+          </a:lnRef>
+          <a:fillRef idx="2">
+            <a:schemeClr val="accent4"/>
+          </a:fillRef>
+          <a:effectRef idx="1">
+            <a:schemeClr val="accent4"/>
+          </a:effectRef>
+          <a:fontRef idx="minor">
+            <a:schemeClr val="dk1"/>
+          </a:fontRef>
+        </p:style>
+        <p:txBody>
+          <a:bodyPr rtlCol="0" anchor="ctr"/>
+          <a:lstStyle/>
+          <a:p>
+            <a:pPr algn="ctr"/>
+            <a:endParaRPr lang="en-SG" sz="1050" b="1">
+              <a:solidFill>
+                <a:srgbClr val="92D050"/>
+              </a:solidFill>
+            </a:endParaRPr>
+          </a:p>
+        </p:txBody>
+      </p:sp>
+      <p:cxnSp>
+        <p:nvCxnSpPr>
+          <p:cNvPr id="103" name="Connector: Elbow 102">
+            <a:extLst>
+              <a:ext uri="{FF2B5EF4-FFF2-40B4-BE49-F238E27FC236}">
+                <a16:creationId xmlns:a16="http://schemas.microsoft.com/office/drawing/2014/main" id="{78570F3A-432F-4561-BD36-89C35D6155EA}"/>
+              </a:ext>
+            </a:extLst>
+          </p:cNvPr>
+          <p:cNvCxnSpPr>
+            <a:cxnSpLocks/>
+            <a:endCxn id="102" idx="3"/>
+          </p:cNvCxnSpPr>
+          <p:nvPr/>
+        </p:nvCxnSpPr>
+        <p:spPr>
+          <a:xfrm>
+            <a:off x="3065543" y="5138367"/>
+            <a:ext cx="411635" cy="397550"/>
+          </a:xfrm>
+          <a:prstGeom prst="bentConnector3">
+            <a:avLst>
+              <a:gd name="adj1" fmla="val 2611"/>
+            </a:avLst>
+          </a:prstGeom>
+          <a:ln w="9525" cap="flat" cmpd="sng" algn="ctr">
+            <a:solidFill>
+              <a:srgbClr val="7030A0"/>
+            </a:solidFill>
+            <a:prstDash val="dash"/>
+            <a:round/>
+            <a:headEnd type="none" w="med" len="med"/>
+            <a:tailEnd type="none" w="med" len="med"/>
+          </a:ln>
+        </p:spPr>
+        <p:style>
+          <a:lnRef idx="0">
+            <a:scrgbClr r="0" g="0" b="0"/>
+          </a:lnRef>
+          <a:fillRef idx="0">
+            <a:scrgbClr r="0" g="0" b="0"/>
+          </a:fillRef>
+          <a:effectRef idx="0">
+            <a:scrgbClr r="0" g="0" b="0"/>
+          </a:effectRef>
+          <a:fontRef idx="minor">
+            <a:schemeClr val="tx1"/>
+          </a:fontRef>
+        </p:style>
+      </p:cxnSp>
+      <p:sp>
+        <p:nvSpPr>
+          <p:cNvPr id="104" name="Rectangle 8">
+            <a:extLst>
+              <a:ext uri="{FF2B5EF4-FFF2-40B4-BE49-F238E27FC236}">
+                <a16:creationId xmlns:a16="http://schemas.microsoft.com/office/drawing/2014/main" id="{BFCE3335-C5EA-4291-A994-BDABF186642A}"/>
+              </a:ext>
+            </a:extLst>
+          </p:cNvPr>
+          <p:cNvSpPr/>
+          <p:nvPr/>
+        </p:nvSpPr>
+        <p:spPr>
+          <a:xfrm>
+            <a:off x="3658566" y="5366258"/>
+            <a:ext cx="1060683" cy="364396"/>
+          </a:xfrm>
+          <a:prstGeom prst="rect">
+            <a:avLst/>
+          </a:prstGeom>
+          <a:ln w="19050">
+            <a:solidFill>
+              <a:srgbClr val="7030A0"/>
+            </a:solidFill>
+          </a:ln>
+          <a:effectLst/>
+        </p:spPr>
+        <p:style>
+          <a:lnRef idx="1">
+            <a:schemeClr val="accent4"/>
+          </a:lnRef>
+          <a:fillRef idx="2">
+            <a:schemeClr val="accent4"/>
+          </a:fillRef>
+          <a:effectRef idx="1">
+            <a:schemeClr val="accent4"/>
+          </a:effectRef>
+          <a:fontRef idx="minor">
+            <a:schemeClr val="dk1"/>
+          </a:fontRef>
+        </p:style>
+        <p:txBody>
+          <a:bodyPr rtlCol="0" anchor="ctr"/>
+          <a:lstStyle/>
+          <a:p>
+            <a:pPr algn="ctr"/>
+            <a:r>
+              <a:rPr lang="en-US" sz="1050" dirty="0" err="1">
+                <a:solidFill>
+                  <a:srgbClr val="7030A0"/>
+                </a:solidFill>
+              </a:rPr>
+              <a:t>BudgetBook</a:t>
+            </a:r>
+            <a:endParaRPr lang="en-SG" sz="1050" dirty="0">
+              <a:solidFill>
+                <a:srgbClr val="7030A0"/>
+              </a:solidFill>
+            </a:endParaRPr>
+          </a:p>
+        </p:txBody>
+      </p:sp>
+      <p:sp>
+        <p:nvSpPr>
+          <p:cNvPr id="105" name="Isosceles Triangle 102">
+            <a:extLst>
+              <a:ext uri="{FF2B5EF4-FFF2-40B4-BE49-F238E27FC236}">
+                <a16:creationId xmlns:a16="http://schemas.microsoft.com/office/drawing/2014/main" id="{7ED9D133-9D42-493B-A687-078632DC7302}"/>
+              </a:ext>
+            </a:extLst>
+          </p:cNvPr>
+          <p:cNvSpPr/>
+          <p:nvPr/>
+        </p:nvSpPr>
+        <p:spPr>
+          <a:xfrm rot="5400000">
+            <a:off x="5159589" y="5452195"/>
+            <a:ext cx="271014" cy="187417"/>
+          </a:xfrm>
+          <a:prstGeom prst="triangle">
+            <a:avLst>
+              <a:gd name="adj" fmla="val 44517"/>
+            </a:avLst>
+          </a:prstGeom>
+          <a:solidFill>
+            <a:schemeClr val="accent4">
+              <a:lumMod val="20000"/>
+              <a:lumOff val="80000"/>
+            </a:schemeClr>
+          </a:solidFill>
+          <a:ln w="19050">
+            <a:solidFill>
+              <a:srgbClr val="7030A0"/>
+            </a:solidFill>
+          </a:ln>
+          <a:effectLst/>
+        </p:spPr>
+        <p:style>
+          <a:lnRef idx="1">
+            <a:schemeClr val="accent6"/>
+          </a:lnRef>
+          <a:fillRef idx="2">
+            <a:schemeClr val="accent6"/>
+          </a:fillRef>
+          <a:effectRef idx="1">
+            <a:schemeClr val="accent6"/>
+          </a:effectRef>
+          <a:fontRef idx="minor">
+            <a:schemeClr val="dk1"/>
+          </a:fontRef>
+        </p:style>
+        <p:txBody>
+          <a:bodyPr rtlCol="0" anchor="ctr"/>
+          <a:lstStyle/>
+          <a:p>
+            <a:pPr algn="ctr"/>
+            <a:endParaRPr lang="en-SG" sz="1050"/>
+          </a:p>
+        </p:txBody>
+      </p:sp>
+      <p:cxnSp>
+        <p:nvCxnSpPr>
+          <p:cNvPr id="106" name="Elbow Connector 63">
+            <a:extLst>
+              <a:ext uri="{FF2B5EF4-FFF2-40B4-BE49-F238E27FC236}">
+                <a16:creationId xmlns:a16="http://schemas.microsoft.com/office/drawing/2014/main" id="{75B241E8-E8A0-4325-B73A-3D3F7024ECB6}"/>
+              </a:ext>
+            </a:extLst>
+          </p:cNvPr>
+          <p:cNvCxnSpPr>
+            <a:cxnSpLocks/>
+          </p:cNvCxnSpPr>
+          <p:nvPr/>
+        </p:nvCxnSpPr>
+        <p:spPr>
+          <a:xfrm flipV="1">
+            <a:off x="4711381" y="5539638"/>
+            <a:ext cx="453851" cy="2698"/>
+          </a:xfrm>
+          <a:prstGeom prst="bentConnector3">
+            <a:avLst>
+              <a:gd name="adj1" fmla="val 50000"/>
+            </a:avLst>
+          </a:prstGeom>
+          <a:ln w="19050">
+            <a:solidFill>
+              <a:srgbClr val="7030A0"/>
+            </a:solidFill>
+            <a:prstDash val="sysDot"/>
+            <a:headEnd type="none" w="med" len="med"/>
+            <a:tailEnd type="none" w="med" len="med"/>
+          </a:ln>
+          <a:effectLst/>
+        </p:spPr>
+        <p:style>
+          <a:lnRef idx="1">
+            <a:schemeClr val="accent2"/>
+          </a:lnRef>
+          <a:fillRef idx="2">
+            <a:schemeClr val="accent2"/>
+          </a:fillRef>
+          <a:effectRef idx="1">
+            <a:schemeClr val="accent2"/>
+          </a:effectRef>
+          <a:fontRef idx="minor">
+            <a:schemeClr val="dk1"/>
+          </a:fontRef>
+        </p:style>
+      </p:cxnSp>
+      <p:sp>
+        <p:nvSpPr>
+          <p:cNvPr id="108" name="Rectangle 8">
+            <a:extLst>
+              <a:ext uri="{FF2B5EF4-FFF2-40B4-BE49-F238E27FC236}">
+                <a16:creationId xmlns:a16="http://schemas.microsoft.com/office/drawing/2014/main" id="{ABDE7B99-EAFB-4DAC-80D0-95183A065415}"/>
+              </a:ext>
+            </a:extLst>
+          </p:cNvPr>
+          <p:cNvSpPr/>
+          <p:nvPr/>
+        </p:nvSpPr>
+        <p:spPr>
+          <a:xfrm>
+            <a:off x="5388805" y="5342148"/>
+            <a:ext cx="1443661" cy="364396"/>
+          </a:xfrm>
+          <a:prstGeom prst="rect">
+            <a:avLst/>
+          </a:prstGeom>
+          <a:ln w="19050">
+            <a:solidFill>
+              <a:srgbClr val="7030A0"/>
+            </a:solidFill>
+          </a:ln>
+          <a:effectLst/>
+        </p:spPr>
+        <p:style>
+          <a:lnRef idx="1">
+            <a:schemeClr val="accent4"/>
+          </a:lnRef>
+          <a:fillRef idx="2">
+            <a:schemeClr val="accent4"/>
+          </a:fillRef>
+          <a:effectRef idx="1">
+            <a:schemeClr val="accent4"/>
+          </a:effectRef>
+          <a:fontRef idx="minor">
+            <a:schemeClr val="dk1"/>
+          </a:fontRef>
+        </p:style>
+        <p:txBody>
+          <a:bodyPr rtlCol="0" anchor="ctr"/>
+          <a:lstStyle/>
+          <a:p>
+            <a:pPr algn="ctr"/>
+            <a:r>
+              <a:rPr lang="en-US" sz="1050" dirty="0">
+                <a:solidFill>
+                  <a:srgbClr val="7030A0"/>
+                </a:solidFill>
+              </a:rPr>
+              <a:t>&lt;&lt;interface&gt;&gt;</a:t>
+            </a:r>
+            <a:br>
+              <a:rPr lang="en-US" sz="1050" dirty="0">
+                <a:solidFill>
+                  <a:srgbClr val="7030A0"/>
+                </a:solidFill>
+              </a:rPr>
+            </a:br>
+            <a:r>
+              <a:rPr lang="en-US" sz="1050" dirty="0" err="1">
+                <a:solidFill>
+                  <a:srgbClr val="7030A0"/>
+                </a:solidFill>
+              </a:rPr>
+              <a:t>ReadOnlyBudgetBook</a:t>
+            </a:r>
+            <a:endParaRPr lang="en-SG" sz="1050" dirty="0">
+              <a:solidFill>
+                <a:srgbClr val="7030A0"/>
+              </a:solidFill>
+            </a:endParaRPr>
+          </a:p>
+        </p:txBody>
+      </p:sp>
+      <p:sp>
+        <p:nvSpPr>
+          <p:cNvPr id="109" name="Rectangle 8">
+            <a:extLst>
+              <a:ext uri="{FF2B5EF4-FFF2-40B4-BE49-F238E27FC236}">
+                <a16:creationId xmlns:a16="http://schemas.microsoft.com/office/drawing/2014/main" id="{E6F95EF9-2B32-4FD8-B937-5D1735F872C7}"/>
+              </a:ext>
+            </a:extLst>
+          </p:cNvPr>
+          <p:cNvSpPr/>
+          <p:nvPr/>
+        </p:nvSpPr>
+        <p:spPr>
+          <a:xfrm>
+            <a:off x="4768788" y="4788049"/>
+            <a:ext cx="1156969" cy="346760"/>
+          </a:xfrm>
+          <a:prstGeom prst="rect">
+            <a:avLst/>
+          </a:prstGeom>
+          <a:ln w="19050">
+            <a:solidFill>
+              <a:srgbClr val="7030A0"/>
+            </a:solidFill>
+          </a:ln>
+          <a:effectLst/>
+        </p:spPr>
+        <p:style>
+          <a:lnRef idx="1">
+            <a:schemeClr val="accent4"/>
+          </a:lnRef>
+          <a:fillRef idx="2">
+            <a:schemeClr val="accent4"/>
+          </a:fillRef>
+          <a:effectRef idx="1">
+            <a:schemeClr val="accent4"/>
+          </a:effectRef>
+          <a:fontRef idx="minor">
+            <a:schemeClr val="dk1"/>
+          </a:fontRef>
+        </p:style>
+        <p:txBody>
+          <a:bodyPr rtlCol="0" anchor="ctr"/>
+          <a:lstStyle/>
+          <a:p>
+            <a:pPr algn="ctr"/>
+            <a:r>
+              <a:rPr lang="en-US" sz="1050" dirty="0" err="1">
+                <a:solidFill>
+                  <a:srgbClr val="7030A0"/>
+                </a:solidFill>
+              </a:rPr>
+              <a:t>UniqueCcaList</a:t>
+            </a:r>
+            <a:endParaRPr lang="en-SG" sz="1050" dirty="0">
+              <a:solidFill>
+                <a:srgbClr val="7030A0"/>
+              </a:solidFill>
+            </a:endParaRPr>
+          </a:p>
+        </p:txBody>
+      </p:sp>
+      <p:sp>
+        <p:nvSpPr>
+          <p:cNvPr id="110" name="Flowchart: Decision 96">
+            <a:extLst>
+              <a:ext uri="{FF2B5EF4-FFF2-40B4-BE49-F238E27FC236}">
+                <a16:creationId xmlns:a16="http://schemas.microsoft.com/office/drawing/2014/main" id="{9381286D-401B-4A19-958A-F1A5FF73EA7D}"/>
+              </a:ext>
+            </a:extLst>
+          </p:cNvPr>
+          <p:cNvSpPr/>
+          <p:nvPr/>
+        </p:nvSpPr>
+        <p:spPr>
+          <a:xfrm>
+            <a:off x="4401110" y="4862419"/>
+            <a:ext cx="236048" cy="173380"/>
+          </a:xfrm>
+          <a:prstGeom prst="flowChartDecision">
+            <a:avLst/>
+          </a:prstGeom>
+          <a:solidFill>
+            <a:srgbClr val="7030A0"/>
+          </a:solidFill>
+          <a:ln w="19050">
+            <a:solidFill>
+              <a:srgbClr val="7030A0"/>
+            </a:solidFill>
+          </a:ln>
+          <a:effectLst/>
+        </p:spPr>
+        <p:style>
+          <a:lnRef idx="1">
+            <a:schemeClr val="accent6"/>
+          </a:lnRef>
+          <a:fillRef idx="2">
+            <a:schemeClr val="accent6"/>
+          </a:fillRef>
+          <a:effectRef idx="1">
+            <a:schemeClr val="accent6"/>
+          </a:effectRef>
+          <a:fontRef idx="minor">
+            <a:schemeClr val="dk1"/>
+          </a:fontRef>
+        </p:style>
+        <p:txBody>
+          <a:bodyPr rtlCol="0" anchor="ctr"/>
+          <a:lstStyle/>
+          <a:p>
+            <a:pPr algn="ctr"/>
+            <a:endParaRPr lang="en-US" sz="1050"/>
+          </a:p>
+        </p:txBody>
+      </p:sp>
+      <p:sp>
+        <p:nvSpPr>
+          <p:cNvPr id="111" name="TextBox 110">
+            <a:extLst>
+              <a:ext uri="{FF2B5EF4-FFF2-40B4-BE49-F238E27FC236}">
+                <a16:creationId xmlns:a16="http://schemas.microsoft.com/office/drawing/2014/main" id="{4D9309EF-6F66-44DA-B9C9-DD32C7124DA1}"/>
+              </a:ext>
+            </a:extLst>
+          </p:cNvPr>
+          <p:cNvSpPr txBox="1"/>
+          <p:nvPr/>
+        </p:nvSpPr>
+        <p:spPr>
+          <a:xfrm>
+            <a:off x="4506117" y="5053366"/>
+            <a:ext cx="189257" cy="178683"/>
+          </a:xfrm>
+          <a:prstGeom prst="rect">
+            <a:avLst/>
+          </a:prstGeom>
+          <a:noFill/>
+        </p:spPr>
+        <p:txBody>
+          <a:bodyPr wrap="square" lIns="0" tIns="0" rIns="0" bIns="0" rtlCol="0">
+            <a:noAutofit/>
+          </a:bodyPr>
+          <a:lstStyle/>
+          <a:p>
+            <a:pPr algn="ctr"/>
+            <a:r>
+              <a:rPr lang="en-US" sz="1100" dirty="0">
+                <a:solidFill>
+                  <a:srgbClr val="7030A0"/>
+                </a:solidFill>
+              </a:rPr>
+              <a:t>1</a:t>
+            </a:r>
+            <a:endParaRPr lang="en-SG" sz="1100" dirty="0">
+              <a:solidFill>
+                <a:srgbClr val="7030A0"/>
+              </a:solidFill>
+            </a:endParaRPr>
+          </a:p>
+        </p:txBody>
+      </p:sp>
+      <p:cxnSp>
+        <p:nvCxnSpPr>
+          <p:cNvPr id="112" name="Straight Arrow Connector 111">
+            <a:extLst>
+              <a:ext uri="{FF2B5EF4-FFF2-40B4-BE49-F238E27FC236}">
+                <a16:creationId xmlns:a16="http://schemas.microsoft.com/office/drawing/2014/main" id="{899C6520-21F5-4929-9754-A1931026BB23}"/>
+              </a:ext>
+            </a:extLst>
+          </p:cNvPr>
+          <p:cNvCxnSpPr>
+            <a:stCxn id="110" idx="1"/>
+            <a:endCxn id="109" idx="1"/>
+          </p:cNvCxnSpPr>
+          <p:nvPr/>
+        </p:nvCxnSpPr>
+        <p:spPr>
+          <a:xfrm>
+            <a:off x="4401110" y="4949109"/>
+            <a:ext cx="367678" cy="12320"/>
+          </a:xfrm>
+          <a:prstGeom prst="straightConnector1">
+            <a:avLst/>
+          </a:prstGeom>
+          <a:ln w="19050">
+            <a:solidFill>
+              <a:srgbClr val="7030A0"/>
+            </a:solidFill>
+            <a:headEnd type="none" w="med" len="med"/>
+            <a:tailEnd type="arrow" w="med" len="med"/>
+          </a:ln>
+          <a:effectLst/>
+        </p:spPr>
+        <p:style>
+          <a:lnRef idx="1">
+            <a:schemeClr val="accent2"/>
+          </a:lnRef>
+          <a:fillRef idx="2">
+            <a:schemeClr val="accent2"/>
+          </a:fillRef>
+          <a:effectRef idx="1">
+            <a:schemeClr val="accent2"/>
+          </a:effectRef>
+          <a:fontRef idx="minor">
+            <a:schemeClr val="dk1"/>
+          </a:fontRef>
+        </p:style>
+      </p:cxnSp>
+      <p:sp>
+        <p:nvSpPr>
+          <p:cNvPr id="113" name="Flowchart: Decision 96">
+            <a:extLst>
+              <a:ext uri="{FF2B5EF4-FFF2-40B4-BE49-F238E27FC236}">
+                <a16:creationId xmlns:a16="http://schemas.microsoft.com/office/drawing/2014/main" id="{8A0E1D59-02C5-4B3F-96C4-9CAA982502E9}"/>
+              </a:ext>
+            </a:extLst>
+          </p:cNvPr>
+          <p:cNvSpPr/>
+          <p:nvPr/>
+        </p:nvSpPr>
+        <p:spPr>
+          <a:xfrm>
+            <a:off x="5936662" y="4854296"/>
+            <a:ext cx="236048" cy="173380"/>
+          </a:xfrm>
+          <a:prstGeom prst="flowChartDecision">
+            <a:avLst/>
+          </a:prstGeom>
+          <a:noFill/>
+          <a:ln w="19050">
+            <a:solidFill>
+              <a:srgbClr val="7030A0"/>
+            </a:solidFill>
+          </a:ln>
+          <a:effectLst/>
+        </p:spPr>
+        <p:style>
+          <a:lnRef idx="1">
+            <a:schemeClr val="accent6"/>
+          </a:lnRef>
+          <a:fillRef idx="2">
+            <a:schemeClr val="accent6"/>
+          </a:fillRef>
+          <a:effectRef idx="1">
+            <a:schemeClr val="accent6"/>
+          </a:effectRef>
+          <a:fontRef idx="minor">
+            <a:schemeClr val="dk1"/>
+          </a:fontRef>
+        </p:style>
+        <p:txBody>
+          <a:bodyPr rtlCol="0" anchor="ctr"/>
+          <a:lstStyle/>
+          <a:p>
+            <a:pPr algn="ctr"/>
+            <a:endParaRPr lang="en-US" sz="1050"/>
+          </a:p>
+        </p:txBody>
+      </p:sp>
+      <p:cxnSp>
+        <p:nvCxnSpPr>
+          <p:cNvPr id="115" name="Elbow Connector 63">
+            <a:extLst>
+              <a:ext uri="{FF2B5EF4-FFF2-40B4-BE49-F238E27FC236}">
+                <a16:creationId xmlns:a16="http://schemas.microsoft.com/office/drawing/2014/main" id="{F6DA3A00-BB27-4F96-98D1-9AA087FB7AEB}"/>
+              </a:ext>
+            </a:extLst>
+          </p:cNvPr>
+          <p:cNvCxnSpPr>
+            <a:cxnSpLocks/>
+          </p:cNvCxnSpPr>
+          <p:nvPr/>
+        </p:nvCxnSpPr>
+        <p:spPr>
+          <a:xfrm>
+            <a:off x="6172710" y="4940986"/>
+            <a:ext cx="218878" cy="3080"/>
+          </a:xfrm>
+          <a:prstGeom prst="bentConnector3">
+            <a:avLst/>
+          </a:prstGeom>
+          <a:ln w="19050">
+            <a:solidFill>
+              <a:srgbClr val="7030A0"/>
+            </a:solidFill>
+            <a:headEnd type="none" w="med" len="med"/>
+            <a:tailEnd type="arrow" w="med" len="med"/>
+          </a:ln>
+          <a:effectLst/>
+        </p:spPr>
+        <p:style>
+          <a:lnRef idx="1">
+            <a:schemeClr val="accent2"/>
+          </a:lnRef>
+          <a:fillRef idx="2">
+            <a:schemeClr val="accent2"/>
+          </a:fillRef>
+          <a:effectRef idx="1">
+            <a:schemeClr val="accent2"/>
+          </a:effectRef>
+          <a:fontRef idx="minor">
+            <a:schemeClr val="dk1"/>
+          </a:fontRef>
+        </p:style>
+      </p:cxnSp>
+      <p:sp>
+        <p:nvSpPr>
+          <p:cNvPr id="116" name="Rectangle 8">
+            <a:extLst>
+              <a:ext uri="{FF2B5EF4-FFF2-40B4-BE49-F238E27FC236}">
+                <a16:creationId xmlns:a16="http://schemas.microsoft.com/office/drawing/2014/main" id="{BF72E205-5DC9-4115-9350-1FD35D45E7D7}"/>
+              </a:ext>
+            </a:extLst>
+          </p:cNvPr>
+          <p:cNvSpPr/>
+          <p:nvPr/>
+        </p:nvSpPr>
+        <p:spPr>
+          <a:xfrm>
+            <a:off x="6386192" y="4788049"/>
+            <a:ext cx="708186" cy="346760"/>
+          </a:xfrm>
+          <a:prstGeom prst="rect">
+            <a:avLst/>
+          </a:prstGeom>
+          <a:ln w="19050">
+            <a:solidFill>
+              <a:srgbClr val="7030A0"/>
+            </a:solidFill>
+          </a:ln>
+          <a:effectLst/>
+        </p:spPr>
+        <p:style>
+          <a:lnRef idx="1">
+            <a:schemeClr val="accent4"/>
+          </a:lnRef>
+          <a:fillRef idx="2">
+            <a:schemeClr val="accent4"/>
+          </a:fillRef>
+          <a:effectRef idx="1">
+            <a:schemeClr val="accent4"/>
+          </a:effectRef>
+          <a:fontRef idx="minor">
+            <a:schemeClr val="dk1"/>
+          </a:fontRef>
+        </p:style>
+        <p:txBody>
+          <a:bodyPr rtlCol="0" anchor="ctr"/>
+          <a:lstStyle/>
+          <a:p>
+            <a:pPr algn="ctr"/>
+            <a:r>
+              <a:rPr lang="en-US" sz="1050" dirty="0" err="1">
+                <a:solidFill>
+                  <a:srgbClr val="7030A0"/>
+                </a:solidFill>
+              </a:rPr>
+              <a:t>Cca</a:t>
+            </a:r>
+            <a:endParaRPr lang="en-SG" sz="1050" dirty="0">
+              <a:solidFill>
+                <a:srgbClr val="7030A0"/>
+              </a:solidFill>
+            </a:endParaRPr>
+          </a:p>
+        </p:txBody>
+      </p:sp>
+      <p:cxnSp>
+        <p:nvCxnSpPr>
+          <p:cNvPr id="117" name="Elbow Connector 80">
+            <a:extLst>
+              <a:ext uri="{FF2B5EF4-FFF2-40B4-BE49-F238E27FC236}">
+                <a16:creationId xmlns:a16="http://schemas.microsoft.com/office/drawing/2014/main" id="{641552EA-EDE7-4236-A9BF-4B27DA0734E1}"/>
+              </a:ext>
+            </a:extLst>
+          </p:cNvPr>
+          <p:cNvCxnSpPr>
+            <a:cxnSpLocks/>
+          </p:cNvCxnSpPr>
+          <p:nvPr/>
+        </p:nvCxnSpPr>
+        <p:spPr>
+          <a:xfrm>
+            <a:off x="7340273" y="4938552"/>
+            <a:ext cx="429006" cy="1741"/>
+          </a:xfrm>
+          <a:prstGeom prst="bentConnector3">
+            <a:avLst/>
+          </a:prstGeom>
+          <a:ln w="19050">
+            <a:solidFill>
+              <a:srgbClr val="7030A0"/>
+            </a:solidFill>
+            <a:headEnd type="none" w="med" len="med"/>
+            <a:tailEnd type="arrow" w="med" len="med"/>
+          </a:ln>
+          <a:effectLst/>
+        </p:spPr>
+        <p:style>
+          <a:lnRef idx="1">
+            <a:schemeClr val="accent2"/>
+          </a:lnRef>
+          <a:fillRef idx="2">
+            <a:schemeClr val="accent2"/>
+          </a:fillRef>
+          <a:effectRef idx="1">
+            <a:schemeClr val="accent2"/>
+          </a:effectRef>
+          <a:fontRef idx="minor">
+            <a:schemeClr val="dk1"/>
+          </a:fontRef>
+        </p:style>
+      </p:cxnSp>
+      <p:sp>
+        <p:nvSpPr>
+          <p:cNvPr id="121" name="Rectangle 8">
+            <a:extLst>
+              <a:ext uri="{FF2B5EF4-FFF2-40B4-BE49-F238E27FC236}">
+                <a16:creationId xmlns:a16="http://schemas.microsoft.com/office/drawing/2014/main" id="{FB63AF94-44A6-4305-9AB0-92E747304547}"/>
+              </a:ext>
+            </a:extLst>
+          </p:cNvPr>
+          <p:cNvSpPr/>
+          <p:nvPr/>
+        </p:nvSpPr>
+        <p:spPr>
+          <a:xfrm>
+            <a:off x="7775799" y="4140426"/>
+            <a:ext cx="708186" cy="285783"/>
+          </a:xfrm>
+          <a:prstGeom prst="rect">
+            <a:avLst/>
+          </a:prstGeom>
+          <a:ln w="19050">
+            <a:solidFill>
+              <a:srgbClr val="7030A0"/>
+            </a:solidFill>
+          </a:ln>
+          <a:effectLst/>
+        </p:spPr>
+        <p:style>
+          <a:lnRef idx="1">
+            <a:schemeClr val="accent4"/>
+          </a:lnRef>
+          <a:fillRef idx="2">
+            <a:schemeClr val="accent4"/>
+          </a:fillRef>
+          <a:effectRef idx="1">
+            <a:schemeClr val="accent4"/>
+          </a:effectRef>
+          <a:fontRef idx="minor">
+            <a:schemeClr val="dk1"/>
+          </a:fontRef>
+        </p:style>
+        <p:txBody>
+          <a:bodyPr rtlCol="0" anchor="ctr"/>
+          <a:lstStyle/>
+          <a:p>
+            <a:pPr algn="ctr"/>
+            <a:r>
+              <a:rPr lang="en-US" sz="1050" dirty="0" err="1">
+                <a:solidFill>
+                  <a:srgbClr val="7030A0"/>
+                </a:solidFill>
+              </a:rPr>
+              <a:t>CcaName</a:t>
+            </a:r>
+            <a:endParaRPr lang="en-SG" sz="1050" dirty="0">
+              <a:solidFill>
+                <a:srgbClr val="7030A0"/>
+              </a:solidFill>
+            </a:endParaRPr>
+          </a:p>
+        </p:txBody>
+      </p:sp>
+      <p:cxnSp>
+        <p:nvCxnSpPr>
+          <p:cNvPr id="123" name="Elbow Connector 83">
+            <a:extLst>
+              <a:ext uri="{FF2B5EF4-FFF2-40B4-BE49-F238E27FC236}">
+                <a16:creationId xmlns:a16="http://schemas.microsoft.com/office/drawing/2014/main" id="{B7B96EBF-5503-4A93-AD2A-94A5EF969320}"/>
+              </a:ext>
+            </a:extLst>
+          </p:cNvPr>
+          <p:cNvCxnSpPr/>
+          <p:nvPr/>
+        </p:nvCxnSpPr>
+        <p:spPr>
+          <a:xfrm>
+            <a:off x="7334877" y="4942304"/>
+            <a:ext cx="434402" cy="318195"/>
+          </a:xfrm>
+          <a:prstGeom prst="bentConnector3">
+            <a:avLst/>
+          </a:prstGeom>
+          <a:ln w="19050">
+            <a:solidFill>
+              <a:srgbClr val="7030A0"/>
+            </a:solidFill>
+            <a:headEnd type="none" w="med" len="med"/>
+            <a:tailEnd type="arrow" w="med" len="med"/>
+          </a:ln>
+          <a:effectLst/>
+        </p:spPr>
+        <p:style>
+          <a:lnRef idx="1">
+            <a:schemeClr val="accent2"/>
+          </a:lnRef>
+          <a:fillRef idx="2">
+            <a:schemeClr val="accent2"/>
+          </a:fillRef>
+          <a:effectRef idx="1">
+            <a:schemeClr val="accent2"/>
+          </a:effectRef>
+          <a:fontRef idx="minor">
+            <a:schemeClr val="dk1"/>
+          </a:fontRef>
+        </p:style>
+      </p:cxnSp>
+      <p:sp>
+        <p:nvSpPr>
+          <p:cNvPr id="125" name="Rectangle 8">
+            <a:extLst>
+              <a:ext uri="{FF2B5EF4-FFF2-40B4-BE49-F238E27FC236}">
+                <a16:creationId xmlns:a16="http://schemas.microsoft.com/office/drawing/2014/main" id="{0C9F705A-2435-4D90-88EF-58FEE5842AB7}"/>
+              </a:ext>
+            </a:extLst>
+          </p:cNvPr>
+          <p:cNvSpPr/>
+          <p:nvPr/>
+        </p:nvSpPr>
+        <p:spPr>
+          <a:xfrm>
+            <a:off x="7775799" y="4468715"/>
+            <a:ext cx="708186" cy="285783"/>
+          </a:xfrm>
+          <a:prstGeom prst="rect">
+            <a:avLst/>
+          </a:prstGeom>
+          <a:ln w="19050">
+            <a:solidFill>
+              <a:srgbClr val="7030A0"/>
+            </a:solidFill>
+          </a:ln>
+          <a:effectLst/>
+        </p:spPr>
+        <p:style>
+          <a:lnRef idx="1">
+            <a:schemeClr val="accent4"/>
+          </a:lnRef>
+          <a:fillRef idx="2">
+            <a:schemeClr val="accent4"/>
+          </a:fillRef>
+          <a:effectRef idx="1">
+            <a:schemeClr val="accent4"/>
+          </a:effectRef>
+          <a:fontRef idx="minor">
+            <a:schemeClr val="dk1"/>
+          </a:fontRef>
+        </p:style>
+        <p:txBody>
+          <a:bodyPr rtlCol="0" anchor="ctr"/>
+          <a:lstStyle/>
+          <a:p>
+            <a:pPr algn="ctr"/>
+            <a:r>
+              <a:rPr lang="en-US" sz="1050" dirty="0">
+                <a:solidFill>
+                  <a:srgbClr val="7030A0"/>
+                </a:solidFill>
+              </a:rPr>
+              <a:t>Head</a:t>
+            </a:r>
+            <a:endParaRPr lang="en-SG" sz="1050" dirty="0">
+              <a:solidFill>
+                <a:srgbClr val="7030A0"/>
+              </a:solidFill>
+            </a:endParaRPr>
+          </a:p>
+        </p:txBody>
+      </p:sp>
+      <p:sp>
+        <p:nvSpPr>
+          <p:cNvPr id="126" name="Flowchart: Decision 96">
+            <a:extLst>
+              <a:ext uri="{FF2B5EF4-FFF2-40B4-BE49-F238E27FC236}">
+                <a16:creationId xmlns:a16="http://schemas.microsoft.com/office/drawing/2014/main" id="{07B3C727-F5C7-4EAC-9791-BA4A69E7C1D8}"/>
+              </a:ext>
+            </a:extLst>
+          </p:cNvPr>
+          <p:cNvSpPr/>
+          <p:nvPr/>
+        </p:nvSpPr>
+        <p:spPr>
+          <a:xfrm>
+            <a:off x="7097728" y="4848934"/>
+            <a:ext cx="236048" cy="173380"/>
+          </a:xfrm>
+          <a:prstGeom prst="flowChartDecision">
+            <a:avLst/>
+          </a:prstGeom>
+          <a:solidFill>
+            <a:srgbClr val="7030A0"/>
+          </a:solidFill>
+          <a:ln w="19050">
+            <a:solidFill>
+              <a:srgbClr val="7030A0"/>
+            </a:solidFill>
+          </a:ln>
+          <a:effectLst/>
+        </p:spPr>
+        <p:style>
+          <a:lnRef idx="1">
+            <a:schemeClr val="accent6"/>
+          </a:lnRef>
+          <a:fillRef idx="2">
+            <a:schemeClr val="accent6"/>
+          </a:fillRef>
+          <a:effectRef idx="1">
+            <a:schemeClr val="accent6"/>
+          </a:effectRef>
+          <a:fontRef idx="minor">
+            <a:schemeClr val="dk1"/>
+          </a:fontRef>
+        </p:style>
+        <p:txBody>
+          <a:bodyPr rtlCol="0" anchor="ctr"/>
+          <a:lstStyle/>
+          <a:p>
+            <a:pPr algn="ctr"/>
+            <a:endParaRPr lang="en-US" sz="1050" dirty="0"/>
+          </a:p>
+        </p:txBody>
+      </p:sp>
+      <p:cxnSp>
+        <p:nvCxnSpPr>
+          <p:cNvPr id="127" name="Elbow Connector 78">
+            <a:extLst>
+              <a:ext uri="{FF2B5EF4-FFF2-40B4-BE49-F238E27FC236}">
+                <a16:creationId xmlns:a16="http://schemas.microsoft.com/office/drawing/2014/main" id="{ABB76CF3-8118-4E7A-B413-16EAC1ACE7FA}"/>
+              </a:ext>
+            </a:extLst>
+          </p:cNvPr>
+          <p:cNvCxnSpPr>
+            <a:cxnSpLocks/>
+          </p:cNvCxnSpPr>
+          <p:nvPr/>
+        </p:nvCxnSpPr>
+        <p:spPr>
+          <a:xfrm flipV="1">
+            <a:off x="7340593" y="4612567"/>
+            <a:ext cx="434402" cy="327761"/>
+          </a:xfrm>
+          <a:prstGeom prst="bentConnector3">
+            <a:avLst/>
+          </a:prstGeom>
+          <a:ln w="19050">
+            <a:solidFill>
+              <a:srgbClr val="7030A0"/>
+            </a:solidFill>
+            <a:headEnd type="none" w="med" len="med"/>
+            <a:tailEnd type="arrow" w="med" len="med"/>
+          </a:ln>
+          <a:effectLst/>
+        </p:spPr>
+        <p:style>
+          <a:lnRef idx="1">
+            <a:schemeClr val="accent2"/>
+          </a:lnRef>
+          <a:fillRef idx="2">
+            <a:schemeClr val="accent2"/>
+          </a:fillRef>
+          <a:effectRef idx="1">
+            <a:schemeClr val="accent2"/>
+          </a:effectRef>
+          <a:fontRef idx="minor">
+            <a:schemeClr val="dk1"/>
+          </a:fontRef>
+        </p:style>
+      </p:cxnSp>
+      <p:cxnSp>
+        <p:nvCxnSpPr>
+          <p:cNvPr id="128" name="Elbow Connector 78">
+            <a:extLst>
+              <a:ext uri="{FF2B5EF4-FFF2-40B4-BE49-F238E27FC236}">
+                <a16:creationId xmlns:a16="http://schemas.microsoft.com/office/drawing/2014/main" id="{363F01F8-2F7E-4AAD-B35B-17D0DCBD9D6A}"/>
+              </a:ext>
+            </a:extLst>
+          </p:cNvPr>
+          <p:cNvCxnSpPr>
+            <a:cxnSpLocks/>
+          </p:cNvCxnSpPr>
+          <p:nvPr/>
+        </p:nvCxnSpPr>
+        <p:spPr>
+          <a:xfrm flipV="1">
+            <a:off x="7340593" y="4278134"/>
+            <a:ext cx="434402" cy="663182"/>
+          </a:xfrm>
+          <a:prstGeom prst="bentConnector3">
+            <a:avLst>
+              <a:gd name="adj1" fmla="val 50000"/>
+            </a:avLst>
+          </a:prstGeom>
+          <a:ln w="19050">
+            <a:solidFill>
+              <a:srgbClr val="7030A0"/>
+            </a:solidFill>
+            <a:headEnd type="none" w="med" len="med"/>
+            <a:tailEnd type="arrow" w="med" len="med"/>
+          </a:ln>
+          <a:effectLst/>
+        </p:spPr>
+        <p:style>
+          <a:lnRef idx="1">
+            <a:schemeClr val="accent2"/>
+          </a:lnRef>
+          <a:fillRef idx="2">
+            <a:schemeClr val="accent2"/>
+          </a:fillRef>
+          <a:effectRef idx="1">
+            <a:schemeClr val="accent2"/>
+          </a:effectRef>
+          <a:fontRef idx="minor">
+            <a:schemeClr val="dk1"/>
+          </a:fontRef>
+        </p:style>
+      </p:cxnSp>
+      <p:sp>
+        <p:nvSpPr>
+          <p:cNvPr id="129" name="Rectangle 8">
+            <a:extLst>
+              <a:ext uri="{FF2B5EF4-FFF2-40B4-BE49-F238E27FC236}">
+                <a16:creationId xmlns:a16="http://schemas.microsoft.com/office/drawing/2014/main" id="{AB42FAE2-1CFE-44EB-A223-16FEC3B13FA4}"/>
+              </a:ext>
+            </a:extLst>
+          </p:cNvPr>
+          <p:cNvSpPr/>
+          <p:nvPr/>
+        </p:nvSpPr>
+        <p:spPr>
+          <a:xfrm>
+            <a:off x="7780537" y="4796752"/>
+            <a:ext cx="708186" cy="285783"/>
+          </a:xfrm>
+          <a:prstGeom prst="rect">
+            <a:avLst/>
+          </a:prstGeom>
+          <a:ln w="19050">
+            <a:solidFill>
+              <a:srgbClr val="7030A0"/>
+            </a:solidFill>
+          </a:ln>
+          <a:effectLst/>
+        </p:spPr>
+        <p:style>
+          <a:lnRef idx="1">
+            <a:schemeClr val="accent4"/>
+          </a:lnRef>
+          <a:fillRef idx="2">
+            <a:schemeClr val="accent4"/>
+          </a:fillRef>
+          <a:effectRef idx="1">
+            <a:schemeClr val="accent4"/>
+          </a:effectRef>
+          <a:fontRef idx="minor">
+            <a:schemeClr val="dk1"/>
+          </a:fontRef>
+        </p:style>
+        <p:txBody>
+          <a:bodyPr rtlCol="0" anchor="ctr"/>
+          <a:lstStyle/>
+          <a:p>
+            <a:pPr algn="ctr"/>
+            <a:r>
+              <a:rPr lang="en-US" sz="1050" dirty="0" err="1">
+                <a:solidFill>
+                  <a:srgbClr val="7030A0"/>
+                </a:solidFill>
+              </a:rPr>
+              <a:t>ViceHead</a:t>
+            </a:r>
+            <a:endParaRPr lang="en-SG" sz="1050" dirty="0">
+              <a:solidFill>
+                <a:srgbClr val="7030A0"/>
+              </a:solidFill>
+            </a:endParaRPr>
+          </a:p>
+        </p:txBody>
+      </p:sp>
+      <p:sp>
+        <p:nvSpPr>
+          <p:cNvPr id="130" name="Rectangle 8">
+            <a:extLst>
+              <a:ext uri="{FF2B5EF4-FFF2-40B4-BE49-F238E27FC236}">
+                <a16:creationId xmlns:a16="http://schemas.microsoft.com/office/drawing/2014/main" id="{1B486F23-8C4E-4557-B845-BB636EE85ECE}"/>
+              </a:ext>
+            </a:extLst>
+          </p:cNvPr>
+          <p:cNvSpPr/>
+          <p:nvPr/>
+        </p:nvSpPr>
+        <p:spPr>
+          <a:xfrm>
+            <a:off x="7775799" y="5134150"/>
+            <a:ext cx="708186" cy="285783"/>
+          </a:xfrm>
+          <a:prstGeom prst="rect">
+            <a:avLst/>
+          </a:prstGeom>
+          <a:ln w="19050">
+            <a:solidFill>
+              <a:srgbClr val="7030A0"/>
+            </a:solidFill>
+          </a:ln>
+          <a:effectLst/>
+        </p:spPr>
+        <p:style>
+          <a:lnRef idx="1">
+            <a:schemeClr val="accent4"/>
+          </a:lnRef>
+          <a:fillRef idx="2">
+            <a:schemeClr val="accent4"/>
+          </a:fillRef>
+          <a:effectRef idx="1">
+            <a:schemeClr val="accent4"/>
+          </a:effectRef>
+          <a:fontRef idx="minor">
+            <a:schemeClr val="dk1"/>
+          </a:fontRef>
+        </p:style>
+        <p:txBody>
+          <a:bodyPr rtlCol="0" anchor="ctr"/>
+          <a:lstStyle/>
+          <a:p>
+            <a:pPr algn="ctr"/>
+            <a:r>
+              <a:rPr lang="en-US" sz="1050" dirty="0">
+                <a:solidFill>
+                  <a:srgbClr val="7030A0"/>
+                </a:solidFill>
+              </a:rPr>
+              <a:t>Budget</a:t>
+            </a:r>
+            <a:endParaRPr lang="en-SG" sz="1050" dirty="0">
+              <a:solidFill>
+                <a:srgbClr val="7030A0"/>
+              </a:solidFill>
+            </a:endParaRPr>
+          </a:p>
+        </p:txBody>
+      </p:sp>
+      <p:cxnSp>
+        <p:nvCxnSpPr>
+          <p:cNvPr id="131" name="Elbow Connector 85">
+            <a:extLst>
+              <a:ext uri="{FF2B5EF4-FFF2-40B4-BE49-F238E27FC236}">
+                <a16:creationId xmlns:a16="http://schemas.microsoft.com/office/drawing/2014/main" id="{8AD4EC1D-22B6-47A8-B79A-AFAFFAADC86C}"/>
+              </a:ext>
+            </a:extLst>
+          </p:cNvPr>
+          <p:cNvCxnSpPr/>
+          <p:nvPr/>
+        </p:nvCxnSpPr>
+        <p:spPr>
+          <a:xfrm>
+            <a:off x="7332986" y="4940664"/>
+            <a:ext cx="434402" cy="641172"/>
+          </a:xfrm>
+          <a:prstGeom prst="bentConnector3">
+            <a:avLst/>
+          </a:prstGeom>
+          <a:ln w="19050">
+            <a:solidFill>
+              <a:srgbClr val="7030A0"/>
+            </a:solidFill>
+            <a:headEnd type="none" w="med" len="med"/>
+            <a:tailEnd type="arrow" w="med" len="med"/>
+          </a:ln>
+          <a:effectLst/>
+        </p:spPr>
+        <p:style>
+          <a:lnRef idx="1">
+            <a:schemeClr val="accent2"/>
+          </a:lnRef>
+          <a:fillRef idx="2">
+            <a:schemeClr val="accent2"/>
+          </a:fillRef>
+          <a:effectRef idx="1">
+            <a:schemeClr val="accent2"/>
+          </a:effectRef>
+          <a:fontRef idx="minor">
+            <a:schemeClr val="dk1"/>
+          </a:fontRef>
+        </p:style>
+      </p:cxnSp>
+      <p:sp>
+        <p:nvSpPr>
+          <p:cNvPr id="132" name="Rectangle 8">
+            <a:extLst>
+              <a:ext uri="{FF2B5EF4-FFF2-40B4-BE49-F238E27FC236}">
+                <a16:creationId xmlns:a16="http://schemas.microsoft.com/office/drawing/2014/main" id="{D163BD0A-B339-4D68-9782-06EDD1942CCD}"/>
+              </a:ext>
+            </a:extLst>
+          </p:cNvPr>
+          <p:cNvSpPr/>
+          <p:nvPr/>
+        </p:nvSpPr>
+        <p:spPr>
+          <a:xfrm>
+            <a:off x="7767388" y="5456721"/>
+            <a:ext cx="708186" cy="285783"/>
+          </a:xfrm>
+          <a:prstGeom prst="rect">
+            <a:avLst/>
+          </a:prstGeom>
+          <a:ln w="19050">
+            <a:solidFill>
+              <a:srgbClr val="7030A0"/>
+            </a:solidFill>
+          </a:ln>
+          <a:effectLst/>
+        </p:spPr>
+        <p:style>
+          <a:lnRef idx="1">
+            <a:schemeClr val="accent4"/>
+          </a:lnRef>
+          <a:fillRef idx="2">
+            <a:schemeClr val="accent4"/>
+          </a:fillRef>
+          <a:effectRef idx="1">
+            <a:schemeClr val="accent4"/>
+          </a:effectRef>
+          <a:fontRef idx="minor">
+            <a:schemeClr val="dk1"/>
+          </a:fontRef>
+        </p:style>
+        <p:txBody>
+          <a:bodyPr rtlCol="0" anchor="ctr"/>
+          <a:lstStyle/>
+          <a:p>
+            <a:pPr algn="ctr"/>
+            <a:r>
+              <a:rPr lang="en-US" sz="1050" dirty="0">
+                <a:solidFill>
+                  <a:srgbClr val="7030A0"/>
+                </a:solidFill>
+              </a:rPr>
+              <a:t>Spent</a:t>
+            </a:r>
+            <a:endParaRPr lang="en-SG" sz="1050" dirty="0">
+              <a:solidFill>
+                <a:srgbClr val="7030A0"/>
+              </a:solidFill>
+            </a:endParaRPr>
+          </a:p>
+        </p:txBody>
+      </p:sp>
+      <p:cxnSp>
+        <p:nvCxnSpPr>
+          <p:cNvPr id="133" name="Elbow Connector 80">
+            <a:extLst>
+              <a:ext uri="{FF2B5EF4-FFF2-40B4-BE49-F238E27FC236}">
+                <a16:creationId xmlns:a16="http://schemas.microsoft.com/office/drawing/2014/main" id="{AF0AF8EE-806F-481D-A5E1-C7219D0B2224}"/>
+              </a:ext>
+            </a:extLst>
+          </p:cNvPr>
+          <p:cNvCxnSpPr>
+            <a:cxnSpLocks/>
+          </p:cNvCxnSpPr>
+          <p:nvPr/>
+        </p:nvCxnSpPr>
+        <p:spPr>
+          <a:xfrm rot="16200000" flipH="1">
+            <a:off x="7514160" y="5617369"/>
+            <a:ext cx="291146" cy="217201"/>
+          </a:xfrm>
+          <a:prstGeom prst="bentConnector3">
+            <a:avLst>
+              <a:gd name="adj1" fmla="val 99728"/>
+            </a:avLst>
+          </a:prstGeom>
+          <a:ln w="19050">
+            <a:solidFill>
+              <a:srgbClr val="7030A0"/>
+            </a:solidFill>
+            <a:headEnd type="none" w="med" len="med"/>
+            <a:tailEnd type="arrow" w="med" len="med"/>
+          </a:ln>
+          <a:effectLst/>
+        </p:spPr>
+        <p:style>
+          <a:lnRef idx="1">
+            <a:schemeClr val="accent2"/>
+          </a:lnRef>
+          <a:fillRef idx="2">
+            <a:schemeClr val="accent2"/>
+          </a:fillRef>
+          <a:effectRef idx="1">
+            <a:schemeClr val="accent2"/>
+          </a:effectRef>
+          <a:fontRef idx="minor">
+            <a:schemeClr val="dk1"/>
+          </a:fontRef>
+        </p:style>
+      </p:cxnSp>
+      <p:sp>
+        <p:nvSpPr>
+          <p:cNvPr id="134" name="Rectangle 8">
+            <a:extLst>
+              <a:ext uri="{FF2B5EF4-FFF2-40B4-BE49-F238E27FC236}">
+                <a16:creationId xmlns:a16="http://schemas.microsoft.com/office/drawing/2014/main" id="{CF2B7844-1FBD-4642-A35F-0F46CB02741A}"/>
+              </a:ext>
+            </a:extLst>
+          </p:cNvPr>
+          <p:cNvSpPr/>
+          <p:nvPr/>
+        </p:nvSpPr>
+        <p:spPr>
+          <a:xfrm>
+            <a:off x="7767388" y="5785597"/>
+            <a:ext cx="708186" cy="285783"/>
+          </a:xfrm>
+          <a:prstGeom prst="rect">
+            <a:avLst/>
+          </a:prstGeom>
+          <a:ln w="19050">
+            <a:solidFill>
+              <a:srgbClr val="7030A0"/>
+            </a:solidFill>
+          </a:ln>
+          <a:effectLst/>
+        </p:spPr>
+        <p:style>
+          <a:lnRef idx="1">
+            <a:schemeClr val="accent4"/>
+          </a:lnRef>
+          <a:fillRef idx="2">
+            <a:schemeClr val="accent4"/>
+          </a:fillRef>
+          <a:effectRef idx="1">
+            <a:schemeClr val="accent4"/>
+          </a:effectRef>
+          <a:fontRef idx="minor">
+            <a:schemeClr val="dk1"/>
+          </a:fontRef>
+        </p:style>
+        <p:txBody>
+          <a:bodyPr rtlCol="0" anchor="ctr"/>
+          <a:lstStyle/>
+          <a:p>
+            <a:pPr algn="ctr"/>
+            <a:r>
+              <a:rPr lang="en-US" sz="800" dirty="0">
+                <a:solidFill>
+                  <a:srgbClr val="7030A0"/>
+                </a:solidFill>
+              </a:rPr>
+              <a:t>Outstanding</a:t>
+            </a:r>
+            <a:endParaRPr lang="en-SG" sz="800" dirty="0">
+              <a:solidFill>
+                <a:srgbClr val="7030A0"/>
+              </a:solidFill>
+            </a:endParaRPr>
+          </a:p>
+        </p:txBody>
+      </p:sp>
+      <p:cxnSp>
+        <p:nvCxnSpPr>
+          <p:cNvPr id="135" name="Elbow Connector 80">
+            <a:extLst>
+              <a:ext uri="{FF2B5EF4-FFF2-40B4-BE49-F238E27FC236}">
+                <a16:creationId xmlns:a16="http://schemas.microsoft.com/office/drawing/2014/main" id="{F78D1A34-6467-4FA6-8B1D-7C7F79EB12BE}"/>
+              </a:ext>
+            </a:extLst>
+          </p:cNvPr>
+          <p:cNvCxnSpPr>
+            <a:cxnSpLocks/>
+          </p:cNvCxnSpPr>
+          <p:nvPr/>
+        </p:nvCxnSpPr>
+        <p:spPr>
+          <a:xfrm rot="16200000" flipH="1">
+            <a:off x="7510071" y="5917153"/>
+            <a:ext cx="291146" cy="217201"/>
+          </a:xfrm>
+          <a:prstGeom prst="bentConnector3">
+            <a:avLst>
+              <a:gd name="adj1" fmla="val 99728"/>
+            </a:avLst>
+          </a:prstGeom>
+          <a:ln w="19050">
+            <a:solidFill>
+              <a:srgbClr val="7030A0"/>
+            </a:solidFill>
+            <a:headEnd type="none" w="med" len="med"/>
+            <a:tailEnd type="arrow" w="med" len="med"/>
+          </a:ln>
+          <a:effectLst/>
+        </p:spPr>
+        <p:style>
+          <a:lnRef idx="1">
+            <a:schemeClr val="accent2"/>
+          </a:lnRef>
+          <a:fillRef idx="2">
+            <a:schemeClr val="accent2"/>
+          </a:fillRef>
+          <a:effectRef idx="1">
+            <a:schemeClr val="accent2"/>
+          </a:effectRef>
+          <a:fontRef idx="minor">
+            <a:schemeClr val="dk1"/>
+          </a:fontRef>
+        </p:style>
+      </p:cxnSp>
+      <p:sp>
+        <p:nvSpPr>
+          <p:cNvPr id="136" name="Rectangle 8">
+            <a:extLst>
+              <a:ext uri="{FF2B5EF4-FFF2-40B4-BE49-F238E27FC236}">
+                <a16:creationId xmlns:a16="http://schemas.microsoft.com/office/drawing/2014/main" id="{1BDE1C87-632C-4D8E-853B-1197EACA7836}"/>
+              </a:ext>
+            </a:extLst>
+          </p:cNvPr>
+          <p:cNvSpPr/>
+          <p:nvPr/>
+        </p:nvSpPr>
+        <p:spPr>
+          <a:xfrm>
+            <a:off x="7774995" y="6115017"/>
+            <a:ext cx="708186" cy="285783"/>
+          </a:xfrm>
+          <a:prstGeom prst="rect">
+            <a:avLst/>
+          </a:prstGeom>
+          <a:ln w="19050">
+            <a:solidFill>
+              <a:srgbClr val="7030A0"/>
+            </a:solidFill>
+          </a:ln>
+          <a:effectLst/>
+        </p:spPr>
+        <p:style>
+          <a:lnRef idx="1">
+            <a:schemeClr val="accent4"/>
+          </a:lnRef>
+          <a:fillRef idx="2">
+            <a:schemeClr val="accent4"/>
+          </a:fillRef>
+          <a:effectRef idx="1">
+            <a:schemeClr val="accent4"/>
+          </a:effectRef>
+          <a:fontRef idx="minor">
+            <a:schemeClr val="dk1"/>
+          </a:fontRef>
+        </p:style>
+        <p:txBody>
+          <a:bodyPr rtlCol="0" anchor="ctr"/>
+          <a:lstStyle/>
+          <a:p>
+            <a:pPr algn="ctr"/>
+            <a:r>
+              <a:rPr lang="en-US" sz="800" dirty="0">
+                <a:solidFill>
+                  <a:srgbClr val="7030A0"/>
+                </a:solidFill>
+              </a:rPr>
+              <a:t>Set&lt;Entry&gt;</a:t>
+            </a:r>
+            <a:endParaRPr lang="en-SG" sz="800" dirty="0">
+              <a:solidFill>
+                <a:srgbClr val="7030A0"/>
+              </a:solidFill>
+            </a:endParaRPr>
+          </a:p>
+        </p:txBody>
+      </p:sp>
+      <p:sp>
+        <p:nvSpPr>
+          <p:cNvPr id="137" name="Flowchart: Decision 96">
+            <a:extLst>
+              <a:ext uri="{FF2B5EF4-FFF2-40B4-BE49-F238E27FC236}">
+                <a16:creationId xmlns:a16="http://schemas.microsoft.com/office/drawing/2014/main" id="{235BB24B-D8CC-4D48-9DE8-5E4FCCF6E0EB}"/>
+              </a:ext>
+            </a:extLst>
+          </p:cNvPr>
+          <p:cNvSpPr/>
+          <p:nvPr/>
+        </p:nvSpPr>
+        <p:spPr>
+          <a:xfrm>
+            <a:off x="4383849" y="2910790"/>
+            <a:ext cx="236048" cy="173380"/>
+          </a:xfrm>
+          <a:prstGeom prst="flowChartDecision">
+            <a:avLst/>
+          </a:prstGeom>
+          <a:solidFill>
+            <a:srgbClr val="7030A0"/>
+          </a:solidFill>
+          <a:ln w="19050">
+            <a:solidFill>
+              <a:srgbClr val="7030A0"/>
+            </a:solidFill>
+          </a:ln>
+          <a:effectLst/>
+        </p:spPr>
+        <p:style>
+          <a:lnRef idx="1">
+            <a:schemeClr val="accent6"/>
+          </a:lnRef>
+          <a:fillRef idx="2">
+            <a:schemeClr val="accent6"/>
+          </a:fillRef>
+          <a:effectRef idx="1">
+            <a:schemeClr val="accent6"/>
+          </a:effectRef>
+          <a:fontRef idx="minor">
+            <a:schemeClr val="dk1"/>
+          </a:fontRef>
+        </p:style>
+        <p:txBody>
+          <a:bodyPr rtlCol="0" anchor="ctr"/>
+          <a:lstStyle/>
+          <a:p>
+            <a:pPr algn="ctr"/>
+            <a:endParaRPr lang="en-US" sz="1050" dirty="0"/>
+          </a:p>
+        </p:txBody>
+      </p:sp>
+      <p:cxnSp>
+        <p:nvCxnSpPr>
+          <p:cNvPr id="138" name="Elbow Connector 80">
+            <a:extLst>
+              <a:ext uri="{FF2B5EF4-FFF2-40B4-BE49-F238E27FC236}">
+                <a16:creationId xmlns:a16="http://schemas.microsoft.com/office/drawing/2014/main" id="{741C8E1B-150B-4EE9-A6EA-C07192E586AD}"/>
+              </a:ext>
+            </a:extLst>
+          </p:cNvPr>
+          <p:cNvCxnSpPr>
+            <a:cxnSpLocks/>
+          </p:cNvCxnSpPr>
+          <p:nvPr/>
+        </p:nvCxnSpPr>
+        <p:spPr>
+          <a:xfrm>
+            <a:off x="4615168" y="2997480"/>
+            <a:ext cx="429006" cy="1741"/>
+          </a:xfrm>
+          <a:prstGeom prst="bentConnector3">
+            <a:avLst/>
+          </a:prstGeom>
+          <a:ln w="19050">
+            <a:solidFill>
+              <a:srgbClr val="7030A0"/>
+            </a:solidFill>
+            <a:headEnd type="none" w="med" len="med"/>
+            <a:tailEnd type="arrow" w="med" len="med"/>
+          </a:ln>
+          <a:effectLst/>
+        </p:spPr>
+        <p:style>
+          <a:lnRef idx="1">
+            <a:schemeClr val="accent2"/>
+          </a:lnRef>
+          <a:fillRef idx="2">
+            <a:schemeClr val="accent2"/>
+          </a:fillRef>
+          <a:effectRef idx="1">
+            <a:schemeClr val="accent2"/>
+          </a:effectRef>
+          <a:fontRef idx="minor">
+            <a:schemeClr val="dk1"/>
+          </a:fontRef>
+        </p:style>
+      </p:cxnSp>
+      <p:sp>
+        <p:nvSpPr>
+          <p:cNvPr id="139" name="Rectangle 8">
+            <a:extLst>
+              <a:ext uri="{FF2B5EF4-FFF2-40B4-BE49-F238E27FC236}">
+                <a16:creationId xmlns:a16="http://schemas.microsoft.com/office/drawing/2014/main" id="{668EB5F2-F7CA-4F38-B1D7-FC8CEB4E1D77}"/>
+              </a:ext>
+            </a:extLst>
+          </p:cNvPr>
+          <p:cNvSpPr/>
+          <p:nvPr/>
+        </p:nvSpPr>
+        <p:spPr>
+          <a:xfrm>
+            <a:off x="5044174" y="2874825"/>
+            <a:ext cx="708186" cy="285783"/>
+          </a:xfrm>
+          <a:prstGeom prst="rect">
+            <a:avLst/>
+          </a:prstGeom>
+          <a:ln w="19050">
+            <a:solidFill>
+              <a:srgbClr val="7030A0"/>
+            </a:solidFill>
+          </a:ln>
+          <a:effectLst/>
+        </p:spPr>
+        <p:style>
+          <a:lnRef idx="1">
+            <a:schemeClr val="accent4"/>
+          </a:lnRef>
+          <a:fillRef idx="2">
+            <a:schemeClr val="accent4"/>
+          </a:fillRef>
+          <a:effectRef idx="1">
+            <a:schemeClr val="accent4"/>
+          </a:effectRef>
+          <a:fontRef idx="minor">
+            <a:schemeClr val="dk1"/>
+          </a:fontRef>
+        </p:style>
+        <p:txBody>
+          <a:bodyPr rtlCol="0" anchor="ctr"/>
+          <a:lstStyle/>
+          <a:p>
+            <a:pPr algn="ctr"/>
+            <a:r>
+              <a:rPr lang="en-US" sz="1050" dirty="0">
+                <a:solidFill>
+                  <a:srgbClr val="7030A0"/>
+                </a:solidFill>
+              </a:rPr>
+              <a:t>String</a:t>
+            </a:r>
+            <a:endParaRPr lang="en-SG" sz="1050" dirty="0">
+              <a:solidFill>
+                <a:srgbClr val="7030A0"/>
+              </a:solidFill>
+            </a:endParaRPr>
+          </a:p>
+        </p:txBody>
+      </p:sp>
+      <p:cxnSp>
+        <p:nvCxnSpPr>
+          <p:cNvPr id="140" name="Elbow Connector 78">
+            <a:extLst>
+              <a:ext uri="{FF2B5EF4-FFF2-40B4-BE49-F238E27FC236}">
+                <a16:creationId xmlns:a16="http://schemas.microsoft.com/office/drawing/2014/main" id="{D9CC3A4B-412B-465A-9E85-EAA72505E0EC}"/>
+              </a:ext>
+            </a:extLst>
+          </p:cNvPr>
+          <p:cNvCxnSpPr>
+            <a:cxnSpLocks/>
+          </p:cNvCxnSpPr>
+          <p:nvPr/>
+        </p:nvCxnSpPr>
+        <p:spPr>
+          <a:xfrm flipV="1">
+            <a:off x="4634015" y="2672741"/>
+            <a:ext cx="434402" cy="327761"/>
+          </a:xfrm>
+          <a:prstGeom prst="bentConnector3">
+            <a:avLst/>
+          </a:prstGeom>
+          <a:ln w="19050">
+            <a:solidFill>
+              <a:srgbClr val="7030A0"/>
+            </a:solidFill>
+            <a:headEnd type="none" w="med" len="med"/>
+            <a:tailEnd type="arrow" w="med" len="med"/>
+          </a:ln>
+          <a:effectLst/>
+        </p:spPr>
+        <p:style>
+          <a:lnRef idx="1">
+            <a:schemeClr val="accent2"/>
+          </a:lnRef>
+          <a:fillRef idx="2">
+            <a:schemeClr val="accent2"/>
+          </a:fillRef>
+          <a:effectRef idx="1">
+            <a:schemeClr val="accent2"/>
+          </a:effectRef>
+          <a:fontRef idx="minor">
+            <a:schemeClr val="dk1"/>
+          </a:fontRef>
+        </p:style>
+      </p:cxnSp>
+      <p:cxnSp>
+        <p:nvCxnSpPr>
+          <p:cNvPr id="141" name="Elbow Connector 83">
+            <a:extLst>
+              <a:ext uri="{FF2B5EF4-FFF2-40B4-BE49-F238E27FC236}">
+                <a16:creationId xmlns:a16="http://schemas.microsoft.com/office/drawing/2014/main" id="{64FBD3DF-E12E-4FC7-8E8D-9E2A3F2862E7}"/>
+              </a:ext>
+            </a:extLst>
+          </p:cNvPr>
+          <p:cNvCxnSpPr/>
+          <p:nvPr/>
+        </p:nvCxnSpPr>
+        <p:spPr>
+          <a:xfrm>
+            <a:off x="4626714" y="2996231"/>
+            <a:ext cx="434402" cy="318195"/>
+          </a:xfrm>
+          <a:prstGeom prst="bentConnector3">
+            <a:avLst/>
+          </a:prstGeom>
+          <a:ln w="19050">
+            <a:solidFill>
+              <a:srgbClr val="7030A0"/>
+            </a:solidFill>
+            <a:headEnd type="none" w="med" len="med"/>
+            <a:tailEnd type="arrow" w="med" len="med"/>
+          </a:ln>
+          <a:effectLst/>
+        </p:spPr>
+        <p:style>
+          <a:lnRef idx="1">
+            <a:schemeClr val="accent2"/>
+          </a:lnRef>
+          <a:fillRef idx="2">
+            <a:schemeClr val="accent2"/>
+          </a:fillRef>
+          <a:effectRef idx="1">
+            <a:schemeClr val="accent2"/>
+          </a:effectRef>
+          <a:fontRef idx="minor">
+            <a:schemeClr val="dk1"/>
+          </a:fontRef>
+        </p:style>
+      </p:cxnSp>
+      <p:sp>
+        <p:nvSpPr>
+          <p:cNvPr id="142" name="Rectangle 8">
+            <a:extLst>
+              <a:ext uri="{FF2B5EF4-FFF2-40B4-BE49-F238E27FC236}">
+                <a16:creationId xmlns:a16="http://schemas.microsoft.com/office/drawing/2014/main" id="{7292234E-D14A-4B60-84D2-B45FC55F04F7}"/>
+              </a:ext>
+            </a:extLst>
+          </p:cNvPr>
+          <p:cNvSpPr/>
+          <p:nvPr/>
+        </p:nvSpPr>
+        <p:spPr>
+          <a:xfrm>
+            <a:off x="5056296" y="2548703"/>
+            <a:ext cx="708186" cy="285783"/>
+          </a:xfrm>
+          <a:prstGeom prst="rect">
+            <a:avLst/>
+          </a:prstGeom>
+          <a:ln w="19050">
+            <a:solidFill>
+              <a:srgbClr val="7030A0"/>
+            </a:solidFill>
+          </a:ln>
+          <a:effectLst/>
+        </p:spPr>
+        <p:style>
+          <a:lnRef idx="1">
+            <a:schemeClr val="accent4"/>
+          </a:lnRef>
+          <a:fillRef idx="2">
+            <a:schemeClr val="accent4"/>
+          </a:fillRef>
+          <a:effectRef idx="1">
+            <a:schemeClr val="accent4"/>
+          </a:effectRef>
+          <a:fontRef idx="minor">
+            <a:schemeClr val="dk1"/>
+          </a:fontRef>
+        </p:style>
+        <p:txBody>
+          <a:bodyPr rtlCol="0" anchor="ctr"/>
+          <a:lstStyle/>
+          <a:p>
+            <a:pPr algn="ctr"/>
+            <a:r>
+              <a:rPr lang="en-US" sz="1050" dirty="0">
+                <a:solidFill>
+                  <a:srgbClr val="7030A0"/>
+                </a:solidFill>
+              </a:rPr>
+              <a:t>Email</a:t>
+            </a:r>
+            <a:endParaRPr lang="en-SG" sz="1050" dirty="0">
+              <a:solidFill>
+                <a:srgbClr val="7030A0"/>
+              </a:solidFill>
+            </a:endParaRPr>
+          </a:p>
+        </p:txBody>
+      </p:sp>
+      <p:sp>
+        <p:nvSpPr>
+          <p:cNvPr id="143" name="Rectangle 8">
+            <a:extLst>
+              <a:ext uri="{FF2B5EF4-FFF2-40B4-BE49-F238E27FC236}">
+                <a16:creationId xmlns:a16="http://schemas.microsoft.com/office/drawing/2014/main" id="{7AC2375B-53B2-4787-97BB-0441872E7B6E}"/>
+              </a:ext>
+            </a:extLst>
+          </p:cNvPr>
+          <p:cNvSpPr/>
+          <p:nvPr/>
+        </p:nvSpPr>
+        <p:spPr>
+          <a:xfrm>
+            <a:off x="5044340" y="3219417"/>
+            <a:ext cx="708186" cy="285783"/>
+          </a:xfrm>
+          <a:prstGeom prst="rect">
+            <a:avLst/>
+          </a:prstGeom>
+          <a:ln w="19050">
+            <a:solidFill>
+              <a:srgbClr val="7030A0"/>
+            </a:solidFill>
+          </a:ln>
+          <a:effectLst/>
+        </p:spPr>
+        <p:style>
+          <a:lnRef idx="1">
+            <a:schemeClr val="accent4"/>
+          </a:lnRef>
+          <a:fillRef idx="2">
+            <a:schemeClr val="accent4"/>
+          </a:fillRef>
+          <a:effectRef idx="1">
+            <a:schemeClr val="accent4"/>
+          </a:effectRef>
+          <a:fontRef idx="minor">
+            <a:schemeClr val="dk1"/>
+          </a:fontRef>
+        </p:style>
+        <p:txBody>
+          <a:bodyPr rtlCol="0" anchor="ctr"/>
+          <a:lstStyle/>
+          <a:p>
+            <a:pPr algn="ctr"/>
+            <a:r>
+              <a:rPr lang="en-US" sz="800" dirty="0">
+                <a:solidFill>
+                  <a:srgbClr val="7030A0"/>
+                </a:solidFill>
+              </a:rPr>
+              <a:t>Set&lt;String&gt;</a:t>
+            </a:r>
+            <a:endParaRPr lang="en-SG" sz="800" dirty="0">
+              <a:solidFill>
+                <a:srgbClr val="7030A0"/>
+              </a:solidFill>
+            </a:endParaRPr>
+          </a:p>
+        </p:txBody>
+      </p:sp>
+      <p:cxnSp>
+        <p:nvCxnSpPr>
+          <p:cNvPr id="144" name="Elbow Connector 80">
+            <a:extLst>
+              <a:ext uri="{FF2B5EF4-FFF2-40B4-BE49-F238E27FC236}">
+                <a16:creationId xmlns:a16="http://schemas.microsoft.com/office/drawing/2014/main" id="{38D0691E-2122-496F-89F6-76B58663CCB3}"/>
+              </a:ext>
+            </a:extLst>
+          </p:cNvPr>
+          <p:cNvCxnSpPr>
+            <a:cxnSpLocks/>
+          </p:cNvCxnSpPr>
+          <p:nvPr/>
+        </p:nvCxnSpPr>
+        <p:spPr>
+          <a:xfrm>
+            <a:off x="6263462" y="3887480"/>
+            <a:ext cx="429006" cy="1741"/>
+          </a:xfrm>
+          <a:prstGeom prst="bentConnector3">
+            <a:avLst/>
+          </a:prstGeom>
+          <a:ln w="19050">
+            <a:solidFill>
+              <a:srgbClr val="7030A0"/>
+            </a:solidFill>
+            <a:headEnd type="none" w="med" len="med"/>
+            <a:tailEnd type="arrow" w="med" len="med"/>
+          </a:ln>
+          <a:effectLst/>
+        </p:spPr>
+        <p:style>
+          <a:lnRef idx="1">
+            <a:schemeClr val="accent2"/>
+          </a:lnRef>
+          <a:fillRef idx="2">
+            <a:schemeClr val="accent2"/>
+          </a:fillRef>
+          <a:effectRef idx="1">
+            <a:schemeClr val="accent2"/>
+          </a:effectRef>
+          <a:fontRef idx="minor">
+            <a:schemeClr val="dk1"/>
+          </a:fontRef>
+        </p:style>
+      </p:cxnSp>
+      <p:cxnSp>
+        <p:nvCxnSpPr>
+          <p:cNvPr id="145" name="Elbow Connector 83">
+            <a:extLst>
+              <a:ext uri="{FF2B5EF4-FFF2-40B4-BE49-F238E27FC236}">
+                <a16:creationId xmlns:a16="http://schemas.microsoft.com/office/drawing/2014/main" id="{EA466D1F-B770-43A6-92CD-1BAA113AC157}"/>
+              </a:ext>
+            </a:extLst>
+          </p:cNvPr>
+          <p:cNvCxnSpPr/>
+          <p:nvPr/>
+        </p:nvCxnSpPr>
+        <p:spPr>
+          <a:xfrm>
+            <a:off x="6258066" y="3891232"/>
+            <a:ext cx="434402" cy="318195"/>
+          </a:xfrm>
+          <a:prstGeom prst="bentConnector3">
+            <a:avLst/>
+          </a:prstGeom>
+          <a:ln w="19050">
+            <a:solidFill>
+              <a:srgbClr val="7030A0"/>
+            </a:solidFill>
+            <a:headEnd type="none" w="med" len="med"/>
+            <a:tailEnd type="arrow" w="med" len="med"/>
+          </a:ln>
+          <a:effectLst/>
+        </p:spPr>
+        <p:style>
+          <a:lnRef idx="1">
+            <a:schemeClr val="accent2"/>
+          </a:lnRef>
+          <a:fillRef idx="2">
+            <a:schemeClr val="accent2"/>
+          </a:fillRef>
+          <a:effectRef idx="1">
+            <a:schemeClr val="accent2"/>
+          </a:effectRef>
+          <a:fontRef idx="minor">
+            <a:schemeClr val="dk1"/>
+          </a:fontRef>
+        </p:style>
+      </p:cxnSp>
+      <p:cxnSp>
+        <p:nvCxnSpPr>
+          <p:cNvPr id="146" name="Elbow Connector 78">
+            <a:extLst>
+              <a:ext uri="{FF2B5EF4-FFF2-40B4-BE49-F238E27FC236}">
+                <a16:creationId xmlns:a16="http://schemas.microsoft.com/office/drawing/2014/main" id="{9E15AC06-CE8E-4687-A2A5-008EBB94D0C1}"/>
+              </a:ext>
+            </a:extLst>
+          </p:cNvPr>
+          <p:cNvCxnSpPr>
+            <a:cxnSpLocks/>
+          </p:cNvCxnSpPr>
+          <p:nvPr/>
+        </p:nvCxnSpPr>
+        <p:spPr>
+          <a:xfrm flipV="1">
+            <a:off x="6263782" y="3561495"/>
+            <a:ext cx="434402" cy="327761"/>
+          </a:xfrm>
+          <a:prstGeom prst="bentConnector3">
+            <a:avLst/>
+          </a:prstGeom>
+          <a:ln w="19050">
+            <a:solidFill>
+              <a:srgbClr val="7030A0"/>
+            </a:solidFill>
+            <a:headEnd type="none" w="med" len="med"/>
+            <a:tailEnd type="arrow" w="med" len="med"/>
+          </a:ln>
+          <a:effectLst/>
+        </p:spPr>
+        <p:style>
+          <a:lnRef idx="1">
+            <a:schemeClr val="accent2"/>
+          </a:lnRef>
+          <a:fillRef idx="2">
+            <a:schemeClr val="accent2"/>
+          </a:fillRef>
+          <a:effectRef idx="1">
+            <a:schemeClr val="accent2"/>
+          </a:effectRef>
+          <a:fontRef idx="minor">
+            <a:schemeClr val="dk1"/>
+          </a:fontRef>
+        </p:style>
+      </p:cxnSp>
+      <p:cxnSp>
+        <p:nvCxnSpPr>
+          <p:cNvPr id="147" name="Elbow Connector 78">
+            <a:extLst>
+              <a:ext uri="{FF2B5EF4-FFF2-40B4-BE49-F238E27FC236}">
+                <a16:creationId xmlns:a16="http://schemas.microsoft.com/office/drawing/2014/main" id="{96517968-CFC5-423A-B5F1-BCA2C11706A4}"/>
+              </a:ext>
+            </a:extLst>
+          </p:cNvPr>
+          <p:cNvCxnSpPr>
+            <a:cxnSpLocks/>
+          </p:cNvCxnSpPr>
+          <p:nvPr/>
+        </p:nvCxnSpPr>
+        <p:spPr>
+          <a:xfrm flipV="1">
+            <a:off x="6263782" y="3227062"/>
+            <a:ext cx="434402" cy="663182"/>
+          </a:xfrm>
+          <a:prstGeom prst="bentConnector3">
+            <a:avLst>
+              <a:gd name="adj1" fmla="val 50000"/>
+            </a:avLst>
+          </a:prstGeom>
+          <a:ln w="19050">
+            <a:solidFill>
+              <a:srgbClr val="7030A0"/>
+            </a:solidFill>
+            <a:headEnd type="none" w="med" len="med"/>
+            <a:tailEnd type="arrow" w="med" len="med"/>
+          </a:ln>
+          <a:effectLst/>
+        </p:spPr>
+        <p:style>
+          <a:lnRef idx="1">
+            <a:schemeClr val="accent2"/>
+          </a:lnRef>
+          <a:fillRef idx="2">
+            <a:schemeClr val="accent2"/>
+          </a:fillRef>
+          <a:effectRef idx="1">
+            <a:schemeClr val="accent2"/>
+          </a:effectRef>
+          <a:fontRef idx="minor">
+            <a:schemeClr val="dk1"/>
+          </a:fontRef>
+        </p:style>
+      </p:cxnSp>
+      <p:cxnSp>
+        <p:nvCxnSpPr>
+          <p:cNvPr id="148" name="Elbow Connector 85">
+            <a:extLst>
+              <a:ext uri="{FF2B5EF4-FFF2-40B4-BE49-F238E27FC236}">
+                <a16:creationId xmlns:a16="http://schemas.microsoft.com/office/drawing/2014/main" id="{8EF09F3D-9454-4327-9E05-52F54B00051F}"/>
+              </a:ext>
+            </a:extLst>
+          </p:cNvPr>
+          <p:cNvCxnSpPr/>
+          <p:nvPr/>
+        </p:nvCxnSpPr>
+        <p:spPr>
+          <a:xfrm>
+            <a:off x="6256175" y="3889592"/>
+            <a:ext cx="434402" cy="641172"/>
+          </a:xfrm>
+          <a:prstGeom prst="bentConnector3">
+            <a:avLst/>
+          </a:prstGeom>
+          <a:ln w="19050">
+            <a:solidFill>
+              <a:srgbClr val="7030A0"/>
+            </a:solidFill>
+            <a:headEnd type="none" w="med" len="med"/>
+            <a:tailEnd type="arrow" w="med" len="med"/>
+          </a:ln>
+          <a:effectLst/>
+        </p:spPr>
+        <p:style>
+          <a:lnRef idx="1">
+            <a:schemeClr val="accent2"/>
+          </a:lnRef>
+          <a:fillRef idx="2">
+            <a:schemeClr val="accent2"/>
+          </a:fillRef>
+          <a:effectRef idx="1">
+            <a:schemeClr val="accent2"/>
+          </a:effectRef>
+          <a:fontRef idx="minor">
+            <a:schemeClr val="dk1"/>
+          </a:fontRef>
+        </p:style>
+      </p:cxnSp>
+      <p:sp>
+        <p:nvSpPr>
+          <p:cNvPr id="149" name="Rectangle 8">
+            <a:extLst>
+              <a:ext uri="{FF2B5EF4-FFF2-40B4-BE49-F238E27FC236}">
+                <a16:creationId xmlns:a16="http://schemas.microsoft.com/office/drawing/2014/main" id="{F015084B-EE12-4EA5-B2D6-DDD2C8F53783}"/>
+              </a:ext>
+            </a:extLst>
+          </p:cNvPr>
+          <p:cNvSpPr/>
+          <p:nvPr/>
+        </p:nvSpPr>
+        <p:spPr>
+          <a:xfrm>
+            <a:off x="6697864" y="3084170"/>
+            <a:ext cx="708186" cy="285783"/>
+          </a:xfrm>
+          <a:prstGeom prst="rect">
+            <a:avLst/>
+          </a:prstGeom>
+          <a:ln w="19050">
+            <a:solidFill>
+              <a:srgbClr val="7030A0"/>
+            </a:solidFill>
+          </a:ln>
+          <a:effectLst/>
+        </p:spPr>
+        <p:style>
+          <a:lnRef idx="1">
+            <a:schemeClr val="accent4"/>
+          </a:lnRef>
+          <a:fillRef idx="2">
+            <a:schemeClr val="accent4"/>
+          </a:fillRef>
+          <a:effectRef idx="1">
+            <a:schemeClr val="accent4"/>
+          </a:effectRef>
+          <a:fontRef idx="minor">
+            <a:schemeClr val="dk1"/>
+          </a:fontRef>
+        </p:style>
+        <p:txBody>
+          <a:bodyPr rtlCol="0" anchor="ctr"/>
+          <a:lstStyle/>
+          <a:p>
+            <a:pPr algn="ctr"/>
+            <a:r>
+              <a:rPr lang="en-US" sz="700" dirty="0">
+                <a:solidFill>
+                  <a:srgbClr val="7030A0"/>
+                </a:solidFill>
+              </a:rPr>
+              <a:t>Map&lt;Year, Set&lt;Month&gt;&gt;</a:t>
+            </a:r>
+            <a:endParaRPr lang="en-SG" sz="700" dirty="0">
+              <a:solidFill>
+                <a:srgbClr val="7030A0"/>
+              </a:solidFill>
+            </a:endParaRPr>
+          </a:p>
+        </p:txBody>
+      </p:sp>
+      <p:sp>
+        <p:nvSpPr>
+          <p:cNvPr id="150" name="Rectangle 8">
+            <a:extLst>
+              <a:ext uri="{FF2B5EF4-FFF2-40B4-BE49-F238E27FC236}">
+                <a16:creationId xmlns:a16="http://schemas.microsoft.com/office/drawing/2014/main" id="{889D5573-7014-48A6-8F3E-09A356CB08F2}"/>
+              </a:ext>
+            </a:extLst>
+          </p:cNvPr>
+          <p:cNvSpPr/>
+          <p:nvPr/>
+        </p:nvSpPr>
+        <p:spPr>
+          <a:xfrm>
+            <a:off x="6697864" y="3412459"/>
+            <a:ext cx="708186" cy="285783"/>
+          </a:xfrm>
+          <a:prstGeom prst="rect">
+            <a:avLst/>
+          </a:prstGeom>
+          <a:ln w="19050">
+            <a:solidFill>
+              <a:srgbClr val="7030A0"/>
+            </a:solidFill>
+          </a:ln>
+          <a:effectLst/>
+        </p:spPr>
+        <p:style>
+          <a:lnRef idx="1">
+            <a:schemeClr val="accent4"/>
+          </a:lnRef>
+          <a:fillRef idx="2">
+            <a:schemeClr val="accent4"/>
+          </a:fillRef>
+          <a:effectRef idx="1">
+            <a:schemeClr val="accent4"/>
+          </a:effectRef>
+          <a:fontRef idx="minor">
+            <a:schemeClr val="dk1"/>
+          </a:fontRef>
+        </p:style>
+        <p:txBody>
+          <a:bodyPr rtlCol="0" anchor="ctr"/>
+          <a:lstStyle/>
+          <a:p>
+            <a:pPr algn="ctr"/>
+            <a:r>
+              <a:rPr lang="en-US" sz="1000" dirty="0">
+                <a:solidFill>
+                  <a:srgbClr val="7030A0"/>
+                </a:solidFill>
+              </a:rPr>
+              <a:t>Calendar</a:t>
+            </a:r>
+            <a:endParaRPr lang="en-SG" sz="1000" dirty="0">
+              <a:solidFill>
+                <a:srgbClr val="7030A0"/>
+              </a:solidFill>
+            </a:endParaRPr>
+          </a:p>
+        </p:txBody>
+      </p:sp>
+      <p:sp>
+        <p:nvSpPr>
+          <p:cNvPr id="151" name="Rectangle 8">
+            <a:extLst>
+              <a:ext uri="{FF2B5EF4-FFF2-40B4-BE49-F238E27FC236}">
+                <a16:creationId xmlns:a16="http://schemas.microsoft.com/office/drawing/2014/main" id="{9F5CE8EA-D823-4C8D-8E03-03A7D0AF0B10}"/>
+              </a:ext>
+            </a:extLst>
+          </p:cNvPr>
+          <p:cNvSpPr/>
+          <p:nvPr/>
+        </p:nvSpPr>
+        <p:spPr>
+          <a:xfrm>
+            <a:off x="6702602" y="3740496"/>
+            <a:ext cx="708186" cy="285783"/>
+          </a:xfrm>
+          <a:prstGeom prst="rect">
+            <a:avLst/>
+          </a:prstGeom>
+          <a:ln w="19050">
+            <a:solidFill>
+              <a:srgbClr val="7030A0"/>
+            </a:solidFill>
+          </a:ln>
+          <a:effectLst/>
+        </p:spPr>
+        <p:style>
+          <a:lnRef idx="1">
+            <a:schemeClr val="accent4"/>
+          </a:lnRef>
+          <a:fillRef idx="2">
+            <a:schemeClr val="accent4"/>
+          </a:fillRef>
+          <a:effectRef idx="1">
+            <a:schemeClr val="accent4"/>
+          </a:effectRef>
+          <a:fontRef idx="minor">
+            <a:schemeClr val="dk1"/>
+          </a:fontRef>
+        </p:style>
+        <p:txBody>
+          <a:bodyPr rtlCol="0" anchor="ctr"/>
+          <a:lstStyle/>
+          <a:p>
+            <a:pPr algn="ctr"/>
+            <a:r>
+              <a:rPr lang="en-US" sz="1050" dirty="0">
+                <a:solidFill>
+                  <a:srgbClr val="7030A0"/>
+                </a:solidFill>
+              </a:rPr>
+              <a:t>String</a:t>
+            </a:r>
+            <a:endParaRPr lang="en-SG" sz="1050" dirty="0">
+              <a:solidFill>
+                <a:srgbClr val="7030A0"/>
+              </a:solidFill>
+            </a:endParaRPr>
+          </a:p>
+        </p:txBody>
+      </p:sp>
+      <p:sp>
+        <p:nvSpPr>
+          <p:cNvPr id="152" name="Rectangle 8">
+            <a:extLst>
+              <a:ext uri="{FF2B5EF4-FFF2-40B4-BE49-F238E27FC236}">
+                <a16:creationId xmlns:a16="http://schemas.microsoft.com/office/drawing/2014/main" id="{1A2CAD6B-9B86-4B81-940F-10A903D13C70}"/>
+              </a:ext>
+            </a:extLst>
+          </p:cNvPr>
+          <p:cNvSpPr/>
+          <p:nvPr/>
+        </p:nvSpPr>
+        <p:spPr>
+          <a:xfrm>
+            <a:off x="6697864" y="4077894"/>
+            <a:ext cx="708186" cy="285783"/>
+          </a:xfrm>
+          <a:prstGeom prst="rect">
+            <a:avLst/>
+          </a:prstGeom>
+          <a:ln w="19050">
+            <a:solidFill>
+              <a:srgbClr val="7030A0"/>
+            </a:solidFill>
+          </a:ln>
+          <a:effectLst/>
+        </p:spPr>
+        <p:style>
+          <a:lnRef idx="1">
+            <a:schemeClr val="accent4"/>
+          </a:lnRef>
+          <a:fillRef idx="2">
+            <a:schemeClr val="accent4"/>
+          </a:fillRef>
+          <a:effectRef idx="1">
+            <a:schemeClr val="accent4"/>
+          </a:effectRef>
+          <a:fontRef idx="minor">
+            <a:schemeClr val="dk1"/>
+          </a:fontRef>
+        </p:style>
+        <p:txBody>
+          <a:bodyPr rtlCol="0" anchor="ctr"/>
+          <a:lstStyle/>
+          <a:p>
+            <a:pPr algn="ctr"/>
+            <a:r>
+              <a:rPr lang="en-US" sz="1050" dirty="0" err="1">
+                <a:solidFill>
+                  <a:srgbClr val="7030A0"/>
+                </a:solidFill>
+              </a:rPr>
+              <a:t>VEvent</a:t>
+            </a:r>
+            <a:endParaRPr lang="en-SG" sz="1050" dirty="0">
+              <a:solidFill>
+                <a:srgbClr val="7030A0"/>
+              </a:solidFill>
+            </a:endParaRPr>
+          </a:p>
+        </p:txBody>
+      </p:sp>
+      <p:sp>
+        <p:nvSpPr>
+          <p:cNvPr id="153" name="Rectangle 8">
+            <a:extLst>
+              <a:ext uri="{FF2B5EF4-FFF2-40B4-BE49-F238E27FC236}">
+                <a16:creationId xmlns:a16="http://schemas.microsoft.com/office/drawing/2014/main" id="{4D0C48A0-E910-4397-8290-ACA19C927B26}"/>
+              </a:ext>
+            </a:extLst>
+          </p:cNvPr>
+          <p:cNvSpPr/>
+          <p:nvPr/>
+        </p:nvSpPr>
+        <p:spPr>
+          <a:xfrm>
+            <a:off x="6689453" y="4400465"/>
+            <a:ext cx="708186" cy="285783"/>
+          </a:xfrm>
+          <a:prstGeom prst="rect">
+            <a:avLst/>
+          </a:prstGeom>
+          <a:ln w="19050">
+            <a:solidFill>
+              <a:srgbClr val="7030A0"/>
+            </a:solidFill>
+          </a:ln>
+          <a:effectLst/>
+        </p:spPr>
+        <p:style>
+          <a:lnRef idx="1">
+            <a:schemeClr val="accent4"/>
+          </a:lnRef>
+          <a:fillRef idx="2">
+            <a:schemeClr val="accent4"/>
+          </a:fillRef>
+          <a:effectRef idx="1">
+            <a:schemeClr val="accent4"/>
+          </a:effectRef>
+          <a:fontRef idx="minor">
+            <a:schemeClr val="dk1"/>
+          </a:fontRef>
+        </p:style>
+        <p:txBody>
+          <a:bodyPr rtlCol="0" anchor="ctr"/>
+          <a:lstStyle/>
+          <a:p>
+            <a:pPr algn="ctr"/>
+            <a:r>
+              <a:rPr lang="en-US" sz="800" dirty="0">
+                <a:solidFill>
+                  <a:srgbClr val="7030A0"/>
+                </a:solidFill>
+              </a:rPr>
+              <a:t>Map&lt;Month, Integer&gt;</a:t>
+            </a:r>
+            <a:endParaRPr lang="en-SG" sz="800" dirty="0">
+              <a:solidFill>
+                <a:srgbClr val="7030A0"/>
+              </a:solidFill>
+            </a:endParaRPr>
+          </a:p>
+        </p:txBody>
+      </p:sp>
+      <p:sp>
+        <p:nvSpPr>
+          <p:cNvPr id="154" name="Flowchart: Decision 96">
+            <a:extLst>
+              <a:ext uri="{FF2B5EF4-FFF2-40B4-BE49-F238E27FC236}">
+                <a16:creationId xmlns:a16="http://schemas.microsoft.com/office/drawing/2014/main" id="{41CF2B87-A103-4E6B-8CBD-AA7F099C1D92}"/>
+              </a:ext>
+            </a:extLst>
+          </p:cNvPr>
+          <p:cNvSpPr/>
+          <p:nvPr/>
+        </p:nvSpPr>
+        <p:spPr>
+          <a:xfrm>
+            <a:off x="6049925" y="3799186"/>
+            <a:ext cx="236048" cy="173380"/>
+          </a:xfrm>
+          <a:prstGeom prst="flowChartDecision">
+            <a:avLst/>
+          </a:prstGeom>
+          <a:solidFill>
+            <a:srgbClr val="7030A0"/>
+          </a:solidFill>
+          <a:ln w="19050">
+            <a:solidFill>
+              <a:srgbClr val="7030A0"/>
+            </a:solidFill>
+          </a:ln>
+          <a:effectLst/>
+        </p:spPr>
+        <p:style>
+          <a:lnRef idx="1">
+            <a:schemeClr val="accent6"/>
+          </a:lnRef>
+          <a:fillRef idx="2">
+            <a:schemeClr val="accent6"/>
+          </a:fillRef>
+          <a:effectRef idx="1">
+            <a:schemeClr val="accent6"/>
+          </a:effectRef>
+          <a:fontRef idx="minor">
+            <a:schemeClr val="dk1"/>
+          </a:fontRef>
+        </p:style>
+        <p:txBody>
+          <a:bodyPr rtlCol="0" anchor="ctr"/>
+          <a:lstStyle/>
+          <a:p>
+            <a:pPr algn="ctr"/>
+            <a:endParaRPr lang="en-US" sz="1050" dirty="0"/>
+          </a:p>
+        </p:txBody>
+      </p:sp>
+      <p:cxnSp>
+        <p:nvCxnSpPr>
+          <p:cNvPr id="155" name="Connector: Elbow 154">
+            <a:extLst>
+              <a:ext uri="{FF2B5EF4-FFF2-40B4-BE49-F238E27FC236}">
+                <a16:creationId xmlns:a16="http://schemas.microsoft.com/office/drawing/2014/main" id="{48299C2C-3497-4CA2-B9F3-470E5C667AEC}"/>
+              </a:ext>
+            </a:extLst>
+          </p:cNvPr>
+          <p:cNvCxnSpPr>
+            <a:cxnSpLocks/>
+          </p:cNvCxnSpPr>
+          <p:nvPr/>
+        </p:nvCxnSpPr>
+        <p:spPr>
+          <a:xfrm>
+            <a:off x="2362200" y="4615794"/>
+            <a:ext cx="4270975" cy="174212"/>
+          </a:xfrm>
+          <a:prstGeom prst="bentConnector2">
+            <a:avLst/>
+          </a:prstGeom>
+          <a:ln>
+            <a:solidFill>
+              <a:srgbClr val="7030A0"/>
+            </a:solidFill>
+            <a:headEnd type="none" w="med" len="med"/>
+            <a:tailEnd type="arrow" w="med" len="med"/>
+          </a:ln>
+        </p:spPr>
+        <p:style>
+          <a:lnRef idx="1">
+            <a:schemeClr val="accent4"/>
+          </a:lnRef>
+          <a:fillRef idx="0">
+            <a:schemeClr val="accent4"/>
+          </a:fillRef>
+          <a:effectRef idx="0">
+            <a:schemeClr val="accent4"/>
+          </a:effectRef>
+          <a:fontRef idx="minor">
+            <a:schemeClr val="tx1"/>
+          </a:fontRef>
+        </p:style>
+      </p:cxnSp>
+      <p:sp>
+        <p:nvSpPr>
+          <p:cNvPr id="156" name="TextBox 155">
+            <a:extLst>
+              <a:ext uri="{FF2B5EF4-FFF2-40B4-BE49-F238E27FC236}">
+                <a16:creationId xmlns:a16="http://schemas.microsoft.com/office/drawing/2014/main" id="{3C9E4A81-7A80-460A-9BC4-9162583EF19A}"/>
+              </a:ext>
+            </a:extLst>
+          </p:cNvPr>
+          <p:cNvSpPr txBox="1"/>
+          <p:nvPr/>
+        </p:nvSpPr>
+        <p:spPr>
+          <a:xfrm>
+            <a:off x="4581856" y="4395042"/>
+            <a:ext cx="800219" cy="261610"/>
+          </a:xfrm>
+          <a:prstGeom prst="rect">
+            <a:avLst/>
+          </a:prstGeom>
+          <a:noFill/>
+        </p:spPr>
+        <p:txBody>
+          <a:bodyPr wrap="none" rtlCol="0">
+            <a:spAutoFit/>
+          </a:bodyPr>
+          <a:lstStyle/>
+          <a:p>
+            <a:r>
+              <a:rPr lang="en-US" sz="1100" dirty="0">
+                <a:solidFill>
+                  <a:srgbClr val="7030A0"/>
+                </a:solidFill>
+              </a:rPr>
+              <a:t>filtered list</a:t>
+            </a:r>
+            <a:endParaRPr lang="en-SG" sz="1100" dirty="0">
+              <a:solidFill>
+                <a:srgbClr val="7030A0"/>
+              </a:solidFill>
+            </a:endParaRPr>
+          </a:p>
+        </p:txBody>
+      </p:sp>
+      <p:sp>
+        <p:nvSpPr>
+          <p:cNvPr id="157" name="TextBox 156">
+            <a:extLst>
+              <a:ext uri="{FF2B5EF4-FFF2-40B4-BE49-F238E27FC236}">
+                <a16:creationId xmlns:a16="http://schemas.microsoft.com/office/drawing/2014/main" id="{A934876F-F313-49AB-9C45-95F7CF23E791}"/>
+              </a:ext>
+            </a:extLst>
+          </p:cNvPr>
+          <p:cNvSpPr txBox="1"/>
+          <p:nvPr/>
+        </p:nvSpPr>
+        <p:spPr>
+          <a:xfrm>
+            <a:off x="6367276" y="4580018"/>
+            <a:ext cx="256802" cy="261610"/>
+          </a:xfrm>
+          <a:prstGeom prst="rect">
+            <a:avLst/>
+          </a:prstGeom>
+          <a:noFill/>
+        </p:spPr>
+        <p:txBody>
+          <a:bodyPr wrap="none" rtlCol="0">
+            <a:spAutoFit/>
+          </a:bodyPr>
+          <a:lstStyle/>
+          <a:p>
+            <a:r>
+              <a:rPr lang="en-US" sz="1100" dirty="0">
+                <a:solidFill>
+                  <a:srgbClr val="7030A0"/>
+                </a:solidFill>
+              </a:rPr>
+              <a:t>1</a:t>
+            </a:r>
+            <a:endParaRPr lang="en-SG" sz="1100" dirty="0">
+              <a:solidFill>
+                <a:srgbClr val="7030A0"/>
+              </a:solidFill>
+            </a:endParaRPr>
+          </a:p>
+        </p:txBody>
+      </p:sp>
     </p:spTree>
     <p:extLst>
       <p:ext uri="{BB962C8B-B14F-4D97-AF65-F5344CB8AC3E}">

</xml_diff>

<commit_message>
docs/diagram: Update model to include Name for account
</commit_message>
<xml_diff>
--- a/docs/diagrams/ModelComponentClassBetterOopDiagram.pptx
+++ b/docs/diagrams/ModelComponentClassBetterOopDiagram.pptx
@@ -208,7 +208,7 @@
           <a:p>
             <a:fld id="{F5CC4B3F-88C1-4FFA-B1B6-F41C21DC6924}" type="datetimeFigureOut">
               <a:rPr lang="en-US" smtClean="0"/>
-              <a:t>12-Nov-18</a:t>
+              <a:t>11/12/2018</a:t>
             </a:fld>
             <a:endParaRPr lang="en-US"/>
           </a:p>
@@ -654,7 +654,7 @@
           <a:p>
             <a:fld id="{78C97017-6FC3-485B-9764-EAC9E56C1D49}" type="datetimeFigureOut">
               <a:rPr lang="en-US" smtClean="0"/>
-              <a:t>12-Nov-18</a:t>
+              <a:t>11/12/2018</a:t>
             </a:fld>
             <a:endParaRPr lang="en-US"/>
           </a:p>
@@ -822,7 +822,7 @@
           <a:p>
             <a:fld id="{78C97017-6FC3-485B-9764-EAC9E56C1D49}" type="datetimeFigureOut">
               <a:rPr lang="en-US" smtClean="0"/>
-              <a:t>12-Nov-18</a:t>
+              <a:t>11/12/2018</a:t>
             </a:fld>
             <a:endParaRPr lang="en-US"/>
           </a:p>
@@ -1000,7 +1000,7 @@
           <a:p>
             <a:fld id="{78C97017-6FC3-485B-9764-EAC9E56C1D49}" type="datetimeFigureOut">
               <a:rPr lang="en-US" smtClean="0"/>
-              <a:t>12-Nov-18</a:t>
+              <a:t>11/12/2018</a:t>
             </a:fld>
             <a:endParaRPr lang="en-US"/>
           </a:p>
@@ -1168,7 +1168,7 @@
           <a:p>
             <a:fld id="{78C97017-6FC3-485B-9764-EAC9E56C1D49}" type="datetimeFigureOut">
               <a:rPr lang="en-US" smtClean="0"/>
-              <a:t>12-Nov-18</a:t>
+              <a:t>11/12/2018</a:t>
             </a:fld>
             <a:endParaRPr lang="en-US"/>
           </a:p>
@@ -1413,7 +1413,7 @@
           <a:p>
             <a:fld id="{78C97017-6FC3-485B-9764-EAC9E56C1D49}" type="datetimeFigureOut">
               <a:rPr lang="en-US" smtClean="0"/>
-              <a:t>12-Nov-18</a:t>
+              <a:t>11/12/2018</a:t>
             </a:fld>
             <a:endParaRPr lang="en-US"/>
           </a:p>
@@ -1698,7 +1698,7 @@
           <a:p>
             <a:fld id="{78C97017-6FC3-485B-9764-EAC9E56C1D49}" type="datetimeFigureOut">
               <a:rPr lang="en-US" smtClean="0"/>
-              <a:t>12-Nov-18</a:t>
+              <a:t>11/12/2018</a:t>
             </a:fld>
             <a:endParaRPr lang="en-US"/>
           </a:p>
@@ -2117,7 +2117,7 @@
           <a:p>
             <a:fld id="{78C97017-6FC3-485B-9764-EAC9E56C1D49}" type="datetimeFigureOut">
               <a:rPr lang="en-US" smtClean="0"/>
-              <a:t>12-Nov-18</a:t>
+              <a:t>11/12/2018</a:t>
             </a:fld>
             <a:endParaRPr lang="en-US"/>
           </a:p>
@@ -2234,7 +2234,7 @@
           <a:p>
             <a:fld id="{78C97017-6FC3-485B-9764-EAC9E56C1D49}" type="datetimeFigureOut">
               <a:rPr lang="en-US" smtClean="0"/>
-              <a:t>12-Nov-18</a:t>
+              <a:t>11/12/2018</a:t>
             </a:fld>
             <a:endParaRPr lang="en-US"/>
           </a:p>
@@ -2329,7 +2329,7 @@
           <a:p>
             <a:fld id="{78C97017-6FC3-485B-9764-EAC9E56C1D49}" type="datetimeFigureOut">
               <a:rPr lang="en-US" smtClean="0"/>
-              <a:t>12-Nov-18</a:t>
+              <a:t>11/12/2018</a:t>
             </a:fld>
             <a:endParaRPr lang="en-US"/>
           </a:p>
@@ -2604,7 +2604,7 @@
           <a:p>
             <a:fld id="{78C97017-6FC3-485B-9764-EAC9E56C1D49}" type="datetimeFigureOut">
               <a:rPr lang="en-US" smtClean="0"/>
-              <a:t>12-Nov-18</a:t>
+              <a:t>11/12/2018</a:t>
             </a:fld>
             <a:endParaRPr lang="en-US"/>
           </a:p>
@@ -2856,7 +2856,7 @@
           <a:p>
             <a:fld id="{78C97017-6FC3-485B-9764-EAC9E56C1D49}" type="datetimeFigureOut">
               <a:rPr lang="en-US" smtClean="0"/>
-              <a:t>12-Nov-18</a:t>
+              <a:t>11/12/2018</a:t>
             </a:fld>
             <a:endParaRPr lang="en-US"/>
           </a:p>
@@ -3067,7 +3067,7 @@
           <a:p>
             <a:fld id="{78C97017-6FC3-485B-9764-EAC9E56C1D49}" type="datetimeFigureOut">
               <a:rPr lang="en-US" smtClean="0"/>
-              <a:t>12-Nov-18</a:t>
+              <a:t>11/12/2018</a:t>
             </a:fld>
             <a:endParaRPr lang="en-US"/>
           </a:p>
@@ -3450,7 +3450,7 @@
         </p:nvSpPr>
         <p:spPr>
           <a:xfrm>
-            <a:off x="539529" y="1293270"/>
+            <a:off x="561300" y="1461663"/>
             <a:ext cx="9595071" cy="8688929"/>
           </a:xfrm>
           <a:prstGeom prst="roundRect">
@@ -4394,7 +4394,7 @@
         </p:nvSpPr>
         <p:spPr>
           <a:xfrm>
-            <a:off x="8232145" y="3962400"/>
+            <a:off x="8232145" y="3623852"/>
             <a:ext cx="911855" cy="285783"/>
           </a:xfrm>
           <a:prstGeom prst="rect">
@@ -4501,8 +4501,8 @@
         </p:nvCxnSpPr>
         <p:spPr>
           <a:xfrm flipV="1">
-            <a:off x="7731272" y="4105292"/>
-            <a:ext cx="500873" cy="175361"/>
+            <a:off x="7731272" y="3766744"/>
+            <a:ext cx="500873" cy="513909"/>
           </a:xfrm>
           <a:prstGeom prst="bentConnector3">
             <a:avLst/>
@@ -4539,7 +4539,7 @@
         </p:nvSpPr>
         <p:spPr>
           <a:xfrm>
-            <a:off x="8232145" y="4332428"/>
+            <a:off x="8232145" y="3993880"/>
             <a:ext cx="911855" cy="285783"/>
           </a:xfrm>
           <a:prstGeom prst="rect">
@@ -4598,9 +4598,9 @@
           <p:nvPr/>
         </p:nvCxnSpPr>
         <p:spPr>
-          <a:xfrm>
-            <a:off x="7731272" y="4280653"/>
-            <a:ext cx="500873" cy="194667"/>
+          <a:xfrm flipV="1">
+            <a:off x="7731272" y="4136772"/>
+            <a:ext cx="500873" cy="143881"/>
           </a:xfrm>
           <a:prstGeom prst="bentConnector3">
             <a:avLst>
@@ -6149,8 +6149,8 @@
         </p:nvCxnSpPr>
         <p:spPr>
           <a:xfrm flipV="1">
-            <a:off x="7587624" y="2353233"/>
-            <a:ext cx="644521" cy="709121"/>
+            <a:off x="7587624" y="2116964"/>
+            <a:ext cx="644521" cy="945390"/>
           </a:xfrm>
           <a:prstGeom prst="bentConnector3">
             <a:avLst>
@@ -6199,8 +6199,8 @@
         </p:nvCxnSpPr>
         <p:spPr>
           <a:xfrm flipV="1">
-            <a:off x="7587624" y="2687841"/>
-            <a:ext cx="644521" cy="374513"/>
+            <a:off x="7587624" y="2451572"/>
+            <a:ext cx="644521" cy="610782"/>
           </a:xfrm>
           <a:prstGeom prst="bentConnector3">
             <a:avLst/>
@@ -6247,8 +6247,8 @@
         </p:nvCxnSpPr>
         <p:spPr>
           <a:xfrm flipV="1">
-            <a:off x="7587624" y="3056454"/>
-            <a:ext cx="644521" cy="5900"/>
+            <a:off x="7587624" y="2820185"/>
+            <a:ext cx="644521" cy="242169"/>
           </a:xfrm>
           <a:prstGeom prst="bentConnector3">
             <a:avLst/>
@@ -6296,7 +6296,7 @@
         <p:spPr>
           <a:xfrm>
             <a:off x="7587624" y="3062354"/>
-            <a:ext cx="643195" cy="410776"/>
+            <a:ext cx="643195" cy="174507"/>
           </a:xfrm>
           <a:prstGeom prst="bentConnector3">
             <a:avLst>
@@ -6386,7 +6386,7 @@
         </p:nvSpPr>
         <p:spPr>
           <a:xfrm>
-            <a:off x="8232145" y="2217469"/>
+            <a:off x="8232145" y="1981200"/>
             <a:ext cx="1284214" cy="271528"/>
           </a:xfrm>
           <a:prstGeom prst="rect">
@@ -6448,7 +6448,7 @@
         </p:nvSpPr>
         <p:spPr>
           <a:xfrm>
-            <a:off x="8232145" y="2559513"/>
+            <a:off x="8232145" y="2323244"/>
             <a:ext cx="1284214" cy="256656"/>
           </a:xfrm>
           <a:prstGeom prst="rect">
@@ -6510,7 +6510,7 @@
         </p:nvSpPr>
         <p:spPr>
           <a:xfrm>
-            <a:off x="8232145" y="2896721"/>
+            <a:off x="8232145" y="2660452"/>
             <a:ext cx="1284215" cy="319466"/>
           </a:xfrm>
           <a:prstGeom prst="rect">
@@ -6572,7 +6572,7 @@
         </p:nvSpPr>
         <p:spPr>
           <a:xfrm>
-            <a:off x="8230819" y="3300367"/>
+            <a:off x="8230819" y="3064098"/>
             <a:ext cx="1294181" cy="345526"/>
           </a:xfrm>
           <a:prstGeom prst="rect">
@@ -7048,7 +7048,7 @@
         </p:nvSpPr>
         <p:spPr>
           <a:xfrm>
-            <a:off x="8640329" y="4769397"/>
+            <a:off x="8640329" y="4845597"/>
             <a:ext cx="1030278" cy="259803"/>
           </a:xfrm>
           <a:prstGeom prst="rect">
@@ -7162,8 +7162,8 @@
         </p:nvCxnSpPr>
         <p:spPr>
           <a:xfrm flipV="1">
-            <a:off x="8101412" y="4899299"/>
-            <a:ext cx="538917" cy="451502"/>
+            <a:off x="8101412" y="4975499"/>
+            <a:ext cx="538917" cy="375302"/>
           </a:xfrm>
           <a:prstGeom prst="bentConnector3">
             <a:avLst>
@@ -7208,7 +7208,7 @@
         </p:nvSpPr>
         <p:spPr>
           <a:xfrm>
-            <a:off x="8633717" y="5065304"/>
+            <a:off x="8633717" y="5141504"/>
             <a:ext cx="1027103" cy="259803"/>
           </a:xfrm>
           <a:prstGeom prst="rect">
@@ -7274,8 +7274,8 @@
         </p:nvCxnSpPr>
         <p:spPr>
           <a:xfrm flipV="1">
-            <a:off x="8101412" y="5195206"/>
-            <a:ext cx="532305" cy="155595"/>
+            <a:off x="8101412" y="5271406"/>
+            <a:ext cx="532305" cy="79395"/>
           </a:xfrm>
           <a:prstGeom prst="bentConnector3">
             <a:avLst>
@@ -7320,7 +7320,7 @@
         </p:nvSpPr>
         <p:spPr>
           <a:xfrm>
-            <a:off x="8633623" y="5374551"/>
+            <a:off x="8633623" y="5450751"/>
             <a:ext cx="1027103" cy="259803"/>
           </a:xfrm>
           <a:prstGeom prst="rect">
@@ -7368,56 +7368,6 @@
           </a:p>
         </p:txBody>
       </p:sp>
-      <p:cxnSp>
-        <p:nvCxnSpPr>
-          <p:cNvPr id="140" name="Elbow Connector 78">
-            <a:extLst>
-              <a:ext uri="{FF2B5EF4-FFF2-40B4-BE49-F238E27FC236}">
-                <a16:creationId xmlns:a16="http://schemas.microsoft.com/office/drawing/2014/main" id="{88BC6651-B444-46C7-A165-C873A944C506}"/>
-              </a:ext>
-            </a:extLst>
-          </p:cNvPr>
-          <p:cNvCxnSpPr>
-            <a:cxnSpLocks/>
-            <a:stCxn id="135" idx="3"/>
-            <a:endCxn id="139" idx="1"/>
-          </p:cNvCxnSpPr>
-          <p:nvPr/>
-        </p:nvCxnSpPr>
-        <p:spPr>
-          <a:xfrm>
-            <a:off x="8101412" y="5350801"/>
-            <a:ext cx="532211" cy="153652"/>
-          </a:xfrm>
-          <a:prstGeom prst="bentConnector3">
-            <a:avLst>
-              <a:gd name="adj1" fmla="val 50000"/>
-            </a:avLst>
-          </a:prstGeom>
-          <a:ln w="19050">
-            <a:solidFill>
-              <a:srgbClr val="7030A0"/>
-            </a:solidFill>
-            <a:headEnd type="none" w="med" len="med"/>
-            <a:tailEnd type="arrow" w="med" len="med"/>
-          </a:ln>
-          <a:effectLst/>
-        </p:spPr>
-        <p:style>
-          <a:lnRef idx="1">
-            <a:schemeClr val="accent2"/>
-          </a:lnRef>
-          <a:fillRef idx="2">
-            <a:schemeClr val="accent2"/>
-          </a:fillRef>
-          <a:effectRef idx="1">
-            <a:schemeClr val="accent2"/>
-          </a:effectRef>
-          <a:fontRef idx="minor">
-            <a:schemeClr val="dk1"/>
-          </a:fontRef>
-        </p:style>
-      </p:cxnSp>
       <p:cxnSp>
         <p:nvCxnSpPr>
           <p:cNvPr id="160" name="Elbow Connector 106">
@@ -7844,7 +7794,7 @@
         </p:nvSpPr>
         <p:spPr>
           <a:xfrm>
-            <a:off x="8604471" y="6013521"/>
+            <a:off x="8604471" y="6165921"/>
             <a:ext cx="891955" cy="285783"/>
           </a:xfrm>
           <a:prstGeom prst="rect">
@@ -7910,8 +7860,8 @@
         </p:nvCxnSpPr>
         <p:spPr>
           <a:xfrm flipV="1">
-            <a:off x="8106185" y="6156413"/>
-            <a:ext cx="498286" cy="215892"/>
+            <a:off x="8106185" y="6308813"/>
+            <a:ext cx="498286" cy="63492"/>
           </a:xfrm>
           <a:prstGeom prst="bentConnector3">
             <a:avLst>
@@ -7956,7 +7906,7 @@
         </p:nvSpPr>
         <p:spPr>
           <a:xfrm>
-            <a:off x="8604471" y="6381182"/>
+            <a:off x="8604471" y="6533582"/>
             <a:ext cx="891955" cy="285783"/>
           </a:xfrm>
           <a:prstGeom prst="rect">
@@ -8018,7 +7968,7 @@
         </p:nvSpPr>
         <p:spPr>
           <a:xfrm>
-            <a:off x="8604470" y="6735336"/>
+            <a:off x="8604470" y="6887736"/>
             <a:ext cx="891955" cy="285783"/>
           </a:xfrm>
           <a:prstGeom prst="rect">
@@ -8080,7 +8030,7 @@
         </p:nvSpPr>
         <p:spPr>
           <a:xfrm>
-            <a:off x="8604470" y="7105617"/>
+            <a:off x="8604470" y="7258017"/>
             <a:ext cx="891955" cy="285783"/>
           </a:xfrm>
           <a:prstGeom prst="rect">
@@ -8147,7 +8097,7 @@
         <p:spPr>
           <a:xfrm>
             <a:off x="8106185" y="6372305"/>
-            <a:ext cx="498285" cy="876204"/>
+            <a:ext cx="498285" cy="1028604"/>
           </a:xfrm>
           <a:prstGeom prst="bentConnector3">
             <a:avLst>
@@ -8250,7 +8200,7 @@
         <p:spPr>
           <a:xfrm>
             <a:off x="8106185" y="6372305"/>
-            <a:ext cx="498285" cy="505923"/>
+            <a:ext cx="498285" cy="658323"/>
           </a:xfrm>
           <a:prstGeom prst="bentConnector3">
             <a:avLst>
@@ -8300,7 +8250,7 @@
         <p:spPr>
           <a:xfrm>
             <a:off x="8106185" y="6372305"/>
-            <a:ext cx="498286" cy="151769"/>
+            <a:ext cx="498286" cy="304169"/>
           </a:xfrm>
           <a:prstGeom prst="bentConnector3">
             <a:avLst>
@@ -8958,7 +8908,7 @@
         </p:nvSpPr>
         <p:spPr>
           <a:xfrm>
-            <a:off x="8667747" y="7604238"/>
+            <a:off x="8667747" y="7680438"/>
             <a:ext cx="1163750" cy="346760"/>
           </a:xfrm>
           <a:prstGeom prst="rect">
@@ -9020,7 +8970,7 @@
         </p:nvSpPr>
         <p:spPr>
           <a:xfrm>
-            <a:off x="8670109" y="8036181"/>
+            <a:off x="8670109" y="8112381"/>
             <a:ext cx="1163750" cy="346760"/>
           </a:xfrm>
           <a:prstGeom prst="rect">
@@ -9082,7 +9032,7 @@
         </p:nvSpPr>
         <p:spPr>
           <a:xfrm>
-            <a:off x="8670109" y="8468124"/>
+            <a:off x="8670109" y="8544324"/>
             <a:ext cx="1163750" cy="346760"/>
           </a:xfrm>
           <a:prstGeom prst="rect">
@@ -9144,7 +9094,7 @@
         </p:nvSpPr>
         <p:spPr>
           <a:xfrm>
-            <a:off x="8670109" y="8899382"/>
+            <a:off x="8670109" y="8975582"/>
             <a:ext cx="1163750" cy="346760"/>
           </a:xfrm>
           <a:prstGeom prst="rect">
@@ -9201,7 +9151,7 @@
         </p:nvSpPr>
         <p:spPr>
           <a:xfrm>
-            <a:off x="8666050" y="9330640"/>
+            <a:off x="8666050" y="9406840"/>
             <a:ext cx="1163750" cy="346760"/>
           </a:xfrm>
           <a:prstGeom prst="rect">
@@ -9255,15 +9205,14 @@
           </p:cNvPr>
           <p:cNvCxnSpPr>
             <a:cxnSpLocks/>
-            <a:stCxn id="169" idx="2"/>
             <a:endCxn id="171" idx="1"/>
           </p:cNvCxnSpPr>
           <p:nvPr/>
         </p:nvCxnSpPr>
         <p:spPr>
           <a:xfrm rot="16200000" flipH="1">
-            <a:off x="8266807" y="7376678"/>
-            <a:ext cx="136648" cy="665231"/>
+            <a:off x="8152507" y="7338578"/>
+            <a:ext cx="365248" cy="665231"/>
           </a:xfrm>
           <a:prstGeom prst="bentConnector2">
             <a:avLst/>
@@ -9303,15 +9252,14 @@
           </p:cNvPr>
           <p:cNvCxnSpPr>
             <a:cxnSpLocks/>
-            <a:stCxn id="169" idx="2"/>
             <a:endCxn id="173" idx="1"/>
           </p:cNvCxnSpPr>
           <p:nvPr/>
         </p:nvCxnSpPr>
         <p:spPr>
           <a:xfrm rot="16200000" flipH="1">
-            <a:off x="8052017" y="7591468"/>
-            <a:ext cx="568591" cy="667593"/>
+            <a:off x="7937717" y="7553368"/>
+            <a:ext cx="797191" cy="667593"/>
           </a:xfrm>
           <a:prstGeom prst="bentConnector2">
             <a:avLst/>
@@ -9351,15 +9299,14 @@
           </p:cNvPr>
           <p:cNvCxnSpPr>
             <a:cxnSpLocks/>
-            <a:stCxn id="169" idx="2"/>
             <a:endCxn id="175" idx="1"/>
           </p:cNvCxnSpPr>
           <p:nvPr/>
         </p:nvCxnSpPr>
         <p:spPr>
           <a:xfrm rot="16200000" flipH="1">
-            <a:off x="7836045" y="7807440"/>
-            <a:ext cx="1000534" cy="667593"/>
+            <a:off x="7721745" y="7769340"/>
+            <a:ext cx="1229134" cy="667593"/>
           </a:xfrm>
           <a:prstGeom prst="bentConnector2">
             <a:avLst/>
@@ -9399,15 +9346,14 @@
           </p:cNvPr>
           <p:cNvCxnSpPr>
             <a:cxnSpLocks/>
-            <a:stCxn id="169" idx="2"/>
             <a:endCxn id="176" idx="1"/>
           </p:cNvCxnSpPr>
           <p:nvPr/>
         </p:nvCxnSpPr>
         <p:spPr>
           <a:xfrm rot="16200000" flipH="1">
-            <a:off x="7620416" y="8023069"/>
-            <a:ext cx="1431792" cy="667593"/>
+            <a:off x="7506116" y="7984969"/>
+            <a:ext cx="1660392" cy="667593"/>
           </a:xfrm>
           <a:prstGeom prst="bentConnector2">
             <a:avLst/>
@@ -9447,15 +9393,14 @@
           </p:cNvPr>
           <p:cNvCxnSpPr>
             <a:cxnSpLocks/>
-            <a:stCxn id="169" idx="2"/>
             <a:endCxn id="177" idx="1"/>
           </p:cNvCxnSpPr>
           <p:nvPr/>
         </p:nvCxnSpPr>
         <p:spPr>
           <a:xfrm rot="16200000" flipH="1">
-            <a:off x="7402758" y="8240728"/>
-            <a:ext cx="1863050" cy="663534"/>
+            <a:off x="7288458" y="8202628"/>
+            <a:ext cx="2091650" cy="663534"/>
           </a:xfrm>
           <a:prstGeom prst="bentConnector2">
             <a:avLst/>
@@ -9543,7 +9488,7 @@
         </p:nvSpPr>
         <p:spPr>
           <a:xfrm>
-            <a:off x="8633623" y="5683797"/>
+            <a:off x="8633623" y="5759997"/>
             <a:ext cx="1027103" cy="259803"/>
           </a:xfrm>
           <a:prstGeom prst="rect">
@@ -9591,28 +9536,192 @@
           </a:p>
         </p:txBody>
       </p:sp>
+      <p:sp>
+        <p:nvSpPr>
+          <p:cNvPr id="157" name="Rectangle 8">
+            <a:extLst>
+              <a:ext uri="{FF2B5EF4-FFF2-40B4-BE49-F238E27FC236}">
+                <a16:creationId xmlns:a16="http://schemas.microsoft.com/office/drawing/2014/main" id="{58DE2FE1-E4C1-4532-A243-762E63D8865C}"/>
+              </a:ext>
+            </a:extLst>
+          </p:cNvPr>
+          <p:cNvSpPr/>
+          <p:nvPr/>
+        </p:nvSpPr>
+        <p:spPr>
+          <a:xfrm>
+            <a:off x="8230819" y="4362417"/>
+            <a:ext cx="911855" cy="285783"/>
+          </a:xfrm>
+          <a:prstGeom prst="rect">
+            <a:avLst/>
+          </a:prstGeom>
+          <a:ln w="19050">
+            <a:solidFill>
+              <a:srgbClr val="7030A0"/>
+            </a:solidFill>
+          </a:ln>
+          <a:effectLst/>
+        </p:spPr>
+        <p:style>
+          <a:lnRef idx="1">
+            <a:schemeClr val="accent4"/>
+          </a:lnRef>
+          <a:fillRef idx="2">
+            <a:schemeClr val="accent4"/>
+          </a:fillRef>
+          <a:effectRef idx="1">
+            <a:schemeClr val="accent4"/>
+          </a:effectRef>
+          <a:fontRef idx="minor">
+            <a:schemeClr val="dk1"/>
+          </a:fontRef>
+        </p:style>
+        <p:txBody>
+          <a:bodyPr rtlCol="0" anchor="ctr"/>
+          <a:lstStyle/>
+          <a:p>
+            <a:pPr algn="ctr"/>
+            <a:r>
+              <a:rPr lang="en-US" sz="1050" dirty="0">
+                <a:solidFill>
+                  <a:srgbClr val="7030A0"/>
+                </a:solidFill>
+              </a:rPr>
+              <a:t>Name</a:t>
+            </a:r>
+            <a:endParaRPr lang="en-SG" sz="1050" dirty="0">
+              <a:solidFill>
+                <a:srgbClr val="7030A0"/>
+              </a:solidFill>
+            </a:endParaRPr>
+          </a:p>
+        </p:txBody>
+      </p:sp>
       <p:cxnSp>
         <p:nvCxnSpPr>
-          <p:cNvPr id="156" name="Elbow Connector 78">
+          <p:cNvPr id="163" name="Elbow Connector 80">
             <a:extLst>
               <a:ext uri="{FF2B5EF4-FFF2-40B4-BE49-F238E27FC236}">
-                <a16:creationId xmlns:a16="http://schemas.microsoft.com/office/drawing/2014/main" id="{AE965376-EB34-41CD-9681-DD9EC3BF04EA}"/>
+                <a16:creationId xmlns:a16="http://schemas.microsoft.com/office/drawing/2014/main" id="{47A64F54-EBC2-426C-B044-627449139A1D}"/>
               </a:ext>
             </a:extLst>
           </p:cNvPr>
           <p:cNvCxnSpPr>
             <a:cxnSpLocks/>
+            <a:stCxn id="78" idx="3"/>
+            <a:endCxn id="157" idx="1"/>
           </p:cNvCxnSpPr>
           <p:nvPr/>
         </p:nvCxnSpPr>
         <p:spPr>
           <a:xfrm>
-            <a:off x="8133318" y="5350220"/>
-            <a:ext cx="491901" cy="402872"/>
+            <a:off x="7731272" y="4280653"/>
+            <a:ext cx="499547" cy="224656"/>
           </a:xfrm>
           <a:prstGeom prst="bentConnector3">
             <a:avLst>
-              <a:gd name="adj1" fmla="val 48178"/>
+              <a:gd name="adj1" fmla="val 50000"/>
+            </a:avLst>
+          </a:prstGeom>
+          <a:ln w="19050">
+            <a:solidFill>
+              <a:srgbClr val="7030A0"/>
+            </a:solidFill>
+            <a:headEnd type="none" w="med" len="med"/>
+            <a:tailEnd type="arrow" w="med" len="med"/>
+          </a:ln>
+          <a:effectLst/>
+        </p:spPr>
+        <p:style>
+          <a:lnRef idx="1">
+            <a:schemeClr val="accent2"/>
+          </a:lnRef>
+          <a:fillRef idx="2">
+            <a:schemeClr val="accent2"/>
+          </a:fillRef>
+          <a:effectRef idx="1">
+            <a:schemeClr val="accent2"/>
+          </a:effectRef>
+          <a:fontRef idx="minor">
+            <a:schemeClr val="dk1"/>
+          </a:fontRef>
+        </p:style>
+      </p:cxnSp>
+      <p:cxnSp>
+        <p:nvCxnSpPr>
+          <p:cNvPr id="166" name="Elbow Connector 78">
+            <a:extLst>
+              <a:ext uri="{FF2B5EF4-FFF2-40B4-BE49-F238E27FC236}">
+                <a16:creationId xmlns:a16="http://schemas.microsoft.com/office/drawing/2014/main" id="{880D8205-6163-4489-B9E3-2077CFDA4219}"/>
+              </a:ext>
+            </a:extLst>
+          </p:cNvPr>
+          <p:cNvCxnSpPr>
+            <a:cxnSpLocks/>
+            <a:stCxn id="135" idx="3"/>
+            <a:endCxn id="139" idx="1"/>
+          </p:cNvCxnSpPr>
+          <p:nvPr/>
+        </p:nvCxnSpPr>
+        <p:spPr>
+          <a:xfrm>
+            <a:off x="8101412" y="5350801"/>
+            <a:ext cx="532211" cy="229852"/>
+          </a:xfrm>
+          <a:prstGeom prst="bentConnector3">
+            <a:avLst>
+              <a:gd name="adj1" fmla="val 50000"/>
+            </a:avLst>
+          </a:prstGeom>
+          <a:ln w="19050">
+            <a:solidFill>
+              <a:srgbClr val="7030A0"/>
+            </a:solidFill>
+            <a:headEnd type="none" w="med" len="med"/>
+            <a:tailEnd type="arrow" w="med" len="med"/>
+          </a:ln>
+          <a:effectLst/>
+        </p:spPr>
+        <p:style>
+          <a:lnRef idx="1">
+            <a:schemeClr val="accent2"/>
+          </a:lnRef>
+          <a:fillRef idx="2">
+            <a:schemeClr val="accent2"/>
+          </a:fillRef>
+          <a:effectRef idx="1">
+            <a:schemeClr val="accent2"/>
+          </a:effectRef>
+          <a:fontRef idx="minor">
+            <a:schemeClr val="dk1"/>
+          </a:fontRef>
+        </p:style>
+      </p:cxnSp>
+      <p:cxnSp>
+        <p:nvCxnSpPr>
+          <p:cNvPr id="168" name="Elbow Connector 78">
+            <a:extLst>
+              <a:ext uri="{FF2B5EF4-FFF2-40B4-BE49-F238E27FC236}">
+                <a16:creationId xmlns:a16="http://schemas.microsoft.com/office/drawing/2014/main" id="{A9522865-6825-4C83-AD40-2100776F09BA}"/>
+              </a:ext>
+            </a:extLst>
+          </p:cNvPr>
+          <p:cNvCxnSpPr>
+            <a:cxnSpLocks/>
+            <a:stCxn id="135" idx="3"/>
+            <a:endCxn id="126" idx="1"/>
+          </p:cNvCxnSpPr>
+          <p:nvPr/>
+        </p:nvCxnSpPr>
+        <p:spPr>
+          <a:xfrm>
+            <a:off x="8101412" y="5350801"/>
+            <a:ext cx="532211" cy="539098"/>
+          </a:xfrm>
+          <a:prstGeom prst="bentConnector3">
+            <a:avLst>
+              <a:gd name="adj1" fmla="val 50000"/>
             </a:avLst>
           </a:prstGeom>
           <a:ln w="19050">

</xml_diff>

<commit_message>
docs/: Update diagrams and images
</commit_message>
<xml_diff>
--- a/docs/diagrams/ModelComponentClassBetterOopDiagram.pptx
+++ b/docs/diagrams/ModelComponentClassBetterOopDiagram.pptx
@@ -208,7 +208,7 @@
           <a:p>
             <a:fld id="{F5CC4B3F-88C1-4FFA-B1B6-F41C21DC6924}" type="datetimeFigureOut">
               <a:rPr lang="en-US" smtClean="0"/>
-              <a:t>10/25/2018</a:t>
+              <a:t>11/12/2018</a:t>
             </a:fld>
             <a:endParaRPr lang="en-US"/>
           </a:p>
@@ -654,7 +654,7 @@
           <a:p>
             <a:fld id="{78C97017-6FC3-485B-9764-EAC9E56C1D49}" type="datetimeFigureOut">
               <a:rPr lang="en-US" smtClean="0"/>
-              <a:t>10/25/2018</a:t>
+              <a:t>11/12/2018</a:t>
             </a:fld>
             <a:endParaRPr lang="en-US"/>
           </a:p>
@@ -822,7 +822,7 @@
           <a:p>
             <a:fld id="{78C97017-6FC3-485B-9764-EAC9E56C1D49}" type="datetimeFigureOut">
               <a:rPr lang="en-US" smtClean="0"/>
-              <a:t>10/25/2018</a:t>
+              <a:t>11/12/2018</a:t>
             </a:fld>
             <a:endParaRPr lang="en-US"/>
           </a:p>
@@ -1000,7 +1000,7 @@
           <a:p>
             <a:fld id="{78C97017-6FC3-485B-9764-EAC9E56C1D49}" type="datetimeFigureOut">
               <a:rPr lang="en-US" smtClean="0"/>
-              <a:t>10/25/2018</a:t>
+              <a:t>11/12/2018</a:t>
             </a:fld>
             <a:endParaRPr lang="en-US"/>
           </a:p>
@@ -1168,7 +1168,7 @@
           <a:p>
             <a:fld id="{78C97017-6FC3-485B-9764-EAC9E56C1D49}" type="datetimeFigureOut">
               <a:rPr lang="en-US" smtClean="0"/>
-              <a:t>10/25/2018</a:t>
+              <a:t>11/12/2018</a:t>
             </a:fld>
             <a:endParaRPr lang="en-US"/>
           </a:p>
@@ -1413,7 +1413,7 @@
           <a:p>
             <a:fld id="{78C97017-6FC3-485B-9764-EAC9E56C1D49}" type="datetimeFigureOut">
               <a:rPr lang="en-US" smtClean="0"/>
-              <a:t>10/25/2018</a:t>
+              <a:t>11/12/2018</a:t>
             </a:fld>
             <a:endParaRPr lang="en-US"/>
           </a:p>
@@ -1698,7 +1698,7 @@
           <a:p>
             <a:fld id="{78C97017-6FC3-485B-9764-EAC9E56C1D49}" type="datetimeFigureOut">
               <a:rPr lang="en-US" smtClean="0"/>
-              <a:t>10/25/2018</a:t>
+              <a:t>11/12/2018</a:t>
             </a:fld>
             <a:endParaRPr lang="en-US"/>
           </a:p>
@@ -2117,7 +2117,7 @@
           <a:p>
             <a:fld id="{78C97017-6FC3-485B-9764-EAC9E56C1D49}" type="datetimeFigureOut">
               <a:rPr lang="en-US" smtClean="0"/>
-              <a:t>10/25/2018</a:t>
+              <a:t>11/12/2018</a:t>
             </a:fld>
             <a:endParaRPr lang="en-US"/>
           </a:p>
@@ -2234,7 +2234,7 @@
           <a:p>
             <a:fld id="{78C97017-6FC3-485B-9764-EAC9E56C1D49}" type="datetimeFigureOut">
               <a:rPr lang="en-US" smtClean="0"/>
-              <a:t>10/25/2018</a:t>
+              <a:t>11/12/2018</a:t>
             </a:fld>
             <a:endParaRPr lang="en-US"/>
           </a:p>
@@ -2329,7 +2329,7 @@
           <a:p>
             <a:fld id="{78C97017-6FC3-485B-9764-EAC9E56C1D49}" type="datetimeFigureOut">
               <a:rPr lang="en-US" smtClean="0"/>
-              <a:t>10/25/2018</a:t>
+              <a:t>11/12/2018</a:t>
             </a:fld>
             <a:endParaRPr lang="en-US"/>
           </a:p>
@@ -2604,7 +2604,7 @@
           <a:p>
             <a:fld id="{78C97017-6FC3-485B-9764-EAC9E56C1D49}" type="datetimeFigureOut">
               <a:rPr lang="en-US" smtClean="0"/>
-              <a:t>10/25/2018</a:t>
+              <a:t>11/12/2018</a:t>
             </a:fld>
             <a:endParaRPr lang="en-US"/>
           </a:p>
@@ -2856,7 +2856,7 @@
           <a:p>
             <a:fld id="{78C97017-6FC3-485B-9764-EAC9E56C1D49}" type="datetimeFigureOut">
               <a:rPr lang="en-US" smtClean="0"/>
-              <a:t>10/25/2018</a:t>
+              <a:t>11/12/2018</a:t>
             </a:fld>
             <a:endParaRPr lang="en-US"/>
           </a:p>
@@ -3067,7 +3067,7 @@
           <a:p>
             <a:fld id="{78C97017-6FC3-485B-9764-EAC9E56C1D49}" type="datetimeFigureOut">
               <a:rPr lang="en-US" smtClean="0"/>
-              <a:t>10/25/2018</a:t>
+              <a:t>11/12/2018</a:t>
             </a:fld>
             <a:endParaRPr lang="en-US"/>
           </a:p>
@@ -4095,14 +4095,14 @@
       </p:sp>
       <p:sp>
         <p:nvSpPr>
-          <p:cNvPr id="49" name="Rectangle 8"/>
+          <p:cNvPr id="62" name="Rectangle 8"/>
           <p:cNvSpPr/>
           <p:nvPr/>
         </p:nvSpPr>
         <p:spPr>
           <a:xfrm>
-            <a:off x="4762209" y="2863434"/>
-            <a:ext cx="1156969" cy="346760"/>
+            <a:off x="6313677" y="2858066"/>
+            <a:ext cx="708186" cy="346760"/>
           </a:xfrm>
           <a:prstGeom prst="rect">
             <a:avLst/>
@@ -4134,12 +4134,12 @@
           <a:p>
             <a:pPr algn="ctr"/>
             <a:r>
-              <a:rPr lang="en-US" sz="1050" dirty="0" err="1">
+              <a:rPr lang="en-US" sz="1050" dirty="0">
                 <a:solidFill>
                   <a:srgbClr val="7030A0"/>
                 </a:solidFill>
               </a:rPr>
-              <a:t>UniqueEventList</a:t>
+              <a:t>Event</a:t>
             </a:r>
             <a:endParaRPr lang="en-SG" sz="1050" dirty="0">
               <a:solidFill>
@@ -4151,13 +4151,13 @@
       </p:sp>
       <p:sp>
         <p:nvSpPr>
-          <p:cNvPr id="51" name="Flowchart: Decision 96"/>
+          <p:cNvPr id="78" name="Flowchart: Decision 96"/>
           <p:cNvSpPr/>
           <p:nvPr/>
         </p:nvSpPr>
         <p:spPr>
           <a:xfrm>
-            <a:off x="4233246" y="2948201"/>
+            <a:off x="7041947" y="2948201"/>
             <a:ext cx="236048" cy="173380"/>
           </a:xfrm>
           <a:prstGeom prst="flowChartDecision">
@@ -4196,56 +4196,273 @@
           </a:p>
         </p:txBody>
       </p:sp>
-      <p:cxnSp>
-        <p:nvCxnSpPr>
-          <p:cNvPr id="30" name="Elbow Connector 29"/>
-          <p:cNvCxnSpPr>
-            <a:stCxn id="51" idx="3"/>
-            <a:endCxn id="49" idx="1"/>
-          </p:cNvCxnSpPr>
+      <p:sp>
+        <p:nvSpPr>
+          <p:cNvPr id="114" name="TextBox 113"/>
+          <p:cNvSpPr txBox="1"/>
           <p:nvPr/>
-        </p:nvCxnSpPr>
-        <p:spPr>
-          <a:xfrm>
-            <a:off x="4469294" y="3034891"/>
-            <a:ext cx="292915" cy="1923"/>
-          </a:xfrm>
-          <a:prstGeom prst="bentConnector3">
+        </p:nvSpPr>
+        <p:spPr>
+          <a:xfrm rot="16200000">
+            <a:off x="6362886" y="3586305"/>
+            <a:ext cx="881018" cy="261610"/>
+          </a:xfrm>
+          <a:prstGeom prst="rect">
             <a:avLst/>
           </a:prstGeom>
+          <a:noFill/>
+        </p:spPr>
+        <p:txBody>
+          <a:bodyPr wrap="square" rtlCol="0">
+            <a:spAutoFit/>
+          </a:bodyPr>
+          <a:lstStyle/>
+          <a:p>
+            <a:pPr algn="r"/>
+            <a:r>
+              <a:rPr lang="en-US" sz="1100" dirty="0">
+                <a:solidFill>
+                  <a:srgbClr val="7030A0"/>
+                </a:solidFill>
+              </a:rPr>
+              <a:t>filtered list</a:t>
+            </a:r>
+            <a:endParaRPr lang="en-SG" sz="1100" dirty="0">
+              <a:solidFill>
+                <a:srgbClr val="7030A0"/>
+              </a:solidFill>
+            </a:endParaRPr>
+          </a:p>
+        </p:txBody>
+      </p:sp>
+      <p:sp>
+        <p:nvSpPr>
+          <p:cNvPr id="65" name="TextBox 64"/>
+          <p:cNvSpPr txBox="1"/>
+          <p:nvPr/>
+        </p:nvSpPr>
+        <p:spPr>
+          <a:xfrm>
+            <a:off x="2560167" y="2753818"/>
+            <a:ext cx="78378" cy="193767"/>
+          </a:xfrm>
+          <a:prstGeom prst="rect">
+            <a:avLst/>
+          </a:prstGeom>
+          <a:noFill/>
+        </p:spPr>
+        <p:txBody>
+          <a:bodyPr wrap="square" lIns="0" tIns="0" rIns="0" bIns="0" rtlCol="0">
+            <a:noAutofit/>
+          </a:bodyPr>
+          <a:lstStyle/>
+          <a:p>
+            <a:pPr algn="ctr"/>
+            <a:r>
+              <a:rPr lang="en-US" sz="1100" dirty="0">
+                <a:solidFill>
+                  <a:srgbClr val="7030A0"/>
+                </a:solidFill>
+              </a:rPr>
+              <a:t>1</a:t>
+            </a:r>
+            <a:endParaRPr lang="en-SG" sz="1100" dirty="0">
+              <a:solidFill>
+                <a:srgbClr val="7030A0"/>
+              </a:solidFill>
+            </a:endParaRPr>
+          </a:p>
+        </p:txBody>
+      </p:sp>
+      <p:sp>
+        <p:nvSpPr>
+          <p:cNvPr id="66" name="TextBox 65"/>
+          <p:cNvSpPr txBox="1"/>
+          <p:nvPr/>
+        </p:nvSpPr>
+        <p:spPr>
+          <a:xfrm>
+            <a:off x="2707070" y="3667737"/>
+            <a:ext cx="189257" cy="178683"/>
+          </a:xfrm>
+          <a:prstGeom prst="rect">
+            <a:avLst/>
+          </a:prstGeom>
+          <a:noFill/>
+        </p:spPr>
+        <p:txBody>
+          <a:bodyPr wrap="square" lIns="0" tIns="0" rIns="0" bIns="0" rtlCol="0">
+            <a:noAutofit/>
+          </a:bodyPr>
+          <a:lstStyle/>
+          <a:p>
+            <a:pPr algn="ctr"/>
+            <a:r>
+              <a:rPr lang="en-US" sz="1100" dirty="0">
+                <a:solidFill>
+                  <a:srgbClr val="7030A0"/>
+                </a:solidFill>
+              </a:rPr>
+              <a:t>1</a:t>
+            </a:r>
+            <a:endParaRPr lang="en-SG" sz="1100" dirty="0">
+              <a:solidFill>
+                <a:srgbClr val="7030A0"/>
+              </a:solidFill>
+            </a:endParaRPr>
+          </a:p>
+        </p:txBody>
+      </p:sp>
+      <p:sp>
+        <p:nvSpPr>
+          <p:cNvPr id="70" name="TextBox 69"/>
+          <p:cNvSpPr txBox="1"/>
+          <p:nvPr/>
+        </p:nvSpPr>
+        <p:spPr>
+          <a:xfrm>
+            <a:off x="6449896" y="3204826"/>
+            <a:ext cx="189257" cy="178683"/>
+          </a:xfrm>
+          <a:prstGeom prst="rect">
+            <a:avLst/>
+          </a:prstGeom>
+          <a:noFill/>
+        </p:spPr>
+        <p:txBody>
+          <a:bodyPr wrap="square" lIns="0" tIns="0" rIns="0" bIns="0" rtlCol="0">
+            <a:noAutofit/>
+          </a:bodyPr>
+          <a:lstStyle/>
+          <a:p>
+            <a:pPr algn="ctr"/>
+            <a:r>
+              <a:rPr lang="en-US" sz="1100" dirty="0">
+                <a:solidFill>
+                  <a:srgbClr val="7030A0"/>
+                </a:solidFill>
+              </a:rPr>
+              <a:t>1</a:t>
+            </a:r>
+            <a:endParaRPr lang="en-SG" sz="1100" dirty="0">
+              <a:solidFill>
+                <a:srgbClr val="7030A0"/>
+              </a:solidFill>
+            </a:endParaRPr>
+          </a:p>
+        </p:txBody>
+      </p:sp>
+      <p:sp>
+        <p:nvSpPr>
+          <p:cNvPr id="50" name="TextBox 49">
+            <a:extLst>
+              <a:ext uri="{FF2B5EF4-FFF2-40B4-BE49-F238E27FC236}">
+                <a16:creationId xmlns:a16="http://schemas.microsoft.com/office/drawing/2014/main" id="{B3FA9D57-880F-49C4-AD0B-A64E30D6F403}"/>
+              </a:ext>
+            </a:extLst>
+          </p:cNvPr>
+          <p:cNvSpPr txBox="1"/>
+          <p:nvPr/>
+        </p:nvSpPr>
+        <p:spPr>
+          <a:xfrm>
+            <a:off x="6714344" y="2430721"/>
+            <a:ext cx="189257" cy="178683"/>
+          </a:xfrm>
+          <a:prstGeom prst="rect">
+            <a:avLst/>
+          </a:prstGeom>
+          <a:noFill/>
+        </p:spPr>
+        <p:txBody>
+          <a:bodyPr wrap="square" lIns="0" tIns="0" rIns="0" bIns="0" rtlCol="0">
+            <a:noAutofit/>
+          </a:bodyPr>
+          <a:lstStyle/>
+          <a:p>
+            <a:pPr algn="ctr"/>
+            <a:r>
+              <a:rPr lang="en-US" sz="1100" dirty="0">
+                <a:solidFill>
+                  <a:srgbClr val="7030A0"/>
+                </a:solidFill>
+              </a:rPr>
+              <a:t>*</a:t>
+            </a:r>
+            <a:endParaRPr lang="en-SG" sz="1100" dirty="0">
+              <a:solidFill>
+                <a:srgbClr val="7030A0"/>
+              </a:solidFill>
+            </a:endParaRPr>
+          </a:p>
+        </p:txBody>
+      </p:sp>
+      <p:sp>
+        <p:nvSpPr>
+          <p:cNvPr id="55" name="Flowchart: Decision 96">
+            <a:extLst>
+              <a:ext uri="{FF2B5EF4-FFF2-40B4-BE49-F238E27FC236}">
+                <a16:creationId xmlns:a16="http://schemas.microsoft.com/office/drawing/2014/main" id="{B9F96195-942D-4692-91B7-CF34229E7461}"/>
+              </a:ext>
+            </a:extLst>
+          </p:cNvPr>
+          <p:cNvSpPr/>
+          <p:nvPr/>
+        </p:nvSpPr>
+        <p:spPr>
+          <a:xfrm rot="16200000">
+            <a:off x="6553482" y="2664721"/>
+            <a:ext cx="236048" cy="173380"/>
+          </a:xfrm>
+          <a:prstGeom prst="flowChartDecision">
+            <a:avLst/>
+          </a:prstGeom>
+          <a:noFill/>
           <a:ln w="19050">
             <a:solidFill>
               <a:srgbClr val="7030A0"/>
             </a:solidFill>
-            <a:headEnd type="none" w="med" len="med"/>
-            <a:tailEnd type="arrow" w="med" len="med"/>
           </a:ln>
           <a:effectLst/>
         </p:spPr>
         <p:style>
           <a:lnRef idx="1">
-            <a:schemeClr val="accent2"/>
+            <a:schemeClr val="accent6"/>
           </a:lnRef>
           <a:fillRef idx="2">
-            <a:schemeClr val="accent2"/>
+            <a:schemeClr val="accent6"/>
           </a:fillRef>
           <a:effectRef idx="1">
-            <a:schemeClr val="accent2"/>
+            <a:schemeClr val="accent6"/>
           </a:effectRef>
           <a:fontRef idx="minor">
             <a:schemeClr val="dk1"/>
           </a:fontRef>
         </p:style>
-      </p:cxnSp>
-      <p:sp>
-        <p:nvSpPr>
-          <p:cNvPr id="62" name="Rectangle 8"/>
+        <p:txBody>
+          <a:bodyPr rtlCol="0" anchor="ctr"/>
+          <a:lstStyle/>
+          <a:p>
+            <a:pPr algn="ctr"/>
+            <a:endParaRPr lang="en-US" sz="1050"/>
+          </a:p>
+        </p:txBody>
+      </p:sp>
+      <p:sp>
+        <p:nvSpPr>
+          <p:cNvPr id="67" name="Rectangle 8">
+            <a:extLst>
+              <a:ext uri="{FF2B5EF4-FFF2-40B4-BE49-F238E27FC236}">
+                <a16:creationId xmlns:a16="http://schemas.microsoft.com/office/drawing/2014/main" id="{36D68104-33BB-4C8F-B764-F3F0B25E592B}"/>
+              </a:ext>
+            </a:extLst>
+          </p:cNvPr>
           <p:cNvSpPr/>
           <p:nvPr/>
         </p:nvSpPr>
         <p:spPr>
           <a:xfrm>
-            <a:off x="6313677" y="2858066"/>
+            <a:off x="6317196" y="2059626"/>
             <a:ext cx="708186" cy="346760"/>
           </a:xfrm>
           <a:prstGeom prst="rect">
@@ -4283,952 +4500,13 @@
                   <a:srgbClr val="7030A0"/>
                 </a:solidFill>
               </a:rPr>
-              <a:t>Event</a:t>
+              <a:t>Tag</a:t>
             </a:r>
             <a:endParaRPr lang="en-SG" sz="1050" dirty="0">
               <a:solidFill>
                 <a:srgbClr val="7030A0"/>
               </a:solidFill>
             </a:endParaRPr>
-          </a:p>
-        </p:txBody>
-      </p:sp>
-      <p:sp>
-        <p:nvSpPr>
-          <p:cNvPr id="63" name="Flowchart: Decision 96"/>
-          <p:cNvSpPr/>
-          <p:nvPr/>
-        </p:nvSpPr>
-        <p:spPr>
-          <a:xfrm>
-            <a:off x="5918460" y="2941065"/>
-            <a:ext cx="236048" cy="173380"/>
-          </a:xfrm>
-          <a:prstGeom prst="flowChartDecision">
-            <a:avLst/>
-          </a:prstGeom>
-          <a:noFill/>
-          <a:ln w="19050">
-            <a:solidFill>
-              <a:srgbClr val="7030A0"/>
-            </a:solidFill>
-          </a:ln>
-          <a:effectLst/>
-        </p:spPr>
-        <p:style>
-          <a:lnRef idx="1">
-            <a:schemeClr val="accent6"/>
-          </a:lnRef>
-          <a:fillRef idx="2">
-            <a:schemeClr val="accent6"/>
-          </a:fillRef>
-          <a:effectRef idx="1">
-            <a:schemeClr val="accent6"/>
-          </a:effectRef>
-          <a:fontRef idx="minor">
-            <a:schemeClr val="dk1"/>
-          </a:fontRef>
-        </p:style>
-        <p:txBody>
-          <a:bodyPr rtlCol="0" anchor="ctr"/>
-          <a:lstStyle/>
-          <a:p>
-            <a:pPr algn="ctr"/>
-            <a:endParaRPr lang="en-US" sz="1050"/>
-          </a:p>
-        </p:txBody>
-      </p:sp>
-      <p:cxnSp>
-        <p:nvCxnSpPr>
-          <p:cNvPr id="64" name="Elbow Connector 63"/>
-          <p:cNvCxnSpPr>
-            <a:cxnSpLocks/>
-            <a:stCxn id="63" idx="3"/>
-            <a:endCxn id="62" idx="1"/>
-          </p:cNvCxnSpPr>
-          <p:nvPr/>
-        </p:nvCxnSpPr>
-        <p:spPr>
-          <a:xfrm>
-            <a:off x="6154508" y="3027755"/>
-            <a:ext cx="159169" cy="3691"/>
-          </a:xfrm>
-          <a:prstGeom prst="bentConnector3">
-            <a:avLst/>
-          </a:prstGeom>
-          <a:ln w="19050">
-            <a:solidFill>
-              <a:srgbClr val="7030A0"/>
-            </a:solidFill>
-            <a:headEnd type="none" w="med" len="med"/>
-            <a:tailEnd type="arrow" w="med" len="med"/>
-          </a:ln>
-          <a:effectLst/>
-        </p:spPr>
-        <p:style>
-          <a:lnRef idx="1">
-            <a:schemeClr val="accent2"/>
-          </a:lnRef>
-          <a:fillRef idx="2">
-            <a:schemeClr val="accent2"/>
-          </a:fillRef>
-          <a:effectRef idx="1">
-            <a:schemeClr val="accent2"/>
-          </a:effectRef>
-          <a:fontRef idx="minor">
-            <a:schemeClr val="dk1"/>
-          </a:fontRef>
-        </p:style>
-      </p:cxnSp>
-      <p:sp>
-        <p:nvSpPr>
-          <p:cNvPr id="78" name="Flowchart: Decision 96"/>
-          <p:cNvSpPr/>
-          <p:nvPr/>
-        </p:nvSpPr>
-        <p:spPr>
-          <a:xfrm>
-            <a:off x="7041947" y="2948201"/>
-            <a:ext cx="236048" cy="173380"/>
-          </a:xfrm>
-          <a:prstGeom prst="flowChartDecision">
-            <a:avLst/>
-          </a:prstGeom>
-          <a:solidFill>
-            <a:srgbClr val="7030A0"/>
-          </a:solidFill>
-          <a:ln w="19050">
-            <a:solidFill>
-              <a:srgbClr val="7030A0"/>
-            </a:solidFill>
-          </a:ln>
-          <a:effectLst/>
-        </p:spPr>
-        <p:style>
-          <a:lnRef idx="1">
-            <a:schemeClr val="accent6"/>
-          </a:lnRef>
-          <a:fillRef idx="2">
-            <a:schemeClr val="accent6"/>
-          </a:fillRef>
-          <a:effectRef idx="1">
-            <a:schemeClr val="accent6"/>
-          </a:effectRef>
-          <a:fontRef idx="minor">
-            <a:schemeClr val="dk1"/>
-          </a:fontRef>
-        </p:style>
-        <p:txBody>
-          <a:bodyPr rtlCol="0" anchor="ctr"/>
-          <a:lstStyle/>
-          <a:p>
-            <a:pPr algn="ctr"/>
-            <a:endParaRPr lang="en-US" sz="1050"/>
-          </a:p>
-        </p:txBody>
-      </p:sp>
-      <p:sp>
-        <p:nvSpPr>
-          <p:cNvPr id="114" name="TextBox 113"/>
-          <p:cNvSpPr txBox="1"/>
-          <p:nvPr/>
-        </p:nvSpPr>
-        <p:spPr>
-          <a:xfrm rot="16200000">
-            <a:off x="6362886" y="3586305"/>
-            <a:ext cx="881018" cy="261610"/>
-          </a:xfrm>
-          <a:prstGeom prst="rect">
-            <a:avLst/>
-          </a:prstGeom>
-          <a:noFill/>
-        </p:spPr>
-        <p:txBody>
-          <a:bodyPr wrap="square" rtlCol="0">
-            <a:spAutoFit/>
-          </a:bodyPr>
-          <a:lstStyle/>
-          <a:p>
-            <a:pPr algn="r"/>
-            <a:r>
-              <a:rPr lang="en-US" sz="1100" dirty="0">
-                <a:solidFill>
-                  <a:srgbClr val="7030A0"/>
-                </a:solidFill>
-              </a:rPr>
-              <a:t>filtered list</a:t>
-            </a:r>
-            <a:endParaRPr lang="en-SG" sz="1100" dirty="0">
-              <a:solidFill>
-                <a:srgbClr val="7030A0"/>
-              </a:solidFill>
-            </a:endParaRPr>
-          </a:p>
-        </p:txBody>
-      </p:sp>
-      <p:sp>
-        <p:nvSpPr>
-          <p:cNvPr id="122" name="Rectangle 8"/>
-          <p:cNvSpPr/>
-          <p:nvPr/>
-        </p:nvSpPr>
-        <p:spPr>
-          <a:xfrm>
-            <a:off x="2057401" y="4239491"/>
-            <a:ext cx="1066800" cy="346760"/>
-          </a:xfrm>
-          <a:prstGeom prst="rect">
-            <a:avLst/>
-          </a:prstGeom>
-          <a:ln w="19050">
-            <a:solidFill>
-              <a:srgbClr val="7030A0"/>
-            </a:solidFill>
-          </a:ln>
-          <a:effectLst/>
-        </p:spPr>
-        <p:style>
-          <a:lnRef idx="1">
-            <a:schemeClr val="accent4"/>
-          </a:lnRef>
-          <a:fillRef idx="2">
-            <a:schemeClr val="accent4"/>
-          </a:fillRef>
-          <a:effectRef idx="1">
-            <a:schemeClr val="accent4"/>
-          </a:effectRef>
-          <a:fontRef idx="minor">
-            <a:schemeClr val="dk1"/>
-          </a:fontRef>
-        </p:style>
-        <p:txBody>
-          <a:bodyPr rtlCol="0" anchor="ctr"/>
-          <a:lstStyle/>
-          <a:p>
-            <a:pPr algn="ctr"/>
-            <a:r>
-              <a:rPr lang="en-US" sz="1050" dirty="0">
-                <a:solidFill>
-                  <a:srgbClr val="7030A0"/>
-                </a:solidFill>
-              </a:rPr>
-              <a:t>&lt;&lt;interface&gt;&gt;</a:t>
-            </a:r>
-            <a:br>
-              <a:rPr lang="en-US" sz="1050">
-                <a:solidFill>
-                  <a:srgbClr val="7030A0"/>
-                </a:solidFill>
-              </a:rPr>
-            </a:br>
-            <a:r>
-              <a:rPr lang="en-US" sz="1050" dirty="0" err="1">
-                <a:solidFill>
-                  <a:srgbClr val="7030A0"/>
-                </a:solidFill>
-              </a:rPr>
-              <a:t>ObservableList</a:t>
-            </a:r>
-            <a:endParaRPr lang="en-SG" sz="1050" dirty="0">
-              <a:solidFill>
-                <a:srgbClr val="7030A0"/>
-              </a:solidFill>
-            </a:endParaRPr>
-          </a:p>
-        </p:txBody>
-      </p:sp>
-      <p:cxnSp>
-        <p:nvCxnSpPr>
-          <p:cNvPr id="124" name="Elbow Connector 122"/>
-          <p:cNvCxnSpPr>
-            <a:stCxn id="119" idx="1"/>
-            <a:endCxn id="122" idx="1"/>
-          </p:cNvCxnSpPr>
-          <p:nvPr/>
-        </p:nvCxnSpPr>
-        <p:spPr>
-          <a:xfrm rot="16200000" flipH="1">
-            <a:off x="1364475" y="3719944"/>
-            <a:ext cx="831471" cy="554381"/>
-          </a:xfrm>
-          <a:prstGeom prst="bentConnector2">
-            <a:avLst/>
-          </a:prstGeom>
-          <a:ln w="19050">
-            <a:solidFill>
-              <a:srgbClr val="7030A0"/>
-            </a:solidFill>
-            <a:prstDash val="sysDot"/>
-            <a:headEnd type="none" w="med" len="med"/>
-            <a:tailEnd type="arrow" w="med" len="med"/>
-          </a:ln>
-          <a:effectLst/>
-        </p:spPr>
-        <p:style>
-          <a:lnRef idx="1">
-            <a:schemeClr val="accent2"/>
-          </a:lnRef>
-          <a:fillRef idx="2">
-            <a:schemeClr val="accent2"/>
-          </a:fillRef>
-          <a:effectRef idx="1">
-            <a:schemeClr val="accent2"/>
-          </a:effectRef>
-          <a:fontRef idx="minor">
-            <a:schemeClr val="dk1"/>
-          </a:fontRef>
-        </p:style>
-      </p:cxnSp>
-      <p:sp>
-        <p:nvSpPr>
-          <p:cNvPr id="54" name="TextBox 53"/>
-          <p:cNvSpPr txBox="1"/>
-          <p:nvPr/>
-        </p:nvSpPr>
-        <p:spPr>
-          <a:xfrm>
-            <a:off x="4324972" y="3058864"/>
-            <a:ext cx="189257" cy="178683"/>
-          </a:xfrm>
-          <a:prstGeom prst="rect">
-            <a:avLst/>
-          </a:prstGeom>
-          <a:noFill/>
-        </p:spPr>
-        <p:txBody>
-          <a:bodyPr wrap="square" lIns="0" tIns="0" rIns="0" bIns="0" rtlCol="0">
-            <a:noAutofit/>
-          </a:bodyPr>
-          <a:lstStyle/>
-          <a:p>
-            <a:pPr algn="ctr"/>
-            <a:r>
-              <a:rPr lang="en-US" sz="1100" dirty="0">
-                <a:solidFill>
-                  <a:srgbClr val="7030A0"/>
-                </a:solidFill>
-              </a:rPr>
-              <a:t>1</a:t>
-            </a:r>
-            <a:endParaRPr lang="en-SG" sz="1100" dirty="0">
-              <a:solidFill>
-                <a:srgbClr val="7030A0"/>
-              </a:solidFill>
-            </a:endParaRPr>
-          </a:p>
-        </p:txBody>
-      </p:sp>
-      <p:sp>
-        <p:nvSpPr>
-          <p:cNvPr id="61" name="TextBox 60"/>
-          <p:cNvSpPr txBox="1"/>
-          <p:nvPr/>
-        </p:nvSpPr>
-        <p:spPr>
-          <a:xfrm>
-            <a:off x="6135256" y="3097917"/>
-            <a:ext cx="189257" cy="178683"/>
-          </a:xfrm>
-          <a:prstGeom prst="rect">
-            <a:avLst/>
-          </a:prstGeom>
-          <a:noFill/>
-        </p:spPr>
-        <p:txBody>
-          <a:bodyPr wrap="square" lIns="0" tIns="0" rIns="0" bIns="0" rtlCol="0">
-            <a:noAutofit/>
-          </a:bodyPr>
-          <a:lstStyle/>
-          <a:p>
-            <a:pPr algn="ctr"/>
-            <a:r>
-              <a:rPr lang="en-US" sz="1100" dirty="0">
-                <a:solidFill>
-                  <a:srgbClr val="7030A0"/>
-                </a:solidFill>
-              </a:rPr>
-              <a:t>*</a:t>
-            </a:r>
-            <a:endParaRPr lang="en-SG" sz="1100" dirty="0">
-              <a:solidFill>
-                <a:srgbClr val="7030A0"/>
-              </a:solidFill>
-            </a:endParaRPr>
-          </a:p>
-        </p:txBody>
-      </p:sp>
-      <p:sp>
-        <p:nvSpPr>
-          <p:cNvPr id="65" name="TextBox 64"/>
-          <p:cNvSpPr txBox="1"/>
-          <p:nvPr/>
-        </p:nvSpPr>
-        <p:spPr>
-          <a:xfrm>
-            <a:off x="2560167" y="2753818"/>
-            <a:ext cx="78378" cy="193767"/>
-          </a:xfrm>
-          <a:prstGeom prst="rect">
-            <a:avLst/>
-          </a:prstGeom>
-          <a:noFill/>
-        </p:spPr>
-        <p:txBody>
-          <a:bodyPr wrap="square" lIns="0" tIns="0" rIns="0" bIns="0" rtlCol="0">
-            <a:noAutofit/>
-          </a:bodyPr>
-          <a:lstStyle/>
-          <a:p>
-            <a:pPr algn="ctr"/>
-            <a:r>
-              <a:rPr lang="en-US" sz="1100" dirty="0">
-                <a:solidFill>
-                  <a:srgbClr val="7030A0"/>
-                </a:solidFill>
-              </a:rPr>
-              <a:t>1</a:t>
-            </a:r>
-            <a:endParaRPr lang="en-SG" sz="1100" dirty="0">
-              <a:solidFill>
-                <a:srgbClr val="7030A0"/>
-              </a:solidFill>
-            </a:endParaRPr>
-          </a:p>
-        </p:txBody>
-      </p:sp>
-      <p:sp>
-        <p:nvSpPr>
-          <p:cNvPr id="66" name="TextBox 65"/>
-          <p:cNvSpPr txBox="1"/>
-          <p:nvPr/>
-        </p:nvSpPr>
-        <p:spPr>
-          <a:xfrm>
-            <a:off x="2707070" y="3667737"/>
-            <a:ext cx="189257" cy="178683"/>
-          </a:xfrm>
-          <a:prstGeom prst="rect">
-            <a:avLst/>
-          </a:prstGeom>
-          <a:noFill/>
-        </p:spPr>
-        <p:txBody>
-          <a:bodyPr wrap="square" lIns="0" tIns="0" rIns="0" bIns="0" rtlCol="0">
-            <a:noAutofit/>
-          </a:bodyPr>
-          <a:lstStyle/>
-          <a:p>
-            <a:pPr algn="ctr"/>
-            <a:r>
-              <a:rPr lang="en-US" sz="1100" dirty="0">
-                <a:solidFill>
-                  <a:srgbClr val="7030A0"/>
-                </a:solidFill>
-              </a:rPr>
-              <a:t>1</a:t>
-            </a:r>
-            <a:endParaRPr lang="en-SG" sz="1100" dirty="0">
-              <a:solidFill>
-                <a:srgbClr val="7030A0"/>
-              </a:solidFill>
-            </a:endParaRPr>
-          </a:p>
-        </p:txBody>
-      </p:sp>
-      <p:sp>
-        <p:nvSpPr>
-          <p:cNvPr id="70" name="TextBox 69"/>
-          <p:cNvSpPr txBox="1"/>
-          <p:nvPr/>
-        </p:nvSpPr>
-        <p:spPr>
-          <a:xfrm>
-            <a:off x="6449896" y="3204826"/>
-            <a:ext cx="189257" cy="178683"/>
-          </a:xfrm>
-          <a:prstGeom prst="rect">
-            <a:avLst/>
-          </a:prstGeom>
-          <a:noFill/>
-        </p:spPr>
-        <p:txBody>
-          <a:bodyPr wrap="square" lIns="0" tIns="0" rIns="0" bIns="0" rtlCol="0">
-            <a:noAutofit/>
-          </a:bodyPr>
-          <a:lstStyle/>
-          <a:p>
-            <a:pPr algn="ctr"/>
-            <a:r>
-              <a:rPr lang="en-US" sz="1100" dirty="0">
-                <a:solidFill>
-                  <a:srgbClr val="7030A0"/>
-                </a:solidFill>
-              </a:rPr>
-              <a:t>1</a:t>
-            </a:r>
-            <a:endParaRPr lang="en-SG" sz="1100" dirty="0">
-              <a:solidFill>
-                <a:srgbClr val="7030A0"/>
-              </a:solidFill>
-            </a:endParaRPr>
-          </a:p>
-        </p:txBody>
-      </p:sp>
-      <p:sp>
-        <p:nvSpPr>
-          <p:cNvPr id="52" name="Rectangle 8">
-            <a:extLst>
-              <a:ext uri="{FF2B5EF4-FFF2-40B4-BE49-F238E27FC236}">
-                <a16:creationId xmlns:a16="http://schemas.microsoft.com/office/drawing/2014/main" id="{ABDCDBD2-131A-4B66-A2F2-43BBEE82C773}"/>
-              </a:ext>
-            </a:extLst>
-          </p:cNvPr>
-          <p:cNvSpPr/>
-          <p:nvPr/>
-        </p:nvSpPr>
-        <p:spPr>
-          <a:xfrm>
-            <a:off x="4755872" y="2206861"/>
-            <a:ext cx="1156969" cy="285783"/>
-          </a:xfrm>
-          <a:prstGeom prst="rect">
-            <a:avLst/>
-          </a:prstGeom>
-          <a:ln w="19050">
-            <a:solidFill>
-              <a:srgbClr val="7030A0"/>
-            </a:solidFill>
-          </a:ln>
-          <a:effectLst/>
-        </p:spPr>
-        <p:style>
-          <a:lnRef idx="1">
-            <a:schemeClr val="accent4"/>
-          </a:lnRef>
-          <a:fillRef idx="2">
-            <a:schemeClr val="accent4"/>
-          </a:fillRef>
-          <a:effectRef idx="1">
-            <a:schemeClr val="accent4"/>
-          </a:effectRef>
-          <a:fontRef idx="minor">
-            <a:schemeClr val="dk1"/>
-          </a:fontRef>
-        </p:style>
-        <p:txBody>
-          <a:bodyPr rtlCol="0" anchor="ctr"/>
-          <a:lstStyle/>
-          <a:p>
-            <a:pPr algn="ctr"/>
-            <a:r>
-              <a:rPr lang="en-US" sz="1050" dirty="0" err="1">
-                <a:solidFill>
-                  <a:srgbClr val="7030A0"/>
-                </a:solidFill>
-              </a:rPr>
-              <a:t>UniqueTagList</a:t>
-            </a:r>
-            <a:endParaRPr lang="en-SG" sz="1050" dirty="0">
-              <a:solidFill>
-                <a:srgbClr val="7030A0"/>
-              </a:solidFill>
-            </a:endParaRPr>
-          </a:p>
-        </p:txBody>
-      </p:sp>
-      <p:cxnSp>
-        <p:nvCxnSpPr>
-          <p:cNvPr id="53" name="Elbow Connector 78">
-            <a:extLst>
-              <a:ext uri="{FF2B5EF4-FFF2-40B4-BE49-F238E27FC236}">
-                <a16:creationId xmlns:a16="http://schemas.microsoft.com/office/drawing/2014/main" id="{B97967F8-618A-448B-81FD-CDFD4AF0EC64}"/>
-              </a:ext>
-            </a:extLst>
-          </p:cNvPr>
-          <p:cNvCxnSpPr>
-            <a:cxnSpLocks/>
-            <a:stCxn id="54" idx="0"/>
-            <a:endCxn id="52" idx="1"/>
-          </p:cNvCxnSpPr>
-          <p:nvPr/>
-        </p:nvCxnSpPr>
-        <p:spPr>
-          <a:xfrm rot="5400000" flipH="1" flipV="1">
-            <a:off x="4233181" y="2536174"/>
-            <a:ext cx="709111" cy="336271"/>
-          </a:xfrm>
-          <a:prstGeom prst="bentConnector2">
-            <a:avLst/>
-          </a:prstGeom>
-          <a:ln w="19050">
-            <a:solidFill>
-              <a:srgbClr val="7030A0"/>
-            </a:solidFill>
-            <a:headEnd type="none" w="med" len="med"/>
-            <a:tailEnd type="arrow" w="med" len="med"/>
-          </a:ln>
-          <a:effectLst/>
-        </p:spPr>
-        <p:style>
-          <a:lnRef idx="1">
-            <a:schemeClr val="accent2"/>
-          </a:lnRef>
-          <a:fillRef idx="2">
-            <a:schemeClr val="accent2"/>
-          </a:fillRef>
-          <a:effectRef idx="1">
-            <a:schemeClr val="accent2"/>
-          </a:effectRef>
-          <a:fontRef idx="minor">
-            <a:schemeClr val="dk1"/>
-          </a:fontRef>
-        </p:style>
-      </p:cxnSp>
-      <p:sp>
-        <p:nvSpPr>
-          <p:cNvPr id="50" name="TextBox 49">
-            <a:extLst>
-              <a:ext uri="{FF2B5EF4-FFF2-40B4-BE49-F238E27FC236}">
-                <a16:creationId xmlns:a16="http://schemas.microsoft.com/office/drawing/2014/main" id="{B3FA9D57-880F-49C4-AD0B-A64E30D6F403}"/>
-              </a:ext>
-            </a:extLst>
-          </p:cNvPr>
-          <p:cNvSpPr txBox="1"/>
-          <p:nvPr/>
-        </p:nvSpPr>
-        <p:spPr>
-          <a:xfrm>
-            <a:off x="6714344" y="2430721"/>
-            <a:ext cx="189257" cy="178683"/>
-          </a:xfrm>
-          <a:prstGeom prst="rect">
-            <a:avLst/>
-          </a:prstGeom>
-          <a:noFill/>
-        </p:spPr>
-        <p:txBody>
-          <a:bodyPr wrap="square" lIns="0" tIns="0" rIns="0" bIns="0" rtlCol="0">
-            <a:noAutofit/>
-          </a:bodyPr>
-          <a:lstStyle/>
-          <a:p>
-            <a:pPr algn="ctr"/>
-            <a:r>
-              <a:rPr lang="en-US" sz="1100" dirty="0">
-                <a:solidFill>
-                  <a:srgbClr val="7030A0"/>
-                </a:solidFill>
-              </a:rPr>
-              <a:t>*</a:t>
-            </a:r>
-            <a:endParaRPr lang="en-SG" sz="1100" dirty="0">
-              <a:solidFill>
-                <a:srgbClr val="7030A0"/>
-              </a:solidFill>
-            </a:endParaRPr>
-          </a:p>
-        </p:txBody>
-      </p:sp>
-      <p:sp>
-        <p:nvSpPr>
-          <p:cNvPr id="55" name="Flowchart: Decision 96">
-            <a:extLst>
-              <a:ext uri="{FF2B5EF4-FFF2-40B4-BE49-F238E27FC236}">
-                <a16:creationId xmlns:a16="http://schemas.microsoft.com/office/drawing/2014/main" id="{B9F96195-942D-4692-91B7-CF34229E7461}"/>
-              </a:ext>
-            </a:extLst>
-          </p:cNvPr>
-          <p:cNvSpPr/>
-          <p:nvPr/>
-        </p:nvSpPr>
-        <p:spPr>
-          <a:xfrm rot="16200000">
-            <a:off x="6553482" y="2664721"/>
-            <a:ext cx="236048" cy="173380"/>
-          </a:xfrm>
-          <a:prstGeom prst="flowChartDecision">
-            <a:avLst/>
-          </a:prstGeom>
-          <a:noFill/>
-          <a:ln w="19050">
-            <a:solidFill>
-              <a:srgbClr val="7030A0"/>
-            </a:solidFill>
-          </a:ln>
-          <a:effectLst/>
-        </p:spPr>
-        <p:style>
-          <a:lnRef idx="1">
-            <a:schemeClr val="accent6"/>
-          </a:lnRef>
-          <a:fillRef idx="2">
-            <a:schemeClr val="accent6"/>
-          </a:fillRef>
-          <a:effectRef idx="1">
-            <a:schemeClr val="accent6"/>
-          </a:effectRef>
-          <a:fontRef idx="minor">
-            <a:schemeClr val="dk1"/>
-          </a:fontRef>
-        </p:style>
-        <p:txBody>
-          <a:bodyPr rtlCol="0" anchor="ctr"/>
-          <a:lstStyle/>
-          <a:p>
-            <a:pPr algn="ctr"/>
-            <a:endParaRPr lang="en-US" sz="1050"/>
-          </a:p>
-        </p:txBody>
-      </p:sp>
-      <p:cxnSp>
-        <p:nvCxnSpPr>
-          <p:cNvPr id="59" name="Elbow Connector 63">
-            <a:extLst>
-              <a:ext uri="{FF2B5EF4-FFF2-40B4-BE49-F238E27FC236}">
-                <a16:creationId xmlns:a16="http://schemas.microsoft.com/office/drawing/2014/main" id="{E2D6A56C-A223-4236-A1F0-7EFEBA2FC940}"/>
-              </a:ext>
-            </a:extLst>
-          </p:cNvPr>
-          <p:cNvCxnSpPr>
-            <a:cxnSpLocks/>
-            <a:endCxn id="67" idx="1"/>
-          </p:cNvCxnSpPr>
-          <p:nvPr/>
-        </p:nvCxnSpPr>
-        <p:spPr>
-          <a:xfrm flipV="1">
-            <a:off x="5884280" y="2233006"/>
-            <a:ext cx="432916" cy="111294"/>
-          </a:xfrm>
-          <a:prstGeom prst="bentConnector3">
-            <a:avLst/>
-          </a:prstGeom>
-          <a:ln w="19050">
-            <a:solidFill>
-              <a:srgbClr val="7030A0"/>
-            </a:solidFill>
-            <a:headEnd type="none" w="med" len="med"/>
-            <a:tailEnd type="arrow" w="med" len="med"/>
-          </a:ln>
-          <a:effectLst/>
-        </p:spPr>
-        <p:style>
-          <a:lnRef idx="1">
-            <a:schemeClr val="accent2"/>
-          </a:lnRef>
-          <a:fillRef idx="2">
-            <a:schemeClr val="accent2"/>
-          </a:fillRef>
-          <a:effectRef idx="1">
-            <a:schemeClr val="accent2"/>
-          </a:effectRef>
-          <a:fontRef idx="minor">
-            <a:schemeClr val="dk1"/>
-          </a:fontRef>
-        </p:style>
-      </p:cxnSp>
-      <p:sp>
-        <p:nvSpPr>
-          <p:cNvPr id="67" name="Rectangle 8">
-            <a:extLst>
-              <a:ext uri="{FF2B5EF4-FFF2-40B4-BE49-F238E27FC236}">
-                <a16:creationId xmlns:a16="http://schemas.microsoft.com/office/drawing/2014/main" id="{36D68104-33BB-4C8F-B764-F3F0B25E592B}"/>
-              </a:ext>
-            </a:extLst>
-          </p:cNvPr>
-          <p:cNvSpPr/>
-          <p:nvPr/>
-        </p:nvSpPr>
-        <p:spPr>
-          <a:xfrm>
-            <a:off x="6317196" y="2059626"/>
-            <a:ext cx="708186" cy="346760"/>
-          </a:xfrm>
-          <a:prstGeom prst="rect">
-            <a:avLst/>
-          </a:prstGeom>
-          <a:ln w="19050">
-            <a:solidFill>
-              <a:srgbClr val="7030A0"/>
-            </a:solidFill>
-          </a:ln>
-          <a:effectLst/>
-        </p:spPr>
-        <p:style>
-          <a:lnRef idx="1">
-            <a:schemeClr val="accent4"/>
-          </a:lnRef>
-          <a:fillRef idx="2">
-            <a:schemeClr val="accent4"/>
-          </a:fillRef>
-          <a:effectRef idx="1">
-            <a:schemeClr val="accent4"/>
-          </a:effectRef>
-          <a:fontRef idx="minor">
-            <a:schemeClr val="dk1"/>
-          </a:fontRef>
-        </p:style>
-        <p:txBody>
-          <a:bodyPr rtlCol="0" anchor="ctr"/>
-          <a:lstStyle/>
-          <a:p>
-            <a:pPr algn="ctr"/>
-            <a:r>
-              <a:rPr lang="en-US" sz="1050" dirty="0">
-                <a:solidFill>
-                  <a:srgbClr val="7030A0"/>
-                </a:solidFill>
-              </a:rPr>
-              <a:t>Tag</a:t>
-            </a:r>
-            <a:endParaRPr lang="en-SG" sz="1050" dirty="0">
-              <a:solidFill>
-                <a:srgbClr val="7030A0"/>
-              </a:solidFill>
-            </a:endParaRPr>
-          </a:p>
-        </p:txBody>
-      </p:sp>
-      <p:sp>
-        <p:nvSpPr>
-          <p:cNvPr id="68" name="TextBox 67">
-            <a:extLst>
-              <a:ext uri="{FF2B5EF4-FFF2-40B4-BE49-F238E27FC236}">
-                <a16:creationId xmlns:a16="http://schemas.microsoft.com/office/drawing/2014/main" id="{18A2ABF0-4DA8-43EE-BACE-A737C4E4CFEC}"/>
-              </a:ext>
-            </a:extLst>
-          </p:cNvPr>
-          <p:cNvSpPr txBox="1"/>
-          <p:nvPr/>
-        </p:nvSpPr>
-        <p:spPr>
-          <a:xfrm>
-            <a:off x="6135256" y="2278014"/>
-            <a:ext cx="189257" cy="178683"/>
-          </a:xfrm>
-          <a:prstGeom prst="rect">
-            <a:avLst/>
-          </a:prstGeom>
-          <a:noFill/>
-        </p:spPr>
-        <p:txBody>
-          <a:bodyPr wrap="square" lIns="0" tIns="0" rIns="0" bIns="0" rtlCol="0">
-            <a:noAutofit/>
-          </a:bodyPr>
-          <a:lstStyle/>
-          <a:p>
-            <a:pPr algn="ctr"/>
-            <a:r>
-              <a:rPr lang="en-US" sz="1100" dirty="0">
-                <a:solidFill>
-                  <a:srgbClr val="7030A0"/>
-                </a:solidFill>
-              </a:rPr>
-              <a:t>*</a:t>
-            </a:r>
-            <a:endParaRPr lang="en-SG" sz="1100" dirty="0">
-              <a:solidFill>
-                <a:srgbClr val="7030A0"/>
-              </a:solidFill>
-            </a:endParaRPr>
-          </a:p>
-        </p:txBody>
-      </p:sp>
-      <p:sp>
-        <p:nvSpPr>
-          <p:cNvPr id="69" name="TextBox 68">
-            <a:extLst>
-              <a:ext uri="{FF2B5EF4-FFF2-40B4-BE49-F238E27FC236}">
-                <a16:creationId xmlns:a16="http://schemas.microsoft.com/office/drawing/2014/main" id="{8CF9406A-39C7-4163-8880-BB65541FC08E}"/>
-              </a:ext>
-            </a:extLst>
-          </p:cNvPr>
-          <p:cNvSpPr txBox="1"/>
-          <p:nvPr/>
-        </p:nvSpPr>
-        <p:spPr>
-          <a:xfrm>
-            <a:off x="4367100" y="2172972"/>
-            <a:ext cx="189257" cy="178683"/>
-          </a:xfrm>
-          <a:prstGeom prst="rect">
-            <a:avLst/>
-          </a:prstGeom>
-          <a:noFill/>
-        </p:spPr>
-        <p:txBody>
-          <a:bodyPr wrap="square" lIns="0" tIns="0" rIns="0" bIns="0" rtlCol="0">
-            <a:noAutofit/>
-          </a:bodyPr>
-          <a:lstStyle/>
-          <a:p>
-            <a:pPr algn="ctr"/>
-            <a:r>
-              <a:rPr lang="en-US" sz="1100" dirty="0">
-                <a:solidFill>
-                  <a:srgbClr val="7030A0"/>
-                </a:solidFill>
-              </a:rPr>
-              <a:t>1</a:t>
-            </a:r>
-            <a:endParaRPr lang="en-SG" sz="1100" dirty="0">
-              <a:solidFill>
-                <a:srgbClr val="7030A0"/>
-              </a:solidFill>
-            </a:endParaRPr>
-          </a:p>
-        </p:txBody>
-      </p:sp>
-      <p:sp>
-        <p:nvSpPr>
-          <p:cNvPr id="71" name="Flowchart: Decision 96">
-            <a:extLst>
-              <a:ext uri="{FF2B5EF4-FFF2-40B4-BE49-F238E27FC236}">
-                <a16:creationId xmlns:a16="http://schemas.microsoft.com/office/drawing/2014/main" id="{233007D4-EEA2-4CA6-ACFE-1517B654224E}"/>
-              </a:ext>
-            </a:extLst>
-          </p:cNvPr>
-          <p:cNvSpPr/>
-          <p:nvPr/>
-        </p:nvSpPr>
-        <p:spPr>
-          <a:xfrm>
-            <a:off x="5911329" y="2262081"/>
-            <a:ext cx="236048" cy="173380"/>
-          </a:xfrm>
-          <a:prstGeom prst="flowChartDecision">
-            <a:avLst/>
-          </a:prstGeom>
-          <a:solidFill>
-            <a:srgbClr val="7030A0"/>
-          </a:solidFill>
-          <a:ln w="19050">
-            <a:solidFill>
-              <a:srgbClr val="7030A0"/>
-            </a:solidFill>
-          </a:ln>
-          <a:effectLst/>
-        </p:spPr>
-        <p:style>
-          <a:lnRef idx="1">
-            <a:schemeClr val="accent6"/>
-          </a:lnRef>
-          <a:fillRef idx="2">
-            <a:schemeClr val="accent6"/>
-          </a:fillRef>
-          <a:effectRef idx="1">
-            <a:schemeClr val="accent6"/>
-          </a:effectRef>
-          <a:fontRef idx="minor">
-            <a:schemeClr val="dk1"/>
-          </a:fontRef>
-        </p:style>
-        <p:txBody>
-          <a:bodyPr rtlCol="0" anchor="ctr"/>
-          <a:lstStyle/>
-          <a:p>
-            <a:pPr algn="ctr"/>
-            <a:endParaRPr lang="en-US" sz="1050"/>
           </a:p>
         </p:txBody>
       </p:sp>
@@ -5593,252 +4871,6 @@
           </a:effectRef>
           <a:fontRef idx="minor">
             <a:schemeClr val="dk1"/>
-          </a:fontRef>
-        </p:style>
-      </p:cxnSp>
-      <p:cxnSp>
-        <p:nvCxnSpPr>
-          <p:cNvPr id="56" name="Straight Connector 55">
-            <a:extLst>
-              <a:ext uri="{FF2B5EF4-FFF2-40B4-BE49-F238E27FC236}">
-                <a16:creationId xmlns:a16="http://schemas.microsoft.com/office/drawing/2014/main" id="{5BE16AEA-8D04-4936-B134-3162110E0E2A}"/>
-              </a:ext>
-            </a:extLst>
-          </p:cNvPr>
-          <p:cNvCxnSpPr/>
-          <p:nvPr/>
-        </p:nvCxnSpPr>
-        <p:spPr>
-          <a:xfrm flipH="1">
-            <a:off x="1260922" y="4038600"/>
-            <a:ext cx="2301376" cy="547651"/>
-          </a:xfrm>
-          <a:prstGeom prst="line">
-            <a:avLst/>
-          </a:prstGeom>
-          <a:ln>
-            <a:solidFill>
-              <a:srgbClr val="FF0000"/>
-            </a:solidFill>
-          </a:ln>
-        </p:spPr>
-        <p:style>
-          <a:lnRef idx="1">
-            <a:schemeClr val="accent1"/>
-          </a:lnRef>
-          <a:fillRef idx="0">
-            <a:schemeClr val="accent1"/>
-          </a:fillRef>
-          <a:effectRef idx="0">
-            <a:schemeClr val="accent1"/>
-          </a:effectRef>
-          <a:fontRef idx="minor">
-            <a:schemeClr val="tx1"/>
-          </a:fontRef>
-        </p:style>
-      </p:cxnSp>
-      <p:cxnSp>
-        <p:nvCxnSpPr>
-          <p:cNvPr id="57" name="Straight Connector 56">
-            <a:extLst>
-              <a:ext uri="{FF2B5EF4-FFF2-40B4-BE49-F238E27FC236}">
-                <a16:creationId xmlns:a16="http://schemas.microsoft.com/office/drawing/2014/main" id="{16F6CE04-6B92-4D8A-B035-1DE268272BF8}"/>
-              </a:ext>
-            </a:extLst>
-          </p:cNvPr>
-          <p:cNvCxnSpPr/>
-          <p:nvPr/>
-        </p:nvCxnSpPr>
-        <p:spPr>
-          <a:xfrm>
-            <a:off x="1260922" y="3723310"/>
-            <a:ext cx="2091878" cy="924890"/>
-          </a:xfrm>
-          <a:prstGeom prst="line">
-            <a:avLst/>
-          </a:prstGeom>
-          <a:ln>
-            <a:solidFill>
-              <a:srgbClr val="FF0000"/>
-            </a:solidFill>
-          </a:ln>
-        </p:spPr>
-        <p:style>
-          <a:lnRef idx="1">
-            <a:schemeClr val="accent1"/>
-          </a:lnRef>
-          <a:fillRef idx="0">
-            <a:schemeClr val="accent1"/>
-          </a:fillRef>
-          <a:effectRef idx="0">
-            <a:schemeClr val="accent1"/>
-          </a:effectRef>
-          <a:fontRef idx="minor">
-            <a:schemeClr val="tx1"/>
-          </a:fontRef>
-        </p:style>
-      </p:cxnSp>
-      <p:cxnSp>
-        <p:nvCxnSpPr>
-          <p:cNvPr id="60" name="Straight Connector 59">
-            <a:extLst>
-              <a:ext uri="{FF2B5EF4-FFF2-40B4-BE49-F238E27FC236}">
-                <a16:creationId xmlns:a16="http://schemas.microsoft.com/office/drawing/2014/main" id="{CED94425-5A35-43DF-88F1-129C5093F067}"/>
-              </a:ext>
-            </a:extLst>
-          </p:cNvPr>
-          <p:cNvCxnSpPr/>
-          <p:nvPr/>
-        </p:nvCxnSpPr>
-        <p:spPr>
-          <a:xfrm flipV="1">
-            <a:off x="4324972" y="2706821"/>
-            <a:ext cx="1923428" cy="569779"/>
-          </a:xfrm>
-          <a:prstGeom prst="line">
-            <a:avLst/>
-          </a:prstGeom>
-          <a:ln>
-            <a:solidFill>
-              <a:srgbClr val="FF0000"/>
-            </a:solidFill>
-          </a:ln>
-        </p:spPr>
-        <p:style>
-          <a:lnRef idx="1">
-            <a:schemeClr val="accent1"/>
-          </a:lnRef>
-          <a:fillRef idx="0">
-            <a:schemeClr val="accent1"/>
-          </a:fillRef>
-          <a:effectRef idx="0">
-            <a:schemeClr val="accent1"/>
-          </a:effectRef>
-          <a:fontRef idx="minor">
-            <a:schemeClr val="tx1"/>
-          </a:fontRef>
-        </p:style>
-      </p:cxnSp>
-      <p:cxnSp>
-        <p:nvCxnSpPr>
-          <p:cNvPr id="73" name="Straight Connector 72">
-            <a:extLst>
-              <a:ext uri="{FF2B5EF4-FFF2-40B4-BE49-F238E27FC236}">
-                <a16:creationId xmlns:a16="http://schemas.microsoft.com/office/drawing/2014/main" id="{76B19419-1717-4E08-92A6-6D341519FE46}"/>
-              </a:ext>
-            </a:extLst>
-          </p:cNvPr>
-          <p:cNvCxnSpPr/>
-          <p:nvPr/>
-        </p:nvCxnSpPr>
-        <p:spPr>
-          <a:xfrm>
-            <a:off x="4315840" y="2724312"/>
-            <a:ext cx="1914045" cy="552288"/>
-          </a:xfrm>
-          <a:prstGeom prst="line">
-            <a:avLst/>
-          </a:prstGeom>
-          <a:ln>
-            <a:solidFill>
-              <a:srgbClr val="FF0000"/>
-            </a:solidFill>
-          </a:ln>
-        </p:spPr>
-        <p:style>
-          <a:lnRef idx="1">
-            <a:schemeClr val="accent1"/>
-          </a:lnRef>
-          <a:fillRef idx="0">
-            <a:schemeClr val="accent1"/>
-          </a:fillRef>
-          <a:effectRef idx="0">
-            <a:schemeClr val="accent1"/>
-          </a:effectRef>
-          <a:fontRef idx="minor">
-            <a:schemeClr val="tx1"/>
-          </a:fontRef>
-        </p:style>
-      </p:cxnSp>
-      <p:cxnSp>
-        <p:nvCxnSpPr>
-          <p:cNvPr id="74" name="Straight Connector 73">
-            <a:extLst>
-              <a:ext uri="{FF2B5EF4-FFF2-40B4-BE49-F238E27FC236}">
-                <a16:creationId xmlns:a16="http://schemas.microsoft.com/office/drawing/2014/main" id="{D32C1645-2633-4FDC-99D1-D3C0D6BDC40B}"/>
-              </a:ext>
-            </a:extLst>
-          </p:cNvPr>
-          <p:cNvCxnSpPr/>
-          <p:nvPr/>
-        </p:nvCxnSpPr>
-        <p:spPr>
-          <a:xfrm>
-            <a:off x="4338570" y="2032878"/>
-            <a:ext cx="1914045" cy="552288"/>
-          </a:xfrm>
-          <a:prstGeom prst="line">
-            <a:avLst/>
-          </a:prstGeom>
-          <a:ln>
-            <a:solidFill>
-              <a:srgbClr val="FF0000"/>
-            </a:solidFill>
-          </a:ln>
-        </p:spPr>
-        <p:style>
-          <a:lnRef idx="1">
-            <a:schemeClr val="accent1"/>
-          </a:lnRef>
-          <a:fillRef idx="0">
-            <a:schemeClr val="accent1"/>
-          </a:fillRef>
-          <a:effectRef idx="0">
-            <a:schemeClr val="accent1"/>
-          </a:effectRef>
-          <a:fontRef idx="minor">
-            <a:schemeClr val="tx1"/>
-          </a:fontRef>
-        </p:style>
-      </p:cxnSp>
-      <p:cxnSp>
-        <p:nvCxnSpPr>
-          <p:cNvPr id="82" name="Straight Connector 81">
-            <a:extLst>
-              <a:ext uri="{FF2B5EF4-FFF2-40B4-BE49-F238E27FC236}">
-                <a16:creationId xmlns:a16="http://schemas.microsoft.com/office/drawing/2014/main" id="{3B8BABFB-31B1-43BD-BC3D-25DBD37FEBDF}"/>
-              </a:ext>
-            </a:extLst>
-          </p:cNvPr>
-          <p:cNvCxnSpPr/>
-          <p:nvPr/>
-        </p:nvCxnSpPr>
-        <p:spPr>
-          <a:xfrm flipV="1">
-            <a:off x="4338570" y="1966407"/>
-            <a:ext cx="1923428" cy="569779"/>
-          </a:xfrm>
-          <a:prstGeom prst="line">
-            <a:avLst/>
-          </a:prstGeom>
-          <a:ln>
-            <a:solidFill>
-              <a:srgbClr val="FF0000"/>
-            </a:solidFill>
-          </a:ln>
-        </p:spPr>
-        <p:style>
-          <a:lnRef idx="1">
-            <a:schemeClr val="accent1"/>
-          </a:lnRef>
-          <a:fillRef idx="0">
-            <a:schemeClr val="accent1"/>
-          </a:fillRef>
-          <a:effectRef idx="0">
-            <a:schemeClr val="accent1"/>
-          </a:effectRef>
-          <a:fontRef idx="minor">
-            <a:schemeClr val="tx1"/>
           </a:fontRef>
         </p:style>
       </p:cxnSp>

</xml_diff>

<commit_message>
change addressbook to clinicio
</commit_message>
<xml_diff>
--- a/docs/diagrams/ModelComponentClassBetterOopDiagram.pptx
+++ b/docs/diagrams/ModelComponentClassBetterOopDiagram.pptx
@@ -208,7 +208,7 @@
           <a:p>
             <a:fld id="{F5CC4B3F-88C1-4FFA-B1B6-F41C21DC6924}" type="datetimeFigureOut">
               <a:rPr lang="en-US" smtClean="0"/>
-              <a:t>6/27/2018</a:t>
+              <a:t>11/12/2018</a:t>
             </a:fld>
             <a:endParaRPr lang="en-US"/>
           </a:p>
@@ -654,7 +654,7 @@
           <a:p>
             <a:fld id="{78C97017-6FC3-485B-9764-EAC9E56C1D49}" type="datetimeFigureOut">
               <a:rPr lang="en-US" smtClean="0"/>
-              <a:t>6/27/2018</a:t>
+              <a:t>11/12/2018</a:t>
             </a:fld>
             <a:endParaRPr lang="en-US"/>
           </a:p>
@@ -822,7 +822,7 @@
           <a:p>
             <a:fld id="{78C97017-6FC3-485B-9764-EAC9E56C1D49}" type="datetimeFigureOut">
               <a:rPr lang="en-US" smtClean="0"/>
-              <a:t>6/27/2018</a:t>
+              <a:t>11/12/2018</a:t>
             </a:fld>
             <a:endParaRPr lang="en-US"/>
           </a:p>
@@ -1000,7 +1000,7 @@
           <a:p>
             <a:fld id="{78C97017-6FC3-485B-9764-EAC9E56C1D49}" type="datetimeFigureOut">
               <a:rPr lang="en-US" smtClean="0"/>
-              <a:t>6/27/2018</a:t>
+              <a:t>11/12/2018</a:t>
             </a:fld>
             <a:endParaRPr lang="en-US"/>
           </a:p>
@@ -1168,7 +1168,7 @@
           <a:p>
             <a:fld id="{78C97017-6FC3-485B-9764-EAC9E56C1D49}" type="datetimeFigureOut">
               <a:rPr lang="en-US" smtClean="0"/>
-              <a:t>6/27/2018</a:t>
+              <a:t>11/12/2018</a:t>
             </a:fld>
             <a:endParaRPr lang="en-US"/>
           </a:p>
@@ -1413,7 +1413,7 @@
           <a:p>
             <a:fld id="{78C97017-6FC3-485B-9764-EAC9E56C1D49}" type="datetimeFigureOut">
               <a:rPr lang="en-US" smtClean="0"/>
-              <a:t>6/27/2018</a:t>
+              <a:t>11/12/2018</a:t>
             </a:fld>
             <a:endParaRPr lang="en-US"/>
           </a:p>
@@ -1698,7 +1698,7 @@
           <a:p>
             <a:fld id="{78C97017-6FC3-485B-9764-EAC9E56C1D49}" type="datetimeFigureOut">
               <a:rPr lang="en-US" smtClean="0"/>
-              <a:t>6/27/2018</a:t>
+              <a:t>11/12/2018</a:t>
             </a:fld>
             <a:endParaRPr lang="en-US"/>
           </a:p>
@@ -2117,7 +2117,7 @@
           <a:p>
             <a:fld id="{78C97017-6FC3-485B-9764-EAC9E56C1D49}" type="datetimeFigureOut">
               <a:rPr lang="en-US" smtClean="0"/>
-              <a:t>6/27/2018</a:t>
+              <a:t>11/12/2018</a:t>
             </a:fld>
             <a:endParaRPr lang="en-US"/>
           </a:p>
@@ -2234,7 +2234,7 @@
           <a:p>
             <a:fld id="{78C97017-6FC3-485B-9764-EAC9E56C1D49}" type="datetimeFigureOut">
               <a:rPr lang="en-US" smtClean="0"/>
-              <a:t>6/27/2018</a:t>
+              <a:t>11/12/2018</a:t>
             </a:fld>
             <a:endParaRPr lang="en-US"/>
           </a:p>
@@ -2329,7 +2329,7 @@
           <a:p>
             <a:fld id="{78C97017-6FC3-485B-9764-EAC9E56C1D49}" type="datetimeFigureOut">
               <a:rPr lang="en-US" smtClean="0"/>
-              <a:t>6/27/2018</a:t>
+              <a:t>11/12/2018</a:t>
             </a:fld>
             <a:endParaRPr lang="en-US"/>
           </a:p>
@@ -2604,7 +2604,7 @@
           <a:p>
             <a:fld id="{78C97017-6FC3-485B-9764-EAC9E56C1D49}" type="datetimeFigureOut">
               <a:rPr lang="en-US" smtClean="0"/>
-              <a:t>6/27/2018</a:t>
+              <a:t>11/12/2018</a:t>
             </a:fld>
             <a:endParaRPr lang="en-US"/>
           </a:p>
@@ -2856,7 +2856,7 @@
           <a:p>
             <a:fld id="{78C97017-6FC3-485B-9764-EAC9E56C1D49}" type="datetimeFigureOut">
               <a:rPr lang="en-US" smtClean="0"/>
-              <a:t>6/27/2018</a:t>
+              <a:t>11/12/2018</a:t>
             </a:fld>
             <a:endParaRPr lang="en-US"/>
           </a:p>
@@ -3067,7 +3067,7 @@
           <a:p>
             <a:fld id="{78C97017-6FC3-485B-9764-EAC9E56C1D49}" type="datetimeFigureOut">
               <a:rPr lang="en-US" smtClean="0"/>
-              <a:t>6/27/2018</a:t>
+              <a:t>11/12/2018</a:t>
             </a:fld>
             <a:endParaRPr lang="en-US"/>
           </a:p>
@@ -3992,12 +3992,12 @@
           <a:p>
             <a:pPr algn="ctr"/>
             <a:r>
-              <a:rPr lang="en-US" sz="1050" dirty="0" err="1" smtClean="0">
+              <a:rPr lang="en-US" sz="1050" dirty="0" err="1">
                 <a:solidFill>
                   <a:srgbClr val="7030A0"/>
                 </a:solidFill>
               </a:rPr>
-              <a:t>VersionedAddressBook</a:t>
+              <a:t>VersionedClinicIo</a:t>
             </a:r>
             <a:endParaRPr lang="en-SG" sz="1050" dirty="0">
               <a:solidFill>
@@ -4900,14 +4900,6 @@
                 </a:solidFill>
               </a:rPr>
               <a:t>&lt;&lt;interface&gt;&gt;</a:t>
-            </a:r>
-            <a:r>
-              <a:rPr lang="en-US" sz="1050">
-                <a:solidFill>
-                  <a:srgbClr val="7030A0"/>
-                </a:solidFill>
-              </a:rPr>
-              <a:t/>
             </a:r>
             <a:br>
               <a:rPr lang="en-US" sz="1050">
@@ -5829,7 +5821,7 @@
                   <a:srgbClr val="7030A0"/>
                 </a:solidFill>
               </a:rPr>
-              <a:t>ReadOnlyAddressBook</a:t>
+              <a:t>ReadOnlyClinicIo</a:t>
             </a:r>
             <a:endParaRPr lang="en-SG" sz="1050" dirty="0">
               <a:solidFill>
@@ -5885,7 +5877,7 @@
                   <a:srgbClr val="7030A0"/>
                 </a:solidFill>
               </a:rPr>
-              <a:t>AddressBook</a:t>
+              <a:t>ClinicIo</a:t>
             </a:r>
             <a:endParaRPr lang="en-SG" sz="1050" dirty="0">
               <a:solidFill>

</xml_diff>